<commit_message>
doc and ppt updated for "conclusion"
</commit_message>
<xml_diff>
--- a/docs/Quality of Care.pptx
+++ b/docs/Quality of Care.pptx
@@ -5,7 +5,7 @@
     <p:sldMasterId id="2147483746" r:id="rId1"/>
   </p:sldMasterIdLst>
   <p:notesMasterIdLst>
-    <p:notesMasterId r:id="rId21"/>
+    <p:notesMasterId r:id="rId23"/>
   </p:notesMasterIdLst>
   <p:sldIdLst>
     <p:sldId id="257" r:id="rId2"/>
@@ -21,12 +21,14 @@
     <p:sldId id="271" r:id="rId12"/>
     <p:sldId id="263" r:id="rId13"/>
     <p:sldId id="272" r:id="rId14"/>
-    <p:sldId id="273" r:id="rId15"/>
-    <p:sldId id="274" r:id="rId16"/>
-    <p:sldId id="264" r:id="rId17"/>
-    <p:sldId id="275" r:id="rId18"/>
-    <p:sldId id="276" r:id="rId19"/>
-    <p:sldId id="265" r:id="rId20"/>
+    <p:sldId id="278" r:id="rId15"/>
+    <p:sldId id="277" r:id="rId16"/>
+    <p:sldId id="273" r:id="rId17"/>
+    <p:sldId id="274" r:id="rId18"/>
+    <p:sldId id="264" r:id="rId19"/>
+    <p:sldId id="275" r:id="rId20"/>
+    <p:sldId id="276" r:id="rId21"/>
+    <p:sldId id="265" r:id="rId22"/>
   </p:sldIdLst>
   <p:sldSz cx="12192000" cy="6858000"/>
   <p:notesSz cx="6858000" cy="9144000"/>
@@ -215,7 +217,7 @@
           <a:p>
             <a:fld id="{BC46ECE3-5739-471E-8276-669D33A7DECB}" type="datetimeFigureOut">
               <a:rPr lang="en-IN" smtClean="0"/>
-              <a:t>14-04-2020</a:t>
+              <a:t>25-04-2020</a:t>
             </a:fld>
             <a:endParaRPr lang="en-IN"/>
           </a:p>
@@ -727,7 +729,7 @@
           <a:p>
             <a:fld id="{DA33E745-8FE1-47CC-91DA-CD8A7CF025A3}" type="datetime1">
               <a:rPr lang="en-US" smtClean="0"/>
-              <a:t>4/14/2020</a:t>
+              <a:t>4/25/2020</a:t>
             </a:fld>
             <a:endParaRPr lang="en-US" dirty="0"/>
           </a:p>
@@ -919,7 +921,7 @@
           <a:p>
             <a:fld id="{D0F87860-D0B0-438C-9AE6-1AD9EE8E8B0E}" type="datetime1">
               <a:rPr lang="en-US" smtClean="0"/>
-              <a:t>4/14/2020</a:t>
+              <a:t>4/25/2020</a:t>
             </a:fld>
             <a:endParaRPr lang="en-US" dirty="0"/>
           </a:p>
@@ -1165,7 +1167,7 @@
           <a:p>
             <a:fld id="{B322B73F-9EB1-4EA4-AD9F-B2980F2457F0}" type="datetime1">
               <a:rPr lang="en-US" smtClean="0"/>
-              <a:t>4/14/2020</a:t>
+              <a:t>4/25/2020</a:t>
             </a:fld>
             <a:endParaRPr lang="en-US" dirty="0"/>
           </a:p>
@@ -1357,7 +1359,7 @@
           <a:p>
             <a:fld id="{729E3528-EB33-475D-8B9A-F28254ACC31C}" type="datetime1">
               <a:rPr lang="en-US" smtClean="0"/>
-              <a:t>4/14/2020</a:t>
+              <a:t>4/25/2020</a:t>
             </a:fld>
             <a:endParaRPr lang="en-US" dirty="0"/>
           </a:p>
@@ -1734,7 +1736,7 @@
           <a:p>
             <a:fld id="{2BEE3975-8C66-4BA8-A7E2-CAB9A35681C1}" type="datetime1">
               <a:rPr lang="en-US" smtClean="0"/>
-              <a:t>4/14/2020</a:t>
+              <a:t>4/25/2020</a:t>
             </a:fld>
             <a:endParaRPr lang="en-US" dirty="0"/>
           </a:p>
@@ -1993,7 +1995,7 @@
           <a:p>
             <a:fld id="{15715BA5-2FD0-4578-8689-EC29B250C8A4}" type="datetime1">
               <a:rPr lang="en-US" smtClean="0"/>
-              <a:t>4/14/2020</a:t>
+              <a:t>4/25/2020</a:t>
             </a:fld>
             <a:endParaRPr lang="en-US" dirty="0"/>
           </a:p>
@@ -2394,7 +2396,7 @@
           <a:p>
             <a:fld id="{30D3F7EE-31C8-4752-93C5-13E9A9E58C9C}" type="datetime1">
               <a:rPr lang="en-US" smtClean="0"/>
-              <a:t>4/14/2020</a:t>
+              <a:t>4/25/2020</a:t>
             </a:fld>
             <a:endParaRPr lang="en-US" dirty="0"/>
           </a:p>
@@ -2534,7 +2536,7 @@
           <a:p>
             <a:fld id="{37E26A07-523D-43DE-8DBE-08FFE0AA0CA1}" type="datetime1">
               <a:rPr lang="en-US" smtClean="0"/>
-              <a:t>4/14/2020</a:t>
+              <a:t>4/25/2020</a:t>
             </a:fld>
             <a:endParaRPr lang="en-US" dirty="0"/>
           </a:p>
@@ -2695,7 +2697,7 @@
           <a:p>
             <a:fld id="{2C9CFBD5-D14A-4300-BA93-A2414E4D5FA5}" type="datetime1">
               <a:rPr lang="en-US" smtClean="0"/>
-              <a:t>4/14/2020</a:t>
+              <a:t>4/25/2020</a:t>
             </a:fld>
             <a:endParaRPr lang="en-US" dirty="0"/>
           </a:p>
@@ -3028,7 +3030,7 @@
           <a:p>
             <a:fld id="{39B460A2-04A8-47A8-9FCB-846A50EC35F0}" type="datetime1">
               <a:rPr lang="en-US" smtClean="0"/>
-              <a:t>4/14/2020</a:t>
+              <a:t>4/25/2020</a:t>
             </a:fld>
             <a:endParaRPr lang="en-US" dirty="0"/>
           </a:p>
@@ -3382,7 +3384,7 @@
           <a:p>
             <a:fld id="{9728EA47-BE8C-4FD8-AADD-542A56491222}" type="datetime1">
               <a:rPr lang="en-US" smtClean="0"/>
-              <a:t>4/14/2020</a:t>
+              <a:t>4/25/2020</a:t>
             </a:fld>
             <a:endParaRPr lang="en-US" dirty="0"/>
           </a:p>
@@ -3647,7 +3649,7 @@
           <a:p>
             <a:fld id="{A89E64EA-8512-4027-A5F4-89414817116A}" type="datetime1">
               <a:rPr lang="en-US" smtClean="0"/>
-              <a:t>4/14/2020</a:t>
+              <a:t>4/25/2020</a:t>
             </a:fld>
             <a:endParaRPr lang="en-US" dirty="0"/>
           </a:p>
@@ -4190,7 +4192,7 @@
                 <a16:creationId xmlns:a16="http://schemas.microsoft.com/office/drawing/2014/main" id="{A9286AD2-18A9-4868-A4E3-7A2097A20810}"/>
               </a:ext>
               <a:ext uri="{C183D7F6-B498-43B3-948B-1728B52AA6E4}">
-                <adec:decorative xmlns:adec="http://schemas.microsoft.com/office/drawing/2017/decorative" val="1"/>
+                <adec:decorative xmlns:adec="http://schemas.microsoft.com/office/drawing/2017/decorative" xmlns="" val="1"/>
               </a:ext>
             </a:extLst>
           </p:cNvPr>
@@ -4282,6 +4284,10 @@
               <a:rPr lang="en-US" sz="4000" dirty="0"/>
               <a:t>for</a:t>
             </a:r>
+            <a:r>
+              <a:rPr lang="en-US" dirty="0"/>
+              <a:t/>
+            </a:r>
             <a:br>
               <a:rPr lang="en-US" dirty="0"/>
             </a:br>
@@ -4388,7 +4394,7 @@
                 <a16:creationId xmlns:a16="http://schemas.microsoft.com/office/drawing/2014/main" id="{E7A7CD63-7EC3-44F3-95D0-595C4019FF24}"/>
               </a:ext>
               <a:ext uri="{C183D7F6-B498-43B3-948B-1728B52AA6E4}">
-                <adec:decorative xmlns:adec="http://schemas.microsoft.com/office/drawing/2017/decorative" val="1"/>
+                <adec:decorative xmlns:adec="http://schemas.microsoft.com/office/drawing/2017/decorative" xmlns="" val="1"/>
               </a:ext>
             </a:extLst>
           </p:cNvPr>
@@ -4527,6 +4533,47 @@
           </a:p>
         </p:txBody>
       </p:sp>
+      <p:pic>
+        <p:nvPicPr>
+          <p:cNvPr id="9" name="Picture 8"/>
+          <p:cNvPicPr/>
+          <p:nvPr/>
+        </p:nvPicPr>
+        <p:blipFill>
+          <a:blip r:embed="rId3">
+            <a:extLst>
+              <a:ext uri="{28A0092B-C50C-407E-A947-70E740481C1C}">
+                <a14:useLocalDpi xmlns:a14="http://schemas.microsoft.com/office/drawing/2010/main" val="0"/>
+              </a:ext>
+            </a:extLst>
+          </a:blip>
+          <a:stretch>
+            <a:fillRect/>
+          </a:stretch>
+        </p:blipFill>
+        <p:spPr bwMode="auto">
+          <a:xfrm>
+            <a:off x="5376862" y="5300010"/>
+            <a:ext cx="1438275" cy="1381125"/>
+          </a:xfrm>
+          <a:prstGeom prst="rect">
+            <a:avLst/>
+          </a:prstGeom>
+          <a:blipFill dpi="0" rotWithShape="1">
+            <a:blip r:embed="rId4"/>
+            <a:srcRect/>
+            <a:tile tx="0" ty="0" sx="100000" sy="100000" flip="none" algn="tl"/>
+          </a:blipFill>
+          <a:ln>
+            <a:noFill/>
+          </a:ln>
+          <a:effectLst>
+            <a:glow>
+              <a:schemeClr val="accent1"/>
+            </a:glow>
+          </a:effectLst>
+        </p:spPr>
+      </p:pic>
     </p:spTree>
     <p:extLst>
       <p:ext uri="{BB962C8B-B14F-4D97-AF65-F5344CB8AC3E}">
@@ -4708,27 +4755,21 @@
       </p:sp>
       <p:graphicFrame>
         <p:nvGraphicFramePr>
-          <p:cNvPr id="7" name="Table 6">
-            <a:extLst>
-              <a:ext uri="{FF2B5EF4-FFF2-40B4-BE49-F238E27FC236}">
-                <a16:creationId xmlns:a16="http://schemas.microsoft.com/office/drawing/2014/main" id="{1759354B-8DC5-42D0-A0E9-3BAF824BE415}"/>
-              </a:ext>
-            </a:extLst>
-          </p:cNvPr>
+          <p:cNvPr id="6" name="Table 5"/>
           <p:cNvGraphicFramePr>
             <a:graphicFrameLocks noGrp="1"/>
           </p:cNvGraphicFramePr>
           <p:nvPr>
             <p:extLst>
               <p:ext uri="{D42A27DB-BD31-4B8C-83A1-F6EECF244321}">
-                <p14:modId xmlns:p14="http://schemas.microsoft.com/office/powerpoint/2010/main" val="298095303"/>
+                <p14:modId xmlns:p14="http://schemas.microsoft.com/office/powerpoint/2010/main" val="2438655921"/>
               </p:ext>
             </p:extLst>
           </p:nvPr>
         </p:nvGraphicFramePr>
         <p:xfrm>
-          <a:off x="5233462" y="3305216"/>
-          <a:ext cx="5922218" cy="2563876"/>
+          <a:off x="5218430" y="3589537"/>
+          <a:ext cx="5937250" cy="2332355"/>
         </p:xfrm>
         <a:graphic>
           <a:graphicData uri="http://schemas.openxmlformats.org/drawingml/2006/table">
@@ -4737,22 +4778,22 @@
                 <a:tableStyleId>{5C22544A-7EE6-4342-B048-85BDC9FD1C3A}</a:tableStyleId>
               </a:tblPr>
               <a:tblGrid>
-                <a:gridCol w="1763998">
+                <a:gridCol w="1887220">
                   <a:extLst>
                     <a:ext uri="{9D8B030D-6E8A-4147-A177-3AD203B41FA5}">
-                      <a16:colId xmlns:a16="http://schemas.microsoft.com/office/drawing/2014/main" val="3164613238"/>
+                      <a16:colId xmlns:a16="http://schemas.microsoft.com/office/drawing/2014/main" val="2102987955"/>
                     </a:ext>
                   </a:extLst>
                 </a:gridCol>
-                <a:gridCol w="4158220">
+                <a:gridCol w="4050030">
                   <a:extLst>
                     <a:ext uri="{9D8B030D-6E8A-4147-A177-3AD203B41FA5}">
-                      <a16:colId xmlns:a16="http://schemas.microsoft.com/office/drawing/2014/main" val="2607824995"/>
+                      <a16:colId xmlns:a16="http://schemas.microsoft.com/office/drawing/2014/main" val="3498791425"/>
                     </a:ext>
                   </a:extLst>
                 </a:gridCol>
               </a:tblGrid>
-              <a:tr h="113760">
+              <a:tr h="0">
                 <a:tc>
                   <a:txBody>
                     <a:bodyPr/>
@@ -4772,7 +4813,7 @@
                         </a:rPr>
                         <a:t>Data attribute</a:t>
                       </a:r>
-                      <a:endParaRPr lang="en-IN" sz="1200">
+                      <a:endParaRPr lang="en-US" sz="1200">
                         <a:effectLst/>
                         <a:latin typeface="Times New Roman" panose="02020603050405020304" pitchFamily="18" charset="0"/>
                         <a:ea typeface="Calibri" panose="020F0502020204030204" pitchFamily="34" charset="0"/>
@@ -4801,7 +4842,7 @@
                         </a:rPr>
                         <a:t>Description</a:t>
                       </a:r>
-                      <a:endParaRPr lang="en-IN" sz="1200">
+                      <a:endParaRPr lang="en-US" sz="1200">
                         <a:effectLst/>
                         <a:latin typeface="Times New Roman" panose="02020603050405020304" pitchFamily="18" charset="0"/>
                         <a:ea typeface="Calibri" panose="020F0502020204030204" pitchFamily="34" charset="0"/>
@@ -4813,11 +4854,11 @@
                 </a:tc>
                 <a:extLst>
                   <a:ext uri="{0D108BD9-81ED-4DB2-BD59-A6C34878D82A}">
-                    <a16:rowId xmlns:a16="http://schemas.microsoft.com/office/drawing/2014/main" val="2090906481"/>
+                    <a16:rowId xmlns:a16="http://schemas.microsoft.com/office/drawing/2014/main" val="2411612316"/>
                   </a:ext>
                 </a:extLst>
               </a:tr>
-              <a:tr h="113760">
+              <a:tr h="0">
                 <a:tc>
                   <a:txBody>
                     <a:bodyPr/>
@@ -4837,7 +4878,7 @@
                         </a:rPr>
                         <a:t>Pregnancies</a:t>
                       </a:r>
-                      <a:endParaRPr lang="en-IN" sz="1200">
+                      <a:endParaRPr lang="en-US" sz="1200">
                         <a:effectLst/>
                         <a:latin typeface="Times New Roman" panose="02020603050405020304" pitchFamily="18" charset="0"/>
                         <a:ea typeface="Calibri" panose="020F0502020204030204" pitchFamily="34" charset="0"/>
@@ -4845,7 +4886,13 @@
                       </a:endParaRPr>
                     </a:p>
                   </a:txBody>
-                  <a:tcPr marL="68580" marR="68580" marT="0" marB="0"/>
+                  <a:tcPr marL="68580" marR="68580" marT="0" marB="0">
+                    <a:solidFill>
+                      <a:schemeClr val="bg1">
+                        <a:lumMod val="65000"/>
+                      </a:schemeClr>
+                    </a:solidFill>
+                  </a:tcPr>
                 </a:tc>
                 <a:tc>
                   <a:txBody>
@@ -4866,7 +4913,7 @@
                         </a:rPr>
                         <a:t>Number of times pregnant</a:t>
                       </a:r>
-                      <a:endParaRPr lang="en-IN" sz="1200">
+                      <a:endParaRPr lang="en-US" sz="1200">
                         <a:effectLst/>
                         <a:latin typeface="Times New Roman" panose="02020603050405020304" pitchFamily="18" charset="0"/>
                         <a:ea typeface="Calibri" panose="020F0502020204030204" pitchFamily="34" charset="0"/>
@@ -4878,11 +4925,11 @@
                 </a:tc>
                 <a:extLst>
                   <a:ext uri="{0D108BD9-81ED-4DB2-BD59-A6C34878D82A}">
-                    <a16:rowId xmlns:a16="http://schemas.microsoft.com/office/drawing/2014/main" val="1285618210"/>
+                    <a16:rowId xmlns:a16="http://schemas.microsoft.com/office/drawing/2014/main" val="1091387238"/>
                   </a:ext>
                 </a:extLst>
               </a:tr>
-              <a:tr h="237536">
+              <a:tr h="0">
                 <a:tc>
                   <a:txBody>
                     <a:bodyPr/>
@@ -4897,12 +4944,12 @@
                         </a:spcAft>
                       </a:pPr>
                       <a:r>
-                        <a:rPr lang="en-IN" sz="1200" dirty="0">
+                        <a:rPr lang="en-IN" sz="1200">
                           <a:effectLst/>
                         </a:rPr>
                         <a:t>Glucose</a:t>
                       </a:r>
-                      <a:endParaRPr lang="en-IN" sz="1200" dirty="0">
+                      <a:endParaRPr lang="en-US" sz="1200">
                         <a:effectLst/>
                         <a:latin typeface="Times New Roman" panose="02020603050405020304" pitchFamily="18" charset="0"/>
                         <a:ea typeface="Calibri" panose="020F0502020204030204" pitchFamily="34" charset="0"/>
@@ -4910,7 +4957,13 @@
                       </a:endParaRPr>
                     </a:p>
                   </a:txBody>
-                  <a:tcPr marL="68580" marR="68580" marT="0" marB="0"/>
+                  <a:tcPr marL="68580" marR="68580" marT="0" marB="0">
+                    <a:solidFill>
+                      <a:schemeClr val="bg1">
+                        <a:lumMod val="65000"/>
+                      </a:schemeClr>
+                    </a:solidFill>
+                  </a:tcPr>
                 </a:tc>
                 <a:tc>
                   <a:txBody>
@@ -4929,9 +4982,9 @@
                         <a:rPr lang="en-IN" sz="1200">
                           <a:effectLst/>
                         </a:rPr>
-                        <a:t>Plasma glucose concentration at 2 hours in an oral glucose tolerance test</a:t>
+                        <a:t>Plasma glucose concentration (2 hours) oral glucose tolerance</a:t>
                       </a:r>
-                      <a:endParaRPr lang="en-IN" sz="1200">
+                      <a:endParaRPr lang="en-US" sz="1200">
                         <a:effectLst/>
                         <a:latin typeface="Times New Roman" panose="02020603050405020304" pitchFamily="18" charset="0"/>
                         <a:ea typeface="Calibri" panose="020F0502020204030204" pitchFamily="34" charset="0"/>
@@ -4943,11 +4996,11 @@
                 </a:tc>
                 <a:extLst>
                   <a:ext uri="{0D108BD9-81ED-4DB2-BD59-A6C34878D82A}">
-                    <a16:rowId xmlns:a16="http://schemas.microsoft.com/office/drawing/2014/main" val="4263736156"/>
+                    <a16:rowId xmlns:a16="http://schemas.microsoft.com/office/drawing/2014/main" val="2937120245"/>
                   </a:ext>
                 </a:extLst>
               </a:tr>
-              <a:tr h="113760">
+              <a:tr h="0">
                 <a:tc>
                   <a:txBody>
                     <a:bodyPr/>
@@ -4967,7 +5020,7 @@
                         </a:rPr>
                         <a:t>BloodPressure</a:t>
                       </a:r>
-                      <a:endParaRPr lang="en-IN" sz="1200">
+                      <a:endParaRPr lang="en-US" sz="1200">
                         <a:effectLst/>
                         <a:latin typeface="Times New Roman" panose="02020603050405020304" pitchFamily="18" charset="0"/>
                         <a:ea typeface="Calibri" panose="020F0502020204030204" pitchFamily="34" charset="0"/>
@@ -4975,7 +5028,13 @@
                       </a:endParaRPr>
                     </a:p>
                   </a:txBody>
-                  <a:tcPr marL="68580" marR="68580" marT="0" marB="0"/>
+                  <a:tcPr marL="68580" marR="68580" marT="0" marB="0">
+                    <a:solidFill>
+                      <a:schemeClr val="bg1">
+                        <a:lumMod val="65000"/>
+                      </a:schemeClr>
+                    </a:solidFill>
+                  </a:tcPr>
                 </a:tc>
                 <a:tc>
                   <a:txBody>
@@ -4996,7 +5055,7 @@
                         </a:rPr>
                         <a:t>Diastolic blood pressure (mm Hg)</a:t>
                       </a:r>
-                      <a:endParaRPr lang="en-IN" sz="1200">
+                      <a:endParaRPr lang="en-US" sz="1200">
                         <a:effectLst/>
                         <a:latin typeface="Times New Roman" panose="02020603050405020304" pitchFamily="18" charset="0"/>
                         <a:ea typeface="Calibri" panose="020F0502020204030204" pitchFamily="34" charset="0"/>
@@ -5008,11 +5067,11 @@
                 </a:tc>
                 <a:extLst>
                   <a:ext uri="{0D108BD9-81ED-4DB2-BD59-A6C34878D82A}">
-                    <a16:rowId xmlns:a16="http://schemas.microsoft.com/office/drawing/2014/main" val="1284690872"/>
+                    <a16:rowId xmlns:a16="http://schemas.microsoft.com/office/drawing/2014/main" val="1309295653"/>
                   </a:ext>
                 </a:extLst>
               </a:tr>
-              <a:tr h="113760">
+              <a:tr h="0">
                 <a:tc>
                   <a:txBody>
                     <a:bodyPr/>
@@ -5032,7 +5091,7 @@
                         </a:rPr>
                         <a:t>SkinThickness</a:t>
                       </a:r>
-                      <a:endParaRPr lang="en-IN" sz="1200">
+                      <a:endParaRPr lang="en-US" sz="1200">
                         <a:effectLst/>
                         <a:latin typeface="Times New Roman" panose="02020603050405020304" pitchFamily="18" charset="0"/>
                         <a:ea typeface="Calibri" panose="020F0502020204030204" pitchFamily="34" charset="0"/>
@@ -5040,7 +5099,13 @@
                       </a:endParaRPr>
                     </a:p>
                   </a:txBody>
-                  <a:tcPr marL="68580" marR="68580" marT="0" marB="0"/>
+                  <a:tcPr marL="68580" marR="68580" marT="0" marB="0">
+                    <a:solidFill>
+                      <a:schemeClr val="bg1">
+                        <a:lumMod val="65000"/>
+                      </a:schemeClr>
+                    </a:solidFill>
+                  </a:tcPr>
                 </a:tc>
                 <a:tc>
                   <a:txBody>
@@ -5061,7 +5126,7 @@
                         </a:rPr>
                         <a:t>Triceps skinfold thickness (mm)</a:t>
                       </a:r>
-                      <a:endParaRPr lang="en-IN" sz="1200">
+                      <a:endParaRPr lang="en-US" sz="1200">
                         <a:effectLst/>
                         <a:latin typeface="Times New Roman" panose="02020603050405020304" pitchFamily="18" charset="0"/>
                         <a:ea typeface="Calibri" panose="020F0502020204030204" pitchFamily="34" charset="0"/>
@@ -5073,11 +5138,11 @@
                 </a:tc>
                 <a:extLst>
                   <a:ext uri="{0D108BD9-81ED-4DB2-BD59-A6C34878D82A}">
-                    <a16:rowId xmlns:a16="http://schemas.microsoft.com/office/drawing/2014/main" val="3894544338"/>
+                    <a16:rowId xmlns:a16="http://schemas.microsoft.com/office/drawing/2014/main" val="2295833846"/>
                   </a:ext>
                 </a:extLst>
               </a:tr>
-              <a:tr h="113760">
+              <a:tr h="0">
                 <a:tc>
                   <a:txBody>
                     <a:bodyPr/>
@@ -5097,7 +5162,7 @@
                         </a:rPr>
                         <a:t>Insulin</a:t>
                       </a:r>
-                      <a:endParaRPr lang="en-IN" sz="1200">
+                      <a:endParaRPr lang="en-US" sz="1200">
                         <a:effectLst/>
                         <a:latin typeface="Times New Roman" panose="02020603050405020304" pitchFamily="18" charset="0"/>
                         <a:ea typeface="Calibri" panose="020F0502020204030204" pitchFamily="34" charset="0"/>
@@ -5105,7 +5170,13 @@
                       </a:endParaRPr>
                     </a:p>
                   </a:txBody>
-                  <a:tcPr marL="68580" marR="68580" marT="0" marB="0"/>
+                  <a:tcPr marL="68580" marR="68580" marT="0" marB="0">
+                    <a:solidFill>
+                      <a:schemeClr val="bg1">
+                        <a:lumMod val="65000"/>
+                      </a:schemeClr>
+                    </a:solidFill>
+                  </a:tcPr>
                 </a:tc>
                 <a:tc>
                   <a:txBody>
@@ -5126,7 +5197,7 @@
                         </a:rPr>
                         <a:t>2-hour serum insulin (mu U/ml)</a:t>
                       </a:r>
-                      <a:endParaRPr lang="en-IN" sz="1200">
+                      <a:endParaRPr lang="en-US" sz="1200">
                         <a:effectLst/>
                         <a:latin typeface="Times New Roman" panose="02020603050405020304" pitchFamily="18" charset="0"/>
                         <a:ea typeface="Calibri" panose="020F0502020204030204" pitchFamily="34" charset="0"/>
@@ -5138,11 +5209,11 @@
                 </a:tc>
                 <a:extLst>
                   <a:ext uri="{0D108BD9-81ED-4DB2-BD59-A6C34878D82A}">
-                    <a16:rowId xmlns:a16="http://schemas.microsoft.com/office/drawing/2014/main" val="4225497338"/>
+                    <a16:rowId xmlns:a16="http://schemas.microsoft.com/office/drawing/2014/main" val="657439141"/>
                   </a:ext>
                 </a:extLst>
               </a:tr>
-              <a:tr h="361312">
+              <a:tr h="229235">
                 <a:tc>
                   <a:txBody>
                     <a:bodyPr/>
@@ -5162,23 +5233,7 @@
                         </a:rPr>
                         <a:t>DiabetesPedigreeFunction</a:t>
                       </a:r>
-                    </a:p>
-                    <a:p>
-                      <a:pPr>
-                        <a:lnSpc>
-                          <a:spcPct val="115000"/>
-                        </a:lnSpc>
-                        <a:spcAft>
-                          <a:spcPts val="0"/>
-                        </a:spcAft>
-                      </a:pPr>
-                      <a:r>
-                        <a:rPr lang="en-IN" sz="1200">
-                          <a:effectLst/>
-                        </a:rPr>
-                        <a:t> </a:t>
-                      </a:r>
-                      <a:endParaRPr lang="en-IN" sz="1200">
+                      <a:endParaRPr lang="en-US" sz="1200">
                         <a:effectLst/>
                         <a:latin typeface="Times New Roman" panose="02020603050405020304" pitchFamily="18" charset="0"/>
                         <a:ea typeface="Calibri" panose="020F0502020204030204" pitchFamily="34" charset="0"/>
@@ -5186,7 +5241,13 @@
                       </a:endParaRPr>
                     </a:p>
                   </a:txBody>
-                  <a:tcPr marL="68580" marR="68580" marT="0" marB="0"/>
+                  <a:tcPr marL="68580" marR="68580" marT="0" marB="0">
+                    <a:solidFill>
+                      <a:schemeClr val="bg1">
+                        <a:lumMod val="65000"/>
+                      </a:schemeClr>
+                    </a:solidFill>
+                  </a:tcPr>
                 </a:tc>
                 <a:tc>
                   <a:txBody>
@@ -5202,12 +5263,12 @@
                         </a:spcAft>
                       </a:pPr>
                       <a:r>
-                        <a:rPr lang="en-IN" sz="1200" dirty="0">
+                        <a:rPr lang="en-IN" sz="1200">
                           <a:effectLst/>
                         </a:rPr>
-                        <a:t>Function value which scores the likelihood of diabetes based on family history</a:t>
+                        <a:t>Score for likelihood of diabetes based on family history</a:t>
                       </a:r>
-                      <a:endParaRPr lang="en-IN" sz="1200" dirty="0">
+                      <a:endParaRPr lang="en-US" sz="1200">
                         <a:effectLst/>
                         <a:latin typeface="Times New Roman" panose="02020603050405020304" pitchFamily="18" charset="0"/>
                         <a:ea typeface="Calibri" panose="020F0502020204030204" pitchFamily="34" charset="0"/>
@@ -5219,11 +5280,11 @@
                 </a:tc>
                 <a:extLst>
                   <a:ext uri="{0D108BD9-81ED-4DB2-BD59-A6C34878D82A}">
-                    <a16:rowId xmlns:a16="http://schemas.microsoft.com/office/drawing/2014/main" val="908389189"/>
+                    <a16:rowId xmlns:a16="http://schemas.microsoft.com/office/drawing/2014/main" val="2506530431"/>
                   </a:ext>
                 </a:extLst>
               </a:tr>
-              <a:tr h="113760">
+              <a:tr h="0">
                 <a:tc>
                   <a:txBody>
                     <a:bodyPr/>
@@ -5243,7 +5304,7 @@
                         </a:rPr>
                         <a:t>BMI</a:t>
                       </a:r>
-                      <a:endParaRPr lang="en-IN" sz="1200">
+                      <a:endParaRPr lang="en-US" sz="1200">
                         <a:effectLst/>
                         <a:latin typeface="Times New Roman" panose="02020603050405020304" pitchFamily="18" charset="0"/>
                         <a:ea typeface="Calibri" panose="020F0502020204030204" pitchFamily="34" charset="0"/>
@@ -5251,7 +5312,13 @@
                       </a:endParaRPr>
                     </a:p>
                   </a:txBody>
-                  <a:tcPr marL="68580" marR="68580" marT="0" marB="0"/>
+                  <a:tcPr marL="68580" marR="68580" marT="0" marB="0">
+                    <a:solidFill>
+                      <a:schemeClr val="bg1">
+                        <a:lumMod val="65000"/>
+                      </a:schemeClr>
+                    </a:solidFill>
+                  </a:tcPr>
                 </a:tc>
                 <a:tc>
                   <a:txBody>
@@ -5272,7 +5339,7 @@
                         </a:rPr>
                         <a:t>Body mass index (weight in kg / (height in m) ^2)</a:t>
                       </a:r>
-                      <a:endParaRPr lang="en-IN" sz="1200">
+                      <a:endParaRPr lang="en-US" sz="1200">
                         <a:effectLst/>
                         <a:latin typeface="Times New Roman" panose="02020603050405020304" pitchFamily="18" charset="0"/>
                         <a:ea typeface="Calibri" panose="020F0502020204030204" pitchFamily="34" charset="0"/>
@@ -5284,11 +5351,11 @@
                 </a:tc>
                 <a:extLst>
                   <a:ext uri="{0D108BD9-81ED-4DB2-BD59-A6C34878D82A}">
-                    <a16:rowId xmlns:a16="http://schemas.microsoft.com/office/drawing/2014/main" val="3594278784"/>
+                    <a16:rowId xmlns:a16="http://schemas.microsoft.com/office/drawing/2014/main" val="4228557886"/>
                   </a:ext>
                 </a:extLst>
               </a:tr>
-              <a:tr h="113760">
+              <a:tr h="0">
                 <a:tc>
                   <a:txBody>
                     <a:bodyPr/>
@@ -5303,12 +5370,12 @@
                         </a:spcAft>
                       </a:pPr>
                       <a:r>
-                        <a:rPr lang="en-IN" sz="1200">
+                        <a:rPr lang="en-IN" sz="1200" dirty="0">
                           <a:effectLst/>
                         </a:rPr>
                         <a:t>Age</a:t>
                       </a:r>
-                      <a:endParaRPr lang="en-IN" sz="1200">
+                      <a:endParaRPr lang="en-US" sz="1200" dirty="0">
                         <a:effectLst/>
                         <a:latin typeface="Times New Roman" panose="02020603050405020304" pitchFamily="18" charset="0"/>
                         <a:ea typeface="Calibri" panose="020F0502020204030204" pitchFamily="34" charset="0"/>
@@ -5316,7 +5383,13 @@
                       </a:endParaRPr>
                     </a:p>
                   </a:txBody>
-                  <a:tcPr marL="68580" marR="68580" marT="0" marB="0"/>
+                  <a:tcPr marL="68580" marR="68580" marT="0" marB="0">
+                    <a:solidFill>
+                      <a:schemeClr val="bg1">
+                        <a:lumMod val="65000"/>
+                      </a:schemeClr>
+                    </a:solidFill>
+                  </a:tcPr>
                 </a:tc>
                 <a:tc>
                   <a:txBody>
@@ -5337,7 +5410,7 @@
                         </a:rPr>
                         <a:t>Age for a person in years</a:t>
                       </a:r>
-                      <a:endParaRPr lang="en-IN" sz="1200">
+                      <a:endParaRPr lang="en-US" sz="1200">
                         <a:effectLst/>
                         <a:latin typeface="Times New Roman" panose="02020603050405020304" pitchFamily="18" charset="0"/>
                         <a:ea typeface="Calibri" panose="020F0502020204030204" pitchFamily="34" charset="0"/>
@@ -5349,11 +5422,11 @@
                 </a:tc>
                 <a:extLst>
                   <a:ext uri="{0D108BD9-81ED-4DB2-BD59-A6C34878D82A}">
-                    <a16:rowId xmlns:a16="http://schemas.microsoft.com/office/drawing/2014/main" val="842840533"/>
+                    <a16:rowId xmlns:a16="http://schemas.microsoft.com/office/drawing/2014/main" val="2565715498"/>
                   </a:ext>
                 </a:extLst>
               </a:tr>
-              <a:tr h="113760">
+              <a:tr h="0">
                 <a:tc>
                   <a:txBody>
                     <a:bodyPr/>
@@ -5373,7 +5446,7 @@
                         </a:rPr>
                         <a:t>Outcome</a:t>
                       </a:r>
-                      <a:endParaRPr lang="en-IN" sz="1200">
+                      <a:endParaRPr lang="en-US" sz="1200">
                         <a:effectLst/>
                         <a:latin typeface="Times New Roman" panose="02020603050405020304" pitchFamily="18" charset="0"/>
                         <a:ea typeface="Calibri" panose="020F0502020204030204" pitchFamily="34" charset="0"/>
@@ -5402,7 +5475,7 @@
                         </a:rPr>
                         <a:t>Class variable (0 or 1) whether or not a patient has diabetes</a:t>
                       </a:r>
-                      <a:endParaRPr lang="en-IN" sz="1200" dirty="0">
+                      <a:endParaRPr lang="en-US" sz="1200" dirty="0">
                         <a:effectLst/>
                         <a:latin typeface="Times New Roman" panose="02020603050405020304" pitchFamily="18" charset="0"/>
                         <a:ea typeface="Calibri" panose="020F0502020204030204" pitchFamily="34" charset="0"/>
@@ -5414,7 +5487,7 @@
                 </a:tc>
                 <a:extLst>
                   <a:ext uri="{0D108BD9-81ED-4DB2-BD59-A6C34878D82A}">
-                    <a16:rowId xmlns:a16="http://schemas.microsoft.com/office/drawing/2014/main" val="1478995712"/>
+                    <a16:rowId xmlns:a16="http://schemas.microsoft.com/office/drawing/2014/main" val="2075920379"/>
                   </a:ext>
                 </a:extLst>
               </a:tr>
@@ -5432,6 +5505,13 @@
   <p:clrMapOvr>
     <a:masterClrMapping/>
   </p:clrMapOvr>
+  <p:timing>
+    <p:tnLst>
+      <p:par>
+        <p:cTn id="1" dur="indefinite" restart="never" nodeType="tmRoot"/>
+      </p:par>
+    </p:tnLst>
+  </p:timing>
 </p:sld>
 </file>
 
@@ -5667,6 +5747,13 @@
   <p:clrMapOvr>
     <a:masterClrMapping/>
   </p:clrMapOvr>
+  <p:timing>
+    <p:tnLst>
+      <p:par>
+        <p:cTn id="1" dur="indefinite" restart="never" nodeType="tmRoot"/>
+      </p:par>
+    </p:tnLst>
+  </p:timing>
 </p:sld>
 </file>
 
@@ -5930,10 +6017,519 @@
   <p:clrMapOvr>
     <a:masterClrMapping/>
   </p:clrMapOvr>
+  <p:timing>
+    <p:tnLst>
+      <p:par>
+        <p:cTn id="1" dur="indefinite" restart="never" nodeType="tmRoot"/>
+      </p:par>
+    </p:tnLst>
+  </p:timing>
 </p:sld>
 </file>
 
 <file path=ppt/slides/slide13.xml><?xml version="1.0" encoding="utf-8"?>
+<p:sld xmlns:a="http://schemas.openxmlformats.org/drawingml/2006/main" xmlns:r="http://schemas.openxmlformats.org/officeDocument/2006/relationships" xmlns:p="http://schemas.openxmlformats.org/presentationml/2006/main">
+  <p:cSld>
+    <p:spTree>
+      <p:nvGrpSpPr>
+        <p:cNvPr id="1" name=""/>
+        <p:cNvGrpSpPr/>
+        <p:nvPr/>
+      </p:nvGrpSpPr>
+      <p:grpSpPr>
+        <a:xfrm>
+          <a:off x="0" y="0"/>
+          <a:ext cx="0" cy="0"/>
+          <a:chOff x="0" y="0"/>
+          <a:chExt cx="0" cy="0"/>
+        </a:xfrm>
+      </p:grpSpPr>
+      <p:sp>
+        <p:nvSpPr>
+          <p:cNvPr id="2" name="Title 1">
+            <a:extLst>
+              <a:ext uri="{FF2B5EF4-FFF2-40B4-BE49-F238E27FC236}">
+                <a16:creationId xmlns:a16="http://schemas.microsoft.com/office/drawing/2014/main" id="{7A1329A8-3B27-46C8-86BC-C8EE88CDF870}"/>
+              </a:ext>
+            </a:extLst>
+          </p:cNvPr>
+          <p:cNvSpPr>
+            <a:spLocks noGrp="1"/>
+          </p:cNvSpPr>
+          <p:nvPr>
+            <p:ph type="title"/>
+          </p:nvPr>
+        </p:nvSpPr>
+        <p:spPr/>
+        <p:txBody>
+          <a:bodyPr/>
+          <a:lstStyle/>
+          <a:p>
+            <a:r>
+              <a:rPr lang="en-IN" dirty="0"/>
+              <a:t>Search Risk Groups</a:t>
+            </a:r>
+            <a:br>
+              <a:rPr lang="en-IN" dirty="0"/>
+            </a:br>
+            <a:r>
+              <a:rPr lang="en-IN" sz="2400" dirty="0" smtClean="0"/>
+              <a:t>Standard K-means (gap-stat)  </a:t>
+            </a:r>
+            <a:endParaRPr lang="en-IN" sz="2400" dirty="0"/>
+          </a:p>
+        </p:txBody>
+      </p:sp>
+      <p:sp>
+        <p:nvSpPr>
+          <p:cNvPr id="3" name="Content Placeholder 2">
+            <a:extLst>
+              <a:ext uri="{FF2B5EF4-FFF2-40B4-BE49-F238E27FC236}">
+                <a16:creationId xmlns:a16="http://schemas.microsoft.com/office/drawing/2014/main" id="{51BAE5EF-CC1C-4914-832B-C2D1FCF9A503}"/>
+              </a:ext>
+            </a:extLst>
+          </p:cNvPr>
+          <p:cNvSpPr>
+            <a:spLocks noGrp="1"/>
+          </p:cNvSpPr>
+          <p:nvPr>
+            <p:ph idx="1"/>
+          </p:nvPr>
+        </p:nvSpPr>
+        <p:spPr/>
+        <p:txBody>
+          <a:bodyPr/>
+          <a:lstStyle/>
+          <a:p>
+            <a:pPr lvl="1"/>
+            <a:r>
+              <a:rPr lang="en-IN" sz="1600" dirty="0" smtClean="0"/>
+              <a:t>K-means execute with gap-stat indicated the data is not separable, as optimal K value was 1.</a:t>
+            </a:r>
+            <a:endParaRPr lang="en-IN" sz="1600" dirty="0"/>
+          </a:p>
+          <a:p>
+            <a:pPr lvl="1"/>
+            <a:r>
+              <a:rPr lang="en-IN" sz="1600" dirty="0" smtClean="0"/>
+              <a:t>K-means with all eight data attributes </a:t>
+            </a:r>
+            <a:br>
+              <a:rPr lang="en-IN" sz="1600" dirty="0" smtClean="0"/>
+            </a:br>
+            <a:r>
+              <a:rPr lang="en-IN" sz="1600" dirty="0" smtClean="0"/>
+              <a:t>for K = 3 was not useful</a:t>
+            </a:r>
+            <a:r>
+              <a:rPr lang="en-IN" sz="1600" dirty="0" smtClean="0"/>
+              <a:t>.</a:t>
+            </a:r>
+          </a:p>
+          <a:p>
+            <a:pPr lvl="1"/>
+            <a:r>
+              <a:rPr lang="en-IN" sz="1600" dirty="0" smtClean="0"/>
+              <a:t>Conclusion: Data was not easily separable </a:t>
+            </a:r>
+            <a:br>
+              <a:rPr lang="en-IN" sz="1600" dirty="0" smtClean="0"/>
+            </a:br>
+            <a:r>
+              <a:rPr lang="en-IN" sz="1600" dirty="0" smtClean="0"/>
+              <a:t>into groups based on risk using default K-means.</a:t>
+            </a:r>
+            <a:endParaRPr lang="en-IN" sz="1600" dirty="0"/>
+          </a:p>
+          <a:p>
+            <a:pPr lvl="1"/>
+            <a:endParaRPr lang="en-IN" dirty="0"/>
+          </a:p>
+          <a:p>
+            <a:endParaRPr lang="en-IN" dirty="0"/>
+          </a:p>
+          <a:p>
+            <a:endParaRPr lang="en-IN" dirty="0"/>
+          </a:p>
+        </p:txBody>
+      </p:sp>
+      <p:sp>
+        <p:nvSpPr>
+          <p:cNvPr id="4" name="Footer Placeholder 3">
+            <a:extLst>
+              <a:ext uri="{FF2B5EF4-FFF2-40B4-BE49-F238E27FC236}">
+                <a16:creationId xmlns:a16="http://schemas.microsoft.com/office/drawing/2014/main" id="{104A305F-50DE-440A-B627-60B3F1A61E81}"/>
+              </a:ext>
+            </a:extLst>
+          </p:cNvPr>
+          <p:cNvSpPr>
+            <a:spLocks noGrp="1"/>
+          </p:cNvSpPr>
+          <p:nvPr>
+            <p:ph type="ftr" sz="quarter" idx="11"/>
+          </p:nvPr>
+        </p:nvSpPr>
+        <p:spPr/>
+        <p:txBody>
+          <a:bodyPr/>
+          <a:lstStyle/>
+          <a:p>
+            <a:r>
+              <a:rPr lang="en-US"/>
+              <a:t>Vaibhav Gaikwad (2018HT12597)</a:t>
+            </a:r>
+            <a:endParaRPr lang="en-US" dirty="0"/>
+          </a:p>
+        </p:txBody>
+      </p:sp>
+      <p:sp>
+        <p:nvSpPr>
+          <p:cNvPr id="5" name="Slide Number Placeholder 4">
+            <a:extLst>
+              <a:ext uri="{FF2B5EF4-FFF2-40B4-BE49-F238E27FC236}">
+                <a16:creationId xmlns:a16="http://schemas.microsoft.com/office/drawing/2014/main" id="{FD3F77B0-099F-4563-AFAF-1E022D47F219}"/>
+              </a:ext>
+            </a:extLst>
+          </p:cNvPr>
+          <p:cNvSpPr>
+            <a:spLocks noGrp="1"/>
+          </p:cNvSpPr>
+          <p:nvPr>
+            <p:ph type="sldNum" sz="quarter" idx="12"/>
+          </p:nvPr>
+        </p:nvSpPr>
+        <p:spPr/>
+        <p:txBody>
+          <a:bodyPr/>
+          <a:lstStyle/>
+          <a:p>
+            <a:r>
+              <a:rPr lang="en-US" dirty="0"/>
+              <a:t>6</a:t>
+            </a:r>
+          </a:p>
+        </p:txBody>
+      </p:sp>
+      <p:pic>
+        <p:nvPicPr>
+          <p:cNvPr id="12" name="Picture 11"/>
+          <p:cNvPicPr/>
+          <p:nvPr/>
+        </p:nvPicPr>
+        <p:blipFill>
+          <a:blip r:embed="rId2"/>
+          <a:stretch>
+            <a:fillRect/>
+          </a:stretch>
+        </p:blipFill>
+        <p:spPr>
+          <a:xfrm>
+            <a:off x="6872749" y="2695363"/>
+            <a:ext cx="4451846" cy="3173729"/>
+          </a:xfrm>
+          <a:prstGeom prst="rect">
+            <a:avLst/>
+          </a:prstGeom>
+        </p:spPr>
+      </p:pic>
+    </p:spTree>
+    <p:extLst>
+      <p:ext uri="{BB962C8B-B14F-4D97-AF65-F5344CB8AC3E}">
+        <p14:creationId xmlns:p14="http://schemas.microsoft.com/office/powerpoint/2010/main" val="1154019050"/>
+      </p:ext>
+    </p:extLst>
+  </p:cSld>
+  <p:clrMapOvr>
+    <a:masterClrMapping/>
+  </p:clrMapOvr>
+  <p:timing>
+    <p:tnLst>
+      <p:par>
+        <p:cTn id="1" dur="indefinite" restart="never" nodeType="tmRoot"/>
+      </p:par>
+    </p:tnLst>
+  </p:timing>
+</p:sld>
+</file>
+
+<file path=ppt/slides/slide14.xml><?xml version="1.0" encoding="utf-8"?>
+<p:sld xmlns:a="http://schemas.openxmlformats.org/drawingml/2006/main" xmlns:r="http://schemas.openxmlformats.org/officeDocument/2006/relationships" xmlns:p="http://schemas.openxmlformats.org/presentationml/2006/main">
+  <p:cSld>
+    <p:spTree>
+      <p:nvGrpSpPr>
+        <p:cNvPr id="1" name=""/>
+        <p:cNvGrpSpPr/>
+        <p:nvPr/>
+      </p:nvGrpSpPr>
+      <p:grpSpPr>
+        <a:xfrm>
+          <a:off x="0" y="0"/>
+          <a:ext cx="0" cy="0"/>
+          <a:chOff x="0" y="0"/>
+          <a:chExt cx="0" cy="0"/>
+        </a:xfrm>
+      </p:grpSpPr>
+      <p:sp>
+        <p:nvSpPr>
+          <p:cNvPr id="2" name="Title 1">
+            <a:extLst>
+              <a:ext uri="{FF2B5EF4-FFF2-40B4-BE49-F238E27FC236}">
+                <a16:creationId xmlns:a16="http://schemas.microsoft.com/office/drawing/2014/main" id="{7A1329A8-3B27-46C8-86BC-C8EE88CDF870}"/>
+              </a:ext>
+            </a:extLst>
+          </p:cNvPr>
+          <p:cNvSpPr>
+            <a:spLocks noGrp="1"/>
+          </p:cNvSpPr>
+          <p:nvPr>
+            <p:ph type="title"/>
+          </p:nvPr>
+        </p:nvSpPr>
+        <p:spPr/>
+        <p:txBody>
+          <a:bodyPr/>
+          <a:lstStyle/>
+          <a:p>
+            <a:r>
+              <a:rPr lang="en-IN" dirty="0"/>
+              <a:t>Search Risk Groups</a:t>
+            </a:r>
+            <a:br>
+              <a:rPr lang="en-IN" dirty="0"/>
+            </a:br>
+            <a:r>
+              <a:rPr lang="en-IN" sz="2400" dirty="0" smtClean="0"/>
+              <a:t>Standard DBSCAN (</a:t>
+            </a:r>
+            <a:r>
+              <a:rPr lang="en-IN" sz="2400" dirty="0" err="1" smtClean="0"/>
+              <a:t>kNN</a:t>
+            </a:r>
+            <a:r>
+              <a:rPr lang="en-IN" sz="2400" dirty="0" smtClean="0"/>
+              <a:t>) </a:t>
+            </a:r>
+            <a:endParaRPr lang="en-IN" sz="2400" dirty="0"/>
+          </a:p>
+        </p:txBody>
+      </p:sp>
+      <p:sp>
+        <p:nvSpPr>
+          <p:cNvPr id="3" name="Content Placeholder 2">
+            <a:extLst>
+              <a:ext uri="{FF2B5EF4-FFF2-40B4-BE49-F238E27FC236}">
+                <a16:creationId xmlns:a16="http://schemas.microsoft.com/office/drawing/2014/main" id="{51BAE5EF-CC1C-4914-832B-C2D1FCF9A503}"/>
+              </a:ext>
+            </a:extLst>
+          </p:cNvPr>
+          <p:cNvSpPr>
+            <a:spLocks noGrp="1"/>
+          </p:cNvSpPr>
+          <p:nvPr>
+            <p:ph idx="1"/>
+          </p:nvPr>
+        </p:nvSpPr>
+        <p:spPr/>
+        <p:txBody>
+          <a:bodyPr/>
+          <a:lstStyle/>
+          <a:p>
+            <a:pPr lvl="1"/>
+            <a:r>
+              <a:rPr lang="en-IN" sz="1600" dirty="0"/>
+              <a:t>DBSCAN was tested with </a:t>
+            </a:r>
+            <a:r>
+              <a:rPr lang="en-IN" sz="1600" dirty="0" err="1"/>
+              <a:t>kNN</a:t>
+            </a:r>
+            <a:r>
+              <a:rPr lang="en-IN" sz="1600" dirty="0"/>
+              <a:t> for K = 3 and min eps distance was </a:t>
+            </a:r>
+            <a:br>
+              <a:rPr lang="en-IN" sz="1600" dirty="0"/>
+            </a:br>
+            <a:r>
+              <a:rPr lang="en-IN" sz="1600" dirty="0"/>
+              <a:t>observed to be between 60 to 80</a:t>
+            </a:r>
+          </a:p>
+          <a:p>
+            <a:pPr lvl="1"/>
+            <a:r>
+              <a:rPr lang="en-IN" sz="1600" dirty="0"/>
+              <a:t>DBSCAN </a:t>
+            </a:r>
+            <a:r>
+              <a:rPr lang="en-IN" sz="1600" dirty="0" smtClean="0"/>
+              <a:t>with eps = 60 and </a:t>
+            </a:r>
+            <a:r>
+              <a:rPr lang="en-IN" sz="1600" dirty="0" err="1" smtClean="0"/>
+              <a:t>MinPts</a:t>
+            </a:r>
+            <a:r>
+              <a:rPr lang="en-IN" sz="1600" dirty="0" smtClean="0"/>
+              <a:t>  = 5, generated 2 clusters </a:t>
+            </a:r>
+            <a:br>
+              <a:rPr lang="en-IN" sz="1600" dirty="0" smtClean="0"/>
+            </a:br>
+            <a:r>
+              <a:rPr lang="en-IN" sz="1600" dirty="0" smtClean="0"/>
+              <a:t>but did </a:t>
+            </a:r>
+            <a:r>
+              <a:rPr lang="en-IN" sz="1600" dirty="0"/>
+              <a:t>not generate </a:t>
+            </a:r>
+            <a:r>
+              <a:rPr lang="en-IN" sz="1600" dirty="0" smtClean="0"/>
+              <a:t>any </a:t>
+            </a:r>
+            <a:r>
+              <a:rPr lang="en-IN" sz="1600" dirty="0"/>
+              <a:t>useful </a:t>
+            </a:r>
+            <a:r>
+              <a:rPr lang="en-IN" sz="1600" dirty="0" smtClean="0"/>
+              <a:t>results </a:t>
+            </a:r>
+            <a:br>
+              <a:rPr lang="en-IN" sz="1600" dirty="0" smtClean="0"/>
+            </a:br>
+            <a:r>
+              <a:rPr lang="en-IN" sz="1600" dirty="0" smtClean="0"/>
+              <a:t>in regards to the risk groups.</a:t>
+            </a:r>
+          </a:p>
+          <a:p>
+            <a:pPr lvl="1"/>
+            <a:r>
+              <a:rPr lang="en-IN" sz="1600" dirty="0" smtClean="0"/>
+              <a:t>Conclusion: DBSCAN is not a correct choice to proceed, </a:t>
+            </a:r>
+            <a:br>
+              <a:rPr lang="en-IN" sz="1600" dirty="0" smtClean="0"/>
+            </a:br>
+            <a:r>
+              <a:rPr lang="en-IN" sz="1600" dirty="0" smtClean="0"/>
+              <a:t>as data is not easily separable.</a:t>
+            </a:r>
+            <a:endParaRPr lang="en-IN" sz="1600" dirty="0"/>
+          </a:p>
+          <a:p>
+            <a:endParaRPr lang="en-IN" dirty="0"/>
+          </a:p>
+          <a:p>
+            <a:endParaRPr lang="en-IN" dirty="0"/>
+          </a:p>
+          <a:p>
+            <a:endParaRPr lang="en-IN" dirty="0"/>
+          </a:p>
+        </p:txBody>
+      </p:sp>
+      <p:sp>
+        <p:nvSpPr>
+          <p:cNvPr id="4" name="Footer Placeholder 3">
+            <a:extLst>
+              <a:ext uri="{FF2B5EF4-FFF2-40B4-BE49-F238E27FC236}">
+                <a16:creationId xmlns:a16="http://schemas.microsoft.com/office/drawing/2014/main" id="{104A305F-50DE-440A-B627-60B3F1A61E81}"/>
+              </a:ext>
+            </a:extLst>
+          </p:cNvPr>
+          <p:cNvSpPr>
+            <a:spLocks noGrp="1"/>
+          </p:cNvSpPr>
+          <p:nvPr>
+            <p:ph type="ftr" sz="quarter" idx="11"/>
+          </p:nvPr>
+        </p:nvSpPr>
+        <p:spPr/>
+        <p:txBody>
+          <a:bodyPr/>
+          <a:lstStyle/>
+          <a:p>
+            <a:r>
+              <a:rPr lang="en-US"/>
+              <a:t>Vaibhav Gaikwad (2018HT12597)</a:t>
+            </a:r>
+            <a:endParaRPr lang="en-US" dirty="0"/>
+          </a:p>
+        </p:txBody>
+      </p:sp>
+      <p:sp>
+        <p:nvSpPr>
+          <p:cNvPr id="5" name="Slide Number Placeholder 4">
+            <a:extLst>
+              <a:ext uri="{FF2B5EF4-FFF2-40B4-BE49-F238E27FC236}">
+                <a16:creationId xmlns:a16="http://schemas.microsoft.com/office/drawing/2014/main" id="{FD3F77B0-099F-4563-AFAF-1E022D47F219}"/>
+              </a:ext>
+            </a:extLst>
+          </p:cNvPr>
+          <p:cNvSpPr>
+            <a:spLocks noGrp="1"/>
+          </p:cNvSpPr>
+          <p:nvPr>
+            <p:ph type="sldNum" sz="quarter" idx="12"/>
+          </p:nvPr>
+        </p:nvSpPr>
+        <p:spPr/>
+        <p:txBody>
+          <a:bodyPr/>
+          <a:lstStyle/>
+          <a:p>
+            <a:r>
+              <a:rPr lang="en-US" dirty="0"/>
+              <a:t>6</a:t>
+            </a:r>
+          </a:p>
+        </p:txBody>
+      </p:sp>
+      <p:pic>
+        <p:nvPicPr>
+          <p:cNvPr id="13" name="Picture 12"/>
+          <p:cNvPicPr/>
+          <p:nvPr/>
+        </p:nvPicPr>
+        <p:blipFill>
+          <a:blip r:embed="rId2"/>
+          <a:stretch>
+            <a:fillRect/>
+          </a:stretch>
+        </p:blipFill>
+        <p:spPr>
+          <a:xfrm>
+            <a:off x="6776884" y="2573261"/>
+            <a:ext cx="4547710" cy="3369573"/>
+          </a:xfrm>
+          <a:prstGeom prst="rect">
+            <a:avLst/>
+          </a:prstGeom>
+        </p:spPr>
+      </p:pic>
+    </p:spTree>
+    <p:extLst>
+      <p:ext uri="{BB962C8B-B14F-4D97-AF65-F5344CB8AC3E}">
+        <p14:creationId xmlns:p14="http://schemas.microsoft.com/office/powerpoint/2010/main" val="2389237330"/>
+      </p:ext>
+    </p:extLst>
+  </p:cSld>
+  <p:clrMapOvr>
+    <a:masterClrMapping/>
+  </p:clrMapOvr>
+  <p:timing>
+    <p:tnLst>
+      <p:par>
+        <p:cTn id="1" dur="indefinite" restart="never" nodeType="tmRoot"/>
+      </p:par>
+    </p:tnLst>
+  </p:timing>
+</p:sld>
+</file>
+
+<file path=ppt/slides/slide15.xml><?xml version="1.0" encoding="utf-8"?>
 <p:sld xmlns:a="http://schemas.openxmlformats.org/drawingml/2006/main" xmlns:r="http://schemas.openxmlformats.org/officeDocument/2006/relationships" xmlns:p="http://schemas.openxmlformats.org/presentationml/2006/main">
   <p:cSld>
     <p:spTree>
@@ -6233,17 +6829,24 @@
     </p:spTree>
     <p:extLst>
       <p:ext uri="{BB962C8B-B14F-4D97-AF65-F5344CB8AC3E}">
-        <p14:creationId xmlns:p14="http://schemas.microsoft.com/office/powerpoint/2010/main" val="1154019050"/>
+        <p14:creationId xmlns:p14="http://schemas.microsoft.com/office/powerpoint/2010/main" val="3056788143"/>
       </p:ext>
     </p:extLst>
   </p:cSld>
   <p:clrMapOvr>
     <a:masterClrMapping/>
   </p:clrMapOvr>
+  <p:timing>
+    <p:tnLst>
+      <p:par>
+        <p:cTn id="1" dur="indefinite" restart="never" nodeType="tmRoot"/>
+      </p:par>
+    </p:tnLst>
+  </p:timing>
 </p:sld>
 </file>
 
-<file path=ppt/slides/slide14.xml><?xml version="1.0" encoding="utf-8"?>
+<file path=ppt/slides/slide16.xml><?xml version="1.0" encoding="utf-8"?>
 <p:sld xmlns:a="http://schemas.openxmlformats.org/drawingml/2006/main" xmlns:r="http://schemas.openxmlformats.org/officeDocument/2006/relationships" xmlns:p="http://schemas.openxmlformats.org/presentationml/2006/main">
   <p:cSld>
     <p:spTree>
@@ -6411,7 +7014,7 @@
           <a:p>
             <a:fld id="{3A98EE3D-8CD1-4C3F-BD1C-C98C9596463C}" type="slidenum">
               <a:rPr lang="en-US" smtClean="0"/>
-              <a:t>14</a:t>
+              <a:t>16</a:t>
             </a:fld>
             <a:endParaRPr lang="en-US" dirty="0"/>
           </a:p>
@@ -6439,7 +7042,7 @@
         </p:nvGraphicFramePr>
         <p:xfrm>
           <a:off x="5796193" y="4629572"/>
-          <a:ext cx="5587394" cy="1239520"/>
+          <a:ext cx="5587394" cy="1463040"/>
         </p:xfrm>
         <a:graphic>
           <a:graphicData uri="http://schemas.openxmlformats.org/drawingml/2006/table">
@@ -7250,7 +7853,7 @@
 </p:sld>
 </file>
 
-<file path=ppt/slides/slide15.xml><?xml version="1.0" encoding="utf-8"?>
+<file path=ppt/slides/slide17.xml><?xml version="1.0" encoding="utf-8"?>
 <p:sld xmlns:a="http://schemas.openxmlformats.org/drawingml/2006/main" xmlns:r="http://schemas.openxmlformats.org/officeDocument/2006/relationships" xmlns:p="http://schemas.openxmlformats.org/presentationml/2006/main">
   <p:cSld>
     <p:spTree>
@@ -7438,7 +8041,7 @@
           <a:p>
             <a:fld id="{3A98EE3D-8CD1-4C3F-BD1C-C98C9596463C}" type="slidenum">
               <a:rPr lang="en-US" smtClean="0"/>
-              <a:t>15</a:t>
+              <a:t>17</a:t>
             </a:fld>
             <a:endParaRPr lang="en-US" dirty="0"/>
           </a:p>
@@ -7522,7 +8125,7 @@
         </p:nvGraphicFramePr>
         <p:xfrm>
           <a:off x="1097279" y="4329976"/>
-          <a:ext cx="5937250" cy="1239520"/>
+          <a:ext cx="5937250" cy="1463040"/>
         </p:xfrm>
         <a:graphic>
           <a:graphicData uri="http://schemas.openxmlformats.org/drawingml/2006/table">
@@ -8351,7 +8954,7 @@
 </p:sld>
 </file>
 
-<file path=ppt/slides/slide16.xml><?xml version="1.0" encoding="utf-8"?>
+<file path=ppt/slides/slide18.xml><?xml version="1.0" encoding="utf-8"?>
 <p:sld xmlns:a="http://schemas.openxmlformats.org/drawingml/2006/main" xmlns:r="http://schemas.openxmlformats.org/officeDocument/2006/relationships" xmlns:p="http://schemas.openxmlformats.org/presentationml/2006/main">
   <p:cSld>
     <p:spTree>
@@ -8445,13 +9048,44 @@
               <a:rPr lang="en-IN" sz="1600" dirty="0"/>
               <a:t>The focus is on the high-risk cluster size, </a:t>
             </a:r>
+            <a:r>
+              <a:rPr lang="en-IN" sz="1600" dirty="0" smtClean="0"/>
+              <a:t/>
+            </a:r>
             <a:br>
+              <a:rPr lang="en-IN" sz="1600" dirty="0" smtClean="0"/>
+            </a:br>
+            <a:r>
+              <a:rPr lang="en-IN" sz="1600" dirty="0" smtClean="0"/>
+              <a:t>decreasing </a:t>
+            </a:r>
+            <a:r>
               <a:rPr lang="en-IN" sz="1600" dirty="0"/>
-            </a:br>
-            <a:r>
-              <a:rPr lang="en-IN" sz="1600" dirty="0"/>
-              <a:t>Decreasing trend of high-risk cluster indicates good QoC. </a:t>
-            </a:r>
+              <a:t>trend of high-risk cluster indicates good QoC. </a:t>
+            </a:r>
+            <a:endParaRPr lang="en-IN" sz="1600" dirty="0" smtClean="0"/>
+          </a:p>
+          <a:p>
+            <a:pPr lvl="1"/>
+            <a:r>
+              <a:rPr lang="en-IN" sz="1600" dirty="0" smtClean="0"/>
+              <a:t>Following example data is plotted (C1: high risk cluster)</a:t>
+            </a:r>
+          </a:p>
+          <a:p>
+            <a:pPr lvl="1"/>
+            <a:r>
+              <a:rPr lang="en-IN" sz="1600" dirty="0" smtClean="0"/>
+              <a:t>Simple linear regression (colour: red) line is added + slope details</a:t>
+            </a:r>
+          </a:p>
+          <a:p>
+            <a:pPr lvl="1"/>
+            <a:r>
+              <a:rPr lang="en-IN" sz="1600" dirty="0" smtClean="0"/>
+              <a:t>Negative slope: Good  QoC (for high risk)</a:t>
+            </a:r>
+            <a:endParaRPr lang="en-IN" sz="1600" dirty="0"/>
           </a:p>
           <a:p>
             <a:pPr marL="0" indent="0">
@@ -8528,7 +9162,7 @@
           <a:p>
             <a:fld id="{3A98EE3D-8CD1-4C3F-BD1C-C98C9596463C}" type="slidenum">
               <a:rPr lang="en-US" smtClean="0"/>
-              <a:t>16</a:t>
+              <a:t>18</a:t>
             </a:fld>
             <a:endParaRPr lang="en-US" dirty="0"/>
           </a:p>
@@ -8549,14 +9183,14 @@
           <p:nvPr>
             <p:extLst>
               <p:ext uri="{D42A27DB-BD31-4B8C-83A1-F6EECF244321}">
-                <p14:modId xmlns:p14="http://schemas.microsoft.com/office/powerpoint/2010/main" val="119688992"/>
+                <p14:modId xmlns:p14="http://schemas.microsoft.com/office/powerpoint/2010/main" val="3096647112"/>
               </p:ext>
             </p:extLst>
           </p:nvPr>
         </p:nvGraphicFramePr>
         <p:xfrm>
-          <a:off x="1290196" y="4617155"/>
-          <a:ext cx="6025902" cy="1239520"/>
+          <a:off x="1333254" y="4898813"/>
+          <a:ext cx="6025902" cy="1341120"/>
         </p:xfrm>
         <a:graphic>
           <a:graphicData uri="http://schemas.openxmlformats.org/drawingml/2006/table">
@@ -8672,12 +9306,12 @@
                         </a:spcAft>
                       </a:pPr>
                       <a:r>
-                        <a:rPr lang="en-IN" sz="1200">
+                        <a:rPr lang="en-IN" sz="1100" dirty="0">
                           <a:effectLst/>
                         </a:rPr>
                         <a:t> </a:t>
                       </a:r>
-                      <a:endParaRPr lang="en-IN" sz="1200">
+                      <a:endParaRPr lang="en-IN" sz="1100" dirty="0">
                         <a:effectLst/>
                         <a:latin typeface="Times New Roman" panose="02020603050405020304" pitchFamily="18" charset="0"/>
                         <a:ea typeface="Calibri" panose="020F0502020204030204" pitchFamily="34" charset="0"/>
@@ -8701,12 +9335,12 @@
                         </a:spcAft>
                       </a:pPr>
                       <a:r>
-                        <a:rPr lang="en-IN" sz="1200">
+                        <a:rPr lang="en-IN" sz="1100">
                           <a:effectLst/>
                         </a:rPr>
                         <a:t>Jan</a:t>
                       </a:r>
-                      <a:endParaRPr lang="en-IN" sz="1200">
+                      <a:endParaRPr lang="en-IN" sz="1100">
                         <a:effectLst/>
                         <a:latin typeface="Times New Roman" panose="02020603050405020304" pitchFamily="18" charset="0"/>
                         <a:ea typeface="Calibri" panose="020F0502020204030204" pitchFamily="34" charset="0"/>
@@ -8730,12 +9364,12 @@
                         </a:spcAft>
                       </a:pPr>
                       <a:r>
-                        <a:rPr lang="en-IN" sz="1200">
+                        <a:rPr lang="en-IN" sz="1100">
                           <a:effectLst/>
                         </a:rPr>
                         <a:t>Feb</a:t>
                       </a:r>
-                      <a:endParaRPr lang="en-IN" sz="1200">
+                      <a:endParaRPr lang="en-IN" sz="1100">
                         <a:effectLst/>
                         <a:latin typeface="Times New Roman" panose="02020603050405020304" pitchFamily="18" charset="0"/>
                         <a:ea typeface="Calibri" panose="020F0502020204030204" pitchFamily="34" charset="0"/>
@@ -8759,12 +9393,12 @@
                         </a:spcAft>
                       </a:pPr>
                       <a:r>
-                        <a:rPr lang="en-IN" sz="1200">
+                        <a:rPr lang="en-IN" sz="1100" dirty="0">
                           <a:effectLst/>
                         </a:rPr>
                         <a:t>Mar</a:t>
                       </a:r>
-                      <a:endParaRPr lang="en-IN" sz="1200">
+                      <a:endParaRPr lang="en-IN" sz="1100" dirty="0">
                         <a:effectLst/>
                         <a:latin typeface="Times New Roman" panose="02020603050405020304" pitchFamily="18" charset="0"/>
                         <a:ea typeface="Calibri" panose="020F0502020204030204" pitchFamily="34" charset="0"/>
@@ -8788,12 +9422,12 @@
                         </a:spcAft>
                       </a:pPr>
                       <a:r>
-                        <a:rPr lang="en-IN" sz="1200" dirty="0">
+                        <a:rPr lang="en-IN" sz="1100" dirty="0">
                           <a:effectLst/>
                         </a:rPr>
                         <a:t>Apr</a:t>
                       </a:r>
-                      <a:endParaRPr lang="en-IN" sz="1200" dirty="0">
+                      <a:endParaRPr lang="en-IN" sz="1100" dirty="0">
                         <a:effectLst/>
                         <a:latin typeface="Times New Roman" panose="02020603050405020304" pitchFamily="18" charset="0"/>
                         <a:ea typeface="Calibri" panose="020F0502020204030204" pitchFamily="34" charset="0"/>
@@ -8817,12 +9451,12 @@
                         </a:spcAft>
                       </a:pPr>
                       <a:r>
-                        <a:rPr lang="en-IN" sz="1200">
+                        <a:rPr lang="en-IN" sz="1100">
                           <a:effectLst/>
                         </a:rPr>
                         <a:t>May</a:t>
                       </a:r>
-                      <a:endParaRPr lang="en-IN" sz="1200">
+                      <a:endParaRPr lang="en-IN" sz="1100">
                         <a:effectLst/>
                         <a:latin typeface="Times New Roman" panose="02020603050405020304" pitchFamily="18" charset="0"/>
                         <a:ea typeface="Calibri" panose="020F0502020204030204" pitchFamily="34" charset="0"/>
@@ -8846,12 +9480,12 @@
                         </a:spcAft>
                       </a:pPr>
                       <a:r>
-                        <a:rPr lang="en-IN" sz="1200">
+                        <a:rPr lang="en-IN" sz="1100">
                           <a:effectLst/>
                         </a:rPr>
                         <a:t>Jun</a:t>
                       </a:r>
-                      <a:endParaRPr lang="en-IN" sz="1200">
+                      <a:endParaRPr lang="en-IN" sz="1100">
                         <a:effectLst/>
                         <a:latin typeface="Times New Roman" panose="02020603050405020304" pitchFamily="18" charset="0"/>
                         <a:ea typeface="Calibri" panose="020F0502020204030204" pitchFamily="34" charset="0"/>
@@ -8875,12 +9509,12 @@
                         </a:spcAft>
                       </a:pPr>
                       <a:r>
-                        <a:rPr lang="en-IN" sz="1200">
+                        <a:rPr lang="en-IN" sz="1100">
                           <a:effectLst/>
                         </a:rPr>
                         <a:t>Jul</a:t>
                       </a:r>
-                      <a:endParaRPr lang="en-IN" sz="1200">
+                      <a:endParaRPr lang="en-IN" sz="1100">
                         <a:effectLst/>
                         <a:latin typeface="Times New Roman" panose="02020603050405020304" pitchFamily="18" charset="0"/>
                         <a:ea typeface="Calibri" panose="020F0502020204030204" pitchFamily="34" charset="0"/>
@@ -8904,12 +9538,12 @@
                         </a:spcAft>
                       </a:pPr>
                       <a:r>
-                        <a:rPr lang="en-IN" sz="1200">
+                        <a:rPr lang="en-IN" sz="1100" dirty="0">
                           <a:effectLst/>
                         </a:rPr>
                         <a:t>Aug</a:t>
                       </a:r>
-                      <a:endParaRPr lang="en-IN" sz="1200">
+                      <a:endParaRPr lang="en-IN" sz="1100" dirty="0">
                         <a:effectLst/>
                         <a:latin typeface="Times New Roman" panose="02020603050405020304" pitchFamily="18" charset="0"/>
                         <a:ea typeface="Calibri" panose="020F0502020204030204" pitchFamily="34" charset="0"/>
@@ -8933,12 +9567,12 @@
                         </a:spcAft>
                       </a:pPr>
                       <a:r>
-                        <a:rPr lang="en-IN" sz="1200">
+                        <a:rPr lang="en-IN" sz="1100">
                           <a:effectLst/>
                         </a:rPr>
                         <a:t>Sep</a:t>
                       </a:r>
-                      <a:endParaRPr lang="en-IN" sz="1200">
+                      <a:endParaRPr lang="en-IN" sz="1100">
                         <a:effectLst/>
                         <a:latin typeface="Times New Roman" panose="02020603050405020304" pitchFamily="18" charset="0"/>
                         <a:ea typeface="Calibri" panose="020F0502020204030204" pitchFamily="34" charset="0"/>
@@ -8962,12 +9596,12 @@
                         </a:spcAft>
                       </a:pPr>
                       <a:r>
-                        <a:rPr lang="en-IN" sz="1200">
+                        <a:rPr lang="en-IN" sz="1100">
                           <a:effectLst/>
                         </a:rPr>
                         <a:t>Oct</a:t>
                       </a:r>
-                      <a:endParaRPr lang="en-IN" sz="1200">
+                      <a:endParaRPr lang="en-IN" sz="1100">
                         <a:effectLst/>
                         <a:latin typeface="Times New Roman" panose="02020603050405020304" pitchFamily="18" charset="0"/>
                         <a:ea typeface="Calibri" panose="020F0502020204030204" pitchFamily="34" charset="0"/>
@@ -8991,12 +9625,12 @@
                         </a:spcAft>
                       </a:pPr>
                       <a:r>
-                        <a:rPr lang="en-IN" sz="1200">
+                        <a:rPr lang="en-IN" sz="1100" dirty="0">
                           <a:effectLst/>
                         </a:rPr>
                         <a:t>Nov</a:t>
                       </a:r>
-                      <a:endParaRPr lang="en-IN" sz="1200">
+                      <a:endParaRPr lang="en-IN" sz="1100" dirty="0">
                         <a:effectLst/>
                         <a:latin typeface="Times New Roman" panose="02020603050405020304" pitchFamily="18" charset="0"/>
                         <a:ea typeface="Calibri" panose="020F0502020204030204" pitchFamily="34" charset="0"/>
@@ -9020,12 +9654,12 @@
                         </a:spcAft>
                       </a:pPr>
                       <a:r>
-                        <a:rPr lang="en-IN" sz="1200">
+                        <a:rPr lang="en-IN" sz="1100">
                           <a:effectLst/>
                         </a:rPr>
                         <a:t>Dec</a:t>
                       </a:r>
-                      <a:endParaRPr lang="en-IN" sz="1200">
+                      <a:endParaRPr lang="en-IN" sz="1100">
                         <a:effectLst/>
                         <a:latin typeface="Times New Roman" panose="02020603050405020304" pitchFamily="18" charset="0"/>
                         <a:ea typeface="Calibri" panose="020F0502020204030204" pitchFamily="34" charset="0"/>
@@ -9056,12 +9690,12 @@
                         </a:spcAft>
                       </a:pPr>
                       <a:r>
-                        <a:rPr lang="en-IN" sz="1200">
+                        <a:rPr lang="en-IN" sz="1100">
                           <a:effectLst/>
                         </a:rPr>
                         <a:t>C1</a:t>
                       </a:r>
-                      <a:endParaRPr lang="en-IN" sz="1200">
+                      <a:endParaRPr lang="en-IN" sz="1100">
                         <a:effectLst/>
                         <a:latin typeface="Times New Roman" panose="02020603050405020304" pitchFamily="18" charset="0"/>
                         <a:ea typeface="Calibri" panose="020F0502020204030204" pitchFamily="34" charset="0"/>
@@ -9085,12 +9719,12 @@
                         </a:spcAft>
                       </a:pPr>
                       <a:r>
-                        <a:rPr lang="en-IN" sz="1200">
+                        <a:rPr lang="en-IN" sz="1100">
                           <a:effectLst/>
                         </a:rPr>
                         <a:t>85</a:t>
                       </a:r>
-                      <a:endParaRPr lang="en-IN" sz="1200">
+                      <a:endParaRPr lang="en-IN" sz="1100">
                         <a:effectLst/>
                         <a:latin typeface="Times New Roman" panose="02020603050405020304" pitchFamily="18" charset="0"/>
                         <a:ea typeface="Calibri" panose="020F0502020204030204" pitchFamily="34" charset="0"/>
@@ -9114,12 +9748,12 @@
                         </a:spcAft>
                       </a:pPr>
                       <a:r>
-                        <a:rPr lang="en-IN" sz="1200">
+                        <a:rPr lang="en-IN" sz="1100">
                           <a:effectLst/>
                         </a:rPr>
                         <a:t>86</a:t>
                       </a:r>
-                      <a:endParaRPr lang="en-IN" sz="1200">
+                      <a:endParaRPr lang="en-IN" sz="1100">
                         <a:effectLst/>
                         <a:latin typeface="Times New Roman" panose="02020603050405020304" pitchFamily="18" charset="0"/>
                         <a:ea typeface="Calibri" panose="020F0502020204030204" pitchFamily="34" charset="0"/>
@@ -9143,12 +9777,12 @@
                         </a:spcAft>
                       </a:pPr>
                       <a:r>
-                        <a:rPr lang="en-IN" sz="1200">
+                        <a:rPr lang="en-IN" sz="1100">
                           <a:effectLst/>
                         </a:rPr>
                         <a:t>85</a:t>
                       </a:r>
-                      <a:endParaRPr lang="en-IN" sz="1200">
+                      <a:endParaRPr lang="en-IN" sz="1100">
                         <a:effectLst/>
                         <a:latin typeface="Times New Roman" panose="02020603050405020304" pitchFamily="18" charset="0"/>
                         <a:ea typeface="Calibri" panose="020F0502020204030204" pitchFamily="34" charset="0"/>
@@ -9172,12 +9806,12 @@
                         </a:spcAft>
                       </a:pPr>
                       <a:r>
-                        <a:rPr lang="en-IN" sz="1200">
+                        <a:rPr lang="en-IN" sz="1100">
                           <a:effectLst/>
                         </a:rPr>
                         <a:t>82</a:t>
                       </a:r>
-                      <a:endParaRPr lang="en-IN" sz="1200">
+                      <a:endParaRPr lang="en-IN" sz="1100">
                         <a:effectLst/>
                         <a:latin typeface="Times New Roman" panose="02020603050405020304" pitchFamily="18" charset="0"/>
                         <a:ea typeface="Calibri" panose="020F0502020204030204" pitchFamily="34" charset="0"/>
@@ -9201,12 +9835,12 @@
                         </a:spcAft>
                       </a:pPr>
                       <a:r>
-                        <a:rPr lang="en-IN" sz="1200">
+                        <a:rPr lang="en-IN" sz="1100">
                           <a:effectLst/>
                         </a:rPr>
                         <a:t>75</a:t>
                       </a:r>
-                      <a:endParaRPr lang="en-IN" sz="1200">
+                      <a:endParaRPr lang="en-IN" sz="1100">
                         <a:effectLst/>
                         <a:latin typeface="Times New Roman" panose="02020603050405020304" pitchFamily="18" charset="0"/>
                         <a:ea typeface="Calibri" panose="020F0502020204030204" pitchFamily="34" charset="0"/>
@@ -9230,12 +9864,12 @@
                         </a:spcAft>
                       </a:pPr>
                       <a:r>
-                        <a:rPr lang="en-IN" sz="1200">
+                        <a:rPr lang="en-IN" sz="1100">
                           <a:effectLst/>
                         </a:rPr>
                         <a:t>78</a:t>
                       </a:r>
-                      <a:endParaRPr lang="en-IN" sz="1200">
+                      <a:endParaRPr lang="en-IN" sz="1100">
                         <a:effectLst/>
                         <a:latin typeface="Times New Roman" panose="02020603050405020304" pitchFamily="18" charset="0"/>
                         <a:ea typeface="Calibri" panose="020F0502020204030204" pitchFamily="34" charset="0"/>
@@ -9259,12 +9893,12 @@
                         </a:spcAft>
                       </a:pPr>
                       <a:r>
-                        <a:rPr lang="en-IN" sz="1200">
+                        <a:rPr lang="en-IN" sz="1100">
                           <a:effectLst/>
                         </a:rPr>
                         <a:t>74</a:t>
                       </a:r>
-                      <a:endParaRPr lang="en-IN" sz="1200">
+                      <a:endParaRPr lang="en-IN" sz="1100">
                         <a:effectLst/>
                         <a:latin typeface="Times New Roman" panose="02020603050405020304" pitchFamily="18" charset="0"/>
                         <a:ea typeface="Calibri" panose="020F0502020204030204" pitchFamily="34" charset="0"/>
@@ -9288,12 +9922,12 @@
                         </a:spcAft>
                       </a:pPr>
                       <a:r>
-                        <a:rPr lang="en-IN" sz="1200">
+                        <a:rPr lang="en-IN" sz="1100">
                           <a:effectLst/>
                         </a:rPr>
                         <a:t>70</a:t>
                       </a:r>
-                      <a:endParaRPr lang="en-IN" sz="1200">
+                      <a:endParaRPr lang="en-IN" sz="1100">
                         <a:effectLst/>
                         <a:latin typeface="Times New Roman" panose="02020603050405020304" pitchFamily="18" charset="0"/>
                         <a:ea typeface="Calibri" panose="020F0502020204030204" pitchFamily="34" charset="0"/>
@@ -9317,12 +9951,12 @@
                         </a:spcAft>
                       </a:pPr>
                       <a:r>
-                        <a:rPr lang="en-IN" sz="1200">
+                        <a:rPr lang="en-IN" sz="1100">
                           <a:effectLst/>
                         </a:rPr>
                         <a:t>65</a:t>
                       </a:r>
-                      <a:endParaRPr lang="en-IN" sz="1200">
+                      <a:endParaRPr lang="en-IN" sz="1100">
                         <a:effectLst/>
                         <a:latin typeface="Times New Roman" panose="02020603050405020304" pitchFamily="18" charset="0"/>
                         <a:ea typeface="Calibri" panose="020F0502020204030204" pitchFamily="34" charset="0"/>
@@ -9346,12 +9980,12 @@
                         </a:spcAft>
                       </a:pPr>
                       <a:r>
-                        <a:rPr lang="en-IN" sz="1200">
+                        <a:rPr lang="en-IN" sz="1100">
                           <a:effectLst/>
                         </a:rPr>
                         <a:t>64</a:t>
                       </a:r>
-                      <a:endParaRPr lang="en-IN" sz="1200">
+                      <a:endParaRPr lang="en-IN" sz="1100">
                         <a:effectLst/>
                         <a:latin typeface="Times New Roman" panose="02020603050405020304" pitchFamily="18" charset="0"/>
                         <a:ea typeface="Calibri" panose="020F0502020204030204" pitchFamily="34" charset="0"/>
@@ -9375,12 +10009,12 @@
                         </a:spcAft>
                       </a:pPr>
                       <a:r>
-                        <a:rPr lang="en-IN" sz="1200">
+                        <a:rPr lang="en-IN" sz="1100">
                           <a:effectLst/>
                         </a:rPr>
                         <a:t>60</a:t>
                       </a:r>
-                      <a:endParaRPr lang="en-IN" sz="1200">
+                      <a:endParaRPr lang="en-IN" sz="1100">
                         <a:effectLst/>
                         <a:latin typeface="Times New Roman" panose="02020603050405020304" pitchFamily="18" charset="0"/>
                         <a:ea typeface="Calibri" panose="020F0502020204030204" pitchFamily="34" charset="0"/>
@@ -9404,12 +10038,12 @@
                         </a:spcAft>
                       </a:pPr>
                       <a:r>
-                        <a:rPr lang="en-IN" sz="1200">
+                        <a:rPr lang="en-IN" sz="1100">
                           <a:effectLst/>
                         </a:rPr>
                         <a:t>56</a:t>
                       </a:r>
-                      <a:endParaRPr lang="en-IN" sz="1200">
+                      <a:endParaRPr lang="en-IN" sz="1100">
                         <a:effectLst/>
                         <a:latin typeface="Times New Roman" panose="02020603050405020304" pitchFamily="18" charset="0"/>
                         <a:ea typeface="Calibri" panose="020F0502020204030204" pitchFamily="34" charset="0"/>
@@ -9440,12 +10074,12 @@
                         </a:spcAft>
                       </a:pPr>
                       <a:r>
-                        <a:rPr lang="en-IN" sz="1200">
+                        <a:rPr lang="en-IN" sz="1100">
                           <a:effectLst/>
                         </a:rPr>
                         <a:t>C2</a:t>
                       </a:r>
-                      <a:endParaRPr lang="en-IN" sz="1200">
+                      <a:endParaRPr lang="en-IN" sz="1100">
                         <a:effectLst/>
                         <a:latin typeface="Times New Roman" panose="02020603050405020304" pitchFamily="18" charset="0"/>
                         <a:ea typeface="Calibri" panose="020F0502020204030204" pitchFamily="34" charset="0"/>
@@ -9469,12 +10103,12 @@
                         </a:spcAft>
                       </a:pPr>
                       <a:r>
-                        <a:rPr lang="en-IN" sz="1200">
+                        <a:rPr lang="en-IN" sz="1100">
                           <a:effectLst/>
                         </a:rPr>
                         <a:t>39</a:t>
                       </a:r>
-                      <a:endParaRPr lang="en-IN" sz="1200">
+                      <a:endParaRPr lang="en-IN" sz="1100">
                         <a:effectLst/>
                         <a:latin typeface="Times New Roman" panose="02020603050405020304" pitchFamily="18" charset="0"/>
                         <a:ea typeface="Calibri" panose="020F0502020204030204" pitchFamily="34" charset="0"/>
@@ -9498,12 +10132,12 @@
                         </a:spcAft>
                       </a:pPr>
                       <a:r>
-                        <a:rPr lang="en-IN" sz="1200">
+                        <a:rPr lang="en-IN" sz="1100">
                           <a:effectLst/>
                         </a:rPr>
                         <a:t>39</a:t>
                       </a:r>
-                      <a:endParaRPr lang="en-IN" sz="1200">
+                      <a:endParaRPr lang="en-IN" sz="1100">
                         <a:effectLst/>
                         <a:latin typeface="Times New Roman" panose="02020603050405020304" pitchFamily="18" charset="0"/>
                         <a:ea typeface="Calibri" panose="020F0502020204030204" pitchFamily="34" charset="0"/>
@@ -9527,12 +10161,12 @@
                         </a:spcAft>
                       </a:pPr>
                       <a:r>
-                        <a:rPr lang="en-IN" sz="1200">
+                        <a:rPr lang="en-IN" sz="1100">
                           <a:effectLst/>
                         </a:rPr>
                         <a:t>40</a:t>
                       </a:r>
-                      <a:endParaRPr lang="en-IN" sz="1200">
+                      <a:endParaRPr lang="en-IN" sz="1100">
                         <a:effectLst/>
                         <a:latin typeface="Times New Roman" panose="02020603050405020304" pitchFamily="18" charset="0"/>
                         <a:ea typeface="Calibri" panose="020F0502020204030204" pitchFamily="34" charset="0"/>
@@ -9556,12 +10190,12 @@
                         </a:spcAft>
                       </a:pPr>
                       <a:r>
-                        <a:rPr lang="en-IN" sz="1200">
+                        <a:rPr lang="en-IN" sz="1100">
                           <a:effectLst/>
                         </a:rPr>
                         <a:t>43</a:t>
                       </a:r>
-                      <a:endParaRPr lang="en-IN" sz="1200">
+                      <a:endParaRPr lang="en-IN" sz="1100">
                         <a:effectLst/>
                         <a:latin typeface="Times New Roman" panose="02020603050405020304" pitchFamily="18" charset="0"/>
                         <a:ea typeface="Calibri" panose="020F0502020204030204" pitchFamily="34" charset="0"/>
@@ -9585,12 +10219,12 @@
                         </a:spcAft>
                       </a:pPr>
                       <a:r>
-                        <a:rPr lang="en-IN" sz="1200">
+                        <a:rPr lang="en-IN" sz="1100">
                           <a:effectLst/>
                         </a:rPr>
                         <a:t>47</a:t>
                       </a:r>
-                      <a:endParaRPr lang="en-IN" sz="1200">
+                      <a:endParaRPr lang="en-IN" sz="1100">
                         <a:effectLst/>
                         <a:latin typeface="Times New Roman" panose="02020603050405020304" pitchFamily="18" charset="0"/>
                         <a:ea typeface="Calibri" panose="020F0502020204030204" pitchFamily="34" charset="0"/>
@@ -9614,12 +10248,12 @@
                         </a:spcAft>
                       </a:pPr>
                       <a:r>
-                        <a:rPr lang="en-IN" sz="1200">
+                        <a:rPr lang="en-IN" sz="1100">
                           <a:effectLst/>
                         </a:rPr>
                         <a:t>44</a:t>
                       </a:r>
-                      <a:endParaRPr lang="en-IN" sz="1200">
+                      <a:endParaRPr lang="en-IN" sz="1100">
                         <a:effectLst/>
                         <a:latin typeface="Times New Roman" panose="02020603050405020304" pitchFamily="18" charset="0"/>
                         <a:ea typeface="Calibri" panose="020F0502020204030204" pitchFamily="34" charset="0"/>
@@ -9643,12 +10277,12 @@
                         </a:spcAft>
                       </a:pPr>
                       <a:r>
-                        <a:rPr lang="en-IN" sz="1200">
+                        <a:rPr lang="en-IN" sz="1100">
                           <a:effectLst/>
                         </a:rPr>
                         <a:t>46</a:t>
                       </a:r>
-                      <a:endParaRPr lang="en-IN" sz="1200">
+                      <a:endParaRPr lang="en-IN" sz="1100">
                         <a:effectLst/>
                         <a:latin typeface="Times New Roman" panose="02020603050405020304" pitchFamily="18" charset="0"/>
                         <a:ea typeface="Calibri" panose="020F0502020204030204" pitchFamily="34" charset="0"/>
@@ -9672,12 +10306,12 @@
                         </a:spcAft>
                       </a:pPr>
                       <a:r>
-                        <a:rPr lang="en-IN" sz="1200">
+                        <a:rPr lang="en-IN" sz="1100">
                           <a:effectLst/>
                         </a:rPr>
                         <a:t>49</a:t>
                       </a:r>
-                      <a:endParaRPr lang="en-IN" sz="1200">
+                      <a:endParaRPr lang="en-IN" sz="1100">
                         <a:effectLst/>
                         <a:latin typeface="Times New Roman" panose="02020603050405020304" pitchFamily="18" charset="0"/>
                         <a:ea typeface="Calibri" panose="020F0502020204030204" pitchFamily="34" charset="0"/>
@@ -9701,12 +10335,12 @@
                         </a:spcAft>
                       </a:pPr>
                       <a:r>
-                        <a:rPr lang="en-IN" sz="1200">
+                        <a:rPr lang="en-IN" sz="1100">
                           <a:effectLst/>
                         </a:rPr>
                         <a:t>53</a:t>
                       </a:r>
-                      <a:endParaRPr lang="en-IN" sz="1200">
+                      <a:endParaRPr lang="en-IN" sz="1100">
                         <a:effectLst/>
                         <a:latin typeface="Times New Roman" panose="02020603050405020304" pitchFamily="18" charset="0"/>
                         <a:ea typeface="Calibri" panose="020F0502020204030204" pitchFamily="34" charset="0"/>
@@ -9730,12 +10364,12 @@
                         </a:spcAft>
                       </a:pPr>
                       <a:r>
-                        <a:rPr lang="en-IN" sz="1200">
+                        <a:rPr lang="en-IN" sz="1100">
                           <a:effectLst/>
                         </a:rPr>
                         <a:t>54</a:t>
                       </a:r>
-                      <a:endParaRPr lang="en-IN" sz="1200">
+                      <a:endParaRPr lang="en-IN" sz="1100">
                         <a:effectLst/>
                         <a:latin typeface="Times New Roman" panose="02020603050405020304" pitchFamily="18" charset="0"/>
                         <a:ea typeface="Calibri" panose="020F0502020204030204" pitchFamily="34" charset="0"/>
@@ -9759,12 +10393,12 @@
                         </a:spcAft>
                       </a:pPr>
                       <a:r>
-                        <a:rPr lang="en-IN" sz="1200">
+                        <a:rPr lang="en-IN" sz="1100">
                           <a:effectLst/>
                         </a:rPr>
                         <a:t>56</a:t>
                       </a:r>
-                      <a:endParaRPr lang="en-IN" sz="1200">
+                      <a:endParaRPr lang="en-IN" sz="1100">
                         <a:effectLst/>
                         <a:latin typeface="Times New Roman" panose="02020603050405020304" pitchFamily="18" charset="0"/>
                         <a:ea typeface="Calibri" panose="020F0502020204030204" pitchFamily="34" charset="0"/>
@@ -9788,12 +10422,12 @@
                         </a:spcAft>
                       </a:pPr>
                       <a:r>
-                        <a:rPr lang="en-IN" sz="1200">
+                        <a:rPr lang="en-IN" sz="1100">
                           <a:effectLst/>
                         </a:rPr>
                         <a:t>60</a:t>
                       </a:r>
-                      <a:endParaRPr lang="en-IN" sz="1200">
+                      <a:endParaRPr lang="en-IN" sz="1100">
                         <a:effectLst/>
                         <a:latin typeface="Times New Roman" panose="02020603050405020304" pitchFamily="18" charset="0"/>
                         <a:ea typeface="Calibri" panose="020F0502020204030204" pitchFamily="34" charset="0"/>
@@ -9824,12 +10458,12 @@
                         </a:spcAft>
                       </a:pPr>
                       <a:r>
-                        <a:rPr lang="en-IN" sz="1200">
+                        <a:rPr lang="en-IN" sz="1100">
                           <a:effectLst/>
                         </a:rPr>
                         <a:t>C3</a:t>
                       </a:r>
-                      <a:endParaRPr lang="en-IN" sz="1200">
+                      <a:endParaRPr lang="en-IN" sz="1100">
                         <a:effectLst/>
                         <a:latin typeface="Times New Roman" panose="02020603050405020304" pitchFamily="18" charset="0"/>
                         <a:ea typeface="Calibri" panose="020F0502020204030204" pitchFamily="34" charset="0"/>
@@ -9853,12 +10487,12 @@
                         </a:spcAft>
                       </a:pPr>
                       <a:r>
-                        <a:rPr lang="en-IN" sz="1200">
+                        <a:rPr lang="en-IN" sz="1100">
                           <a:effectLst/>
                         </a:rPr>
                         <a:t>76</a:t>
                       </a:r>
-                      <a:endParaRPr lang="en-IN" sz="1200">
+                      <a:endParaRPr lang="en-IN" sz="1100">
                         <a:effectLst/>
                         <a:latin typeface="Times New Roman" panose="02020603050405020304" pitchFamily="18" charset="0"/>
                         <a:ea typeface="Calibri" panose="020F0502020204030204" pitchFamily="34" charset="0"/>
@@ -9882,12 +10516,12 @@
                         </a:spcAft>
                       </a:pPr>
                       <a:r>
-                        <a:rPr lang="en-IN" sz="1200">
+                        <a:rPr lang="en-IN" sz="1100">
                           <a:effectLst/>
                         </a:rPr>
                         <a:t>75</a:t>
                       </a:r>
-                      <a:endParaRPr lang="en-IN" sz="1200">
+                      <a:endParaRPr lang="en-IN" sz="1100">
                         <a:effectLst/>
                         <a:latin typeface="Times New Roman" panose="02020603050405020304" pitchFamily="18" charset="0"/>
                         <a:ea typeface="Calibri" panose="020F0502020204030204" pitchFamily="34" charset="0"/>
@@ -9911,12 +10545,12 @@
                         </a:spcAft>
                       </a:pPr>
                       <a:r>
-                        <a:rPr lang="en-IN" sz="1200">
+                        <a:rPr lang="en-IN" sz="1100">
                           <a:effectLst/>
                         </a:rPr>
                         <a:t>75</a:t>
                       </a:r>
-                      <a:endParaRPr lang="en-IN" sz="1200">
+                      <a:endParaRPr lang="en-IN" sz="1100">
                         <a:effectLst/>
                         <a:latin typeface="Times New Roman" panose="02020603050405020304" pitchFamily="18" charset="0"/>
                         <a:ea typeface="Calibri" panose="020F0502020204030204" pitchFamily="34" charset="0"/>
@@ -9940,12 +10574,12 @@
                         </a:spcAft>
                       </a:pPr>
                       <a:r>
-                        <a:rPr lang="en-IN" sz="1200">
+                        <a:rPr lang="en-IN" sz="1100">
                           <a:effectLst/>
                         </a:rPr>
                         <a:t>75</a:t>
                       </a:r>
-                      <a:endParaRPr lang="en-IN" sz="1200">
+                      <a:endParaRPr lang="en-IN" sz="1100">
                         <a:effectLst/>
                         <a:latin typeface="Times New Roman" panose="02020603050405020304" pitchFamily="18" charset="0"/>
                         <a:ea typeface="Calibri" panose="020F0502020204030204" pitchFamily="34" charset="0"/>
@@ -9969,12 +10603,12 @@
                         </a:spcAft>
                       </a:pPr>
                       <a:r>
-                        <a:rPr lang="en-IN" sz="1200">
+                        <a:rPr lang="en-IN" sz="1100">
                           <a:effectLst/>
                         </a:rPr>
                         <a:t>78</a:t>
                       </a:r>
-                      <a:endParaRPr lang="en-IN" sz="1200">
+                      <a:endParaRPr lang="en-IN" sz="1100">
                         <a:effectLst/>
                         <a:latin typeface="Times New Roman" panose="02020603050405020304" pitchFamily="18" charset="0"/>
                         <a:ea typeface="Calibri" panose="020F0502020204030204" pitchFamily="34" charset="0"/>
@@ -9998,12 +10632,12 @@
                         </a:spcAft>
                       </a:pPr>
                       <a:r>
-                        <a:rPr lang="en-IN" sz="1200">
+                        <a:rPr lang="en-IN" sz="1100">
                           <a:effectLst/>
                         </a:rPr>
                         <a:t>78</a:t>
                       </a:r>
-                      <a:endParaRPr lang="en-IN" sz="1200">
+                      <a:endParaRPr lang="en-IN" sz="1100">
                         <a:effectLst/>
                         <a:latin typeface="Times New Roman" panose="02020603050405020304" pitchFamily="18" charset="0"/>
                         <a:ea typeface="Calibri" panose="020F0502020204030204" pitchFamily="34" charset="0"/>
@@ -10027,12 +10661,12 @@
                         </a:spcAft>
                       </a:pPr>
                       <a:r>
-                        <a:rPr lang="en-IN" sz="1200">
+                        <a:rPr lang="en-IN" sz="1100">
                           <a:effectLst/>
                         </a:rPr>
                         <a:t>80</a:t>
                       </a:r>
-                      <a:endParaRPr lang="en-IN" sz="1200">
+                      <a:endParaRPr lang="en-IN" sz="1100">
                         <a:effectLst/>
                         <a:latin typeface="Times New Roman" panose="02020603050405020304" pitchFamily="18" charset="0"/>
                         <a:ea typeface="Calibri" panose="020F0502020204030204" pitchFamily="34" charset="0"/>
@@ -10056,12 +10690,12 @@
                         </a:spcAft>
                       </a:pPr>
                       <a:r>
-                        <a:rPr lang="en-IN" sz="1200">
+                        <a:rPr lang="en-IN" sz="1100">
                           <a:effectLst/>
                         </a:rPr>
                         <a:t>81</a:t>
                       </a:r>
-                      <a:endParaRPr lang="en-IN" sz="1200">
+                      <a:endParaRPr lang="en-IN" sz="1100">
                         <a:effectLst/>
                         <a:latin typeface="Times New Roman" panose="02020603050405020304" pitchFamily="18" charset="0"/>
                         <a:ea typeface="Calibri" panose="020F0502020204030204" pitchFamily="34" charset="0"/>
@@ -10085,12 +10719,12 @@
                         </a:spcAft>
                       </a:pPr>
                       <a:r>
-                        <a:rPr lang="en-IN" sz="1200">
+                        <a:rPr lang="en-IN" sz="1100">
                           <a:effectLst/>
                         </a:rPr>
                         <a:t>82</a:t>
                       </a:r>
-                      <a:endParaRPr lang="en-IN" sz="1200">
+                      <a:endParaRPr lang="en-IN" sz="1100">
                         <a:effectLst/>
                         <a:latin typeface="Times New Roman" panose="02020603050405020304" pitchFamily="18" charset="0"/>
                         <a:ea typeface="Calibri" panose="020F0502020204030204" pitchFamily="34" charset="0"/>
@@ -10114,12 +10748,12 @@
                         </a:spcAft>
                       </a:pPr>
                       <a:r>
-                        <a:rPr lang="en-IN" sz="1200">
+                        <a:rPr lang="en-IN" sz="1100">
                           <a:effectLst/>
                         </a:rPr>
                         <a:t>82</a:t>
                       </a:r>
-                      <a:endParaRPr lang="en-IN" sz="1200">
+                      <a:endParaRPr lang="en-IN" sz="1100">
                         <a:effectLst/>
                         <a:latin typeface="Times New Roman" panose="02020603050405020304" pitchFamily="18" charset="0"/>
                         <a:ea typeface="Calibri" panose="020F0502020204030204" pitchFamily="34" charset="0"/>
@@ -10143,12 +10777,12 @@
                         </a:spcAft>
                       </a:pPr>
                       <a:r>
-                        <a:rPr lang="en-IN" sz="1200">
+                        <a:rPr lang="en-IN" sz="1100">
                           <a:effectLst/>
                         </a:rPr>
                         <a:t>84</a:t>
                       </a:r>
-                      <a:endParaRPr lang="en-IN" sz="1200">
+                      <a:endParaRPr lang="en-IN" sz="1100">
                         <a:effectLst/>
                         <a:latin typeface="Times New Roman" panose="02020603050405020304" pitchFamily="18" charset="0"/>
                         <a:ea typeface="Calibri" panose="020F0502020204030204" pitchFamily="34" charset="0"/>
@@ -10172,12 +10806,12 @@
                         </a:spcAft>
                       </a:pPr>
                       <a:r>
-                        <a:rPr lang="en-IN" sz="1200" dirty="0">
+                        <a:rPr lang="en-IN" sz="1100" dirty="0">
                           <a:effectLst/>
                         </a:rPr>
                         <a:t>84</a:t>
                       </a:r>
-                      <a:endParaRPr lang="en-IN" sz="1200" dirty="0">
+                      <a:endParaRPr lang="en-IN" sz="1100" dirty="0">
                         <a:effectLst/>
                         <a:latin typeface="Times New Roman" panose="02020603050405020304" pitchFamily="18" charset="0"/>
                         <a:ea typeface="Calibri" panose="020F0502020204030204" pitchFamily="34" charset="0"/>
@@ -10199,30 +10833,35 @@
       </p:graphicFrame>
       <p:pic>
         <p:nvPicPr>
-          <p:cNvPr id="7" name="Picture 6">
-            <a:extLst>
-              <a:ext uri="{FF2B5EF4-FFF2-40B4-BE49-F238E27FC236}">
-                <a16:creationId xmlns:a16="http://schemas.microsoft.com/office/drawing/2014/main" id="{BCD86324-00C7-4077-A449-56558FFE726A}"/>
-              </a:ext>
-            </a:extLst>
-          </p:cNvPr>
+          <p:cNvPr id="8" name="Picture 7"/>
           <p:cNvPicPr/>
           <p:nvPr/>
         </p:nvPicPr>
         <p:blipFill>
-          <a:blip r:embed="rId2"/>
+          <a:blip r:embed="rId2">
+            <a:extLst>
+              <a:ext uri="{28A0092B-C50C-407E-A947-70E740481C1C}">
+                <a14:useLocalDpi xmlns:a14="http://schemas.microsoft.com/office/drawing/2010/main" val="0"/>
+              </a:ext>
+            </a:extLst>
+          </a:blip>
+          <a:srcRect/>
           <a:stretch>
             <a:fillRect/>
           </a:stretch>
         </p:blipFill>
-        <p:spPr>
+        <p:spPr bwMode="auto">
           <a:xfrm>
-            <a:off x="7509013" y="3781850"/>
-            <a:ext cx="3745727" cy="2208319"/>
+            <a:off x="7418149" y="3311012"/>
+            <a:ext cx="4032499" cy="3071322"/>
           </a:xfrm>
           <a:prstGeom prst="rect">
             <a:avLst/>
           </a:prstGeom>
+          <a:noFill/>
+          <a:ln>
+            <a:noFill/>
+          </a:ln>
         </p:spPr>
       </p:pic>
     </p:spTree>
@@ -10235,416 +10874,13 @@
   <p:clrMapOvr>
     <a:masterClrMapping/>
   </p:clrMapOvr>
-</p:sld>
-</file>
-
-<file path=ppt/slides/slide17.xml><?xml version="1.0" encoding="utf-8"?>
-<p:sld xmlns:a="http://schemas.openxmlformats.org/drawingml/2006/main" xmlns:r="http://schemas.openxmlformats.org/officeDocument/2006/relationships" xmlns:p="http://schemas.openxmlformats.org/presentationml/2006/main">
-  <p:cSld>
-    <p:spTree>
-      <p:nvGrpSpPr>
-        <p:cNvPr id="1" name=""/>
-        <p:cNvGrpSpPr/>
-        <p:nvPr/>
-      </p:nvGrpSpPr>
-      <p:grpSpPr>
-        <a:xfrm>
-          <a:off x="0" y="0"/>
-          <a:ext cx="0" cy="0"/>
-          <a:chOff x="0" y="0"/>
-          <a:chExt cx="0" cy="0"/>
-        </a:xfrm>
-      </p:grpSpPr>
-      <p:sp>
-        <p:nvSpPr>
-          <p:cNvPr id="2" name="Title 1">
-            <a:extLst>
-              <a:ext uri="{FF2B5EF4-FFF2-40B4-BE49-F238E27FC236}">
-                <a16:creationId xmlns:a16="http://schemas.microsoft.com/office/drawing/2014/main" id="{EE78CEC5-B211-4638-A0C1-7C0D3E0785F5}"/>
-              </a:ext>
-            </a:extLst>
-          </p:cNvPr>
-          <p:cNvSpPr>
-            <a:spLocks noGrp="1"/>
-          </p:cNvSpPr>
-          <p:nvPr>
-            <p:ph type="title"/>
-          </p:nvPr>
-        </p:nvSpPr>
-        <p:spPr/>
-        <p:txBody>
-          <a:bodyPr/>
-          <a:lstStyle/>
-          <a:p>
-            <a:r>
-              <a:rPr lang="en-IN" dirty="0"/>
-              <a:t>Conclusion</a:t>
-            </a:r>
-          </a:p>
-        </p:txBody>
-      </p:sp>
-      <p:sp>
-        <p:nvSpPr>
-          <p:cNvPr id="3" name="Content Placeholder 2">
-            <a:extLst>
-              <a:ext uri="{FF2B5EF4-FFF2-40B4-BE49-F238E27FC236}">
-                <a16:creationId xmlns:a16="http://schemas.microsoft.com/office/drawing/2014/main" id="{9C7C6623-5669-4B2E-992D-DDCF446171F6}"/>
-              </a:ext>
-            </a:extLst>
-          </p:cNvPr>
-          <p:cNvSpPr>
-            <a:spLocks noGrp="1"/>
-          </p:cNvSpPr>
-          <p:nvPr>
-            <p:ph idx="1"/>
-          </p:nvPr>
-        </p:nvSpPr>
-        <p:spPr/>
-        <p:txBody>
-          <a:bodyPr>
-            <a:normAutofit/>
-          </a:bodyPr>
-          <a:lstStyle/>
-          <a:p>
-            <a:pPr lvl="1"/>
-            <a:r>
-              <a:rPr lang="en-IN" sz="1800" dirty="0"/>
-              <a:t>Time spent on improving the data quality can be reduced with better choice of datasets. </a:t>
-            </a:r>
-          </a:p>
-          <a:p>
-            <a:pPr lvl="1"/>
-            <a:r>
-              <a:rPr lang="en-IN" sz="1800" dirty="0"/>
-              <a:t>K-means helps in analysis of risk-based groups with the right set of data attributes.</a:t>
-            </a:r>
-          </a:p>
-          <a:p>
-            <a:pPr lvl="1"/>
-            <a:r>
-              <a:rPr lang="en-IN" sz="1800" dirty="0"/>
-              <a:t>Random Forest for attribute selection gave better results compared to ASW analysis. </a:t>
-            </a:r>
-          </a:p>
-          <a:p>
-            <a:pPr lvl="1"/>
-            <a:r>
-              <a:rPr lang="en-IN" sz="1800" dirty="0"/>
-              <a:t>Random Forest with prediction accuracy &gt; 80% showed risk-based groups formation.</a:t>
-            </a:r>
-          </a:p>
-          <a:p>
-            <a:pPr lvl="1"/>
-            <a:r>
-              <a:rPr lang="en-IN" sz="1800" dirty="0"/>
-              <a:t>QoC for existing and new systems, have similar models based on trend of size of clusters.</a:t>
-            </a:r>
-          </a:p>
-          <a:p>
-            <a:pPr lvl="0"/>
-            <a:endParaRPr lang="en-IN" dirty="0"/>
-          </a:p>
-          <a:p>
-            <a:pPr marL="0" indent="0">
-              <a:buNone/>
-            </a:pPr>
-            <a:r>
-              <a:rPr lang="en-IN" sz="1800" dirty="0"/>
-              <a:t> </a:t>
-            </a:r>
-          </a:p>
-          <a:p>
-            <a:endParaRPr lang="en-IN" dirty="0"/>
-          </a:p>
-          <a:p>
-            <a:endParaRPr lang="en-IN" dirty="0"/>
-          </a:p>
-          <a:p>
-            <a:endParaRPr lang="en-IN" dirty="0"/>
-          </a:p>
-          <a:p>
-            <a:endParaRPr lang="en-IN" dirty="0"/>
-          </a:p>
-        </p:txBody>
-      </p:sp>
-      <p:sp>
-        <p:nvSpPr>
-          <p:cNvPr id="4" name="Footer Placeholder 3">
-            <a:extLst>
-              <a:ext uri="{FF2B5EF4-FFF2-40B4-BE49-F238E27FC236}">
-                <a16:creationId xmlns:a16="http://schemas.microsoft.com/office/drawing/2014/main" id="{DF343C9C-342F-4516-8475-C8ED1D96ECA3}"/>
-              </a:ext>
-            </a:extLst>
-          </p:cNvPr>
-          <p:cNvSpPr>
-            <a:spLocks noGrp="1"/>
-          </p:cNvSpPr>
-          <p:nvPr>
-            <p:ph type="ftr" sz="quarter" idx="11"/>
-          </p:nvPr>
-        </p:nvSpPr>
-        <p:spPr/>
-        <p:txBody>
-          <a:bodyPr/>
-          <a:lstStyle/>
-          <a:p>
-            <a:r>
-              <a:rPr lang="en-US"/>
-              <a:t>Vaibhav Gaikwad (2018HT12597)</a:t>
-            </a:r>
-            <a:endParaRPr lang="en-US" dirty="0"/>
-          </a:p>
-        </p:txBody>
-      </p:sp>
-      <p:sp>
-        <p:nvSpPr>
-          <p:cNvPr id="5" name="Slide Number Placeholder 4">
-            <a:extLst>
-              <a:ext uri="{FF2B5EF4-FFF2-40B4-BE49-F238E27FC236}">
-                <a16:creationId xmlns:a16="http://schemas.microsoft.com/office/drawing/2014/main" id="{A5691F1F-EB6D-452C-826C-FDE0B81DF43D}"/>
-              </a:ext>
-            </a:extLst>
-          </p:cNvPr>
-          <p:cNvSpPr>
-            <a:spLocks noGrp="1"/>
-          </p:cNvSpPr>
-          <p:nvPr>
-            <p:ph type="sldNum" sz="quarter" idx="12"/>
-          </p:nvPr>
-        </p:nvSpPr>
-        <p:spPr/>
-        <p:txBody>
-          <a:bodyPr/>
-          <a:lstStyle/>
-          <a:p>
-            <a:fld id="{3A98EE3D-8CD1-4C3F-BD1C-C98C9596463C}" type="slidenum">
-              <a:rPr lang="en-US" smtClean="0"/>
-              <a:t>17</a:t>
-            </a:fld>
-            <a:endParaRPr lang="en-US" dirty="0"/>
-          </a:p>
-        </p:txBody>
-      </p:sp>
-    </p:spTree>
-    <p:extLst>
-      <p:ext uri="{BB962C8B-B14F-4D97-AF65-F5344CB8AC3E}">
-        <p14:creationId xmlns:p14="http://schemas.microsoft.com/office/powerpoint/2010/main" val="3288038167"/>
-      </p:ext>
-    </p:extLst>
-  </p:cSld>
-  <p:clrMapOvr>
-    <a:masterClrMapping/>
-  </p:clrMapOvr>
-</p:sld>
-</file>
-
-<file path=ppt/slides/slide18.xml><?xml version="1.0" encoding="utf-8"?>
-<p:sld xmlns:a="http://schemas.openxmlformats.org/drawingml/2006/main" xmlns:r="http://schemas.openxmlformats.org/officeDocument/2006/relationships" xmlns:p="http://schemas.openxmlformats.org/presentationml/2006/main">
-  <p:cSld>
-    <p:spTree>
-      <p:nvGrpSpPr>
-        <p:cNvPr id="1" name=""/>
-        <p:cNvGrpSpPr/>
-        <p:nvPr/>
-      </p:nvGrpSpPr>
-      <p:grpSpPr>
-        <a:xfrm>
-          <a:off x="0" y="0"/>
-          <a:ext cx="0" cy="0"/>
-          <a:chOff x="0" y="0"/>
-          <a:chExt cx="0" cy="0"/>
-        </a:xfrm>
-      </p:grpSpPr>
-      <p:sp>
-        <p:nvSpPr>
-          <p:cNvPr id="2" name="Title 1">
-            <a:extLst>
-              <a:ext uri="{FF2B5EF4-FFF2-40B4-BE49-F238E27FC236}">
-                <a16:creationId xmlns:a16="http://schemas.microsoft.com/office/drawing/2014/main" id="{599B2AC1-B645-47AB-A6C2-1AD107C51238}"/>
-              </a:ext>
-            </a:extLst>
-          </p:cNvPr>
-          <p:cNvSpPr>
-            <a:spLocks noGrp="1"/>
-          </p:cNvSpPr>
-          <p:nvPr>
-            <p:ph type="title"/>
-          </p:nvPr>
-        </p:nvSpPr>
-        <p:spPr/>
-        <p:txBody>
-          <a:bodyPr/>
-          <a:lstStyle/>
-          <a:p>
-            <a:r>
-              <a:rPr lang="en-IN" dirty="0"/>
-              <a:t>References</a:t>
-            </a:r>
-          </a:p>
-        </p:txBody>
-      </p:sp>
-      <p:sp>
-        <p:nvSpPr>
-          <p:cNvPr id="4" name="Footer Placeholder 3">
-            <a:extLst>
-              <a:ext uri="{FF2B5EF4-FFF2-40B4-BE49-F238E27FC236}">
-                <a16:creationId xmlns:a16="http://schemas.microsoft.com/office/drawing/2014/main" id="{DE6B4F98-5A3C-40F4-8F71-2491ABE66B8E}"/>
-              </a:ext>
-            </a:extLst>
-          </p:cNvPr>
-          <p:cNvSpPr>
-            <a:spLocks noGrp="1"/>
-          </p:cNvSpPr>
-          <p:nvPr>
-            <p:ph type="ftr" sz="quarter" idx="11"/>
-          </p:nvPr>
-        </p:nvSpPr>
-        <p:spPr/>
-        <p:txBody>
-          <a:bodyPr/>
-          <a:lstStyle/>
-          <a:p>
-            <a:r>
-              <a:rPr lang="en-US"/>
-              <a:t>Vaibhav Gaikwad (2018HT12597)</a:t>
-            </a:r>
-            <a:endParaRPr lang="en-US" dirty="0"/>
-          </a:p>
-        </p:txBody>
-      </p:sp>
-      <p:sp>
-        <p:nvSpPr>
-          <p:cNvPr id="5" name="Slide Number Placeholder 4">
-            <a:extLst>
-              <a:ext uri="{FF2B5EF4-FFF2-40B4-BE49-F238E27FC236}">
-                <a16:creationId xmlns:a16="http://schemas.microsoft.com/office/drawing/2014/main" id="{998E79DC-D345-4C75-BCA8-AB18B93B1749}"/>
-              </a:ext>
-            </a:extLst>
-          </p:cNvPr>
-          <p:cNvSpPr>
-            <a:spLocks noGrp="1"/>
-          </p:cNvSpPr>
-          <p:nvPr>
-            <p:ph type="sldNum" sz="quarter" idx="12"/>
-          </p:nvPr>
-        </p:nvSpPr>
-        <p:spPr/>
-        <p:txBody>
-          <a:bodyPr/>
-          <a:lstStyle/>
-          <a:p>
-            <a:fld id="{3A98EE3D-8CD1-4C3F-BD1C-C98C9596463C}" type="slidenum">
-              <a:rPr lang="en-US" smtClean="0"/>
-              <a:t>18</a:t>
-            </a:fld>
-            <a:endParaRPr lang="en-US" dirty="0"/>
-          </a:p>
-        </p:txBody>
-      </p:sp>
-      <p:sp>
-        <p:nvSpPr>
-          <p:cNvPr id="10" name="Content Placeholder 9">
-            <a:extLst>
-              <a:ext uri="{FF2B5EF4-FFF2-40B4-BE49-F238E27FC236}">
-                <a16:creationId xmlns:a16="http://schemas.microsoft.com/office/drawing/2014/main" id="{0EA7C94D-365D-49A8-8A45-62E97ACAFAB1}"/>
-              </a:ext>
-            </a:extLst>
-          </p:cNvPr>
-          <p:cNvSpPr>
-            <a:spLocks noGrp="1"/>
-          </p:cNvSpPr>
-          <p:nvPr>
-            <p:ph idx="1"/>
-          </p:nvPr>
-        </p:nvSpPr>
-        <p:spPr/>
-        <p:txBody>
-          <a:bodyPr/>
-          <a:lstStyle/>
-          <a:p>
-            <a:pPr lvl="1" fontAlgn="t"/>
-            <a:r>
-              <a:rPr lang="en-IN" dirty="0"/>
-              <a:t>M. J. Hallett, J. J. Fan, X. G. </a:t>
-            </a:r>
-            <a:r>
-              <a:rPr lang="en-IN" dirty="0" err="1"/>
-              <a:t>Su</a:t>
-            </a:r>
-            <a:r>
-              <a:rPr lang="en-IN" dirty="0"/>
-              <a:t>, R. A. Levine and M. E. Nunn, “Random forest and variable importance rankings for correlated survival data, with applications to tooth loss,” </a:t>
-            </a:r>
-            <a:r>
-              <a:rPr lang="en-IN" i="1" dirty="0"/>
-              <a:t>Statistical Modelling, </a:t>
-            </a:r>
-            <a:r>
-              <a:rPr lang="en-IN" dirty="0"/>
-              <a:t>pp. 523-547, 2014. </a:t>
-            </a:r>
-          </a:p>
-          <a:p>
-            <a:pPr lvl="1" fontAlgn="t"/>
-            <a:r>
-              <a:rPr lang="en-IN" dirty="0"/>
-              <a:t>B. Rai, “Feature Selection and Predictive </a:t>
-            </a:r>
-            <a:r>
-              <a:rPr lang="en-IN" dirty="0" err="1"/>
-              <a:t>Modeling</a:t>
-            </a:r>
-            <a:r>
-              <a:rPr lang="en-IN" dirty="0"/>
-              <a:t> of Housing Data Using Random Forest,” </a:t>
-            </a:r>
-            <a:r>
-              <a:rPr lang="en-IN" i="1" dirty="0"/>
-              <a:t>International Journal of Business and Economics Engineering, </a:t>
-            </a:r>
-            <a:r>
-              <a:rPr lang="en-IN" dirty="0"/>
-              <a:t>vol. 11, no. 4, pp. 919-923, 2017. </a:t>
-            </a:r>
-          </a:p>
-          <a:p>
-            <a:pPr lvl="1" fontAlgn="t"/>
-            <a:r>
-              <a:rPr lang="en-IN" dirty="0"/>
-              <a:t>C. Chapman and E. M. </a:t>
-            </a:r>
-            <a:r>
-              <a:rPr lang="en-IN" dirty="0" err="1"/>
-              <a:t>Feit</a:t>
-            </a:r>
-            <a:r>
-              <a:rPr lang="en-IN" dirty="0"/>
-              <a:t>, “R for Marketing Research and Analytics,” in </a:t>
-            </a:r>
-            <a:r>
-              <a:rPr lang="en-IN" i="1" dirty="0"/>
-              <a:t>R for Marketing Research and Analytics</a:t>
-            </a:r>
-            <a:r>
-              <a:rPr lang="en-IN" dirty="0"/>
-              <a:t>, Springer Nature, 2015, pp. 331,332,333.</a:t>
-            </a:r>
-          </a:p>
-          <a:p>
-            <a:endParaRPr lang="en-IN" dirty="0"/>
-          </a:p>
-        </p:txBody>
-      </p:sp>
-    </p:spTree>
-    <p:extLst>
-      <p:ext uri="{BB962C8B-B14F-4D97-AF65-F5344CB8AC3E}">
-        <p14:creationId xmlns:p14="http://schemas.microsoft.com/office/powerpoint/2010/main" val="1096407868"/>
-      </p:ext>
-    </p:extLst>
-  </p:cSld>
-  <p:clrMapOvr>
-    <a:masterClrMapping/>
-  </p:clrMapOvr>
+  <p:timing>
+    <p:tnLst>
+      <p:par>
+        <p:cTn id="1" dur="indefinite" restart="never" nodeType="tmRoot"/>
+      </p:par>
+    </p:tnLst>
+  </p:timing>
 </p:sld>
 </file>
 
@@ -10667,48 +10903,170 @@
       </p:grpSpPr>
       <p:sp>
         <p:nvSpPr>
-          <p:cNvPr id="4" name="TextBox 3">
-            <a:extLst>
-              <a:ext uri="{FF2B5EF4-FFF2-40B4-BE49-F238E27FC236}">
-                <a16:creationId xmlns:a16="http://schemas.microsoft.com/office/drawing/2014/main" id="{11A817F0-04A7-4B5F-B475-7B6B53E6F9B0}"/>
-              </a:ext>
-            </a:extLst>
-          </p:cNvPr>
-          <p:cNvSpPr txBox="1"/>
-          <p:nvPr/>
-        </p:nvSpPr>
-        <p:spPr>
-          <a:xfrm>
-            <a:off x="4704433" y="3013501"/>
-            <a:ext cx="2783134" cy="830997"/>
-          </a:xfrm>
-          <a:prstGeom prst="rect">
-            <a:avLst/>
-          </a:prstGeom>
-          <a:noFill/>
-        </p:spPr>
-        <p:txBody>
-          <a:bodyPr wrap="none" rtlCol="0">
-            <a:spAutoFit/>
+          <p:cNvPr id="2" name="Title 1">
+            <a:extLst>
+              <a:ext uri="{FF2B5EF4-FFF2-40B4-BE49-F238E27FC236}">
+                <a16:creationId xmlns:a16="http://schemas.microsoft.com/office/drawing/2014/main" id="{EE78CEC5-B211-4638-A0C1-7C0D3E0785F5}"/>
+              </a:ext>
+            </a:extLst>
+          </p:cNvPr>
+          <p:cNvSpPr>
+            <a:spLocks noGrp="1"/>
+          </p:cNvSpPr>
+          <p:nvPr>
+            <p:ph type="title"/>
+          </p:nvPr>
+        </p:nvSpPr>
+        <p:spPr/>
+        <p:txBody>
+          <a:bodyPr/>
+          <a:lstStyle/>
+          <a:p>
+            <a:r>
+              <a:rPr lang="en-IN" dirty="0"/>
+              <a:t>Conclusion</a:t>
+            </a:r>
+          </a:p>
+        </p:txBody>
+      </p:sp>
+      <p:sp>
+        <p:nvSpPr>
+          <p:cNvPr id="3" name="Content Placeholder 2">
+            <a:extLst>
+              <a:ext uri="{FF2B5EF4-FFF2-40B4-BE49-F238E27FC236}">
+                <a16:creationId xmlns:a16="http://schemas.microsoft.com/office/drawing/2014/main" id="{9C7C6623-5669-4B2E-992D-DDCF446171F6}"/>
+              </a:ext>
+            </a:extLst>
+          </p:cNvPr>
+          <p:cNvSpPr>
+            <a:spLocks noGrp="1"/>
+          </p:cNvSpPr>
+          <p:nvPr>
+            <p:ph idx="1"/>
+          </p:nvPr>
+        </p:nvSpPr>
+        <p:spPr/>
+        <p:txBody>
+          <a:bodyPr>
+            <a:normAutofit fontScale="62500" lnSpcReduction="20000"/>
           </a:bodyPr>
           <a:lstStyle/>
           <a:p>
-            <a:pPr algn="ctr"/>
-            <a:r>
-              <a:rPr lang="en-IN" sz="4700" dirty="0">
-                <a:latin typeface="+mj-lt"/>
-              </a:rPr>
-              <a:t>THANKS</a:t>
-            </a:r>
-          </a:p>
-        </p:txBody>
-      </p:sp>
-      <p:sp>
-        <p:nvSpPr>
-          <p:cNvPr id="2" name="Footer Placeholder 1">
-            <a:extLst>
-              <a:ext uri="{FF2B5EF4-FFF2-40B4-BE49-F238E27FC236}">
-                <a16:creationId xmlns:a16="http://schemas.microsoft.com/office/drawing/2014/main" id="{B1BB7FFE-8B25-40B7-B4EB-40454BBC83E5}"/>
+            <a:pPr lvl="1" fontAlgn="t">
+              <a:lnSpc>
+                <a:spcPct val="120000"/>
+              </a:lnSpc>
+            </a:pPr>
+            <a:r>
+              <a:rPr lang="en-IN" sz="2400" dirty="0"/>
+              <a:t>Real life data on diseases like </a:t>
+            </a:r>
+            <a:r>
+              <a:rPr lang="en-IN" sz="2400" dirty="0"/>
+              <a:t>Diabetes, </a:t>
+            </a:r>
+            <a:r>
+              <a:rPr lang="en-IN" sz="2400" dirty="0"/>
+              <a:t>is not easily separable into clusters using default method of K-means or DBSCAN method</a:t>
+            </a:r>
+            <a:r>
+              <a:rPr lang="en-IN" sz="2400" dirty="0"/>
+              <a:t>. Assumption related to good separated clusters should generate risk-based groups was found to be incorrect.</a:t>
+            </a:r>
+            <a:endParaRPr lang="en-IN" sz="2400" dirty="0"/>
+          </a:p>
+          <a:p>
+            <a:pPr lvl="1" fontAlgn="t">
+              <a:lnSpc>
+                <a:spcPct val="120000"/>
+              </a:lnSpc>
+            </a:pPr>
+            <a:r>
+              <a:rPr lang="en-IN" sz="2400" dirty="0"/>
+              <a:t>Unsupervised learning (K-means clustering) helps in analysis of risk-based groups when we find the right set of data attributes.</a:t>
+            </a:r>
+          </a:p>
+          <a:p>
+            <a:pPr lvl="1" fontAlgn="t">
+              <a:lnSpc>
+                <a:spcPct val="120000"/>
+              </a:lnSpc>
+            </a:pPr>
+            <a:r>
+              <a:rPr lang="en-IN" sz="2400" dirty="0"/>
+              <a:t>Random Forest provides better results for attribute selection compared to Average Silhouette Width analysis.</a:t>
+            </a:r>
+          </a:p>
+          <a:p>
+            <a:pPr lvl="1" fontAlgn="t">
+              <a:lnSpc>
+                <a:spcPct val="120000"/>
+              </a:lnSpc>
+            </a:pPr>
+            <a:r>
+              <a:rPr lang="en-IN" sz="2400" dirty="0"/>
+              <a:t>Cluster Confidence Score plays an important role to validate the learning from the model from a medical professional.</a:t>
+            </a:r>
+          </a:p>
+          <a:p>
+            <a:pPr lvl="1" fontAlgn="t">
+              <a:lnSpc>
+                <a:spcPct val="120000"/>
+              </a:lnSpc>
+            </a:pPr>
+            <a:r>
+              <a:rPr lang="en-IN" sz="2400" dirty="0"/>
+              <a:t>Risk-based groups formation was observed after taking the attributes provided by Random Forest approach when prediction accuracy was acquired around 80%.  </a:t>
+            </a:r>
+          </a:p>
+          <a:p>
+            <a:pPr lvl="1" fontAlgn="t">
+              <a:lnSpc>
+                <a:spcPct val="120000"/>
+              </a:lnSpc>
+            </a:pPr>
+            <a:r>
+              <a:rPr lang="en-IN" sz="2400" dirty="0"/>
+              <a:t>QoC for existing and new systems do have similar models based on trend of size of clusters.</a:t>
+            </a:r>
+          </a:p>
+          <a:p>
+            <a:pPr lvl="1"/>
+            <a:endParaRPr lang="en-IN" sz="1800" dirty="0" smtClean="0"/>
+          </a:p>
+          <a:p>
+            <a:pPr lvl="0"/>
+            <a:endParaRPr lang="en-IN" dirty="0"/>
+          </a:p>
+          <a:p>
+            <a:pPr marL="0" indent="0">
+              <a:buNone/>
+            </a:pPr>
+            <a:r>
+              <a:rPr lang="en-IN" sz="1800" dirty="0"/>
+              <a:t> </a:t>
+            </a:r>
+          </a:p>
+          <a:p>
+            <a:endParaRPr lang="en-IN" dirty="0"/>
+          </a:p>
+          <a:p>
+            <a:endParaRPr lang="en-IN" dirty="0"/>
+          </a:p>
+          <a:p>
+            <a:endParaRPr lang="en-IN" dirty="0"/>
+          </a:p>
+          <a:p>
+            <a:endParaRPr lang="en-IN" dirty="0"/>
+          </a:p>
+        </p:txBody>
+      </p:sp>
+      <p:sp>
+        <p:nvSpPr>
+          <p:cNvPr id="4" name="Footer Placeholder 3">
+            <a:extLst>
+              <a:ext uri="{FF2B5EF4-FFF2-40B4-BE49-F238E27FC236}">
+                <a16:creationId xmlns:a16="http://schemas.microsoft.com/office/drawing/2014/main" id="{DF343C9C-342F-4516-8475-C8ED1D96ECA3}"/>
               </a:ext>
             </a:extLst>
           </p:cNvPr>
@@ -10734,10 +11092,10 @@
       </p:sp>
       <p:sp>
         <p:nvSpPr>
-          <p:cNvPr id="3" name="Slide Number Placeholder 2">
-            <a:extLst>
-              <a:ext uri="{FF2B5EF4-FFF2-40B4-BE49-F238E27FC236}">
-                <a16:creationId xmlns:a16="http://schemas.microsoft.com/office/drawing/2014/main" id="{EC5CDFDE-FE24-4E6C-B12C-FAD8DD8BBE3E}"/>
+          <p:cNvPr id="5" name="Slide Number Placeholder 4">
+            <a:extLst>
+              <a:ext uri="{FF2B5EF4-FFF2-40B4-BE49-F238E27FC236}">
+                <a16:creationId xmlns:a16="http://schemas.microsoft.com/office/drawing/2014/main" id="{A5691F1F-EB6D-452C-826C-FDE0B81DF43D}"/>
               </a:ext>
             </a:extLst>
           </p:cNvPr>
@@ -10753,6 +11111,10 @@
           <a:bodyPr/>
           <a:lstStyle/>
           <a:p>
+            <a:fld id="{3A98EE3D-8CD1-4C3F-BD1C-C98C9596463C}" type="slidenum">
+              <a:rPr lang="en-US" smtClean="0"/>
+              <a:t>19</a:t>
+            </a:fld>
             <a:endParaRPr lang="en-US" dirty="0"/>
           </a:p>
         </p:txBody>
@@ -10760,13 +11122,20 @@
     </p:spTree>
     <p:extLst>
       <p:ext uri="{BB962C8B-B14F-4D97-AF65-F5344CB8AC3E}">
-        <p14:creationId xmlns:p14="http://schemas.microsoft.com/office/powerpoint/2010/main" val="3205317315"/>
+        <p14:creationId xmlns:p14="http://schemas.microsoft.com/office/powerpoint/2010/main" val="3288038167"/>
       </p:ext>
     </p:extLst>
   </p:cSld>
   <p:clrMapOvr>
     <a:masterClrMapping/>
   </p:clrMapOvr>
+  <p:timing>
+    <p:tnLst>
+      <p:par>
+        <p:cTn id="1" dur="indefinite" restart="never" nodeType="tmRoot"/>
+      </p:par>
+    </p:tnLst>
+  </p:timing>
 </p:sld>
 </file>
 
@@ -10803,7 +11172,7 @@
                 <a16:creationId xmlns:a16="http://schemas.microsoft.com/office/drawing/2014/main" id="{FBDCECDC-EEE3-4128-AA5E-82A8C08796E8}"/>
               </a:ext>
               <a:ext uri="{C183D7F6-B498-43B3-948B-1728B52AA6E4}">
-                <adec:decorative xmlns:adec="http://schemas.microsoft.com/office/drawing/2017/decorative" val="1"/>
+                <adec:decorative xmlns:adec="http://schemas.microsoft.com/office/drawing/2017/decorative" xmlns="" val="1"/>
               </a:ext>
             </a:extLst>
           </p:cNvPr>
@@ -10906,7 +11275,7 @@
                 <a16:creationId xmlns:a16="http://schemas.microsoft.com/office/drawing/2014/main" id="{4260EDE0-989C-4E16-AF94-F652294D828E}"/>
               </a:ext>
               <a:ext uri="{C183D7F6-B498-43B3-948B-1728B52AA6E4}">
-                <adec:decorative xmlns:adec="http://schemas.microsoft.com/office/drawing/2017/decorative" val="1"/>
+                <adec:decorative xmlns:adec="http://schemas.microsoft.com/office/drawing/2017/decorative" xmlns="" val="1"/>
               </a:ext>
             </a:extLst>
           </p:cNvPr>
@@ -11052,6 +11421,338 @@
     <p:extLst>
       <p:ext uri="{BB962C8B-B14F-4D97-AF65-F5344CB8AC3E}">
         <p14:creationId xmlns:p14="http://schemas.microsoft.com/office/powerpoint/2010/main" val="191714609"/>
+      </p:ext>
+    </p:extLst>
+  </p:cSld>
+  <p:clrMapOvr>
+    <a:masterClrMapping/>
+  </p:clrMapOvr>
+</p:sld>
+</file>
+
+<file path=ppt/slides/slide20.xml><?xml version="1.0" encoding="utf-8"?>
+<p:sld xmlns:a="http://schemas.openxmlformats.org/drawingml/2006/main" xmlns:r="http://schemas.openxmlformats.org/officeDocument/2006/relationships" xmlns:p="http://schemas.openxmlformats.org/presentationml/2006/main">
+  <p:cSld>
+    <p:spTree>
+      <p:nvGrpSpPr>
+        <p:cNvPr id="1" name=""/>
+        <p:cNvGrpSpPr/>
+        <p:nvPr/>
+      </p:nvGrpSpPr>
+      <p:grpSpPr>
+        <a:xfrm>
+          <a:off x="0" y="0"/>
+          <a:ext cx="0" cy="0"/>
+          <a:chOff x="0" y="0"/>
+          <a:chExt cx="0" cy="0"/>
+        </a:xfrm>
+      </p:grpSpPr>
+      <p:sp>
+        <p:nvSpPr>
+          <p:cNvPr id="2" name="Title 1">
+            <a:extLst>
+              <a:ext uri="{FF2B5EF4-FFF2-40B4-BE49-F238E27FC236}">
+                <a16:creationId xmlns:a16="http://schemas.microsoft.com/office/drawing/2014/main" id="{599B2AC1-B645-47AB-A6C2-1AD107C51238}"/>
+              </a:ext>
+            </a:extLst>
+          </p:cNvPr>
+          <p:cNvSpPr>
+            <a:spLocks noGrp="1"/>
+          </p:cNvSpPr>
+          <p:nvPr>
+            <p:ph type="title"/>
+          </p:nvPr>
+        </p:nvSpPr>
+        <p:spPr/>
+        <p:txBody>
+          <a:bodyPr/>
+          <a:lstStyle/>
+          <a:p>
+            <a:r>
+              <a:rPr lang="en-IN" dirty="0"/>
+              <a:t>References</a:t>
+            </a:r>
+          </a:p>
+        </p:txBody>
+      </p:sp>
+      <p:sp>
+        <p:nvSpPr>
+          <p:cNvPr id="4" name="Footer Placeholder 3">
+            <a:extLst>
+              <a:ext uri="{FF2B5EF4-FFF2-40B4-BE49-F238E27FC236}">
+                <a16:creationId xmlns:a16="http://schemas.microsoft.com/office/drawing/2014/main" id="{DE6B4F98-5A3C-40F4-8F71-2491ABE66B8E}"/>
+              </a:ext>
+            </a:extLst>
+          </p:cNvPr>
+          <p:cNvSpPr>
+            <a:spLocks noGrp="1"/>
+          </p:cNvSpPr>
+          <p:nvPr>
+            <p:ph type="ftr" sz="quarter" idx="11"/>
+          </p:nvPr>
+        </p:nvSpPr>
+        <p:spPr/>
+        <p:txBody>
+          <a:bodyPr/>
+          <a:lstStyle/>
+          <a:p>
+            <a:r>
+              <a:rPr lang="en-US"/>
+              <a:t>Vaibhav Gaikwad (2018HT12597)</a:t>
+            </a:r>
+            <a:endParaRPr lang="en-US" dirty="0"/>
+          </a:p>
+        </p:txBody>
+      </p:sp>
+      <p:sp>
+        <p:nvSpPr>
+          <p:cNvPr id="5" name="Slide Number Placeholder 4">
+            <a:extLst>
+              <a:ext uri="{FF2B5EF4-FFF2-40B4-BE49-F238E27FC236}">
+                <a16:creationId xmlns:a16="http://schemas.microsoft.com/office/drawing/2014/main" id="{998E79DC-D345-4C75-BCA8-AB18B93B1749}"/>
+              </a:ext>
+            </a:extLst>
+          </p:cNvPr>
+          <p:cNvSpPr>
+            <a:spLocks noGrp="1"/>
+          </p:cNvSpPr>
+          <p:nvPr>
+            <p:ph type="sldNum" sz="quarter" idx="12"/>
+          </p:nvPr>
+        </p:nvSpPr>
+        <p:spPr/>
+        <p:txBody>
+          <a:bodyPr/>
+          <a:lstStyle/>
+          <a:p>
+            <a:fld id="{3A98EE3D-8CD1-4C3F-BD1C-C98C9596463C}" type="slidenum">
+              <a:rPr lang="en-US" smtClean="0"/>
+              <a:t>20</a:t>
+            </a:fld>
+            <a:endParaRPr lang="en-US" dirty="0"/>
+          </a:p>
+        </p:txBody>
+      </p:sp>
+      <p:sp>
+        <p:nvSpPr>
+          <p:cNvPr id="10" name="Content Placeholder 9">
+            <a:extLst>
+              <a:ext uri="{FF2B5EF4-FFF2-40B4-BE49-F238E27FC236}">
+                <a16:creationId xmlns:a16="http://schemas.microsoft.com/office/drawing/2014/main" id="{0EA7C94D-365D-49A8-8A45-62E97ACAFAB1}"/>
+              </a:ext>
+            </a:extLst>
+          </p:cNvPr>
+          <p:cNvSpPr>
+            <a:spLocks noGrp="1"/>
+          </p:cNvSpPr>
+          <p:nvPr>
+            <p:ph idx="1"/>
+          </p:nvPr>
+        </p:nvSpPr>
+        <p:spPr/>
+        <p:txBody>
+          <a:bodyPr/>
+          <a:lstStyle/>
+          <a:p>
+            <a:pPr lvl="1" fontAlgn="t"/>
+            <a:r>
+              <a:rPr lang="en-IN" dirty="0"/>
+              <a:t>M. J. Hallett, J. J. Fan, X. G. </a:t>
+            </a:r>
+            <a:r>
+              <a:rPr lang="en-IN" dirty="0" err="1"/>
+              <a:t>Su</a:t>
+            </a:r>
+            <a:r>
+              <a:rPr lang="en-IN" dirty="0"/>
+              <a:t>, R. A. Levine and M. E. Nunn, “Random forest and variable importance rankings for correlated survival data, with applications to tooth loss,” </a:t>
+            </a:r>
+            <a:r>
+              <a:rPr lang="en-IN" i="1" dirty="0"/>
+              <a:t>Statistical Modelling, </a:t>
+            </a:r>
+            <a:r>
+              <a:rPr lang="en-IN" dirty="0"/>
+              <a:t>pp. 523-547, 2014. </a:t>
+            </a:r>
+          </a:p>
+          <a:p>
+            <a:pPr lvl="1" fontAlgn="t"/>
+            <a:r>
+              <a:rPr lang="en-IN" dirty="0"/>
+              <a:t>B. Rai, “Feature Selection and Predictive </a:t>
+            </a:r>
+            <a:r>
+              <a:rPr lang="en-IN" dirty="0" err="1"/>
+              <a:t>Modeling</a:t>
+            </a:r>
+            <a:r>
+              <a:rPr lang="en-IN" dirty="0"/>
+              <a:t> of Housing Data Using Random Forest,” </a:t>
+            </a:r>
+            <a:r>
+              <a:rPr lang="en-IN" i="1" dirty="0"/>
+              <a:t>International Journal of Business and Economics Engineering, </a:t>
+            </a:r>
+            <a:r>
+              <a:rPr lang="en-IN" dirty="0"/>
+              <a:t>vol. 11, no. 4, pp. 919-923, 2017. </a:t>
+            </a:r>
+          </a:p>
+          <a:p>
+            <a:pPr lvl="1" fontAlgn="t"/>
+            <a:r>
+              <a:rPr lang="en-IN" dirty="0"/>
+              <a:t>C. Chapman and E. M. </a:t>
+            </a:r>
+            <a:r>
+              <a:rPr lang="en-IN" dirty="0" err="1"/>
+              <a:t>Feit</a:t>
+            </a:r>
+            <a:r>
+              <a:rPr lang="en-IN" dirty="0"/>
+              <a:t>, “R for Marketing Research and Analytics,” in </a:t>
+            </a:r>
+            <a:r>
+              <a:rPr lang="en-IN" i="1" dirty="0"/>
+              <a:t>R for Marketing Research and Analytics</a:t>
+            </a:r>
+            <a:r>
+              <a:rPr lang="en-IN" dirty="0"/>
+              <a:t>, Springer Nature, 2015, pp. 331,332,333.</a:t>
+            </a:r>
+          </a:p>
+          <a:p>
+            <a:endParaRPr lang="en-IN" dirty="0"/>
+          </a:p>
+        </p:txBody>
+      </p:sp>
+    </p:spTree>
+    <p:extLst>
+      <p:ext uri="{BB962C8B-B14F-4D97-AF65-F5344CB8AC3E}">
+        <p14:creationId xmlns:p14="http://schemas.microsoft.com/office/powerpoint/2010/main" val="1096407868"/>
+      </p:ext>
+    </p:extLst>
+  </p:cSld>
+  <p:clrMapOvr>
+    <a:masterClrMapping/>
+  </p:clrMapOvr>
+</p:sld>
+</file>
+
+<file path=ppt/slides/slide21.xml><?xml version="1.0" encoding="utf-8"?>
+<p:sld xmlns:a="http://schemas.openxmlformats.org/drawingml/2006/main" xmlns:r="http://schemas.openxmlformats.org/officeDocument/2006/relationships" xmlns:p="http://schemas.openxmlformats.org/presentationml/2006/main">
+  <p:cSld>
+    <p:spTree>
+      <p:nvGrpSpPr>
+        <p:cNvPr id="1" name=""/>
+        <p:cNvGrpSpPr/>
+        <p:nvPr/>
+      </p:nvGrpSpPr>
+      <p:grpSpPr>
+        <a:xfrm>
+          <a:off x="0" y="0"/>
+          <a:ext cx="0" cy="0"/>
+          <a:chOff x="0" y="0"/>
+          <a:chExt cx="0" cy="0"/>
+        </a:xfrm>
+      </p:grpSpPr>
+      <p:sp>
+        <p:nvSpPr>
+          <p:cNvPr id="4" name="TextBox 3">
+            <a:extLst>
+              <a:ext uri="{FF2B5EF4-FFF2-40B4-BE49-F238E27FC236}">
+                <a16:creationId xmlns:a16="http://schemas.microsoft.com/office/drawing/2014/main" id="{11A817F0-04A7-4B5F-B475-7B6B53E6F9B0}"/>
+              </a:ext>
+            </a:extLst>
+          </p:cNvPr>
+          <p:cNvSpPr txBox="1"/>
+          <p:nvPr/>
+        </p:nvSpPr>
+        <p:spPr>
+          <a:xfrm>
+            <a:off x="4704433" y="3013501"/>
+            <a:ext cx="2783134" cy="830997"/>
+          </a:xfrm>
+          <a:prstGeom prst="rect">
+            <a:avLst/>
+          </a:prstGeom>
+          <a:noFill/>
+        </p:spPr>
+        <p:txBody>
+          <a:bodyPr wrap="none" rtlCol="0">
+            <a:spAutoFit/>
+          </a:bodyPr>
+          <a:lstStyle/>
+          <a:p>
+            <a:pPr algn="ctr"/>
+            <a:r>
+              <a:rPr lang="en-IN" sz="4700" dirty="0">
+                <a:latin typeface="+mj-lt"/>
+              </a:rPr>
+              <a:t>THANKS</a:t>
+            </a:r>
+          </a:p>
+        </p:txBody>
+      </p:sp>
+      <p:sp>
+        <p:nvSpPr>
+          <p:cNvPr id="2" name="Footer Placeholder 1">
+            <a:extLst>
+              <a:ext uri="{FF2B5EF4-FFF2-40B4-BE49-F238E27FC236}">
+                <a16:creationId xmlns:a16="http://schemas.microsoft.com/office/drawing/2014/main" id="{B1BB7FFE-8B25-40B7-B4EB-40454BBC83E5}"/>
+              </a:ext>
+            </a:extLst>
+          </p:cNvPr>
+          <p:cNvSpPr>
+            <a:spLocks noGrp="1"/>
+          </p:cNvSpPr>
+          <p:nvPr>
+            <p:ph type="ftr" sz="quarter" idx="11"/>
+          </p:nvPr>
+        </p:nvSpPr>
+        <p:spPr/>
+        <p:txBody>
+          <a:bodyPr/>
+          <a:lstStyle/>
+          <a:p>
+            <a:r>
+              <a:rPr lang="en-US"/>
+              <a:t>Vaibhav Gaikwad (2018HT12597)</a:t>
+            </a:r>
+            <a:endParaRPr lang="en-US" dirty="0"/>
+          </a:p>
+        </p:txBody>
+      </p:sp>
+      <p:sp>
+        <p:nvSpPr>
+          <p:cNvPr id="3" name="Slide Number Placeholder 2">
+            <a:extLst>
+              <a:ext uri="{FF2B5EF4-FFF2-40B4-BE49-F238E27FC236}">
+                <a16:creationId xmlns:a16="http://schemas.microsoft.com/office/drawing/2014/main" id="{EC5CDFDE-FE24-4E6C-B12C-FAD8DD8BBE3E}"/>
+              </a:ext>
+            </a:extLst>
+          </p:cNvPr>
+          <p:cNvSpPr>
+            <a:spLocks noGrp="1"/>
+          </p:cNvSpPr>
+          <p:nvPr>
+            <p:ph type="sldNum" sz="quarter" idx="12"/>
+          </p:nvPr>
+        </p:nvSpPr>
+        <p:spPr/>
+        <p:txBody>
+          <a:bodyPr/>
+          <a:lstStyle/>
+          <a:p>
+            <a:endParaRPr lang="en-US" dirty="0"/>
+          </a:p>
+        </p:txBody>
+      </p:sp>
+    </p:spTree>
+    <p:extLst>
+      <p:ext uri="{BB962C8B-B14F-4D97-AF65-F5344CB8AC3E}">
+        <p14:creationId xmlns:p14="http://schemas.microsoft.com/office/powerpoint/2010/main" val="3205317315"/>
       </p:ext>
     </p:extLst>
   </p:cSld>
@@ -12164,13 +12865,13 @@
           <p:nvPr/>
         </p:nvPicPr>
         <p:blipFill>
-          <a:blip r:embed="rId3">
+          <a:blip r:embed="rId3" cstate="hqprint">
             <a:extLst>
               <a:ext uri="{28A0092B-C50C-407E-A947-70E740481C1C}">
                 <a14:useLocalDpi xmlns:a14="http://schemas.microsoft.com/office/drawing/2010/main" val="0"/>
               </a:ext>
               <a:ext uri="{96DAC541-7B7A-43D3-8B79-37D633B846F1}">
-                <asvg:svgBlip xmlns:asvg="http://schemas.microsoft.com/office/drawing/2016/SVG/main" r:embed="rId4"/>
+                <asvg:svgBlip xmlns:asvg="http://schemas.microsoft.com/office/drawing/2016/SVG/main" xmlns="" r:embed="rId4"/>
               </a:ext>
             </a:extLst>
           </a:blip>
@@ -12203,7 +12904,7 @@
           <p:nvPr/>
         </p:nvPicPr>
         <p:blipFill>
-          <a:blip r:embed="rId5">
+          <a:blip r:embed="rId5" cstate="hqprint">
             <a:extLst>
               <a:ext uri="{28A0092B-C50C-407E-A947-70E740481C1C}">
                 <a14:useLocalDpi xmlns:a14="http://schemas.microsoft.com/office/drawing/2010/main" val="0"/>
@@ -12434,7 +13135,7 @@
           <p:nvPr/>
         </p:nvPicPr>
         <p:blipFill>
-          <a:blip r:embed="rId6">
+          <a:blip r:embed="rId6" cstate="hqprint">
             <a:extLst>
               <a:ext uri="{28A0092B-C50C-407E-A947-70E740481C1C}">
                 <a14:useLocalDpi xmlns:a14="http://schemas.microsoft.com/office/drawing/2010/main" val="0"/>
@@ -12536,7 +13237,19 @@
           <a:p>
             <a:r>
               <a:rPr lang="en-IN" sz="1800" dirty="0"/>
-              <a:t>Brainstorming sessions to understand the ways to find QoC.</a:t>
+              <a:t>Brainstorming sessions </a:t>
+            </a:r>
+            <a:r>
+              <a:rPr lang="en-IN" sz="1800" dirty="0" smtClean="0"/>
+              <a:t>helped to</a:t>
+            </a:r>
+            <a:r>
+              <a:rPr lang="en-IN" sz="1800" dirty="0" smtClean="0"/>
+              <a:t> </a:t>
+            </a:r>
+            <a:r>
+              <a:rPr lang="en-IN" sz="1800" dirty="0"/>
+              <a:t>understand the ways to find QoC.</a:t>
             </a:r>
           </a:p>
           <a:p>
@@ -12550,8 +13263,13 @@
             <a:pPr marL="761238" lvl="2" indent="-285750"/>
             <a:r>
               <a:rPr lang="en-IN" sz="1050" dirty="0"/>
-              <a:t>The adoption of such a method does not seem to be proactive.</a:t>
-            </a:r>
+              <a:t>The adoption of such a method does not seem </a:t>
+            </a:r>
+            <a:r>
+              <a:rPr lang="en-IN" sz="1050" dirty="0" smtClean="0"/>
+              <a:t>very accurate and feedback is always optional.</a:t>
+            </a:r>
+            <a:endParaRPr lang="en-IN" sz="1050" dirty="0"/>
           </a:p>
           <a:p>
             <a:pPr marL="578358" lvl="1" indent="-285750"/>
@@ -12823,8 +13541,8 @@
         </p:blipFill>
         <p:spPr bwMode="auto">
           <a:xfrm>
-            <a:off x="2977049" y="2345634"/>
-            <a:ext cx="6237902" cy="3156223"/>
+            <a:off x="4506410" y="2795460"/>
+            <a:ext cx="5926061" cy="3156223"/>
           </a:xfrm>
           <a:prstGeom prst="rect">
             <a:avLst/>
@@ -12835,6 +13553,288 @@
           </a:ln>
         </p:spPr>
       </p:pic>
+      <p:sp>
+        <p:nvSpPr>
+          <p:cNvPr id="6" name="Content Placeholder 2">
+            <a:extLst>
+              <a:ext uri="{FF2B5EF4-FFF2-40B4-BE49-F238E27FC236}">
+                <a16:creationId xmlns:a16="http://schemas.microsoft.com/office/drawing/2014/main" id="{25368742-CC27-4F6B-9BEF-7046CEABE13D}"/>
+              </a:ext>
+            </a:extLst>
+          </p:cNvPr>
+          <p:cNvSpPr txBox="1">
+            <a:spLocks/>
+          </p:cNvSpPr>
+          <p:nvPr/>
+        </p:nvSpPr>
+        <p:spPr>
+          <a:xfrm>
+            <a:off x="1097280" y="2108201"/>
+            <a:ext cx="10058400" cy="3760891"/>
+          </a:xfrm>
+          <a:prstGeom prst="rect">
+            <a:avLst/>
+          </a:prstGeom>
+        </p:spPr>
+        <p:txBody>
+          <a:bodyPr vert="horz" lIns="0" tIns="45720" rIns="0" bIns="45720" rtlCol="0">
+            <a:normAutofit/>
+          </a:bodyPr>
+          <a:lstStyle>
+            <a:lvl1pPr marL="91440" indent="-91440" algn="l" defTabSz="914400" rtl="0" eaLnBrk="1" latinLnBrk="0" hangingPunct="1">
+              <a:lnSpc>
+                <a:spcPct val="110000"/>
+              </a:lnSpc>
+              <a:spcBef>
+                <a:spcPts val="1200"/>
+              </a:spcBef>
+              <a:spcAft>
+                <a:spcPts val="200"/>
+              </a:spcAft>
+              <a:buClr>
+                <a:schemeClr val="accent1"/>
+              </a:buClr>
+              <a:buSzPct val="100000"/>
+              <a:buFont typeface="Calibri" panose="020F0502020204030204" pitchFamily="34" charset="0"/>
+              <a:buChar char=" "/>
+              <a:defRPr sz="1900" kern="1200">
+                <a:solidFill>
+                  <a:schemeClr val="tx1">
+                    <a:lumMod val="75000"/>
+                    <a:lumOff val="25000"/>
+                  </a:schemeClr>
+                </a:solidFill>
+                <a:latin typeface="+mn-lt"/>
+                <a:ea typeface="+mn-ea"/>
+                <a:cs typeface="+mn-cs"/>
+              </a:defRPr>
+            </a:lvl1pPr>
+            <a:lvl2pPr marL="384048" indent="-182880" algn="l" defTabSz="914400" rtl="0" eaLnBrk="1" latinLnBrk="0" hangingPunct="1">
+              <a:lnSpc>
+                <a:spcPct val="100000"/>
+              </a:lnSpc>
+              <a:spcBef>
+                <a:spcPts val="200"/>
+              </a:spcBef>
+              <a:spcAft>
+                <a:spcPts val="400"/>
+              </a:spcAft>
+              <a:buClrTx/>
+              <a:buFont typeface="Calibri" pitchFamily="34" charset="0"/>
+              <a:buChar char="◦"/>
+              <a:defRPr sz="1700" kern="1200">
+                <a:solidFill>
+                  <a:schemeClr val="tx1">
+                    <a:lumMod val="75000"/>
+                    <a:lumOff val="25000"/>
+                  </a:schemeClr>
+                </a:solidFill>
+                <a:latin typeface="+mn-lt"/>
+                <a:ea typeface="+mn-ea"/>
+                <a:cs typeface="+mn-cs"/>
+              </a:defRPr>
+            </a:lvl2pPr>
+            <a:lvl3pPr marL="566928" indent="-182880" algn="l" defTabSz="914400" rtl="0" eaLnBrk="1" latinLnBrk="0" hangingPunct="1">
+              <a:lnSpc>
+                <a:spcPct val="100000"/>
+              </a:lnSpc>
+              <a:spcBef>
+                <a:spcPts val="200"/>
+              </a:spcBef>
+              <a:spcAft>
+                <a:spcPts val="400"/>
+              </a:spcAft>
+              <a:buClrTx/>
+              <a:buFont typeface="Calibri" pitchFamily="34" charset="0"/>
+              <a:buChar char="◦"/>
+              <a:defRPr sz="1300" kern="1200">
+                <a:solidFill>
+                  <a:schemeClr val="tx1">
+                    <a:lumMod val="75000"/>
+                    <a:lumOff val="25000"/>
+                  </a:schemeClr>
+                </a:solidFill>
+                <a:latin typeface="+mn-lt"/>
+                <a:ea typeface="+mn-ea"/>
+                <a:cs typeface="+mn-cs"/>
+              </a:defRPr>
+            </a:lvl3pPr>
+            <a:lvl4pPr marL="749808" indent="-182880" algn="l" defTabSz="914400" rtl="0" eaLnBrk="1" latinLnBrk="0" hangingPunct="1">
+              <a:lnSpc>
+                <a:spcPct val="100000"/>
+              </a:lnSpc>
+              <a:spcBef>
+                <a:spcPts val="200"/>
+              </a:spcBef>
+              <a:spcAft>
+                <a:spcPts val="400"/>
+              </a:spcAft>
+              <a:buClrTx/>
+              <a:buFont typeface="Calibri" pitchFamily="34" charset="0"/>
+              <a:buChar char="◦"/>
+              <a:defRPr sz="1300" kern="1200">
+                <a:solidFill>
+                  <a:schemeClr val="tx1">
+                    <a:lumMod val="75000"/>
+                    <a:lumOff val="25000"/>
+                  </a:schemeClr>
+                </a:solidFill>
+                <a:latin typeface="+mn-lt"/>
+                <a:ea typeface="+mn-ea"/>
+                <a:cs typeface="+mn-cs"/>
+              </a:defRPr>
+            </a:lvl4pPr>
+            <a:lvl5pPr marL="932688" indent="-182880" algn="l" defTabSz="914400" rtl="0" eaLnBrk="1" latinLnBrk="0" hangingPunct="1">
+              <a:lnSpc>
+                <a:spcPct val="100000"/>
+              </a:lnSpc>
+              <a:spcBef>
+                <a:spcPts val="200"/>
+              </a:spcBef>
+              <a:spcAft>
+                <a:spcPts val="400"/>
+              </a:spcAft>
+              <a:buClrTx/>
+              <a:buFont typeface="Calibri" pitchFamily="34" charset="0"/>
+              <a:buChar char="◦"/>
+              <a:defRPr sz="1300" kern="1200">
+                <a:solidFill>
+                  <a:schemeClr val="tx1">
+                    <a:lumMod val="75000"/>
+                    <a:lumOff val="25000"/>
+                  </a:schemeClr>
+                </a:solidFill>
+                <a:latin typeface="+mn-lt"/>
+                <a:ea typeface="+mn-ea"/>
+                <a:cs typeface="+mn-cs"/>
+              </a:defRPr>
+            </a:lvl5pPr>
+            <a:lvl6pPr marL="1100000" indent="-228600" algn="l" defTabSz="914400" rtl="0" eaLnBrk="1" latinLnBrk="0" hangingPunct="1">
+              <a:lnSpc>
+                <a:spcPct val="90000"/>
+              </a:lnSpc>
+              <a:spcBef>
+                <a:spcPts val="200"/>
+              </a:spcBef>
+              <a:spcAft>
+                <a:spcPts val="400"/>
+              </a:spcAft>
+              <a:buClr>
+                <a:schemeClr val="accent1"/>
+              </a:buClr>
+              <a:buFont typeface="Calibri" pitchFamily="34" charset="0"/>
+              <a:buChar char="◦"/>
+              <a:defRPr sz="1400" kern="1200">
+                <a:solidFill>
+                  <a:schemeClr val="tx1">
+                    <a:lumMod val="75000"/>
+                    <a:lumOff val="25000"/>
+                  </a:schemeClr>
+                </a:solidFill>
+                <a:latin typeface="+mn-lt"/>
+                <a:ea typeface="+mn-ea"/>
+                <a:cs typeface="+mn-cs"/>
+              </a:defRPr>
+            </a:lvl6pPr>
+            <a:lvl7pPr marL="1300000" indent="-228600" algn="l" defTabSz="914400" rtl="0" eaLnBrk="1" latinLnBrk="0" hangingPunct="1">
+              <a:lnSpc>
+                <a:spcPct val="90000"/>
+              </a:lnSpc>
+              <a:spcBef>
+                <a:spcPts val="200"/>
+              </a:spcBef>
+              <a:spcAft>
+                <a:spcPts val="400"/>
+              </a:spcAft>
+              <a:buClr>
+                <a:schemeClr val="accent1"/>
+              </a:buClr>
+              <a:buFont typeface="Calibri" pitchFamily="34" charset="0"/>
+              <a:buChar char="◦"/>
+              <a:defRPr sz="1400" kern="1200">
+                <a:solidFill>
+                  <a:schemeClr val="tx1">
+                    <a:lumMod val="75000"/>
+                    <a:lumOff val="25000"/>
+                  </a:schemeClr>
+                </a:solidFill>
+                <a:latin typeface="+mn-lt"/>
+                <a:ea typeface="+mn-ea"/>
+                <a:cs typeface="+mn-cs"/>
+              </a:defRPr>
+            </a:lvl7pPr>
+            <a:lvl8pPr marL="1500000" indent="-228600" algn="l" defTabSz="914400" rtl="0" eaLnBrk="1" latinLnBrk="0" hangingPunct="1">
+              <a:lnSpc>
+                <a:spcPct val="90000"/>
+              </a:lnSpc>
+              <a:spcBef>
+                <a:spcPts val="200"/>
+              </a:spcBef>
+              <a:spcAft>
+                <a:spcPts val="400"/>
+              </a:spcAft>
+              <a:buClr>
+                <a:schemeClr val="accent1"/>
+              </a:buClr>
+              <a:buFont typeface="Calibri" pitchFamily="34" charset="0"/>
+              <a:buChar char="◦"/>
+              <a:defRPr sz="1400" kern="1200">
+                <a:solidFill>
+                  <a:schemeClr val="tx1">
+                    <a:lumMod val="75000"/>
+                    <a:lumOff val="25000"/>
+                  </a:schemeClr>
+                </a:solidFill>
+                <a:latin typeface="+mn-lt"/>
+                <a:ea typeface="+mn-ea"/>
+                <a:cs typeface="+mn-cs"/>
+              </a:defRPr>
+            </a:lvl8pPr>
+            <a:lvl9pPr marL="1700000" indent="-228600" algn="l" defTabSz="914400" rtl="0" eaLnBrk="1" latinLnBrk="0" hangingPunct="1">
+              <a:lnSpc>
+                <a:spcPct val="90000"/>
+              </a:lnSpc>
+              <a:spcBef>
+                <a:spcPts val="200"/>
+              </a:spcBef>
+              <a:spcAft>
+                <a:spcPts val="400"/>
+              </a:spcAft>
+              <a:buClr>
+                <a:schemeClr val="accent1"/>
+              </a:buClr>
+              <a:buFont typeface="Calibri" pitchFamily="34" charset="0"/>
+              <a:buChar char="◦"/>
+              <a:defRPr sz="1400" kern="1200">
+                <a:solidFill>
+                  <a:schemeClr val="tx1">
+                    <a:lumMod val="75000"/>
+                    <a:lumOff val="25000"/>
+                  </a:schemeClr>
+                </a:solidFill>
+                <a:latin typeface="+mn-lt"/>
+                <a:ea typeface="+mn-ea"/>
+                <a:cs typeface="+mn-cs"/>
+              </a:defRPr>
+            </a:lvl9pPr>
+          </a:lstStyle>
+          <a:p>
+            <a:pPr lvl="1"/>
+            <a:r>
+              <a:rPr lang="en-IN" dirty="0" smtClean="0"/>
+              <a:t>The focus is on the design of the Analytics Component. </a:t>
+            </a:r>
+          </a:p>
+          <a:p>
+            <a:pPr lvl="1"/>
+            <a:r>
+              <a:rPr lang="en-IN" dirty="0" smtClean="0"/>
+              <a:t>Rest of the integrations will be considered during the actual implementation.</a:t>
+            </a:r>
+            <a:endParaRPr lang="en-IN" dirty="0"/>
+          </a:p>
+        </p:txBody>
+      </p:sp>
     </p:spTree>
     <p:extLst>
       <p:ext uri="{BB962C8B-B14F-4D97-AF65-F5344CB8AC3E}">
@@ -13071,6 +14071,13 @@
   <p:clrMapOvr>
     <a:masterClrMapping/>
   </p:clrMapOvr>
+  <p:timing>
+    <p:tnLst>
+      <p:par>
+        <p:cTn id="1" dur="indefinite" restart="never" nodeType="tmRoot"/>
+      </p:par>
+    </p:tnLst>
+  </p:timing>
 </p:sld>
 </file>
 

</xml_diff>

<commit_message>
grammarly checks on report and ppt - submitted these latest
</commit_message>
<xml_diff>
--- a/docs/Quality of Care.pptx
+++ b/docs/Quality of Care.pptx
@@ -217,7 +217,7 @@
           <a:p>
             <a:fld id="{BC46ECE3-5739-471E-8276-669D33A7DECB}" type="datetimeFigureOut">
               <a:rPr lang="en-IN" smtClean="0"/>
-              <a:t>25-04-2020</a:t>
+              <a:t>26-04-2020</a:t>
             </a:fld>
             <a:endParaRPr lang="en-IN"/>
           </a:p>
@@ -729,7 +729,7 @@
           <a:p>
             <a:fld id="{DA33E745-8FE1-47CC-91DA-CD8A7CF025A3}" type="datetime1">
               <a:rPr lang="en-US" smtClean="0"/>
-              <a:t>4/25/2020</a:t>
+              <a:t>4/26/2020</a:t>
             </a:fld>
             <a:endParaRPr lang="en-US" dirty="0"/>
           </a:p>
@@ -921,7 +921,7 @@
           <a:p>
             <a:fld id="{D0F87860-D0B0-438C-9AE6-1AD9EE8E8B0E}" type="datetime1">
               <a:rPr lang="en-US" smtClean="0"/>
-              <a:t>4/25/2020</a:t>
+              <a:t>4/26/2020</a:t>
             </a:fld>
             <a:endParaRPr lang="en-US" dirty="0"/>
           </a:p>
@@ -1167,7 +1167,7 @@
           <a:p>
             <a:fld id="{B322B73F-9EB1-4EA4-AD9F-B2980F2457F0}" type="datetime1">
               <a:rPr lang="en-US" smtClean="0"/>
-              <a:t>4/25/2020</a:t>
+              <a:t>4/26/2020</a:t>
             </a:fld>
             <a:endParaRPr lang="en-US" dirty="0"/>
           </a:p>
@@ -1359,7 +1359,7 @@
           <a:p>
             <a:fld id="{729E3528-EB33-475D-8B9A-F28254ACC31C}" type="datetime1">
               <a:rPr lang="en-US" smtClean="0"/>
-              <a:t>4/25/2020</a:t>
+              <a:t>4/26/2020</a:t>
             </a:fld>
             <a:endParaRPr lang="en-US" dirty="0"/>
           </a:p>
@@ -1736,7 +1736,7 @@
           <a:p>
             <a:fld id="{2BEE3975-8C66-4BA8-A7E2-CAB9A35681C1}" type="datetime1">
               <a:rPr lang="en-US" smtClean="0"/>
-              <a:t>4/25/2020</a:t>
+              <a:t>4/26/2020</a:t>
             </a:fld>
             <a:endParaRPr lang="en-US" dirty="0"/>
           </a:p>
@@ -1995,7 +1995,7 @@
           <a:p>
             <a:fld id="{15715BA5-2FD0-4578-8689-EC29B250C8A4}" type="datetime1">
               <a:rPr lang="en-US" smtClean="0"/>
-              <a:t>4/25/2020</a:t>
+              <a:t>4/26/2020</a:t>
             </a:fld>
             <a:endParaRPr lang="en-US" dirty="0"/>
           </a:p>
@@ -2396,7 +2396,7 @@
           <a:p>
             <a:fld id="{30D3F7EE-31C8-4752-93C5-13E9A9E58C9C}" type="datetime1">
               <a:rPr lang="en-US" smtClean="0"/>
-              <a:t>4/25/2020</a:t>
+              <a:t>4/26/2020</a:t>
             </a:fld>
             <a:endParaRPr lang="en-US" dirty="0"/>
           </a:p>
@@ -2536,7 +2536,7 @@
           <a:p>
             <a:fld id="{37E26A07-523D-43DE-8DBE-08FFE0AA0CA1}" type="datetime1">
               <a:rPr lang="en-US" smtClean="0"/>
-              <a:t>4/25/2020</a:t>
+              <a:t>4/26/2020</a:t>
             </a:fld>
             <a:endParaRPr lang="en-US" dirty="0"/>
           </a:p>
@@ -2697,7 +2697,7 @@
           <a:p>
             <a:fld id="{2C9CFBD5-D14A-4300-BA93-A2414E4D5FA5}" type="datetime1">
               <a:rPr lang="en-US" smtClean="0"/>
-              <a:t>4/25/2020</a:t>
+              <a:t>4/26/2020</a:t>
             </a:fld>
             <a:endParaRPr lang="en-US" dirty="0"/>
           </a:p>
@@ -3030,7 +3030,7 @@
           <a:p>
             <a:fld id="{39B460A2-04A8-47A8-9FCB-846A50EC35F0}" type="datetime1">
               <a:rPr lang="en-US" smtClean="0"/>
-              <a:t>4/25/2020</a:t>
+              <a:t>4/26/2020</a:t>
             </a:fld>
             <a:endParaRPr lang="en-US" dirty="0"/>
           </a:p>
@@ -3384,7 +3384,7 @@
           <a:p>
             <a:fld id="{9728EA47-BE8C-4FD8-AADD-542A56491222}" type="datetime1">
               <a:rPr lang="en-US" smtClean="0"/>
-              <a:t>4/25/2020</a:t>
+              <a:t>4/26/2020</a:t>
             </a:fld>
             <a:endParaRPr lang="en-US" dirty="0"/>
           </a:p>
@@ -3649,7 +3649,7 @@
           <a:p>
             <a:fld id="{A89E64EA-8512-4027-A5F4-89414817116A}" type="datetime1">
               <a:rPr lang="en-US" smtClean="0"/>
-              <a:t>4/25/2020</a:t>
+              <a:t>4/26/2020</a:t>
             </a:fld>
             <a:endParaRPr lang="en-US" dirty="0"/>
           </a:p>
@@ -4192,7 +4192,7 @@
                 <a16:creationId xmlns:a16="http://schemas.microsoft.com/office/drawing/2014/main" id="{A9286AD2-18A9-4868-A4E3-7A2097A20810}"/>
               </a:ext>
               <a:ext uri="{C183D7F6-B498-43B3-948B-1728B52AA6E4}">
-                <adec:decorative xmlns="" xmlns:adec="http://schemas.microsoft.com/office/drawing/2017/decorative" val="1"/>
+                <adec:decorative xmlns:adec="http://schemas.microsoft.com/office/drawing/2017/decorative" val="1"/>
               </a:ext>
             </a:extLst>
           </p:cNvPr>
@@ -4284,10 +4284,6 @@
               <a:rPr lang="en-US" sz="4000" dirty="0"/>
               <a:t>for</a:t>
             </a:r>
-            <a:r>
-              <a:rPr lang="en-US" dirty="0"/>
-              <a:t/>
-            </a:r>
             <a:br>
               <a:rPr lang="en-US" dirty="0"/>
             </a:br>
@@ -4394,7 +4390,7 @@
                 <a16:creationId xmlns:a16="http://schemas.microsoft.com/office/drawing/2014/main" id="{E7A7CD63-7EC3-44F3-95D0-595C4019FF24}"/>
               </a:ext>
               <a:ext uri="{C183D7F6-B498-43B3-948B-1728B52AA6E4}">
-                <adec:decorative xmlns="" xmlns:adec="http://schemas.microsoft.com/office/drawing/2017/decorative" val="1"/>
+                <adec:decorative xmlns:adec="http://schemas.microsoft.com/office/drawing/2017/decorative" val="1"/>
               </a:ext>
             </a:extLst>
           </p:cNvPr>
@@ -4743,14 +4739,14 @@
             <a:pPr lvl="1"/>
             <a:r>
               <a:rPr lang="en-IN" dirty="0"/>
-              <a:t>Privacy contracts made it difficult to use the applications from live data.</a:t>
+              <a:t>Privacy contracts made it difficult to use applications with live data.</a:t>
             </a:r>
           </a:p>
           <a:p>
             <a:pPr lvl="1"/>
             <a:r>
               <a:rPr lang="en-IN" dirty="0"/>
-              <a:t>Dataset from Kaggle.com was used referred as PIMA dataset, which had 786 records for diabetic and non-diabetic female patients.</a:t>
+              <a:t>Dataset from Kaggle.com was used referred to as PIMA dataset, which had 786 records for diabetic and non-diabetic female patients.</a:t>
             </a:r>
           </a:p>
           <a:p>
@@ -4841,14 +4837,14 @@
           <p:nvPr>
             <p:extLst>
               <p:ext uri="{D42A27DB-BD31-4B8C-83A1-F6EECF244321}">
-                <p14:modId xmlns:p14="http://schemas.microsoft.com/office/powerpoint/2010/main" val="2438655921"/>
+                <p14:modId xmlns:p14="http://schemas.microsoft.com/office/powerpoint/2010/main" val="1573855351"/>
               </p:ext>
             </p:extLst>
           </p:nvPr>
         </p:nvGraphicFramePr>
         <p:xfrm>
           <a:off x="5218430" y="3589537"/>
-          <a:ext cx="5937250" cy="2332355"/>
+          <a:ext cx="5937250" cy="2179193"/>
         </p:xfrm>
         <a:graphic>
           <a:graphicData uri="http://schemas.openxmlformats.org/drawingml/2006/table">
@@ -4887,12 +4883,12 @@
                         </a:spcAft>
                       </a:pPr>
                       <a:r>
-                        <a:rPr lang="en-IN" sz="1200">
+                        <a:rPr lang="en-IN" sz="1200" dirty="0">
                           <a:effectLst/>
                         </a:rPr>
                         <a:t>Data attribute</a:t>
                       </a:r>
-                      <a:endParaRPr lang="en-US" sz="1200">
+                      <a:endParaRPr lang="en-US" sz="1200" dirty="0">
                         <a:effectLst/>
                         <a:latin typeface="Times New Roman" panose="02020603050405020304" pitchFamily="18" charset="0"/>
                         <a:ea typeface="Calibri" panose="020F0502020204030204" pitchFamily="34" charset="0"/>
@@ -5307,12 +5303,12 @@
                         </a:spcAft>
                       </a:pPr>
                       <a:r>
-                        <a:rPr lang="en-IN" sz="1200">
+                        <a:rPr lang="en-IN" sz="1200" dirty="0">
                           <a:effectLst/>
                         </a:rPr>
                         <a:t>DiabetesPedigreeFunction</a:t>
                       </a:r>
-                      <a:endParaRPr lang="en-US" sz="1200">
+                      <a:endParaRPr lang="en-US" sz="1200" dirty="0">
                         <a:effectLst/>
                         <a:latin typeface="Times New Roman" panose="02020603050405020304" pitchFamily="18" charset="0"/>
                         <a:ea typeface="Calibri" panose="020F0502020204030204" pitchFamily="34" charset="0"/>
@@ -5342,12 +5338,12 @@
                         </a:spcAft>
                       </a:pPr>
                       <a:r>
-                        <a:rPr lang="en-IN" sz="1200">
+                        <a:rPr lang="en-IN" sz="1200" dirty="0">
                           <a:effectLst/>
                         </a:rPr>
-                        <a:t>Score for likelihood of diabetes based on family history</a:t>
+                        <a:t>Score for likelihood of Diabetes based on family history</a:t>
                       </a:r>
-                      <a:endParaRPr lang="en-US" sz="1200">
+                      <a:endParaRPr lang="en-US" sz="1200" dirty="0">
                         <a:effectLst/>
                         <a:latin typeface="Times New Roman" panose="02020603050405020304" pitchFamily="18" charset="0"/>
                         <a:ea typeface="Calibri" panose="020F0502020204030204" pitchFamily="34" charset="0"/>
@@ -5552,7 +5548,7 @@
                         <a:rPr lang="en-IN" sz="1200" dirty="0">
                           <a:effectLst/>
                         </a:rPr>
-                        <a:t>Class variable (0 or 1) whether or not a patient has diabetes</a:t>
+                        <a:t>Class variable (0 or 1) whether or not a patient has Diabetes</a:t>
                       </a:r>
                       <a:endParaRPr lang="en-US" sz="1200" dirty="0">
                         <a:effectLst/>
@@ -5584,13 +5580,6 @@
   <p:clrMapOvr>
     <a:masterClrMapping/>
   </p:clrMapOvr>
-  <p:timing>
-    <p:tnLst>
-      <p:par>
-        <p:cTn id="1" dur="indefinite" restart="never" nodeType="tmRoot"/>
-      </p:par>
-    </p:tnLst>
-  </p:timing>
 </p:sld>
 </file>
 
@@ -5826,13 +5815,6 @@
   <p:clrMapOvr>
     <a:masterClrMapping/>
   </p:clrMapOvr>
-  <p:timing>
-    <p:tnLst>
-      <p:par>
-        <p:cTn id="1" dur="indefinite" restart="never" nodeType="tmRoot"/>
-      </p:par>
-    </p:tnLst>
-  </p:timing>
 </p:sld>
 </file>
 
@@ -6096,13 +6078,6 @@
   <p:clrMapOvr>
     <a:masterClrMapping/>
   </p:clrMapOvr>
-  <p:timing>
-    <p:tnLst>
-      <p:par>
-        <p:cTn id="1" dur="indefinite" restart="never" nodeType="tmRoot"/>
-      </p:par>
-    </p:tnLst>
-  </p:timing>
 </p:sld>
 </file>
 
@@ -6152,10 +6127,9 @@
               <a:rPr lang="en-IN" dirty="0"/>
             </a:br>
             <a:r>
-              <a:rPr lang="en-IN" sz="2400" dirty="0" smtClean="0"/>
+              <a:rPr lang="en-IN" sz="2400" dirty="0"/>
               <a:t>Standard K-means (gap-stat)  </a:t>
             </a:r>
-            <a:endParaRPr lang="en-IN" sz="2400" dirty="0"/>
           </a:p>
         </p:txBody>
       </p:sp>
@@ -6182,39 +6156,37 @@
           <a:p>
             <a:pPr lvl="1"/>
             <a:r>
-              <a:rPr lang="en-IN" sz="1600" dirty="0" smtClean="0"/>
+              <a:rPr lang="en-IN" sz="1600" dirty="0"/>
               <a:t>K-means execute with gap-stat indicated the data is not separable, as optimal K value was 1.</a:t>
             </a:r>
-            <a:endParaRPr lang="en-IN" sz="1600" dirty="0"/>
           </a:p>
           <a:p>
             <a:pPr lvl="1"/>
             <a:r>
-              <a:rPr lang="en-IN" sz="1600" dirty="0" smtClean="0"/>
+              <a:rPr lang="en-IN" sz="1600" dirty="0"/>
               <a:t>K-means with all eight data attributes </a:t>
             </a:r>
             <a:br>
-              <a:rPr lang="en-IN" sz="1600" dirty="0" smtClean="0"/>
+              <a:rPr lang="en-IN" sz="1600" dirty="0"/>
             </a:br>
             <a:r>
-              <a:rPr lang="en-IN" sz="1600" dirty="0" smtClean="0"/>
+              <a:rPr lang="en-IN" sz="1600" dirty="0"/>
               <a:t>for K = 3 was not useful.</a:t>
             </a:r>
           </a:p>
           <a:p>
             <a:pPr lvl="1"/>
             <a:r>
-              <a:rPr lang="en-IN" sz="1600" dirty="0" smtClean="0"/>
+              <a:rPr lang="en-IN" sz="1600" dirty="0"/>
               <a:t>Conclusion: Data was not easily separable </a:t>
             </a:r>
             <a:br>
-              <a:rPr lang="en-IN" sz="1600" dirty="0" smtClean="0"/>
+              <a:rPr lang="en-IN" sz="1600" dirty="0"/>
             </a:br>
             <a:r>
-              <a:rPr lang="en-IN" sz="1600" dirty="0" smtClean="0"/>
+              <a:rPr lang="en-IN" sz="1600" dirty="0"/>
               <a:t>into groups based on risk using default K-means.</a:t>
             </a:r>
-            <a:endParaRPr lang="en-IN" sz="1600" dirty="0"/>
           </a:p>
           <a:p>
             <a:pPr lvl="1"/>
@@ -6317,13 +6289,6 @@
   <p:clrMapOvr>
     <a:masterClrMapping/>
   </p:clrMapOvr>
-  <p:timing>
-    <p:tnLst>
-      <p:par>
-        <p:cTn id="1" dur="indefinite" restart="never" nodeType="tmRoot"/>
-      </p:par>
-    </p:tnLst>
-  </p:timing>
 </p:sld>
 </file>
 
@@ -6373,18 +6338,17 @@
               <a:rPr lang="en-IN" dirty="0"/>
             </a:br>
             <a:r>
-              <a:rPr lang="en-IN" sz="2400" dirty="0" smtClean="0"/>
+              <a:rPr lang="en-IN" sz="2400" dirty="0"/>
               <a:t>Standard DBSCAN (</a:t>
             </a:r>
             <a:r>
-              <a:rPr lang="en-IN" sz="2400" dirty="0" err="1" smtClean="0"/>
+              <a:rPr lang="en-IN" sz="2400" dirty="0" err="1"/>
               <a:t>kNN</a:t>
             </a:r>
             <a:r>
-              <a:rPr lang="en-IN" sz="2400" dirty="0" smtClean="0"/>
+              <a:rPr lang="en-IN" sz="2400" dirty="0"/>
               <a:t>) </a:t>
             </a:r>
-            <a:endParaRPr lang="en-IN" sz="2400" dirty="0"/>
           </a:p>
         </p:txBody>
       </p:sp>
@@ -6434,65 +6398,44 @@
             <a:pPr lvl="1"/>
             <a:r>
               <a:rPr lang="en-IN" sz="1600" dirty="0"/>
-              <a:t>DBSCAN </a:t>
-            </a:r>
-            <a:r>
-              <a:rPr lang="en-IN" sz="1600" dirty="0" smtClean="0"/>
-              <a:t>with eps = 60 and </a:t>
-            </a:r>
-            <a:r>
-              <a:rPr lang="en-IN" sz="1600" dirty="0" err="1" smtClean="0"/>
+              <a:t>DBSCAN with eps = 60 and </a:t>
+            </a:r>
+            <a:r>
+              <a:rPr lang="en-IN" sz="1600" dirty="0" err="1"/>
               <a:t>MinPts</a:t>
             </a:r>
             <a:r>
-              <a:rPr lang="en-IN" sz="1600" dirty="0" smtClean="0"/>
+              <a:rPr lang="en-IN" sz="1600" dirty="0"/>
               <a:t>  = 5, generated 2 clusters </a:t>
             </a:r>
             <a:br>
-              <a:rPr lang="en-IN" sz="1600" dirty="0" smtClean="0"/>
+              <a:rPr lang="en-IN" sz="1600" dirty="0"/>
             </a:br>
             <a:r>
-              <a:rPr lang="en-IN" sz="1600" dirty="0" smtClean="0"/>
-              <a:t>but did </a:t>
-            </a:r>
-            <a:r>
               <a:rPr lang="en-IN" sz="1600" dirty="0"/>
-              <a:t>not generate </a:t>
-            </a:r>
-            <a:r>
-              <a:rPr lang="en-IN" sz="1600" dirty="0" smtClean="0"/>
-              <a:t>any </a:t>
-            </a:r>
-            <a:r>
+              <a:t>but did not generate any useful results </a:t>
+            </a:r>
+            <a:br>
               <a:rPr lang="en-IN" sz="1600" dirty="0"/>
-              <a:t>useful </a:t>
-            </a:r>
-            <a:r>
-              <a:rPr lang="en-IN" sz="1600" dirty="0" smtClean="0"/>
-              <a:t>results </a:t>
+            </a:br>
+            <a:r>
+              <a:rPr lang="en-IN" sz="1600" dirty="0"/>
+              <a:t>in regards to the risk groups.</a:t>
+            </a:r>
+          </a:p>
+          <a:p>
+            <a:pPr lvl="1"/>
+            <a:r>
+              <a:rPr lang="en-IN" sz="1600" dirty="0"/>
+              <a:t>Conclusion: DBSCAN is not a correct choice to proceed, </a:t>
             </a:r>
             <a:br>
-              <a:rPr lang="en-IN" sz="1600" dirty="0" smtClean="0"/>
+              <a:rPr lang="en-IN" sz="1600" dirty="0"/>
             </a:br>
             <a:r>
-              <a:rPr lang="en-IN" sz="1600" dirty="0" smtClean="0"/>
-              <a:t>in regards to the risk groups.</a:t>
-            </a:r>
-          </a:p>
-          <a:p>
-            <a:pPr lvl="1"/>
-            <a:r>
-              <a:rPr lang="en-IN" sz="1600" dirty="0" smtClean="0"/>
-              <a:t>Conclusion: DBSCAN is not a correct choice to proceed, </a:t>
-            </a:r>
-            <a:br>
-              <a:rPr lang="en-IN" sz="1600" dirty="0" smtClean="0"/>
-            </a:br>
-            <a:r>
-              <a:rPr lang="en-IN" sz="1600" dirty="0" smtClean="0"/>
+              <a:rPr lang="en-IN" sz="1600" dirty="0"/>
               <a:t>as data is not easily separable.</a:t>
             </a:r>
-            <a:endParaRPr lang="en-IN" sz="1600" dirty="0"/>
           </a:p>
           <a:p>
             <a:endParaRPr lang="en-IN" dirty="0"/>
@@ -6594,13 +6537,6 @@
   <p:clrMapOvr>
     <a:masterClrMapping/>
   </p:clrMapOvr>
-  <p:timing>
-    <p:tnLst>
-      <p:par>
-        <p:cTn id="1" dur="indefinite" restart="never" nodeType="tmRoot"/>
-      </p:par>
-    </p:tnLst>
-  </p:timing>
 </p:sld>
 </file>
 
@@ -6911,13 +6847,6 @@
   <p:clrMapOvr>
     <a:masterClrMapping/>
   </p:clrMapOvr>
-  <p:timing>
-    <p:tnLst>
-      <p:par>
-        <p:cTn id="1" dur="indefinite" restart="never" nodeType="tmRoot"/>
-      </p:par>
-    </p:tnLst>
-  </p:timing>
 </p:sld>
 </file>
 
@@ -7117,7 +7046,7 @@
         </p:nvGraphicFramePr>
         <p:xfrm>
           <a:off x="5796193" y="4629572"/>
-          <a:ext cx="5587394" cy="1463040"/>
+          <a:ext cx="5587394" cy="1239520"/>
         </p:xfrm>
         <a:graphic>
           <a:graphicData uri="http://schemas.openxmlformats.org/drawingml/2006/table">
@@ -8200,7 +8129,7 @@
         </p:nvGraphicFramePr>
         <p:xfrm>
           <a:off x="1097279" y="4329976"/>
-          <a:ext cx="5937250" cy="1463040"/>
+          <a:ext cx="5937250" cy="1239520"/>
         </p:xfrm>
         <a:graphic>
           <a:graphicData uri="http://schemas.openxmlformats.org/drawingml/2006/table">
@@ -9123,44 +9052,34 @@
               <a:rPr lang="en-IN" sz="1600" dirty="0"/>
               <a:t>The focus is on the high-risk cluster size, </a:t>
             </a:r>
-            <a:r>
-              <a:rPr lang="en-IN" sz="1600" dirty="0" smtClean="0"/>
-              <a:t/>
-            </a:r>
             <a:br>
-              <a:rPr lang="en-IN" sz="1600" dirty="0" smtClean="0"/>
+              <a:rPr lang="en-IN" sz="1600" dirty="0"/>
             </a:br>
             <a:r>
-              <a:rPr lang="en-IN" sz="1600" dirty="0" smtClean="0"/>
-              <a:t>decreasing </a:t>
-            </a:r>
-            <a:r>
               <a:rPr lang="en-IN" sz="1600" dirty="0"/>
-              <a:t>trend of high-risk cluster indicates good QoC. </a:t>
-            </a:r>
-            <a:endParaRPr lang="en-IN" sz="1600" dirty="0" smtClean="0"/>
+              <a:t>decreasing trend of high-risk cluster indicates good QoC. </a:t>
+            </a:r>
           </a:p>
           <a:p>
             <a:pPr lvl="1"/>
             <a:r>
-              <a:rPr lang="en-IN" sz="1600" dirty="0" smtClean="0"/>
+              <a:rPr lang="en-IN" sz="1600" dirty="0"/>
               <a:t>Following example data is plotted (C1: high risk cluster)</a:t>
             </a:r>
           </a:p>
           <a:p>
             <a:pPr lvl="1"/>
             <a:r>
-              <a:rPr lang="en-IN" sz="1600" dirty="0" smtClean="0"/>
+              <a:rPr lang="en-IN" sz="1600" dirty="0"/>
               <a:t>Simple linear regression (colour: red) line is added + slope details</a:t>
             </a:r>
           </a:p>
           <a:p>
             <a:pPr lvl="1"/>
             <a:r>
-              <a:rPr lang="en-IN" sz="1600" dirty="0" smtClean="0"/>
+              <a:rPr lang="en-IN" sz="1600" dirty="0"/>
               <a:t>Negative slope: Good  QoC (for high risk)</a:t>
             </a:r>
-            <a:endParaRPr lang="en-IN" sz="1600" dirty="0"/>
           </a:p>
           <a:p>
             <a:pPr marL="0" indent="0">
@@ -9265,7 +9184,7 @@
         </p:nvGraphicFramePr>
         <p:xfrm>
           <a:off x="1333254" y="4898813"/>
-          <a:ext cx="6025902" cy="1341120"/>
+          <a:ext cx="6025902" cy="1136396"/>
         </p:xfrm>
         <a:graphic>
           <a:graphicData uri="http://schemas.openxmlformats.org/drawingml/2006/table">
@@ -10949,13 +10868,6 @@
   <p:clrMapOvr>
     <a:masterClrMapping/>
   </p:clrMapOvr>
-  <p:timing>
-    <p:tnLst>
-      <p:par>
-        <p:cTn id="1" dur="indefinite" restart="never" nodeType="tmRoot"/>
-      </p:par>
-    </p:tnLst>
-  </p:timing>
 </p:sld>
 </file>
 
@@ -11094,7 +11006,7 @@
           </a:p>
           <a:p>
             <a:pPr lvl="1"/>
-            <a:endParaRPr lang="en-IN" sz="1800" dirty="0" smtClean="0"/>
+            <a:endParaRPr lang="en-IN" sz="1800" dirty="0"/>
           </a:p>
           <a:p>
             <a:pPr lvl="0"/>
@@ -11191,13 +11103,6 @@
   <p:clrMapOvr>
     <a:masterClrMapping/>
   </p:clrMapOvr>
-  <p:timing>
-    <p:tnLst>
-      <p:par>
-        <p:cTn id="1" dur="indefinite" restart="never" nodeType="tmRoot"/>
-      </p:par>
-    </p:tnLst>
-  </p:timing>
 </p:sld>
 </file>
 
@@ -11234,7 +11139,7 @@
                 <a16:creationId xmlns:a16="http://schemas.microsoft.com/office/drawing/2014/main" id="{FBDCECDC-EEE3-4128-AA5E-82A8C08796E8}"/>
               </a:ext>
               <a:ext uri="{C183D7F6-B498-43B3-948B-1728B52AA6E4}">
-                <adec:decorative xmlns="" xmlns:adec="http://schemas.microsoft.com/office/drawing/2017/decorative" val="1"/>
+                <adec:decorative xmlns:adec="http://schemas.microsoft.com/office/drawing/2017/decorative" val="1"/>
               </a:ext>
             </a:extLst>
           </p:cNvPr>
@@ -11337,7 +11242,7 @@
                 <a16:creationId xmlns:a16="http://schemas.microsoft.com/office/drawing/2014/main" id="{4260EDE0-989C-4E16-AF94-F652294D828E}"/>
               </a:ext>
               <a:ext uri="{C183D7F6-B498-43B3-948B-1728B52AA6E4}">
-                <adec:decorative xmlns="" xmlns:adec="http://schemas.microsoft.com/office/drawing/2017/decorative" val="1"/>
+                <adec:decorative xmlns:adec="http://schemas.microsoft.com/office/drawing/2017/decorative" val="1"/>
               </a:ext>
             </a:extLst>
           </p:cNvPr>
@@ -12232,14 +12137,14 @@
             <a:pPr lvl="1"/>
             <a:r>
               <a:rPr lang="en-IN" sz="1900" dirty="0"/>
-              <a:t>In healthcare domain the applications are build around the idea of providing care.</a:t>
+              <a:t>In the healthcare domain, the applications are built around the idea of providing care.</a:t>
             </a:r>
           </a:p>
           <a:p>
             <a:pPr lvl="1"/>
             <a:r>
               <a:rPr lang="en-IN" sz="1900" dirty="0"/>
-              <a:t>Philips VitalHealth has various chronic disease management solutions build for diseases (e.g.  Diabetes, COPD, Asthma etc.).</a:t>
+              <a:t>Philips VitalHealth has various chronic disease management solutions build for diseases (e.g.  Diabetes, COPD, Asthma, etc.).</a:t>
             </a:r>
           </a:p>
           <a:p>
@@ -12364,7 +12269,7 @@
             </a:pPr>
             <a:r>
               <a:rPr lang="en-US" dirty="0"/>
-              <a:t>QoC is stated good when the health of population is stable or improving. </a:t>
+              <a:t>QoC is stated good when the health of the population is stable or improving. </a:t>
             </a:r>
           </a:p>
           <a:p>
@@ -12404,7 +12309,7 @@
             </a:pPr>
             <a:r>
               <a:rPr lang="en-US" dirty="0"/>
-              <a:t>QoC measurement is must for accountable care as per CDC’s Meaningful Use policy.</a:t>
+              <a:t>QoC measurement is a must for accountable care as per CDC’s Meaningful Use policy.</a:t>
             </a:r>
           </a:p>
           <a:p>
@@ -12601,21 +12506,21 @@
             <a:pPr lvl="1"/>
             <a:r>
               <a:rPr lang="en-IN" sz="3300" dirty="0"/>
-              <a:t>Current solutions are having little or no way to assess the QoC.</a:t>
+              <a:t>Current solutions have little or no way to assess the QoC.</a:t>
             </a:r>
           </a:p>
           <a:p>
             <a:pPr lvl="1"/>
             <a:r>
               <a:rPr lang="en-IN" sz="3300" dirty="0"/>
-              <a:t>Knowledge related to QoC is observed in the people, but is not yet implemented.</a:t>
+              <a:t>Knowledge related to QoC is observed in the people but is not yet implemented.</a:t>
             </a:r>
           </a:p>
           <a:p>
             <a:pPr lvl="1"/>
             <a:r>
               <a:rPr lang="en-IN" sz="3300" dirty="0"/>
-              <a:t>Ad-hoc methods are adopted for QoC report generation on need basis.</a:t>
+              <a:t>Ad-hoc methods are adopted for QoC report generation on a need basis.</a:t>
             </a:r>
           </a:p>
           <a:p>
@@ -12933,7 +12838,7 @@
                 <a14:useLocalDpi xmlns:a14="http://schemas.microsoft.com/office/drawing/2010/main" val="0"/>
               </a:ext>
               <a:ext uri="{96DAC541-7B7A-43D3-8B79-37D633B846F1}">
-                <asvg:svgBlip xmlns="" xmlns:asvg="http://schemas.microsoft.com/office/drawing/2016/SVG/main" r:embed="rId4"/>
+                <asvg:svgBlip xmlns:asvg="http://schemas.microsoft.com/office/drawing/2016/SVG/main" r:embed="rId4"/>
               </a:ext>
             </a:extLst>
           </a:blip>
@@ -13299,15 +13204,7 @@
           <a:p>
             <a:r>
               <a:rPr lang="en-IN" sz="1800" dirty="0"/>
-              <a:t>Brainstorming sessions </a:t>
-            </a:r>
-            <a:r>
-              <a:rPr lang="en-IN" sz="1800" dirty="0" smtClean="0"/>
-              <a:t>helped to </a:t>
-            </a:r>
-            <a:r>
-              <a:rPr lang="en-IN" sz="1800" dirty="0"/>
-              <a:t>understand the ways to find QoC.</a:t>
+              <a:t>Brainstorming sessions helped to understand the ways to find QoC.</a:t>
             </a:r>
           </a:p>
           <a:p>
@@ -13321,13 +13218,8 @@
             <a:pPr marL="761238" lvl="2" indent="-285750"/>
             <a:r>
               <a:rPr lang="en-IN" sz="1050" dirty="0"/>
-              <a:t>The adoption of such a method does not seem </a:t>
-            </a:r>
-            <a:r>
-              <a:rPr lang="en-IN" sz="1050" dirty="0" smtClean="0"/>
-              <a:t>very accurate and feedback is always optional.</a:t>
-            </a:r>
-            <a:endParaRPr lang="en-IN" sz="1050" dirty="0"/>
+              <a:t>The adoption of such a method does not seem very accurate and feedback is always optional.</a:t>
+            </a:r>
           </a:p>
           <a:p>
             <a:pPr marL="578358" lvl="1" indent="-285750"/>
@@ -13354,13 +13246,13 @@
             <a:pPr marL="761238" lvl="2" indent="-285750"/>
             <a:r>
               <a:rPr lang="en-IN" sz="1050" dirty="0"/>
-              <a:t>It is difficult to achieve due to the dependency on a finding a trustable system.  </a:t>
+              <a:t>It is difficult to achieve due to the dependency on finding a trustable system.  </a:t>
             </a:r>
           </a:p>
           <a:p>
             <a:r>
               <a:rPr lang="en-IN" sz="1800" dirty="0"/>
-              <a:t>Research requirement was gathered and a proposal was made with the objectives.</a:t>
+              <a:t>Research requirement was gathered, and a proposal was made with the objectives.</a:t>
             </a:r>
           </a:p>
           <a:p>
@@ -13879,17 +13771,16 @@
           <a:p>
             <a:pPr lvl="1"/>
             <a:r>
-              <a:rPr lang="en-IN" dirty="0" smtClean="0"/>
+              <a:rPr lang="en-IN" dirty="0"/>
               <a:t>The focus is on the design of the Analytics Component. </a:t>
             </a:r>
           </a:p>
           <a:p>
             <a:pPr lvl="1"/>
             <a:r>
-              <a:rPr lang="en-IN" dirty="0" smtClean="0"/>
+              <a:rPr lang="en-IN" dirty="0"/>
               <a:t>Rest of the integrations will be considered during the actual implementation.</a:t>
             </a:r>
-            <a:endParaRPr lang="en-IN" dirty="0"/>
           </a:p>
         </p:txBody>
       </p:sp>
@@ -14000,7 +13891,7 @@
             <a:pPr lvl="1"/>
             <a:r>
               <a:rPr lang="en-IN" dirty="0"/>
-              <a:t>Data cleaning removes the insignificant data from the exported dataset.</a:t>
+              <a:t>Data cleaning removes insignificant data from the exported dataset.</a:t>
             </a:r>
           </a:p>
           <a:p>
@@ -14014,7 +13905,7 @@
             <a:pPr lvl="1"/>
             <a:r>
               <a:rPr lang="en-IN" dirty="0"/>
-              <a:t>Cluster analysis helps to understand the risk-based groups formation.  </a:t>
+              <a:t>Cluster analysis helps to understand the risk-based group formations.  </a:t>
             </a:r>
           </a:p>
           <a:p>
@@ -14129,13 +14020,6 @@
   <p:clrMapOvr>
     <a:masterClrMapping/>
   </p:clrMapOvr>
-  <p:timing>
-    <p:tnLst>
-      <p:par>
-        <p:cTn id="1" dur="indefinite" restart="never" nodeType="tmRoot"/>
-      </p:par>
-    </p:tnLst>
-  </p:timing>
 </p:sld>
 </file>
 

</xml_diff>

<commit_message>
PPT updated with some new data + notes
</commit_message>
<xml_diff>
--- a/docs/Quality of Care.pptx
+++ b/docs/Quality of Care.pptx
@@ -7,6 +7,9 @@
   <p:notesMasterIdLst>
     <p:notesMasterId r:id="rId23"/>
   </p:notesMasterIdLst>
+  <p:handoutMasterIdLst>
+    <p:handoutMasterId r:id="rId24"/>
+  </p:handoutMasterIdLst>
   <p:sldIdLst>
     <p:sldId id="257" r:id="rId2"/>
     <p:sldId id="258" r:id="rId3"/>
@@ -135,6 +138,171 @@
 </p:presentation>
 </file>
 
+<file path=ppt/handoutMasters/handoutMaster1.xml><?xml version="1.0" encoding="utf-8"?>
+<p:handoutMaster xmlns:a="http://schemas.openxmlformats.org/drawingml/2006/main" xmlns:r="http://schemas.openxmlformats.org/officeDocument/2006/relationships" xmlns:p="http://schemas.openxmlformats.org/presentationml/2006/main">
+  <p:cSld>
+    <p:bg>
+      <p:bgRef idx="1001">
+        <a:schemeClr val="bg1"/>
+      </p:bgRef>
+    </p:bg>
+    <p:spTree>
+      <p:nvGrpSpPr>
+        <p:cNvPr id="1" name=""/>
+        <p:cNvGrpSpPr/>
+        <p:nvPr/>
+      </p:nvGrpSpPr>
+      <p:grpSpPr>
+        <a:xfrm>
+          <a:off x="0" y="0"/>
+          <a:ext cx="0" cy="0"/>
+          <a:chOff x="0" y="0"/>
+          <a:chExt cx="0" cy="0"/>
+        </a:xfrm>
+      </p:grpSpPr>
+      <p:sp>
+        <p:nvSpPr>
+          <p:cNvPr id="2" name="Header Placeholder 1"/>
+          <p:cNvSpPr>
+            <a:spLocks noGrp="1"/>
+          </p:cNvSpPr>
+          <p:nvPr>
+            <p:ph type="hdr" sz="quarter"/>
+          </p:nvPr>
+        </p:nvSpPr>
+        <p:spPr>
+          <a:xfrm>
+            <a:off x="0" y="0"/>
+            <a:ext cx="2971800" cy="458788"/>
+          </a:xfrm>
+          <a:prstGeom prst="rect">
+            <a:avLst/>
+          </a:prstGeom>
+        </p:spPr>
+        <p:txBody>
+          <a:bodyPr vert="horz" lIns="91440" tIns="45720" rIns="91440" bIns="45720" rtlCol="0"/>
+          <a:lstStyle>
+            <a:lvl1pPr algn="l">
+              <a:defRPr sz="1200"/>
+            </a:lvl1pPr>
+          </a:lstStyle>
+          <a:p>
+            <a:endParaRPr lang="en-US"/>
+          </a:p>
+        </p:txBody>
+      </p:sp>
+      <p:sp>
+        <p:nvSpPr>
+          <p:cNvPr id="3" name="Date Placeholder 2"/>
+          <p:cNvSpPr>
+            <a:spLocks noGrp="1"/>
+          </p:cNvSpPr>
+          <p:nvPr>
+            <p:ph type="dt" sz="quarter" idx="1"/>
+          </p:nvPr>
+        </p:nvSpPr>
+        <p:spPr>
+          <a:xfrm>
+            <a:off x="3884613" y="0"/>
+            <a:ext cx="2971800" cy="458788"/>
+          </a:xfrm>
+          <a:prstGeom prst="rect">
+            <a:avLst/>
+          </a:prstGeom>
+        </p:spPr>
+        <p:txBody>
+          <a:bodyPr vert="horz" lIns="91440" tIns="45720" rIns="91440" bIns="45720" rtlCol="0"/>
+          <a:lstStyle>
+            <a:lvl1pPr algn="r">
+              <a:defRPr sz="1200"/>
+            </a:lvl1pPr>
+          </a:lstStyle>
+          <a:p>
+            <a:fld id="{E500F4C0-4E3A-4C47-A929-17026DE34046}" type="datetimeFigureOut">
+              <a:rPr lang="en-US" smtClean="0"/>
+              <a:t>4/27/2020</a:t>
+            </a:fld>
+            <a:endParaRPr lang="en-US"/>
+          </a:p>
+        </p:txBody>
+      </p:sp>
+      <p:sp>
+        <p:nvSpPr>
+          <p:cNvPr id="4" name="Footer Placeholder 3"/>
+          <p:cNvSpPr>
+            <a:spLocks noGrp="1"/>
+          </p:cNvSpPr>
+          <p:nvPr>
+            <p:ph type="ftr" sz="quarter" idx="2"/>
+          </p:nvPr>
+        </p:nvSpPr>
+        <p:spPr>
+          <a:xfrm>
+            <a:off x="0" y="8685213"/>
+            <a:ext cx="2971800" cy="458787"/>
+          </a:xfrm>
+          <a:prstGeom prst="rect">
+            <a:avLst/>
+          </a:prstGeom>
+        </p:spPr>
+        <p:txBody>
+          <a:bodyPr vert="horz" lIns="91440" tIns="45720" rIns="91440" bIns="45720" rtlCol="0" anchor="b"/>
+          <a:lstStyle>
+            <a:lvl1pPr algn="l">
+              <a:defRPr sz="1200"/>
+            </a:lvl1pPr>
+          </a:lstStyle>
+          <a:p>
+            <a:endParaRPr lang="en-US"/>
+          </a:p>
+        </p:txBody>
+      </p:sp>
+      <p:sp>
+        <p:nvSpPr>
+          <p:cNvPr id="5" name="Slide Number Placeholder 4"/>
+          <p:cNvSpPr>
+            <a:spLocks noGrp="1"/>
+          </p:cNvSpPr>
+          <p:nvPr>
+            <p:ph type="sldNum" sz="quarter" idx="3"/>
+          </p:nvPr>
+        </p:nvSpPr>
+        <p:spPr>
+          <a:xfrm>
+            <a:off x="3884613" y="8685213"/>
+            <a:ext cx="2971800" cy="458787"/>
+          </a:xfrm>
+          <a:prstGeom prst="rect">
+            <a:avLst/>
+          </a:prstGeom>
+        </p:spPr>
+        <p:txBody>
+          <a:bodyPr vert="horz" lIns="91440" tIns="45720" rIns="91440" bIns="45720" rtlCol="0" anchor="b"/>
+          <a:lstStyle>
+            <a:lvl1pPr algn="r">
+              <a:defRPr sz="1200"/>
+            </a:lvl1pPr>
+          </a:lstStyle>
+          <a:p>
+            <a:fld id="{04E2398F-B171-451C-801F-F96FE91A31C3}" type="slidenum">
+              <a:rPr lang="en-US" smtClean="0"/>
+              <a:t>‹#›</a:t>
+            </a:fld>
+            <a:endParaRPr lang="en-US"/>
+          </a:p>
+        </p:txBody>
+      </p:sp>
+    </p:spTree>
+    <p:extLst>
+      <p:ext uri="{BB962C8B-B14F-4D97-AF65-F5344CB8AC3E}">
+        <p14:creationId xmlns:p14="http://schemas.microsoft.com/office/powerpoint/2010/main" val="1252231687"/>
+      </p:ext>
+    </p:extLst>
+  </p:cSld>
+  <p:clrMap bg1="lt1" tx1="dk1" bg2="lt2" tx2="dk2" accent1="accent1" accent2="accent2" accent3="accent3" accent4="accent4" accent5="accent5" accent6="accent6" hlink="hlink" folHlink="folHlink"/>
+</p:handoutMaster>
+</file>
+
 <file path=ppt/notesMasters/notesMaster1.xml><?xml version="1.0" encoding="utf-8"?>
 <p:notesMaster xmlns:a="http://schemas.openxmlformats.org/drawingml/2006/main" xmlns:r="http://schemas.openxmlformats.org/officeDocument/2006/relationships" xmlns:p="http://schemas.openxmlformats.org/presentationml/2006/main">
   <p:cSld>
@@ -217,7 +385,7 @@
           <a:p>
             <a:fld id="{BC46ECE3-5739-471E-8276-669D33A7DECB}" type="datetimeFigureOut">
               <a:rPr lang="en-IN" smtClean="0"/>
-              <a:t>26-04-2020</a:t>
+              <a:t>27-04-2020</a:t>
             </a:fld>
             <a:endParaRPr lang="en-IN"/>
           </a:p>
@@ -485,6 +653,2033 @@
 </p:notesMaster>
 </file>
 
+<file path=ppt/notesSlides/notesSlide1.xml><?xml version="1.0" encoding="utf-8"?>
+<p:notes xmlns:a="http://schemas.openxmlformats.org/drawingml/2006/main" xmlns:r="http://schemas.openxmlformats.org/officeDocument/2006/relationships" xmlns:p="http://schemas.openxmlformats.org/presentationml/2006/main">
+  <p:cSld>
+    <p:spTree>
+      <p:nvGrpSpPr>
+        <p:cNvPr id="1" name=""/>
+        <p:cNvGrpSpPr/>
+        <p:nvPr/>
+      </p:nvGrpSpPr>
+      <p:grpSpPr>
+        <a:xfrm>
+          <a:off x="0" y="0"/>
+          <a:ext cx="0" cy="0"/>
+          <a:chOff x="0" y="0"/>
+          <a:chExt cx="0" cy="0"/>
+        </a:xfrm>
+      </p:grpSpPr>
+      <p:sp>
+        <p:nvSpPr>
+          <p:cNvPr id="2" name="Slide Image Placeholder 1"/>
+          <p:cNvSpPr>
+            <a:spLocks noGrp="1" noRot="1" noChangeAspect="1"/>
+          </p:cNvSpPr>
+          <p:nvPr>
+            <p:ph type="sldImg"/>
+          </p:nvPr>
+        </p:nvSpPr>
+        <p:spPr/>
+      </p:sp>
+      <p:sp>
+        <p:nvSpPr>
+          <p:cNvPr id="3" name="Notes Placeholder 2"/>
+          <p:cNvSpPr>
+            <a:spLocks noGrp="1"/>
+          </p:cNvSpPr>
+          <p:nvPr>
+            <p:ph type="body" idx="1"/>
+          </p:nvPr>
+        </p:nvSpPr>
+        <p:spPr/>
+        <p:txBody>
+          <a:bodyPr/>
+          <a:lstStyle/>
+          <a:p>
+            <a:r>
+              <a:rPr lang="en-IN" dirty="0" smtClean="0"/>
+              <a:t>Intro:</a:t>
+            </a:r>
+          </a:p>
+          <a:p>
+            <a:pPr marL="228600" indent="-228600">
+              <a:buAutoNum type="arabicPeriod"/>
+            </a:pPr>
+            <a:r>
+              <a:rPr lang="en-IN" dirty="0" smtClean="0"/>
+              <a:t>My name</a:t>
+            </a:r>
+            <a:r>
+              <a:rPr lang="en-IN" baseline="0" dirty="0" smtClean="0"/>
+              <a:t> is Vaibhav Gaikwad, am a Tech Arch at Philips VH.  almost 13 years now</a:t>
+            </a:r>
+          </a:p>
+          <a:p>
+            <a:pPr marL="228600" indent="-228600">
+              <a:buAutoNum type="arabicPeriod"/>
+            </a:pPr>
+            <a:r>
+              <a:rPr lang="en-IN" baseline="0" dirty="0" smtClean="0"/>
+              <a:t>I am going to present of QoC for CDM applications which is the forte of PVH</a:t>
+            </a:r>
+          </a:p>
+          <a:p>
+            <a:pPr marL="228600" indent="-228600">
+              <a:buAutoNum type="arabicPeriod"/>
+            </a:pPr>
+            <a:r>
+              <a:rPr lang="en-IN" baseline="0" dirty="0" smtClean="0"/>
+              <a:t>The work started in 2</a:t>
+            </a:r>
+            <a:r>
+              <a:rPr lang="en-IN" baseline="30000" dirty="0" smtClean="0"/>
+              <a:t>nd</a:t>
+            </a:r>
+            <a:r>
+              <a:rPr lang="en-IN" baseline="0" dirty="0" smtClean="0"/>
+              <a:t> week of Feb and was finalized on 24</a:t>
+            </a:r>
+            <a:r>
+              <a:rPr lang="en-IN" baseline="30000" dirty="0" smtClean="0"/>
+              <a:t>th</a:t>
+            </a:r>
+            <a:r>
+              <a:rPr lang="en-IN" baseline="0" dirty="0" smtClean="0"/>
+              <a:t> Apr (around 2 months and 1 week more or less)</a:t>
+            </a:r>
+          </a:p>
+        </p:txBody>
+      </p:sp>
+      <p:sp>
+        <p:nvSpPr>
+          <p:cNvPr id="4" name="Slide Number Placeholder 3"/>
+          <p:cNvSpPr>
+            <a:spLocks noGrp="1"/>
+          </p:cNvSpPr>
+          <p:nvPr>
+            <p:ph type="sldNum" sz="quarter" idx="10"/>
+          </p:nvPr>
+        </p:nvSpPr>
+        <p:spPr/>
+        <p:txBody>
+          <a:bodyPr/>
+          <a:lstStyle/>
+          <a:p>
+            <a:fld id="{D58A01DC-D56B-4089-94FD-B2CDCC879BEA}" type="slidenum">
+              <a:rPr lang="en-IN" smtClean="0"/>
+              <a:t>1</a:t>
+            </a:fld>
+            <a:endParaRPr lang="en-IN"/>
+          </a:p>
+        </p:txBody>
+      </p:sp>
+    </p:spTree>
+    <p:extLst>
+      <p:ext uri="{BB962C8B-B14F-4D97-AF65-F5344CB8AC3E}">
+        <p14:creationId xmlns:p14="http://schemas.microsoft.com/office/powerpoint/2010/main" val="1422302722"/>
+      </p:ext>
+    </p:extLst>
+  </p:cSld>
+  <p:clrMapOvr>
+    <a:masterClrMapping/>
+  </p:clrMapOvr>
+</p:notes>
+</file>
+
+<file path=ppt/notesSlides/notesSlide10.xml><?xml version="1.0" encoding="utf-8"?>
+<p:notes xmlns:a="http://schemas.openxmlformats.org/drawingml/2006/main" xmlns:r="http://schemas.openxmlformats.org/officeDocument/2006/relationships" xmlns:p="http://schemas.openxmlformats.org/presentationml/2006/main">
+  <p:cSld>
+    <p:spTree>
+      <p:nvGrpSpPr>
+        <p:cNvPr id="1" name=""/>
+        <p:cNvGrpSpPr/>
+        <p:nvPr/>
+      </p:nvGrpSpPr>
+      <p:grpSpPr>
+        <a:xfrm>
+          <a:off x="0" y="0"/>
+          <a:ext cx="0" cy="0"/>
+          <a:chOff x="0" y="0"/>
+          <a:chExt cx="0" cy="0"/>
+        </a:xfrm>
+      </p:grpSpPr>
+      <p:sp>
+        <p:nvSpPr>
+          <p:cNvPr id="2" name="Slide Image Placeholder 1"/>
+          <p:cNvSpPr>
+            <a:spLocks noGrp="1" noRot="1" noChangeAspect="1"/>
+          </p:cNvSpPr>
+          <p:nvPr>
+            <p:ph type="sldImg"/>
+          </p:nvPr>
+        </p:nvSpPr>
+        <p:spPr/>
+      </p:sp>
+      <p:sp>
+        <p:nvSpPr>
+          <p:cNvPr id="3" name="Notes Placeholder 2"/>
+          <p:cNvSpPr>
+            <a:spLocks noGrp="1"/>
+          </p:cNvSpPr>
+          <p:nvPr>
+            <p:ph type="body" idx="1"/>
+          </p:nvPr>
+        </p:nvSpPr>
+        <p:spPr/>
+        <p:txBody>
+          <a:bodyPr/>
+          <a:lstStyle/>
+          <a:p>
+            <a:pPr marL="228600" indent="-228600">
+              <a:buAutoNum type="arabicPeriod"/>
+            </a:pPr>
+            <a:r>
+              <a:rPr lang="en-IN" sz="1200" b="0" i="0" kern="1200" dirty="0" smtClean="0">
+                <a:solidFill>
+                  <a:schemeClr val="tx1"/>
+                </a:solidFill>
+                <a:effectLst/>
+                <a:latin typeface="+mn-lt"/>
+                <a:ea typeface="+mn-ea"/>
+                <a:cs typeface="+mn-cs"/>
+              </a:rPr>
+              <a:t>Density-based spatial clustering of applications with noise</a:t>
+            </a:r>
+          </a:p>
+          <a:p>
+            <a:pPr marL="228600" indent="-228600">
+              <a:buAutoNum type="arabicPeriod"/>
+            </a:pPr>
+            <a:r>
+              <a:rPr lang="en-IN" sz="1200" b="0" i="0" kern="1200" dirty="0" smtClean="0">
+                <a:solidFill>
+                  <a:schemeClr val="tx1"/>
+                </a:solidFill>
+                <a:effectLst/>
+                <a:latin typeface="+mn-lt"/>
+                <a:ea typeface="+mn-ea"/>
+                <a:cs typeface="+mn-cs"/>
+              </a:rPr>
+              <a:t> eps is the maximum distance between two points in same cluster</a:t>
+            </a:r>
+          </a:p>
+          <a:p>
+            <a:pPr marL="228600" indent="-228600">
+              <a:buAutoNum type="arabicPeriod"/>
+            </a:pPr>
+            <a:r>
+              <a:rPr lang="en-IN" sz="1200" b="0" i="0" kern="1200" dirty="0" smtClean="0">
+                <a:solidFill>
+                  <a:schemeClr val="tx1"/>
+                </a:solidFill>
+                <a:effectLst/>
+                <a:latin typeface="+mn-lt"/>
+                <a:ea typeface="+mn-ea"/>
+                <a:cs typeface="+mn-cs"/>
+              </a:rPr>
+              <a:t> </a:t>
+            </a:r>
+            <a:r>
+              <a:rPr lang="en-IN" b="0" dirty="0" smtClean="0"/>
+              <a:t>optimal eps</a:t>
+            </a:r>
+            <a:r>
+              <a:rPr lang="en-IN" b="0" baseline="0" dirty="0" smtClean="0"/>
+              <a:t> was </a:t>
+            </a:r>
+            <a:r>
+              <a:rPr lang="en-IN" b="0" baseline="0" dirty="0" err="1" smtClean="0"/>
+              <a:t>calc’ed</a:t>
+            </a:r>
+            <a:r>
+              <a:rPr lang="en-IN" b="0" baseline="0" dirty="0" smtClean="0"/>
+              <a:t> using “</a:t>
+            </a:r>
+            <a:r>
+              <a:rPr lang="en-IN" b="0" baseline="0" dirty="0" err="1" smtClean="0"/>
+              <a:t>kNNdistplot</a:t>
+            </a:r>
+            <a:r>
+              <a:rPr lang="en-IN" b="0" baseline="0" dirty="0" smtClean="0"/>
+              <a:t>” method for K = 3</a:t>
+            </a:r>
+          </a:p>
+          <a:p>
+            <a:pPr marL="228600" indent="-228600">
+              <a:buAutoNum type="arabicPeriod"/>
+            </a:pPr>
+            <a:r>
+              <a:rPr lang="en-IN" sz="1200" b="0" i="0" kern="1200" dirty="0" smtClean="0">
+                <a:solidFill>
+                  <a:schemeClr val="tx1"/>
+                </a:solidFill>
+                <a:effectLst/>
+                <a:latin typeface="+mn-lt"/>
+                <a:ea typeface="+mn-ea"/>
+                <a:cs typeface="+mn-cs"/>
+              </a:rPr>
+              <a:t>make use of the average distances of every point to its k nearest </a:t>
+            </a:r>
+            <a:r>
+              <a:rPr lang="en-IN" sz="1200" b="0" i="0" kern="1200" dirty="0" err="1" smtClean="0">
+                <a:solidFill>
+                  <a:schemeClr val="tx1"/>
+                </a:solidFill>
+                <a:effectLst/>
+                <a:latin typeface="+mn-lt"/>
+                <a:ea typeface="+mn-ea"/>
+                <a:cs typeface="+mn-cs"/>
+              </a:rPr>
+              <a:t>neighbors</a:t>
+            </a:r>
+            <a:r>
+              <a:rPr lang="en-IN" sz="1200" b="0" i="0" kern="1200" dirty="0" smtClean="0">
+                <a:solidFill>
+                  <a:schemeClr val="tx1"/>
+                </a:solidFill>
+                <a:effectLst/>
+                <a:latin typeface="+mn-lt"/>
+                <a:ea typeface="+mn-ea"/>
+                <a:cs typeface="+mn-cs"/>
+              </a:rPr>
+              <a:t>. These k distances are then plotted in ascending order. The point where you see an elbow like bend corresponds to the optimal </a:t>
+            </a:r>
+            <a:r>
+              <a:rPr lang="en-IN" sz="1200" b="1" i="0" kern="1200" dirty="0" smtClean="0">
+                <a:solidFill>
+                  <a:schemeClr val="tx1"/>
+                </a:solidFill>
+                <a:effectLst/>
+                <a:latin typeface="+mn-lt"/>
+                <a:ea typeface="+mn-ea"/>
+                <a:cs typeface="+mn-cs"/>
+              </a:rPr>
+              <a:t>*eps*</a:t>
+            </a:r>
+            <a:r>
+              <a:rPr lang="en-IN" sz="1200" b="0" i="0" kern="1200" dirty="0" smtClean="0">
+                <a:solidFill>
+                  <a:schemeClr val="tx1"/>
+                </a:solidFill>
+                <a:effectLst/>
+                <a:latin typeface="+mn-lt"/>
+                <a:ea typeface="+mn-ea"/>
+                <a:cs typeface="+mn-cs"/>
+              </a:rPr>
+              <a:t> value</a:t>
+            </a:r>
+          </a:p>
+          <a:p>
+            <a:pPr marL="228600" indent="-228600">
+              <a:buAutoNum type="arabicPeriod"/>
+            </a:pPr>
+            <a:r>
+              <a:rPr lang="en-IN" sz="1200" b="0" i="0" kern="1200" dirty="0" smtClean="0">
+                <a:solidFill>
+                  <a:schemeClr val="tx1"/>
+                </a:solidFill>
+                <a:effectLst/>
+                <a:latin typeface="+mn-lt"/>
+                <a:ea typeface="+mn-ea"/>
+                <a:cs typeface="+mn-cs"/>
+              </a:rPr>
+              <a:t>So</a:t>
+            </a:r>
+            <a:r>
+              <a:rPr lang="en-IN" sz="1200" b="0" i="0" kern="1200" baseline="0" dirty="0" smtClean="0">
+                <a:solidFill>
+                  <a:schemeClr val="tx1"/>
+                </a:solidFill>
+                <a:effectLst/>
+                <a:latin typeface="+mn-lt"/>
+                <a:ea typeface="+mn-ea"/>
+                <a:cs typeface="+mn-cs"/>
+              </a:rPr>
+              <a:t> now we move to Elbow method</a:t>
+            </a:r>
+            <a:endParaRPr lang="en-US" b="0" dirty="0"/>
+          </a:p>
+        </p:txBody>
+      </p:sp>
+      <p:sp>
+        <p:nvSpPr>
+          <p:cNvPr id="4" name="Slide Number Placeholder 3"/>
+          <p:cNvSpPr>
+            <a:spLocks noGrp="1"/>
+          </p:cNvSpPr>
+          <p:nvPr>
+            <p:ph type="sldNum" sz="quarter" idx="10"/>
+          </p:nvPr>
+        </p:nvSpPr>
+        <p:spPr/>
+        <p:txBody>
+          <a:bodyPr/>
+          <a:lstStyle/>
+          <a:p>
+            <a:fld id="{D58A01DC-D56B-4089-94FD-B2CDCC879BEA}" type="slidenum">
+              <a:rPr lang="en-IN" smtClean="0"/>
+              <a:t>14</a:t>
+            </a:fld>
+            <a:endParaRPr lang="en-IN"/>
+          </a:p>
+        </p:txBody>
+      </p:sp>
+    </p:spTree>
+    <p:extLst>
+      <p:ext uri="{BB962C8B-B14F-4D97-AF65-F5344CB8AC3E}">
+        <p14:creationId xmlns:p14="http://schemas.microsoft.com/office/powerpoint/2010/main" val="825190233"/>
+      </p:ext>
+    </p:extLst>
+  </p:cSld>
+  <p:clrMapOvr>
+    <a:masterClrMapping/>
+  </p:clrMapOvr>
+</p:notes>
+</file>
+
+<file path=ppt/notesSlides/notesSlide11.xml><?xml version="1.0" encoding="utf-8"?>
+<p:notes xmlns:a="http://schemas.openxmlformats.org/drawingml/2006/main" xmlns:r="http://schemas.openxmlformats.org/officeDocument/2006/relationships" xmlns:p="http://schemas.openxmlformats.org/presentationml/2006/main">
+  <p:cSld>
+    <p:spTree>
+      <p:nvGrpSpPr>
+        <p:cNvPr id="1" name=""/>
+        <p:cNvGrpSpPr/>
+        <p:nvPr/>
+      </p:nvGrpSpPr>
+      <p:grpSpPr>
+        <a:xfrm>
+          <a:off x="0" y="0"/>
+          <a:ext cx="0" cy="0"/>
+          <a:chOff x="0" y="0"/>
+          <a:chExt cx="0" cy="0"/>
+        </a:xfrm>
+      </p:grpSpPr>
+      <p:sp>
+        <p:nvSpPr>
+          <p:cNvPr id="2" name="Slide Image Placeholder 1"/>
+          <p:cNvSpPr>
+            <a:spLocks noGrp="1" noRot="1" noChangeAspect="1"/>
+          </p:cNvSpPr>
+          <p:nvPr>
+            <p:ph type="sldImg"/>
+          </p:nvPr>
+        </p:nvSpPr>
+        <p:spPr/>
+      </p:sp>
+      <p:sp>
+        <p:nvSpPr>
+          <p:cNvPr id="3" name="Notes Placeholder 2"/>
+          <p:cNvSpPr>
+            <a:spLocks noGrp="1"/>
+          </p:cNvSpPr>
+          <p:nvPr>
+            <p:ph type="body" idx="1"/>
+          </p:nvPr>
+        </p:nvSpPr>
+        <p:spPr/>
+        <p:txBody>
+          <a:bodyPr/>
+          <a:lstStyle/>
+          <a:p>
+            <a:r>
+              <a:rPr lang="en-IN" dirty="0" smtClean="0"/>
+              <a:t>K</a:t>
+            </a:r>
+            <a:r>
+              <a:rPr lang="en-IN" baseline="0" dirty="0" smtClean="0"/>
+              <a:t> is fixed as 3 mostly to find 3 risk based groups</a:t>
+            </a:r>
+            <a:endParaRPr lang="en-US" dirty="0"/>
+          </a:p>
+        </p:txBody>
+      </p:sp>
+      <p:sp>
+        <p:nvSpPr>
+          <p:cNvPr id="4" name="Slide Number Placeholder 3"/>
+          <p:cNvSpPr>
+            <a:spLocks noGrp="1"/>
+          </p:cNvSpPr>
+          <p:nvPr>
+            <p:ph type="sldNum" sz="quarter" idx="10"/>
+          </p:nvPr>
+        </p:nvSpPr>
+        <p:spPr/>
+        <p:txBody>
+          <a:bodyPr/>
+          <a:lstStyle/>
+          <a:p>
+            <a:fld id="{D58A01DC-D56B-4089-94FD-B2CDCC879BEA}" type="slidenum">
+              <a:rPr lang="en-IN" smtClean="0"/>
+              <a:t>15</a:t>
+            </a:fld>
+            <a:endParaRPr lang="en-IN"/>
+          </a:p>
+        </p:txBody>
+      </p:sp>
+    </p:spTree>
+    <p:extLst>
+      <p:ext uri="{BB962C8B-B14F-4D97-AF65-F5344CB8AC3E}">
+        <p14:creationId xmlns:p14="http://schemas.microsoft.com/office/powerpoint/2010/main" val="1490944872"/>
+      </p:ext>
+    </p:extLst>
+  </p:cSld>
+  <p:clrMapOvr>
+    <a:masterClrMapping/>
+  </p:clrMapOvr>
+</p:notes>
+</file>
+
+<file path=ppt/notesSlides/notesSlide12.xml><?xml version="1.0" encoding="utf-8"?>
+<p:notes xmlns:a="http://schemas.openxmlformats.org/drawingml/2006/main" xmlns:r="http://schemas.openxmlformats.org/officeDocument/2006/relationships" xmlns:p="http://schemas.openxmlformats.org/presentationml/2006/main">
+  <p:cSld>
+    <p:spTree>
+      <p:nvGrpSpPr>
+        <p:cNvPr id="1" name=""/>
+        <p:cNvGrpSpPr/>
+        <p:nvPr/>
+      </p:nvGrpSpPr>
+      <p:grpSpPr>
+        <a:xfrm>
+          <a:off x="0" y="0"/>
+          <a:ext cx="0" cy="0"/>
+          <a:chOff x="0" y="0"/>
+          <a:chExt cx="0" cy="0"/>
+        </a:xfrm>
+      </p:grpSpPr>
+      <p:sp>
+        <p:nvSpPr>
+          <p:cNvPr id="2" name="Slide Image Placeholder 1"/>
+          <p:cNvSpPr>
+            <a:spLocks noGrp="1" noRot="1" noChangeAspect="1"/>
+          </p:cNvSpPr>
+          <p:nvPr>
+            <p:ph type="sldImg"/>
+          </p:nvPr>
+        </p:nvSpPr>
+        <p:spPr/>
+      </p:sp>
+      <p:sp>
+        <p:nvSpPr>
+          <p:cNvPr id="3" name="Notes Placeholder 2"/>
+          <p:cNvSpPr>
+            <a:spLocks noGrp="1"/>
+          </p:cNvSpPr>
+          <p:nvPr>
+            <p:ph type="body" idx="1"/>
+          </p:nvPr>
+        </p:nvSpPr>
+        <p:spPr/>
+        <p:txBody>
+          <a:bodyPr/>
+          <a:lstStyle/>
+          <a:p>
+            <a:pPr marL="228600" indent="-228600">
+              <a:buAutoNum type="arabicPeriod"/>
+            </a:pPr>
+            <a:r>
+              <a:rPr lang="en-IN" dirty="0" smtClean="0"/>
+              <a:t>Now that we have made sure about the group formation</a:t>
+            </a:r>
+            <a:r>
+              <a:rPr lang="en-IN" baseline="0" dirty="0" smtClean="0"/>
+              <a:t> and the QoC attributes and how to search the best ones, we move to the design of QoC assessment using this clusters </a:t>
+            </a:r>
+          </a:p>
+          <a:p>
+            <a:pPr marL="228600" indent="-228600">
+              <a:buAutoNum type="arabicPeriod"/>
+            </a:pPr>
+            <a:r>
+              <a:rPr lang="en-IN" baseline="0" dirty="0" smtClean="0"/>
+              <a:t>We have identified high-risk population and now we have to manage them over time and understand the trend to comment on the QoC</a:t>
+            </a:r>
+          </a:p>
+          <a:p>
+            <a:pPr marL="228600" indent="-228600">
+              <a:buAutoNum type="arabicPeriod"/>
+            </a:pPr>
+            <a:r>
+              <a:rPr lang="en-IN" baseline="0" dirty="0" smtClean="0"/>
+              <a:t>First plot describes the optimal no. of trees needed for Random Forest with min. error</a:t>
+            </a:r>
+          </a:p>
+          <a:p>
+            <a:pPr marL="228600" indent="-228600">
+              <a:buAutoNum type="arabicPeriod"/>
+            </a:pPr>
+            <a:r>
+              <a:rPr lang="en-IN" baseline="0" dirty="0" smtClean="0"/>
+              <a:t>Second plot is from </a:t>
+            </a:r>
+            <a:r>
+              <a:rPr lang="en-IN" baseline="0" dirty="0" err="1" smtClean="0"/>
+              <a:t>varImpPlot</a:t>
+            </a:r>
+            <a:r>
+              <a:rPr lang="en-IN" baseline="0" dirty="0" smtClean="0"/>
+              <a:t> - </a:t>
+            </a:r>
+            <a:r>
+              <a:rPr lang="en-IN" sz="1200" b="0" i="0" kern="1200" dirty="0" smtClean="0">
+                <a:solidFill>
+                  <a:schemeClr val="tx1"/>
+                </a:solidFill>
+                <a:effectLst/>
+                <a:latin typeface="+mn-lt"/>
+                <a:ea typeface="+mn-ea"/>
+                <a:cs typeface="+mn-cs"/>
+              </a:rPr>
+              <a:t>variable importance as measured by a Random Forest (Mean Decrease Accuracy (%</a:t>
+            </a:r>
+            <a:r>
+              <a:rPr lang="en-IN" sz="1200" b="0" i="0" kern="1200" dirty="0" err="1" smtClean="0">
+                <a:solidFill>
+                  <a:schemeClr val="tx1"/>
+                </a:solidFill>
+                <a:effectLst/>
+                <a:latin typeface="+mn-lt"/>
+                <a:ea typeface="+mn-ea"/>
+                <a:cs typeface="+mn-cs"/>
+              </a:rPr>
+              <a:t>IncMSE</a:t>
+            </a:r>
+            <a:r>
+              <a:rPr lang="en-IN" sz="1200" b="0" i="0" kern="1200" dirty="0" smtClean="0">
+                <a:solidFill>
+                  <a:schemeClr val="tx1"/>
+                </a:solidFill>
+                <a:effectLst/>
+                <a:latin typeface="+mn-lt"/>
+                <a:ea typeface="+mn-ea"/>
+                <a:cs typeface="+mn-cs"/>
+              </a:rPr>
+              <a:t>) and Mean Decrease Gini (</a:t>
+            </a:r>
+            <a:r>
+              <a:rPr lang="en-IN" sz="1200" b="1" i="0" kern="1200" dirty="0" err="1" smtClean="0">
+                <a:solidFill>
+                  <a:schemeClr val="tx1"/>
+                </a:solidFill>
+                <a:effectLst/>
+                <a:latin typeface="+mn-lt"/>
+                <a:ea typeface="+mn-ea"/>
+                <a:cs typeface="+mn-cs"/>
+              </a:rPr>
+              <a:t>IncNodePurity</a:t>
+            </a:r>
+            <a:r>
+              <a:rPr lang="en-IN" sz="1200" b="0" i="0" kern="1200" smtClean="0">
+                <a:solidFill>
+                  <a:schemeClr val="tx1"/>
+                </a:solidFill>
+                <a:effectLst/>
+                <a:latin typeface="+mn-lt"/>
+                <a:ea typeface="+mn-ea"/>
+                <a:cs typeface="+mn-cs"/>
+              </a:rPr>
+              <a:t>) )</a:t>
+            </a:r>
+            <a:endParaRPr lang="en-IN" baseline="0" dirty="0" smtClean="0"/>
+          </a:p>
+          <a:p>
+            <a:endParaRPr lang="en-US" dirty="0"/>
+          </a:p>
+        </p:txBody>
+      </p:sp>
+      <p:sp>
+        <p:nvSpPr>
+          <p:cNvPr id="4" name="Slide Number Placeholder 3"/>
+          <p:cNvSpPr>
+            <a:spLocks noGrp="1"/>
+          </p:cNvSpPr>
+          <p:nvPr>
+            <p:ph type="sldNum" sz="quarter" idx="10"/>
+          </p:nvPr>
+        </p:nvSpPr>
+        <p:spPr/>
+        <p:txBody>
+          <a:bodyPr/>
+          <a:lstStyle/>
+          <a:p>
+            <a:fld id="{D58A01DC-D56B-4089-94FD-B2CDCC879BEA}" type="slidenum">
+              <a:rPr lang="en-IN" smtClean="0"/>
+              <a:t>17</a:t>
+            </a:fld>
+            <a:endParaRPr lang="en-IN"/>
+          </a:p>
+        </p:txBody>
+      </p:sp>
+    </p:spTree>
+    <p:extLst>
+      <p:ext uri="{BB962C8B-B14F-4D97-AF65-F5344CB8AC3E}">
+        <p14:creationId xmlns:p14="http://schemas.microsoft.com/office/powerpoint/2010/main" val="2005090637"/>
+      </p:ext>
+    </p:extLst>
+  </p:cSld>
+  <p:clrMapOvr>
+    <a:masterClrMapping/>
+  </p:clrMapOvr>
+</p:notes>
+</file>
+
+<file path=ppt/notesSlides/notesSlide13.xml><?xml version="1.0" encoding="utf-8"?>
+<p:notes xmlns:a="http://schemas.openxmlformats.org/drawingml/2006/main" xmlns:r="http://schemas.openxmlformats.org/officeDocument/2006/relationships" xmlns:p="http://schemas.openxmlformats.org/presentationml/2006/main">
+  <p:cSld>
+    <p:spTree>
+      <p:nvGrpSpPr>
+        <p:cNvPr id="1" name=""/>
+        <p:cNvGrpSpPr/>
+        <p:nvPr/>
+      </p:nvGrpSpPr>
+      <p:grpSpPr>
+        <a:xfrm>
+          <a:off x="0" y="0"/>
+          <a:ext cx="0" cy="0"/>
+          <a:chOff x="0" y="0"/>
+          <a:chExt cx="0" cy="0"/>
+        </a:xfrm>
+      </p:grpSpPr>
+      <p:sp>
+        <p:nvSpPr>
+          <p:cNvPr id="2" name="Slide Image Placeholder 1"/>
+          <p:cNvSpPr>
+            <a:spLocks noGrp="1" noRot="1" noChangeAspect="1"/>
+          </p:cNvSpPr>
+          <p:nvPr>
+            <p:ph type="sldImg"/>
+          </p:nvPr>
+        </p:nvSpPr>
+        <p:spPr/>
+      </p:sp>
+      <p:sp>
+        <p:nvSpPr>
+          <p:cNvPr id="3" name="Notes Placeholder 2"/>
+          <p:cNvSpPr>
+            <a:spLocks noGrp="1"/>
+          </p:cNvSpPr>
+          <p:nvPr>
+            <p:ph type="body" idx="1"/>
+          </p:nvPr>
+        </p:nvSpPr>
+        <p:spPr/>
+        <p:txBody>
+          <a:bodyPr/>
+          <a:lstStyle/>
+          <a:p>
+            <a:pPr marL="228600" indent="-228600">
+              <a:buAutoNum type="arabicPeriod"/>
+            </a:pPr>
+            <a:r>
+              <a:rPr lang="en-IN" dirty="0" smtClean="0"/>
+              <a:t>CCS score</a:t>
+            </a:r>
+            <a:r>
+              <a:rPr lang="en-IN" baseline="0" dirty="0" smtClean="0"/>
+              <a:t> is based on the configuration setup by a medical professional regarding the ranges observed in real-life for patients of specific chronic disease </a:t>
+            </a:r>
+          </a:p>
+          <a:p>
+            <a:pPr marL="228600" indent="-228600">
+              <a:buAutoNum type="arabicPeriod"/>
+            </a:pPr>
+            <a:r>
+              <a:rPr lang="en-IN" baseline="0" dirty="0" smtClean="0"/>
+              <a:t>So it plays and important role to validate the findings about the risk group formations </a:t>
+            </a:r>
+          </a:p>
+          <a:p>
+            <a:pPr marL="228600" indent="-228600">
+              <a:buAutoNum type="arabicPeriod"/>
+            </a:pPr>
+            <a:r>
+              <a:rPr lang="en-IN" baseline="0" dirty="0" smtClean="0"/>
+              <a:t>Score above 7 is take reliable but it can also be a preference from the medical professionals and this value can be optimized over time using this experiment over different diabetes databases </a:t>
+            </a:r>
+          </a:p>
+          <a:p>
+            <a:pPr marL="228600" indent="-228600">
+              <a:buAutoNum type="arabicPeriod"/>
+            </a:pPr>
+            <a:r>
+              <a:rPr lang="en-IN" baseline="0" dirty="0" smtClean="0"/>
+              <a:t>The extend of slope values can be configured too by a medical professional </a:t>
+            </a:r>
+          </a:p>
+          <a:p>
+            <a:endParaRPr lang="en-US" dirty="0"/>
+          </a:p>
+        </p:txBody>
+      </p:sp>
+      <p:sp>
+        <p:nvSpPr>
+          <p:cNvPr id="4" name="Slide Number Placeholder 3"/>
+          <p:cNvSpPr>
+            <a:spLocks noGrp="1"/>
+          </p:cNvSpPr>
+          <p:nvPr>
+            <p:ph type="sldNum" sz="quarter" idx="10"/>
+          </p:nvPr>
+        </p:nvSpPr>
+        <p:spPr/>
+        <p:txBody>
+          <a:bodyPr/>
+          <a:lstStyle/>
+          <a:p>
+            <a:fld id="{D58A01DC-D56B-4089-94FD-B2CDCC879BEA}" type="slidenum">
+              <a:rPr lang="en-IN" smtClean="0"/>
+              <a:t>18</a:t>
+            </a:fld>
+            <a:endParaRPr lang="en-IN"/>
+          </a:p>
+        </p:txBody>
+      </p:sp>
+    </p:spTree>
+    <p:extLst>
+      <p:ext uri="{BB962C8B-B14F-4D97-AF65-F5344CB8AC3E}">
+        <p14:creationId xmlns:p14="http://schemas.microsoft.com/office/powerpoint/2010/main" val="2770198304"/>
+      </p:ext>
+    </p:extLst>
+  </p:cSld>
+  <p:clrMapOvr>
+    <a:masterClrMapping/>
+  </p:clrMapOvr>
+</p:notes>
+</file>
+
+<file path=ppt/notesSlides/notesSlide2.xml><?xml version="1.0" encoding="utf-8"?>
+<p:notes xmlns:a="http://schemas.openxmlformats.org/drawingml/2006/main" xmlns:r="http://schemas.openxmlformats.org/officeDocument/2006/relationships" xmlns:p="http://schemas.openxmlformats.org/presentationml/2006/main">
+  <p:cSld>
+    <p:spTree>
+      <p:nvGrpSpPr>
+        <p:cNvPr id="1" name=""/>
+        <p:cNvGrpSpPr/>
+        <p:nvPr/>
+      </p:nvGrpSpPr>
+      <p:grpSpPr>
+        <a:xfrm>
+          <a:off x="0" y="0"/>
+          <a:ext cx="0" cy="0"/>
+          <a:chOff x="0" y="0"/>
+          <a:chExt cx="0" cy="0"/>
+        </a:xfrm>
+      </p:grpSpPr>
+      <p:sp>
+        <p:nvSpPr>
+          <p:cNvPr id="2" name="Slide Image Placeholder 1"/>
+          <p:cNvSpPr>
+            <a:spLocks noGrp="1" noRot="1" noChangeAspect="1"/>
+          </p:cNvSpPr>
+          <p:nvPr>
+            <p:ph type="sldImg"/>
+          </p:nvPr>
+        </p:nvSpPr>
+        <p:spPr/>
+      </p:sp>
+      <p:sp>
+        <p:nvSpPr>
+          <p:cNvPr id="3" name="Notes Placeholder 2"/>
+          <p:cNvSpPr>
+            <a:spLocks noGrp="1"/>
+          </p:cNvSpPr>
+          <p:nvPr>
+            <p:ph type="body" idx="1"/>
+          </p:nvPr>
+        </p:nvSpPr>
+        <p:spPr/>
+        <p:txBody>
+          <a:bodyPr/>
+          <a:lstStyle/>
+          <a:p>
+            <a:r>
+              <a:rPr lang="en-IN" dirty="0" smtClean="0"/>
+              <a:t>1.</a:t>
+            </a:r>
+            <a:r>
+              <a:rPr lang="en-IN" baseline="0" dirty="0" smtClean="0"/>
+              <a:t> Interesting quote which I felt is relevant in general and also in terms of this study </a:t>
+            </a:r>
+            <a:endParaRPr lang="en-US" dirty="0"/>
+          </a:p>
+        </p:txBody>
+      </p:sp>
+      <p:sp>
+        <p:nvSpPr>
+          <p:cNvPr id="4" name="Slide Number Placeholder 3"/>
+          <p:cNvSpPr>
+            <a:spLocks noGrp="1"/>
+          </p:cNvSpPr>
+          <p:nvPr>
+            <p:ph type="sldNum" sz="quarter" idx="10"/>
+          </p:nvPr>
+        </p:nvSpPr>
+        <p:spPr/>
+        <p:txBody>
+          <a:bodyPr/>
+          <a:lstStyle/>
+          <a:p>
+            <a:fld id="{D58A01DC-D56B-4089-94FD-B2CDCC879BEA}" type="slidenum">
+              <a:rPr lang="en-IN" smtClean="0"/>
+              <a:t>2</a:t>
+            </a:fld>
+            <a:endParaRPr lang="en-IN"/>
+          </a:p>
+        </p:txBody>
+      </p:sp>
+    </p:spTree>
+    <p:extLst>
+      <p:ext uri="{BB962C8B-B14F-4D97-AF65-F5344CB8AC3E}">
+        <p14:creationId xmlns:p14="http://schemas.microsoft.com/office/powerpoint/2010/main" val="3276062111"/>
+      </p:ext>
+    </p:extLst>
+  </p:cSld>
+  <p:clrMapOvr>
+    <a:masterClrMapping/>
+  </p:clrMapOvr>
+</p:notes>
+</file>
+
+<file path=ppt/notesSlides/notesSlide3.xml><?xml version="1.0" encoding="utf-8"?>
+<p:notes xmlns:a="http://schemas.openxmlformats.org/drawingml/2006/main" xmlns:r="http://schemas.openxmlformats.org/officeDocument/2006/relationships" xmlns:p="http://schemas.openxmlformats.org/presentationml/2006/main">
+  <p:cSld>
+    <p:spTree>
+      <p:nvGrpSpPr>
+        <p:cNvPr id="1" name=""/>
+        <p:cNvGrpSpPr/>
+        <p:nvPr/>
+      </p:nvGrpSpPr>
+      <p:grpSpPr>
+        <a:xfrm>
+          <a:off x="0" y="0"/>
+          <a:ext cx="0" cy="0"/>
+          <a:chOff x="0" y="0"/>
+          <a:chExt cx="0" cy="0"/>
+        </a:xfrm>
+      </p:grpSpPr>
+      <p:sp>
+        <p:nvSpPr>
+          <p:cNvPr id="2" name="Slide Image Placeholder 1"/>
+          <p:cNvSpPr>
+            <a:spLocks noGrp="1" noRot="1" noChangeAspect="1"/>
+          </p:cNvSpPr>
+          <p:nvPr>
+            <p:ph type="sldImg"/>
+          </p:nvPr>
+        </p:nvSpPr>
+        <p:spPr/>
+      </p:sp>
+      <p:sp>
+        <p:nvSpPr>
+          <p:cNvPr id="3" name="Notes Placeholder 2"/>
+          <p:cNvSpPr>
+            <a:spLocks noGrp="1"/>
+          </p:cNvSpPr>
+          <p:nvPr>
+            <p:ph type="body" idx="1"/>
+          </p:nvPr>
+        </p:nvSpPr>
+        <p:spPr/>
+        <p:txBody>
+          <a:bodyPr/>
+          <a:lstStyle/>
+          <a:p>
+            <a:pPr marL="228600" indent="-228600">
+              <a:buAutoNum type="arabicPeriod"/>
+            </a:pPr>
+            <a:r>
+              <a:rPr lang="en-IN" baseline="0" dirty="0" smtClean="0"/>
+              <a:t>The work is more on research and design rather than the implementation for the QoC</a:t>
+            </a:r>
+          </a:p>
+          <a:p>
+            <a:pPr marL="228600" indent="-228600">
+              <a:buAutoNum type="arabicPeriod"/>
+            </a:pPr>
+            <a:r>
+              <a:rPr lang="en-IN" baseline="0" dirty="0" smtClean="0"/>
+              <a:t>Idea: We can dig out QoC from applications using Patient’s medical data , this idea was not generally accepted due to the fact that the HQ is in NL and people believe that QoC is already put into place. Of course I had to debate with the key members about it’s business value in other parts of the world and also in developed nations  </a:t>
+            </a:r>
+            <a:endParaRPr lang="en-US" dirty="0" smtClean="0"/>
+          </a:p>
+          <a:p>
+            <a:endParaRPr lang="en-US" dirty="0"/>
+          </a:p>
+        </p:txBody>
+      </p:sp>
+      <p:sp>
+        <p:nvSpPr>
+          <p:cNvPr id="4" name="Slide Number Placeholder 3"/>
+          <p:cNvSpPr>
+            <a:spLocks noGrp="1"/>
+          </p:cNvSpPr>
+          <p:nvPr>
+            <p:ph type="sldNum" sz="quarter" idx="10"/>
+          </p:nvPr>
+        </p:nvSpPr>
+        <p:spPr/>
+        <p:txBody>
+          <a:bodyPr/>
+          <a:lstStyle/>
+          <a:p>
+            <a:fld id="{D58A01DC-D56B-4089-94FD-B2CDCC879BEA}" type="slidenum">
+              <a:rPr lang="en-IN" smtClean="0"/>
+              <a:t>3</a:t>
+            </a:fld>
+            <a:endParaRPr lang="en-IN"/>
+          </a:p>
+        </p:txBody>
+      </p:sp>
+    </p:spTree>
+    <p:extLst>
+      <p:ext uri="{BB962C8B-B14F-4D97-AF65-F5344CB8AC3E}">
+        <p14:creationId xmlns:p14="http://schemas.microsoft.com/office/powerpoint/2010/main" val="3488843314"/>
+      </p:ext>
+    </p:extLst>
+  </p:cSld>
+  <p:clrMapOvr>
+    <a:masterClrMapping/>
+  </p:clrMapOvr>
+</p:notes>
+</file>
+
+<file path=ppt/notesSlides/notesSlide4.xml><?xml version="1.0" encoding="utf-8"?>
+<p:notes xmlns:a="http://schemas.openxmlformats.org/drawingml/2006/main" xmlns:r="http://schemas.openxmlformats.org/officeDocument/2006/relationships" xmlns:p="http://schemas.openxmlformats.org/presentationml/2006/main">
+  <p:cSld>
+    <p:spTree>
+      <p:nvGrpSpPr>
+        <p:cNvPr id="1" name=""/>
+        <p:cNvGrpSpPr/>
+        <p:nvPr/>
+      </p:nvGrpSpPr>
+      <p:grpSpPr>
+        <a:xfrm>
+          <a:off x="0" y="0"/>
+          <a:ext cx="0" cy="0"/>
+          <a:chOff x="0" y="0"/>
+          <a:chExt cx="0" cy="0"/>
+        </a:xfrm>
+      </p:grpSpPr>
+      <p:sp>
+        <p:nvSpPr>
+          <p:cNvPr id="2" name="Slide Image Placeholder 1"/>
+          <p:cNvSpPr>
+            <a:spLocks noGrp="1" noRot="1" noChangeAspect="1"/>
+          </p:cNvSpPr>
+          <p:nvPr>
+            <p:ph type="sldImg"/>
+          </p:nvPr>
+        </p:nvSpPr>
+        <p:spPr/>
+      </p:sp>
+      <p:sp>
+        <p:nvSpPr>
+          <p:cNvPr id="3" name="Notes Placeholder 2"/>
+          <p:cNvSpPr>
+            <a:spLocks noGrp="1"/>
+          </p:cNvSpPr>
+          <p:nvPr>
+            <p:ph type="body" idx="1"/>
+          </p:nvPr>
+        </p:nvSpPr>
+        <p:spPr/>
+        <p:txBody>
+          <a:bodyPr/>
+          <a:lstStyle/>
+          <a:p>
+            <a:r>
+              <a:rPr lang="en-IN" dirty="0" smtClean="0"/>
+              <a:t>1.</a:t>
+            </a:r>
+            <a:r>
+              <a:rPr lang="en-IN" baseline="0" dirty="0" smtClean="0"/>
+              <a:t> the point related to ROI really helped me to push this idea and get the support from the key members for this work</a:t>
+            </a:r>
+            <a:endParaRPr lang="en-US" dirty="0"/>
+          </a:p>
+        </p:txBody>
+      </p:sp>
+      <p:sp>
+        <p:nvSpPr>
+          <p:cNvPr id="4" name="Slide Number Placeholder 3"/>
+          <p:cNvSpPr>
+            <a:spLocks noGrp="1"/>
+          </p:cNvSpPr>
+          <p:nvPr>
+            <p:ph type="sldNum" sz="quarter" idx="10"/>
+          </p:nvPr>
+        </p:nvSpPr>
+        <p:spPr/>
+        <p:txBody>
+          <a:bodyPr/>
+          <a:lstStyle/>
+          <a:p>
+            <a:fld id="{D58A01DC-D56B-4089-94FD-B2CDCC879BEA}" type="slidenum">
+              <a:rPr lang="en-IN" smtClean="0"/>
+              <a:t>4</a:t>
+            </a:fld>
+            <a:endParaRPr lang="en-IN"/>
+          </a:p>
+        </p:txBody>
+      </p:sp>
+    </p:spTree>
+    <p:extLst>
+      <p:ext uri="{BB962C8B-B14F-4D97-AF65-F5344CB8AC3E}">
+        <p14:creationId xmlns:p14="http://schemas.microsoft.com/office/powerpoint/2010/main" val="2733526068"/>
+      </p:ext>
+    </p:extLst>
+  </p:cSld>
+  <p:clrMapOvr>
+    <a:masterClrMapping/>
+  </p:clrMapOvr>
+</p:notes>
+</file>
+
+<file path=ppt/notesSlides/notesSlide5.xml><?xml version="1.0" encoding="utf-8"?>
+<p:notes xmlns:a="http://schemas.openxmlformats.org/drawingml/2006/main" xmlns:r="http://schemas.openxmlformats.org/officeDocument/2006/relationships" xmlns:p="http://schemas.openxmlformats.org/presentationml/2006/main">
+  <p:cSld>
+    <p:spTree>
+      <p:nvGrpSpPr>
+        <p:cNvPr id="1" name=""/>
+        <p:cNvGrpSpPr/>
+        <p:nvPr/>
+      </p:nvGrpSpPr>
+      <p:grpSpPr>
+        <a:xfrm>
+          <a:off x="0" y="0"/>
+          <a:ext cx="0" cy="0"/>
+          <a:chOff x="0" y="0"/>
+          <a:chExt cx="0" cy="0"/>
+        </a:xfrm>
+      </p:grpSpPr>
+      <p:sp>
+        <p:nvSpPr>
+          <p:cNvPr id="2" name="Slide Image Placeholder 1"/>
+          <p:cNvSpPr>
+            <a:spLocks noGrp="1" noRot="1" noChangeAspect="1"/>
+          </p:cNvSpPr>
+          <p:nvPr>
+            <p:ph type="sldImg"/>
+          </p:nvPr>
+        </p:nvSpPr>
+        <p:spPr/>
+      </p:sp>
+      <p:sp>
+        <p:nvSpPr>
+          <p:cNvPr id="3" name="Notes Placeholder 2"/>
+          <p:cNvSpPr>
+            <a:spLocks noGrp="1"/>
+          </p:cNvSpPr>
+          <p:nvPr>
+            <p:ph type="body" idx="1"/>
+          </p:nvPr>
+        </p:nvSpPr>
+        <p:spPr/>
+        <p:txBody>
+          <a:bodyPr/>
+          <a:lstStyle/>
+          <a:p>
+            <a:r>
+              <a:rPr lang="en-IN" dirty="0" smtClean="0"/>
+              <a:t>Some initial observations</a:t>
+            </a:r>
+            <a:r>
+              <a:rPr lang="en-IN" baseline="0" dirty="0" smtClean="0"/>
+              <a:t> are present in the first paragraph </a:t>
+            </a:r>
+          </a:p>
+          <a:p>
+            <a:endParaRPr lang="en-IN" baseline="0" dirty="0" smtClean="0"/>
+          </a:p>
+          <a:p>
+            <a:r>
+              <a:rPr lang="en-IN" baseline="0" dirty="0" smtClean="0"/>
+              <a:t>This was not a generic solution idea, so we shortlisted Diabetes application as that had majority implementations </a:t>
+            </a:r>
+          </a:p>
+          <a:p>
+            <a:endParaRPr lang="en-IN" baseline="0" dirty="0" smtClean="0"/>
+          </a:p>
+          <a:p>
+            <a:r>
+              <a:rPr lang="en-IN" baseline="0" dirty="0" smtClean="0"/>
+              <a:t>Why clustering? – The unsupervised learning should also give same results as we get in real world, related to groups </a:t>
+            </a:r>
+            <a:endParaRPr lang="en-US" dirty="0"/>
+          </a:p>
+        </p:txBody>
+      </p:sp>
+      <p:sp>
+        <p:nvSpPr>
+          <p:cNvPr id="4" name="Slide Number Placeholder 3"/>
+          <p:cNvSpPr>
+            <a:spLocks noGrp="1"/>
+          </p:cNvSpPr>
+          <p:nvPr>
+            <p:ph type="sldNum" sz="quarter" idx="10"/>
+          </p:nvPr>
+        </p:nvSpPr>
+        <p:spPr/>
+        <p:txBody>
+          <a:bodyPr/>
+          <a:lstStyle/>
+          <a:p>
+            <a:fld id="{D58A01DC-D56B-4089-94FD-B2CDCC879BEA}" type="slidenum">
+              <a:rPr lang="en-IN" smtClean="0"/>
+              <a:t>5</a:t>
+            </a:fld>
+            <a:endParaRPr lang="en-IN"/>
+          </a:p>
+        </p:txBody>
+      </p:sp>
+    </p:spTree>
+    <p:extLst>
+      <p:ext uri="{BB962C8B-B14F-4D97-AF65-F5344CB8AC3E}">
+        <p14:creationId xmlns:p14="http://schemas.microsoft.com/office/powerpoint/2010/main" val="185846465"/>
+      </p:ext>
+    </p:extLst>
+  </p:cSld>
+  <p:clrMapOvr>
+    <a:masterClrMapping/>
+  </p:clrMapOvr>
+</p:notes>
+</file>
+
+<file path=ppt/notesSlides/notesSlide6.xml><?xml version="1.0" encoding="utf-8"?>
+<p:notes xmlns:a="http://schemas.openxmlformats.org/drawingml/2006/main" xmlns:r="http://schemas.openxmlformats.org/officeDocument/2006/relationships" xmlns:p="http://schemas.openxmlformats.org/presentationml/2006/main">
+  <p:cSld>
+    <p:spTree>
+      <p:nvGrpSpPr>
+        <p:cNvPr id="1" name=""/>
+        <p:cNvGrpSpPr/>
+        <p:nvPr/>
+      </p:nvGrpSpPr>
+      <p:grpSpPr>
+        <a:xfrm>
+          <a:off x="0" y="0"/>
+          <a:ext cx="0" cy="0"/>
+          <a:chOff x="0" y="0"/>
+          <a:chExt cx="0" cy="0"/>
+        </a:xfrm>
+      </p:grpSpPr>
+      <p:sp>
+        <p:nvSpPr>
+          <p:cNvPr id="2" name="Slide Image Placeholder 1"/>
+          <p:cNvSpPr>
+            <a:spLocks noGrp="1" noRot="1" noChangeAspect="1"/>
+          </p:cNvSpPr>
+          <p:nvPr>
+            <p:ph type="sldImg"/>
+          </p:nvPr>
+        </p:nvSpPr>
+        <p:spPr/>
+      </p:sp>
+      <p:sp>
+        <p:nvSpPr>
+          <p:cNvPr id="3" name="Notes Placeholder 2"/>
+          <p:cNvSpPr>
+            <a:spLocks noGrp="1"/>
+          </p:cNvSpPr>
+          <p:nvPr>
+            <p:ph type="body" idx="1"/>
+          </p:nvPr>
+        </p:nvSpPr>
+        <p:spPr/>
+        <p:txBody>
+          <a:bodyPr/>
+          <a:lstStyle/>
+          <a:p>
+            <a:endParaRPr lang="en-IN" baseline="0" dirty="0" smtClean="0"/>
+          </a:p>
+          <a:p>
+            <a:r>
+              <a:rPr lang="en-IN" baseline="0" dirty="0" smtClean="0"/>
+              <a:t>2 months + 1 week</a:t>
+            </a:r>
+          </a:p>
+          <a:p>
+            <a:endParaRPr lang="en-IN" baseline="0" dirty="0" smtClean="0"/>
+          </a:p>
+          <a:p>
+            <a:r>
+              <a:rPr lang="en-IN" baseline="0" dirty="0" smtClean="0"/>
+              <a:t>1 week was spent on point 1, </a:t>
+            </a:r>
+          </a:p>
+          <a:p>
+            <a:endParaRPr lang="en-IN" baseline="0" dirty="0" smtClean="0"/>
+          </a:p>
+          <a:p>
+            <a:pPr marL="0" marR="0" lvl="0" indent="0" algn="l" defTabSz="914400" rtl="0" eaLnBrk="1" fontAlgn="auto" latinLnBrk="0" hangingPunct="1">
+              <a:lnSpc>
+                <a:spcPct val="100000"/>
+              </a:lnSpc>
+              <a:spcBef>
+                <a:spcPts val="0"/>
+              </a:spcBef>
+              <a:spcAft>
+                <a:spcPts val="0"/>
+              </a:spcAft>
+              <a:buClrTx/>
+              <a:buSzTx/>
+              <a:buFontTx/>
+              <a:buNone/>
+              <a:tabLst/>
+              <a:defRPr/>
+            </a:pPr>
+            <a:r>
+              <a:rPr lang="en-IN" baseline="0" dirty="0" smtClean="0"/>
+              <a:t>Roughly 1 and half month on point 2 and 3 - </a:t>
+            </a:r>
+            <a:r>
+              <a:rPr lang="en-IN" dirty="0" smtClean="0"/>
+              <a:t>Most time was spent on point 2</a:t>
+            </a:r>
+            <a:r>
+              <a:rPr lang="en-IN" baseline="0" dirty="0" smtClean="0"/>
+              <a:t> and 3 as some of the initial assumptions were not accurate and needed some rethinking. That we will see as we continue.</a:t>
+            </a:r>
+          </a:p>
+          <a:p>
+            <a:endParaRPr lang="en-IN" baseline="0" dirty="0" smtClean="0"/>
+          </a:p>
+          <a:p>
+            <a:r>
+              <a:rPr lang="en-IN" baseline="0" dirty="0" smtClean="0"/>
+              <a:t>Again a 1 week or slightly more on the last point  </a:t>
+            </a:r>
+          </a:p>
+          <a:p>
+            <a:endParaRPr lang="en-IN" baseline="0" dirty="0" smtClean="0"/>
+          </a:p>
+          <a:p>
+            <a:r>
+              <a:rPr lang="en-IN" baseline="0" dirty="0" smtClean="0"/>
+              <a:t>Last 1 week for mapping data attributes from this work to actual application in Philips called Coordinate and creating internal report for company mentor and management  </a:t>
+            </a:r>
+          </a:p>
+          <a:p>
+            <a:endParaRPr lang="en-IN" baseline="0" dirty="0" smtClean="0"/>
+          </a:p>
+          <a:p>
+            <a:pPr marL="0" marR="0" lvl="0" indent="0" algn="l" defTabSz="914400" rtl="0" eaLnBrk="1" fontAlgn="auto" latinLnBrk="0" hangingPunct="1">
+              <a:lnSpc>
+                <a:spcPct val="100000"/>
+              </a:lnSpc>
+              <a:spcBef>
+                <a:spcPts val="0"/>
+              </a:spcBef>
+              <a:spcAft>
+                <a:spcPts val="0"/>
+              </a:spcAft>
+              <a:buClrTx/>
+              <a:buSzTx/>
+              <a:buFontTx/>
+              <a:buNone/>
+              <a:tabLst/>
+              <a:defRPr/>
+            </a:pPr>
+            <a:r>
+              <a:rPr lang="en-IN" baseline="0" dirty="0" smtClean="0"/>
+              <a:t>Report generation was done in parallel </a:t>
+            </a:r>
+          </a:p>
+          <a:p>
+            <a:endParaRPr lang="en-US" dirty="0"/>
+          </a:p>
+        </p:txBody>
+      </p:sp>
+      <p:sp>
+        <p:nvSpPr>
+          <p:cNvPr id="4" name="Slide Number Placeholder 3"/>
+          <p:cNvSpPr>
+            <a:spLocks noGrp="1"/>
+          </p:cNvSpPr>
+          <p:nvPr>
+            <p:ph type="sldNum" sz="quarter" idx="10"/>
+          </p:nvPr>
+        </p:nvSpPr>
+        <p:spPr/>
+        <p:txBody>
+          <a:bodyPr/>
+          <a:lstStyle/>
+          <a:p>
+            <a:fld id="{D58A01DC-D56B-4089-94FD-B2CDCC879BEA}" type="slidenum">
+              <a:rPr lang="en-IN" smtClean="0"/>
+              <a:t>6</a:t>
+            </a:fld>
+            <a:endParaRPr lang="en-IN"/>
+          </a:p>
+        </p:txBody>
+      </p:sp>
+    </p:spTree>
+    <p:extLst>
+      <p:ext uri="{BB962C8B-B14F-4D97-AF65-F5344CB8AC3E}">
+        <p14:creationId xmlns:p14="http://schemas.microsoft.com/office/powerpoint/2010/main" val="3588802816"/>
+      </p:ext>
+    </p:extLst>
+  </p:cSld>
+  <p:clrMapOvr>
+    <a:masterClrMapping/>
+  </p:clrMapOvr>
+</p:notes>
+</file>
+
+<file path=ppt/notesSlides/notesSlide7.xml><?xml version="1.0" encoding="utf-8"?>
+<p:notes xmlns:a="http://schemas.openxmlformats.org/drawingml/2006/main" xmlns:r="http://schemas.openxmlformats.org/officeDocument/2006/relationships" xmlns:p="http://schemas.openxmlformats.org/presentationml/2006/main">
+  <p:cSld>
+    <p:spTree>
+      <p:nvGrpSpPr>
+        <p:cNvPr id="1" name=""/>
+        <p:cNvGrpSpPr/>
+        <p:nvPr/>
+      </p:nvGrpSpPr>
+      <p:grpSpPr>
+        <a:xfrm>
+          <a:off x="0" y="0"/>
+          <a:ext cx="0" cy="0"/>
+          <a:chOff x="0" y="0"/>
+          <a:chExt cx="0" cy="0"/>
+        </a:xfrm>
+      </p:grpSpPr>
+      <p:sp>
+        <p:nvSpPr>
+          <p:cNvPr id="2" name="Slide Image Placeholder 1"/>
+          <p:cNvSpPr>
+            <a:spLocks noGrp="1" noRot="1" noChangeAspect="1"/>
+          </p:cNvSpPr>
+          <p:nvPr>
+            <p:ph type="sldImg"/>
+          </p:nvPr>
+        </p:nvSpPr>
+        <p:spPr/>
+      </p:sp>
+      <p:sp>
+        <p:nvSpPr>
+          <p:cNvPr id="3" name="Notes Placeholder 2"/>
+          <p:cNvSpPr>
+            <a:spLocks noGrp="1"/>
+          </p:cNvSpPr>
+          <p:nvPr>
+            <p:ph type="body" idx="1"/>
+          </p:nvPr>
+        </p:nvSpPr>
+        <p:spPr/>
+        <p:txBody>
+          <a:bodyPr/>
+          <a:lstStyle/>
+          <a:p>
+            <a:pPr marL="228600" indent="-228600">
+              <a:buAutoNum type="arabicPeriod"/>
+            </a:pPr>
+            <a:r>
+              <a:rPr lang="en-IN" dirty="0" smtClean="0"/>
+              <a:t>Data</a:t>
+            </a:r>
+            <a:r>
+              <a:rPr lang="en-IN" baseline="0" dirty="0" smtClean="0"/>
+              <a:t> export was itself going to be small size project </a:t>
+            </a:r>
+          </a:p>
+          <a:p>
+            <a:pPr marL="228600" indent="-228600">
+              <a:buAutoNum type="arabicPeriod"/>
+            </a:pPr>
+            <a:r>
+              <a:rPr lang="en-IN" baseline="0" dirty="0" smtClean="0"/>
+              <a:t>Last point was related to making some application reports </a:t>
+            </a:r>
+          </a:p>
+          <a:p>
+            <a:pPr marL="228600" indent="-228600">
+              <a:buAutoNum type="arabicPeriod"/>
+            </a:pPr>
+            <a:r>
+              <a:rPr lang="en-IN" baseline="0" dirty="0" smtClean="0"/>
+              <a:t>First and last point were kept out of the scope</a:t>
+            </a:r>
+            <a:endParaRPr lang="en-US" dirty="0"/>
+          </a:p>
+        </p:txBody>
+      </p:sp>
+      <p:sp>
+        <p:nvSpPr>
+          <p:cNvPr id="4" name="Slide Number Placeholder 3"/>
+          <p:cNvSpPr>
+            <a:spLocks noGrp="1"/>
+          </p:cNvSpPr>
+          <p:nvPr>
+            <p:ph type="sldNum" sz="quarter" idx="10"/>
+          </p:nvPr>
+        </p:nvSpPr>
+        <p:spPr/>
+        <p:txBody>
+          <a:bodyPr/>
+          <a:lstStyle/>
+          <a:p>
+            <a:fld id="{D58A01DC-D56B-4089-94FD-B2CDCC879BEA}" type="slidenum">
+              <a:rPr lang="en-IN" smtClean="0"/>
+              <a:t>9</a:t>
+            </a:fld>
+            <a:endParaRPr lang="en-IN"/>
+          </a:p>
+        </p:txBody>
+      </p:sp>
+    </p:spTree>
+    <p:extLst>
+      <p:ext uri="{BB962C8B-B14F-4D97-AF65-F5344CB8AC3E}">
+        <p14:creationId xmlns:p14="http://schemas.microsoft.com/office/powerpoint/2010/main" val="2929864786"/>
+      </p:ext>
+    </p:extLst>
+  </p:cSld>
+  <p:clrMapOvr>
+    <a:masterClrMapping/>
+  </p:clrMapOvr>
+</p:notes>
+</file>
+
+<file path=ppt/notesSlides/notesSlide8.xml><?xml version="1.0" encoding="utf-8"?>
+<p:notes xmlns:a="http://schemas.openxmlformats.org/drawingml/2006/main" xmlns:r="http://schemas.openxmlformats.org/officeDocument/2006/relationships" xmlns:p="http://schemas.openxmlformats.org/presentationml/2006/main">
+  <p:cSld>
+    <p:spTree>
+      <p:nvGrpSpPr>
+        <p:cNvPr id="1" name=""/>
+        <p:cNvGrpSpPr/>
+        <p:nvPr/>
+      </p:nvGrpSpPr>
+      <p:grpSpPr>
+        <a:xfrm>
+          <a:off x="0" y="0"/>
+          <a:ext cx="0" cy="0"/>
+          <a:chOff x="0" y="0"/>
+          <a:chExt cx="0" cy="0"/>
+        </a:xfrm>
+      </p:grpSpPr>
+      <p:sp>
+        <p:nvSpPr>
+          <p:cNvPr id="2" name="Slide Image Placeholder 1"/>
+          <p:cNvSpPr>
+            <a:spLocks noGrp="1" noRot="1" noChangeAspect="1"/>
+          </p:cNvSpPr>
+          <p:nvPr>
+            <p:ph type="sldImg"/>
+          </p:nvPr>
+        </p:nvSpPr>
+        <p:spPr/>
+      </p:sp>
+      <p:sp>
+        <p:nvSpPr>
+          <p:cNvPr id="3" name="Notes Placeholder 2"/>
+          <p:cNvSpPr>
+            <a:spLocks noGrp="1"/>
+          </p:cNvSpPr>
+          <p:nvPr>
+            <p:ph type="body" idx="1"/>
+          </p:nvPr>
+        </p:nvSpPr>
+        <p:spPr/>
+        <p:txBody>
+          <a:bodyPr/>
+          <a:lstStyle/>
+          <a:p>
+            <a:r>
+              <a:rPr lang="en-IN" dirty="0" smtClean="0"/>
+              <a:t>After understanding</a:t>
+            </a:r>
+            <a:r>
+              <a:rPr lang="en-IN" baseline="0" dirty="0" smtClean="0"/>
+              <a:t> the co-relations between the attributes, the next part was to understand clustering over this dataset</a:t>
+            </a:r>
+          </a:p>
+          <a:p>
+            <a:endParaRPr lang="en-IN" baseline="0" dirty="0" smtClean="0"/>
+          </a:p>
+          <a:p>
+            <a:r>
+              <a:rPr lang="en-IN" baseline="0" dirty="0" smtClean="0"/>
+              <a:t>Unsupervised Clustering was chosen because the idea was to generate risk based groups from the data without adding real world knowledge to it. </a:t>
+            </a:r>
+          </a:p>
+          <a:p>
+            <a:endParaRPr lang="en-IN" baseline="0" dirty="0" smtClean="0"/>
+          </a:p>
+          <a:p>
+            <a:r>
+              <a:rPr lang="en-IN" baseline="0" dirty="0" smtClean="0"/>
+              <a:t>Results from clustering over raw data were generated to get some hints  </a:t>
+            </a:r>
+          </a:p>
+          <a:p>
+            <a:endParaRPr lang="en-IN" baseline="0" dirty="0" smtClean="0"/>
+          </a:p>
+          <a:p>
+            <a:pPr marL="0" marR="0" lvl="0" indent="0" algn="l" defTabSz="914400" rtl="0" eaLnBrk="1" fontAlgn="auto" latinLnBrk="0" hangingPunct="1">
+              <a:lnSpc>
+                <a:spcPct val="100000"/>
+              </a:lnSpc>
+              <a:spcBef>
+                <a:spcPts val="0"/>
+              </a:spcBef>
+              <a:spcAft>
+                <a:spcPts val="0"/>
+              </a:spcAft>
+              <a:buClrTx/>
+              <a:buSzTx/>
+              <a:buFontTx/>
+              <a:buNone/>
+              <a:tabLst/>
+              <a:defRPr/>
+            </a:pPr>
+            <a:r>
+              <a:rPr lang="en-IN" dirty="0" smtClean="0"/>
+              <a:t>Initial assumption</a:t>
+            </a:r>
+            <a:r>
+              <a:rPr lang="en-IN" baseline="0" dirty="0" smtClean="0"/>
+              <a:t> was “good separated clusters” should show risk based groups</a:t>
+            </a:r>
+          </a:p>
+          <a:p>
+            <a:endParaRPr lang="en-US" dirty="0"/>
+          </a:p>
+        </p:txBody>
+      </p:sp>
+      <p:sp>
+        <p:nvSpPr>
+          <p:cNvPr id="4" name="Slide Number Placeholder 3"/>
+          <p:cNvSpPr>
+            <a:spLocks noGrp="1"/>
+          </p:cNvSpPr>
+          <p:nvPr>
+            <p:ph type="sldNum" sz="quarter" idx="10"/>
+          </p:nvPr>
+        </p:nvSpPr>
+        <p:spPr/>
+        <p:txBody>
+          <a:bodyPr/>
+          <a:lstStyle/>
+          <a:p>
+            <a:fld id="{D58A01DC-D56B-4089-94FD-B2CDCC879BEA}" type="slidenum">
+              <a:rPr lang="en-IN" smtClean="0"/>
+              <a:t>12</a:t>
+            </a:fld>
+            <a:endParaRPr lang="en-IN"/>
+          </a:p>
+        </p:txBody>
+      </p:sp>
+    </p:spTree>
+    <p:extLst>
+      <p:ext uri="{BB962C8B-B14F-4D97-AF65-F5344CB8AC3E}">
+        <p14:creationId xmlns:p14="http://schemas.microsoft.com/office/powerpoint/2010/main" val="3533789129"/>
+      </p:ext>
+    </p:extLst>
+  </p:cSld>
+  <p:clrMapOvr>
+    <a:masterClrMapping/>
+  </p:clrMapOvr>
+</p:notes>
+</file>
+
+<file path=ppt/notesSlides/notesSlide9.xml><?xml version="1.0" encoding="utf-8"?>
+<p:notes xmlns:a="http://schemas.openxmlformats.org/drawingml/2006/main" xmlns:r="http://schemas.openxmlformats.org/officeDocument/2006/relationships" xmlns:p="http://schemas.openxmlformats.org/presentationml/2006/main">
+  <p:cSld>
+    <p:spTree>
+      <p:nvGrpSpPr>
+        <p:cNvPr id="1" name=""/>
+        <p:cNvGrpSpPr/>
+        <p:nvPr/>
+      </p:nvGrpSpPr>
+      <p:grpSpPr>
+        <a:xfrm>
+          <a:off x="0" y="0"/>
+          <a:ext cx="0" cy="0"/>
+          <a:chOff x="0" y="0"/>
+          <a:chExt cx="0" cy="0"/>
+        </a:xfrm>
+      </p:grpSpPr>
+      <p:sp>
+        <p:nvSpPr>
+          <p:cNvPr id="2" name="Slide Image Placeholder 1"/>
+          <p:cNvSpPr>
+            <a:spLocks noGrp="1" noRot="1" noChangeAspect="1"/>
+          </p:cNvSpPr>
+          <p:nvPr>
+            <p:ph type="sldImg"/>
+          </p:nvPr>
+        </p:nvSpPr>
+        <p:spPr/>
+      </p:sp>
+      <p:sp>
+        <p:nvSpPr>
+          <p:cNvPr id="3" name="Notes Placeholder 2"/>
+          <p:cNvSpPr>
+            <a:spLocks noGrp="1"/>
+          </p:cNvSpPr>
+          <p:nvPr>
+            <p:ph type="body" idx="1"/>
+          </p:nvPr>
+        </p:nvSpPr>
+        <p:spPr/>
+        <p:txBody>
+          <a:bodyPr/>
+          <a:lstStyle/>
+          <a:p>
+            <a:r>
+              <a:rPr lang="en-IN" sz="1200" b="0" i="0" kern="1200" dirty="0" smtClean="0">
+                <a:solidFill>
+                  <a:schemeClr val="tx1"/>
+                </a:solidFill>
+                <a:effectLst/>
+                <a:latin typeface="+mn-lt"/>
+                <a:ea typeface="+mn-ea"/>
+                <a:cs typeface="+mn-cs"/>
+              </a:rPr>
+              <a:t>Gap Statistic Method</a:t>
+            </a:r>
+          </a:p>
+          <a:p>
+            <a:r>
+              <a:rPr lang="en-IN" sz="1200" b="0" i="0" kern="1200" dirty="0" smtClean="0">
+                <a:solidFill>
+                  <a:schemeClr val="tx1"/>
+                </a:solidFill>
+                <a:effectLst/>
+                <a:latin typeface="+mn-lt"/>
+                <a:ea typeface="+mn-ea"/>
+                <a:cs typeface="+mn-cs"/>
+              </a:rPr>
+              <a:t>The gap statistic has been published by </a:t>
+            </a:r>
+            <a:r>
+              <a:rPr lang="en-IN" sz="1200" b="0" i="0" u="none" strike="noStrike" kern="1200" dirty="0" smtClean="0">
+                <a:solidFill>
+                  <a:schemeClr val="tx1"/>
+                </a:solidFill>
+                <a:effectLst/>
+                <a:latin typeface="+mn-lt"/>
+                <a:ea typeface="+mn-ea"/>
+                <a:cs typeface="+mn-cs"/>
+                <a:hlinkClick r:id="rId3"/>
+              </a:rPr>
+              <a:t>R. </a:t>
+            </a:r>
+            <a:r>
+              <a:rPr lang="en-IN" sz="1200" b="0" i="0" u="none" strike="noStrike" kern="1200" dirty="0" err="1" smtClean="0">
+                <a:solidFill>
+                  <a:schemeClr val="tx1"/>
+                </a:solidFill>
+                <a:effectLst/>
+                <a:latin typeface="+mn-lt"/>
+                <a:ea typeface="+mn-ea"/>
+                <a:cs typeface="+mn-cs"/>
+                <a:hlinkClick r:id="rId3"/>
+              </a:rPr>
+              <a:t>Tibshirani</a:t>
+            </a:r>
+            <a:r>
+              <a:rPr lang="en-IN" sz="1200" b="0" i="0" u="none" strike="noStrike" kern="1200" dirty="0" smtClean="0">
+                <a:solidFill>
+                  <a:schemeClr val="tx1"/>
+                </a:solidFill>
+                <a:effectLst/>
+                <a:latin typeface="+mn-lt"/>
+                <a:ea typeface="+mn-ea"/>
+                <a:cs typeface="+mn-cs"/>
+                <a:hlinkClick r:id="rId3"/>
+              </a:rPr>
+              <a:t>, G. Walther, and T. Hastie (</a:t>
+            </a:r>
+            <a:r>
+              <a:rPr lang="en-IN" sz="1200" b="0" i="0" u="none" strike="noStrike" kern="1200" dirty="0" err="1" smtClean="0">
+                <a:solidFill>
+                  <a:schemeClr val="tx1"/>
+                </a:solidFill>
+                <a:effectLst/>
+                <a:latin typeface="+mn-lt"/>
+                <a:ea typeface="+mn-ea"/>
+                <a:cs typeface="+mn-cs"/>
+                <a:hlinkClick r:id="rId3"/>
+              </a:rPr>
+              <a:t>Standford</a:t>
+            </a:r>
+            <a:r>
+              <a:rPr lang="en-IN" sz="1200" b="0" i="0" u="none" strike="noStrike" kern="1200" dirty="0" smtClean="0">
+                <a:solidFill>
+                  <a:schemeClr val="tx1"/>
+                </a:solidFill>
+                <a:effectLst/>
+                <a:latin typeface="+mn-lt"/>
+                <a:ea typeface="+mn-ea"/>
+                <a:cs typeface="+mn-cs"/>
+                <a:hlinkClick r:id="rId3"/>
+              </a:rPr>
+              <a:t> University, 2001)</a:t>
+            </a:r>
+            <a:r>
+              <a:rPr lang="en-IN" sz="1200" b="0" i="0" kern="1200" dirty="0" smtClean="0">
+                <a:solidFill>
+                  <a:schemeClr val="tx1"/>
+                </a:solidFill>
+                <a:effectLst/>
+                <a:latin typeface="+mn-lt"/>
+                <a:ea typeface="+mn-ea"/>
+                <a:cs typeface="+mn-cs"/>
+              </a:rPr>
+              <a:t>. </a:t>
+            </a:r>
+          </a:p>
+          <a:p>
+            <a:endParaRPr lang="en-IN" sz="1200" b="0" i="0" kern="1200" dirty="0" smtClean="0">
+              <a:solidFill>
+                <a:schemeClr val="tx1"/>
+              </a:solidFill>
+              <a:effectLst/>
+              <a:latin typeface="+mn-lt"/>
+              <a:ea typeface="+mn-ea"/>
+              <a:cs typeface="+mn-cs"/>
+            </a:endParaRPr>
+          </a:p>
+          <a:p>
+            <a:r>
+              <a:rPr lang="en-IN" sz="1200" b="0" i="0" kern="1200" dirty="0" smtClean="0">
+                <a:solidFill>
+                  <a:schemeClr val="tx1"/>
+                </a:solidFill>
+                <a:effectLst/>
+                <a:latin typeface="+mn-lt"/>
+                <a:ea typeface="+mn-ea"/>
+                <a:cs typeface="+mn-cs"/>
+              </a:rPr>
+              <a:t>The approach can be applied to any clustering method (i.e. K-means clustering, hierarchical clustering). </a:t>
+            </a:r>
+          </a:p>
+          <a:p>
+            <a:r>
+              <a:rPr lang="en-IN" sz="1200" b="0" i="0" kern="1200" dirty="0" smtClean="0">
+                <a:solidFill>
+                  <a:schemeClr val="tx1"/>
+                </a:solidFill>
+                <a:effectLst/>
+                <a:latin typeface="+mn-lt"/>
+                <a:ea typeface="+mn-ea"/>
+                <a:cs typeface="+mn-cs"/>
+              </a:rPr>
+              <a:t>The gap statistic compares the total intra-cluster variation for different values of </a:t>
+            </a:r>
+            <a:r>
+              <a:rPr lang="en-IN" sz="1200" b="0" i="1" kern="1200" dirty="0" smtClean="0">
+                <a:solidFill>
+                  <a:schemeClr val="tx1"/>
+                </a:solidFill>
+                <a:effectLst/>
+                <a:latin typeface="+mn-lt"/>
+                <a:ea typeface="+mn-ea"/>
+                <a:cs typeface="+mn-cs"/>
+              </a:rPr>
+              <a:t>k</a:t>
+            </a:r>
+            <a:r>
+              <a:rPr lang="en-IN" sz="1200" b="0" i="0" kern="1200" dirty="0" smtClean="0">
+                <a:solidFill>
+                  <a:schemeClr val="tx1"/>
+                </a:solidFill>
+                <a:effectLst/>
+                <a:latin typeface="+mn-lt"/>
+                <a:ea typeface="+mn-ea"/>
+                <a:cs typeface="+mn-cs"/>
+              </a:rPr>
+              <a:t> with their expected values under null reference distribution of the data (i.e. a distribution with no obvious clustering). </a:t>
+            </a:r>
+          </a:p>
+          <a:p>
+            <a:r>
+              <a:rPr lang="en-IN" sz="1200" b="0" i="0" kern="1200" dirty="0" smtClean="0">
+                <a:solidFill>
+                  <a:schemeClr val="tx1"/>
+                </a:solidFill>
+                <a:effectLst/>
+                <a:latin typeface="+mn-lt"/>
+                <a:ea typeface="+mn-ea"/>
+                <a:cs typeface="+mn-cs"/>
+              </a:rPr>
+              <a:t>The reference dataset is generated using Monte Carlo simulations of the sampling process. </a:t>
+            </a:r>
+          </a:p>
+          <a:p>
+            <a:r>
+              <a:rPr lang="en-IN" sz="1200" b="0" i="0" kern="1200" dirty="0" smtClean="0">
+                <a:solidFill>
+                  <a:schemeClr val="tx1"/>
+                </a:solidFill>
+                <a:effectLst/>
+                <a:latin typeface="+mn-lt"/>
+                <a:ea typeface="+mn-ea"/>
+                <a:cs typeface="+mn-cs"/>
+              </a:rPr>
+              <a:t>That is, for each variable (</a:t>
+            </a:r>
+            <a:r>
+              <a:rPr lang="en-IN" sz="1200" b="0" i="0" kern="1200" dirty="0" err="1" smtClean="0">
+                <a:solidFill>
+                  <a:schemeClr val="tx1"/>
+                </a:solidFill>
+                <a:effectLst/>
+                <a:latin typeface="+mn-lt"/>
+                <a:ea typeface="+mn-ea"/>
+                <a:cs typeface="+mn-cs"/>
+              </a:rPr>
+              <a:t>xixi</a:t>
+            </a:r>
+            <a:r>
+              <a:rPr lang="en-IN" sz="1200" b="0" i="0" kern="1200" dirty="0" smtClean="0">
+                <a:solidFill>
+                  <a:schemeClr val="tx1"/>
+                </a:solidFill>
+                <a:effectLst/>
+                <a:latin typeface="+mn-lt"/>
+                <a:ea typeface="+mn-ea"/>
+                <a:cs typeface="+mn-cs"/>
+              </a:rPr>
+              <a:t>) in the data set we compute its range [min(xi),max(</a:t>
+            </a:r>
+            <a:r>
+              <a:rPr lang="en-IN" sz="1200" b="0" i="0" kern="1200" dirty="0" err="1" smtClean="0">
+                <a:solidFill>
+                  <a:schemeClr val="tx1"/>
+                </a:solidFill>
+                <a:effectLst/>
+                <a:latin typeface="+mn-lt"/>
+                <a:ea typeface="+mn-ea"/>
+                <a:cs typeface="+mn-cs"/>
+              </a:rPr>
+              <a:t>xj</a:t>
+            </a:r>
+            <a:r>
+              <a:rPr lang="en-IN" sz="1200" b="0" i="0" kern="1200" dirty="0" smtClean="0">
+                <a:solidFill>
+                  <a:schemeClr val="tx1"/>
+                </a:solidFill>
+                <a:effectLst/>
+                <a:latin typeface="+mn-lt"/>
+                <a:ea typeface="+mn-ea"/>
+                <a:cs typeface="+mn-cs"/>
+              </a:rPr>
+              <a:t>)][min(xi),max(</a:t>
+            </a:r>
+            <a:r>
+              <a:rPr lang="en-IN" sz="1200" b="0" i="0" kern="1200" dirty="0" err="1" smtClean="0">
+                <a:solidFill>
+                  <a:schemeClr val="tx1"/>
+                </a:solidFill>
+                <a:effectLst/>
+                <a:latin typeface="+mn-lt"/>
+                <a:ea typeface="+mn-ea"/>
+                <a:cs typeface="+mn-cs"/>
+              </a:rPr>
+              <a:t>xj</a:t>
+            </a:r>
+            <a:r>
+              <a:rPr lang="en-IN" sz="1200" b="0" i="0" kern="1200" dirty="0" smtClean="0">
+                <a:solidFill>
+                  <a:schemeClr val="tx1"/>
+                </a:solidFill>
+                <a:effectLst/>
+                <a:latin typeface="+mn-lt"/>
+                <a:ea typeface="+mn-ea"/>
+                <a:cs typeface="+mn-cs"/>
+              </a:rPr>
+              <a:t>)] and generate values for the n points uniformly from the interval min to max.</a:t>
+            </a:r>
+          </a:p>
+          <a:p>
+            <a:endParaRPr lang="en-IN" sz="1200" b="0" i="0" kern="1200" dirty="0" smtClean="0">
+              <a:solidFill>
+                <a:schemeClr val="tx1"/>
+              </a:solidFill>
+              <a:effectLst/>
+              <a:latin typeface="+mn-lt"/>
+              <a:ea typeface="+mn-ea"/>
+              <a:cs typeface="+mn-cs"/>
+            </a:endParaRPr>
+          </a:p>
+          <a:p>
+            <a:r>
+              <a:rPr lang="en-IN" sz="1200" b="0" i="0" kern="1200" dirty="0" smtClean="0">
+                <a:solidFill>
+                  <a:schemeClr val="tx1"/>
+                </a:solidFill>
+                <a:effectLst/>
+                <a:latin typeface="+mn-lt"/>
+                <a:ea typeface="+mn-ea"/>
+                <a:cs typeface="+mn-cs"/>
+              </a:rPr>
+              <a:t>The estimate of the optimal clusters (^</a:t>
+            </a:r>
+            <a:r>
+              <a:rPr lang="en-IN" sz="1200" b="0" i="0" kern="1200" dirty="0" err="1" smtClean="0">
+                <a:solidFill>
+                  <a:schemeClr val="tx1"/>
+                </a:solidFill>
+                <a:effectLst/>
+                <a:latin typeface="+mn-lt"/>
+                <a:ea typeface="+mn-ea"/>
+                <a:cs typeface="+mn-cs"/>
+              </a:rPr>
+              <a:t>kk</a:t>
+            </a:r>
+            <a:r>
+              <a:rPr lang="en-IN" sz="1200" b="0" i="0" kern="1200" dirty="0" smtClean="0">
+                <a:solidFill>
+                  <a:schemeClr val="tx1"/>
+                </a:solidFill>
+                <a:effectLst/>
+                <a:latin typeface="+mn-lt"/>
+                <a:ea typeface="+mn-ea"/>
+                <a:cs typeface="+mn-cs"/>
+              </a:rPr>
+              <a:t>^) will be the value that maximizes Gap(k).</a:t>
+            </a:r>
+          </a:p>
+          <a:p>
+            <a:endParaRPr lang="en-US" dirty="0"/>
+          </a:p>
+        </p:txBody>
+      </p:sp>
+      <p:sp>
+        <p:nvSpPr>
+          <p:cNvPr id="4" name="Slide Number Placeholder 3"/>
+          <p:cNvSpPr>
+            <a:spLocks noGrp="1"/>
+          </p:cNvSpPr>
+          <p:nvPr>
+            <p:ph type="sldNum" sz="quarter" idx="10"/>
+          </p:nvPr>
+        </p:nvSpPr>
+        <p:spPr/>
+        <p:txBody>
+          <a:bodyPr/>
+          <a:lstStyle/>
+          <a:p>
+            <a:fld id="{D58A01DC-D56B-4089-94FD-B2CDCC879BEA}" type="slidenum">
+              <a:rPr lang="en-IN" smtClean="0"/>
+              <a:t>13</a:t>
+            </a:fld>
+            <a:endParaRPr lang="en-IN"/>
+          </a:p>
+        </p:txBody>
+      </p:sp>
+    </p:spTree>
+    <p:extLst>
+      <p:ext uri="{BB962C8B-B14F-4D97-AF65-F5344CB8AC3E}">
+        <p14:creationId xmlns:p14="http://schemas.microsoft.com/office/powerpoint/2010/main" val="3952590023"/>
+      </p:ext>
+    </p:extLst>
+  </p:cSld>
+  <p:clrMapOvr>
+    <a:masterClrMapping/>
+  </p:clrMapOvr>
+</p:notes>
+</file>
+
 <file path=ppt/slideLayouts/slideLayout1.xml><?xml version="1.0" encoding="utf-8"?>
 <p:sldLayout xmlns:a="http://schemas.openxmlformats.org/drawingml/2006/main" xmlns:r="http://schemas.openxmlformats.org/officeDocument/2006/relationships" xmlns:p="http://schemas.openxmlformats.org/presentationml/2006/main" showMasterSp="0" type="title" preserve="1">
   <p:cSld name="Title Slide">
@@ -729,7 +2924,7 @@
           <a:p>
             <a:fld id="{DA33E745-8FE1-47CC-91DA-CD8A7CF025A3}" type="datetime1">
               <a:rPr lang="en-US" smtClean="0"/>
-              <a:t>4/26/2020</a:t>
+              <a:t>4/27/2020</a:t>
             </a:fld>
             <a:endParaRPr lang="en-US" dirty="0"/>
           </a:p>
@@ -921,7 +3116,7 @@
           <a:p>
             <a:fld id="{D0F87860-D0B0-438C-9AE6-1AD9EE8E8B0E}" type="datetime1">
               <a:rPr lang="en-US" smtClean="0"/>
-              <a:t>4/26/2020</a:t>
+              <a:t>4/27/2020</a:t>
             </a:fld>
             <a:endParaRPr lang="en-US" dirty="0"/>
           </a:p>
@@ -1167,7 +3362,7 @@
           <a:p>
             <a:fld id="{B322B73F-9EB1-4EA4-AD9F-B2980F2457F0}" type="datetime1">
               <a:rPr lang="en-US" smtClean="0"/>
-              <a:t>4/26/2020</a:t>
+              <a:t>4/27/2020</a:t>
             </a:fld>
             <a:endParaRPr lang="en-US" dirty="0"/>
           </a:p>
@@ -1359,7 +3554,7 @@
           <a:p>
             <a:fld id="{729E3528-EB33-475D-8B9A-F28254ACC31C}" type="datetime1">
               <a:rPr lang="en-US" smtClean="0"/>
-              <a:t>4/26/2020</a:t>
+              <a:t>4/27/2020</a:t>
             </a:fld>
             <a:endParaRPr lang="en-US" dirty="0"/>
           </a:p>
@@ -1736,7 +3931,7 @@
           <a:p>
             <a:fld id="{2BEE3975-8C66-4BA8-A7E2-CAB9A35681C1}" type="datetime1">
               <a:rPr lang="en-US" smtClean="0"/>
-              <a:t>4/26/2020</a:t>
+              <a:t>4/27/2020</a:t>
             </a:fld>
             <a:endParaRPr lang="en-US" dirty="0"/>
           </a:p>
@@ -1995,7 +4190,7 @@
           <a:p>
             <a:fld id="{15715BA5-2FD0-4578-8689-EC29B250C8A4}" type="datetime1">
               <a:rPr lang="en-US" smtClean="0"/>
-              <a:t>4/26/2020</a:t>
+              <a:t>4/27/2020</a:t>
             </a:fld>
             <a:endParaRPr lang="en-US" dirty="0"/>
           </a:p>
@@ -2396,7 +4591,7 @@
           <a:p>
             <a:fld id="{30D3F7EE-31C8-4752-93C5-13E9A9E58C9C}" type="datetime1">
               <a:rPr lang="en-US" smtClean="0"/>
-              <a:t>4/26/2020</a:t>
+              <a:t>4/27/2020</a:t>
             </a:fld>
             <a:endParaRPr lang="en-US" dirty="0"/>
           </a:p>
@@ -2536,7 +4731,7 @@
           <a:p>
             <a:fld id="{37E26A07-523D-43DE-8DBE-08FFE0AA0CA1}" type="datetime1">
               <a:rPr lang="en-US" smtClean="0"/>
-              <a:t>4/26/2020</a:t>
+              <a:t>4/27/2020</a:t>
             </a:fld>
             <a:endParaRPr lang="en-US" dirty="0"/>
           </a:p>
@@ -2697,7 +4892,7 @@
           <a:p>
             <a:fld id="{2C9CFBD5-D14A-4300-BA93-A2414E4D5FA5}" type="datetime1">
               <a:rPr lang="en-US" smtClean="0"/>
-              <a:t>4/26/2020</a:t>
+              <a:t>4/27/2020</a:t>
             </a:fld>
             <a:endParaRPr lang="en-US" dirty="0"/>
           </a:p>
@@ -3030,7 +5225,7 @@
           <a:p>
             <a:fld id="{39B460A2-04A8-47A8-9FCB-846A50EC35F0}" type="datetime1">
               <a:rPr lang="en-US" smtClean="0"/>
-              <a:t>4/26/2020</a:t>
+              <a:t>4/27/2020</a:t>
             </a:fld>
             <a:endParaRPr lang="en-US" dirty="0"/>
           </a:p>
@@ -3384,7 +5579,7 @@
           <a:p>
             <a:fld id="{9728EA47-BE8C-4FD8-AADD-542A56491222}" type="datetime1">
               <a:rPr lang="en-US" smtClean="0"/>
-              <a:t>4/26/2020</a:t>
+              <a:t>4/27/2020</a:t>
             </a:fld>
             <a:endParaRPr lang="en-US" dirty="0"/>
           </a:p>
@@ -3649,7 +5844,7 @@
           <a:p>
             <a:fld id="{A89E64EA-8512-4027-A5F4-89414817116A}" type="datetime1">
               <a:rPr lang="en-US" smtClean="0"/>
-              <a:t>4/26/2020</a:t>
+              <a:t>4/27/2020</a:t>
             </a:fld>
             <a:endParaRPr lang="en-US" dirty="0"/>
           </a:p>
@@ -4192,7 +6387,7 @@
                 <a16:creationId xmlns:a16="http://schemas.microsoft.com/office/drawing/2014/main" id="{A9286AD2-18A9-4868-A4E3-7A2097A20810}"/>
               </a:ext>
               <a:ext uri="{C183D7F6-B498-43B3-948B-1728B52AA6E4}">
-                <adec:decorative xmlns:adec="http://schemas.microsoft.com/office/drawing/2017/decorative" val="1"/>
+                <adec:decorative xmlns:adec="http://schemas.microsoft.com/office/drawing/2017/decorative" xmlns="" val="1"/>
               </a:ext>
             </a:extLst>
           </p:cNvPr>
@@ -4284,6 +6479,10 @@
               <a:rPr lang="en-US" sz="4000" dirty="0"/>
               <a:t>for</a:t>
             </a:r>
+            <a:r>
+              <a:rPr lang="en-US" dirty="0"/>
+              <a:t/>
+            </a:r>
             <a:br>
               <a:rPr lang="en-US" dirty="0"/>
             </a:br>
@@ -4362,7 +6561,7 @@
           <p:nvPr/>
         </p:nvPicPr>
         <p:blipFill rotWithShape="1">
-          <a:blip r:embed="rId2">
+          <a:blip r:embed="rId3">
             <a:extLst>
               <a:ext uri="{28A0092B-C50C-407E-A947-70E740481C1C}">
                 <a14:useLocalDpi xmlns:a14="http://schemas.microsoft.com/office/drawing/2010/main" val="0"/>
@@ -4390,7 +6589,7 @@
                 <a16:creationId xmlns:a16="http://schemas.microsoft.com/office/drawing/2014/main" id="{E7A7CD63-7EC3-44F3-95D0-595C4019FF24}"/>
               </a:ext>
               <a:ext uri="{C183D7F6-B498-43B3-948B-1728B52AA6E4}">
-                <adec:decorative xmlns:adec="http://schemas.microsoft.com/office/drawing/2017/decorative" val="1"/>
+                <adec:decorative xmlns:adec="http://schemas.microsoft.com/office/drawing/2017/decorative" xmlns="" val="1"/>
               </a:ext>
             </a:extLst>
           </p:cNvPr>
@@ -4562,7 +6761,7 @@
               <a:avLst/>
             </a:prstGeom>
             <a:blipFill dpi="0" rotWithShape="1">
-              <a:blip r:embed="rId3"/>
+              <a:blip r:embed="rId4"/>
               <a:srcRect/>
               <a:tile tx="0" ty="0" sx="100000" sy="100000" flip="none" algn="tl"/>
             </a:blipFill>
@@ -4603,7 +6802,7 @@
             <p:nvPr/>
           </p:nvPicPr>
           <p:blipFill>
-            <a:blip r:embed="rId4">
+            <a:blip r:embed="rId5">
               <a:extLst>
                 <a:ext uri="{28A0092B-C50C-407E-A947-70E740481C1C}">
                   <a14:useLocalDpi xmlns:a14="http://schemas.microsoft.com/office/drawing/2010/main" val="0"/>
@@ -4659,6 +6858,13 @@
   <p:clrMapOvr>
     <a:masterClrMapping/>
   </p:clrMapOvr>
+  <p:timing>
+    <p:tnLst>
+      <p:par>
+        <p:cTn id="1" dur="indefinite" restart="never" nodeType="tmRoot"/>
+      </p:par>
+    </p:tnLst>
+  </p:timing>
 </p:sld>
 </file>
 
@@ -4844,7 +7050,7 @@
         </p:nvGraphicFramePr>
         <p:xfrm>
           <a:off x="5218430" y="3589537"/>
-          <a:ext cx="5937250" cy="2179193"/>
+          <a:ext cx="5937250" cy="2332355"/>
         </p:xfrm>
         <a:graphic>
           <a:graphicData uri="http://schemas.openxmlformats.org/drawingml/2006/table">
@@ -5765,8 +7971,8 @@
         </p:blipFill>
         <p:spPr bwMode="auto">
           <a:xfrm>
-            <a:off x="1036320" y="3338819"/>
-            <a:ext cx="4269022" cy="2672368"/>
+            <a:off x="1036319" y="3105150"/>
+            <a:ext cx="4523063" cy="3047999"/>
           </a:xfrm>
           <a:prstGeom prst="rect">
             <a:avLst/>
@@ -5797,8 +8003,8 @@
         </p:blipFill>
         <p:spPr>
           <a:xfrm>
-            <a:off x="6199465" y="3338819"/>
-            <a:ext cx="4157790" cy="2672368"/>
+            <a:off x="6199464" y="3171824"/>
+            <a:ext cx="4316135" cy="2981325"/>
           </a:xfrm>
           <a:prstGeom prst="rect">
             <a:avLst/>
@@ -5815,6 +8021,13 @@
   <p:clrMapOvr>
     <a:masterClrMapping/>
   </p:clrMapOvr>
+  <p:timing>
+    <p:tnLst>
+      <p:par>
+        <p:cTn id="1" dur="indefinite" restart="never" nodeType="tmRoot"/>
+      </p:par>
+    </p:tnLst>
+  </p:timing>
 </p:sld>
 </file>
 
@@ -6025,15 +8238,15 @@
           <p:nvPr/>
         </p:nvPicPr>
         <p:blipFill>
-          <a:blip r:embed="rId2"/>
+          <a:blip r:embed="rId3"/>
           <a:stretch>
             <a:fillRect/>
           </a:stretch>
         </p:blipFill>
         <p:spPr>
           <a:xfrm>
-            <a:off x="7559288" y="2492931"/>
-            <a:ext cx="3302193" cy="2991430"/>
+            <a:off x="7453520" y="2492930"/>
+            <a:ext cx="3702160" cy="3603070"/>
           </a:xfrm>
           <a:prstGeom prst="rect">
             <a:avLst/>
@@ -6053,14 +8266,14 @@
           <p:nvPr/>
         </p:nvPicPr>
         <p:blipFill>
-          <a:blip r:embed="rId3"/>
+          <a:blip r:embed="rId4"/>
           <a:stretch>
             <a:fillRect/>
           </a:stretch>
         </p:blipFill>
         <p:spPr>
           <a:xfrm>
-            <a:off x="1446475" y="4208011"/>
+            <a:off x="1303600" y="4227061"/>
             <a:ext cx="5943600" cy="1276350"/>
           </a:xfrm>
           <a:prstGeom prst="rect">
@@ -6078,6 +8291,13 @@
   <p:clrMapOvr>
     <a:masterClrMapping/>
   </p:clrMapOvr>
+  <p:timing>
+    <p:tnLst>
+      <p:par>
+        <p:cTn id="1" dur="indefinite" restart="never" nodeType="tmRoot"/>
+      </p:par>
+    </p:tnLst>
+  </p:timing>
 </p:sld>
 </file>
 
@@ -6164,15 +8384,28 @@
             <a:pPr lvl="1"/>
             <a:r>
               <a:rPr lang="en-IN" sz="1600" dirty="0"/>
-              <a:t>K-means with all eight data attributes </a:t>
+              <a:t>K-means with </a:t>
+            </a:r>
+            <a:r>
+              <a:rPr lang="en-IN" sz="1600" dirty="0" smtClean="0"/>
+              <a:t>seven </a:t>
+            </a:r>
+            <a:r>
+              <a:rPr lang="en-IN" sz="1600" dirty="0"/>
+              <a:t>data attributes </a:t>
             </a:r>
             <a:br>
               <a:rPr lang="en-IN" sz="1600" dirty="0"/>
             </a:br>
             <a:r>
               <a:rPr lang="en-IN" sz="1600" dirty="0"/>
-              <a:t>for K = 3 was not useful.</a:t>
-            </a:r>
+              <a:t>for K = 3 was not useful</a:t>
+            </a:r>
+            <a:r>
+              <a:rPr lang="en-IN" sz="1600" dirty="0" smtClean="0"/>
+              <a:t>. Results in table below.</a:t>
+            </a:r>
+            <a:endParaRPr lang="en-IN" sz="1600" dirty="0"/>
           </a:p>
           <a:p>
             <a:pPr lvl="1"/>
@@ -6264,7 +8497,7 @@
           <p:nvPr/>
         </p:nvPicPr>
         <p:blipFill>
-          <a:blip r:embed="rId2"/>
+          <a:blip r:embed="rId3"/>
           <a:stretch>
             <a:fillRect/>
           </a:stretch>
@@ -6279,6 +8512,826 @@
           </a:prstGeom>
         </p:spPr>
       </p:pic>
+      <p:graphicFrame>
+        <p:nvGraphicFramePr>
+          <p:cNvPr id="7" name="Table 6">
+            <a:extLst>
+              <a:ext uri="{FF2B5EF4-FFF2-40B4-BE49-F238E27FC236}">
+                <a16:creationId xmlns:a16="http://schemas.microsoft.com/office/drawing/2014/main" id="{06B5F035-1E65-4BE0-9AF3-8E1CC2509B83}"/>
+              </a:ext>
+            </a:extLst>
+          </p:cNvPr>
+          <p:cNvGraphicFramePr>
+            <a:graphicFrameLocks noGrp="1"/>
+          </p:cNvGraphicFramePr>
+          <p:nvPr>
+            <p:extLst>
+              <p:ext uri="{D42A27DB-BD31-4B8C-83A1-F6EECF244321}">
+                <p14:modId xmlns:p14="http://schemas.microsoft.com/office/powerpoint/2010/main" val="1797376277"/>
+              </p:ext>
+            </p:extLst>
+          </p:nvPr>
+        </p:nvGraphicFramePr>
+        <p:xfrm>
+          <a:off x="1097279" y="4208230"/>
+          <a:ext cx="5587394" cy="1463040"/>
+        </p:xfrm>
+        <a:graphic>
+          <a:graphicData uri="http://schemas.openxmlformats.org/drawingml/2006/table">
+            <a:tbl>
+              <a:tblPr firstRow="1" firstCol="1" bandRow="1">
+                <a:tableStyleId>{5C22544A-7EE6-4342-B048-85BDC9FD1C3A}</a:tableStyleId>
+              </a:tblPr>
+              <a:tblGrid>
+                <a:gridCol w="849762">
+                  <a:extLst>
+                    <a:ext uri="{9D8B030D-6E8A-4147-A177-3AD203B41FA5}">
+                      <a16:colId xmlns:a16="http://schemas.microsoft.com/office/drawing/2014/main" val="1313320758"/>
+                    </a:ext>
+                  </a:extLst>
+                </a:gridCol>
+                <a:gridCol w="974059">
+                  <a:extLst>
+                    <a:ext uri="{9D8B030D-6E8A-4147-A177-3AD203B41FA5}">
+                      <a16:colId xmlns:a16="http://schemas.microsoft.com/office/drawing/2014/main" val="770337168"/>
+                    </a:ext>
+                  </a:extLst>
+                </a:gridCol>
+                <a:gridCol w="1123739">
+                  <a:extLst>
+                    <a:ext uri="{9D8B030D-6E8A-4147-A177-3AD203B41FA5}">
+                      <a16:colId xmlns:a16="http://schemas.microsoft.com/office/drawing/2014/main" val="1734050807"/>
+                    </a:ext>
+                  </a:extLst>
+                </a:gridCol>
+                <a:gridCol w="814220">
+                  <a:extLst>
+                    <a:ext uri="{9D8B030D-6E8A-4147-A177-3AD203B41FA5}">
+                      <a16:colId xmlns:a16="http://schemas.microsoft.com/office/drawing/2014/main" val="1876112509"/>
+                    </a:ext>
+                  </a:extLst>
+                </a:gridCol>
+                <a:gridCol w="917289">
+                  <a:extLst>
+                    <a:ext uri="{9D8B030D-6E8A-4147-A177-3AD203B41FA5}">
+                      <a16:colId xmlns:a16="http://schemas.microsoft.com/office/drawing/2014/main" val="207017078"/>
+                    </a:ext>
+                  </a:extLst>
+                </a:gridCol>
+                <a:gridCol w="908325">
+                  <a:extLst>
+                    <a:ext uri="{9D8B030D-6E8A-4147-A177-3AD203B41FA5}">
+                      <a16:colId xmlns:a16="http://schemas.microsoft.com/office/drawing/2014/main" val="123572951"/>
+                    </a:ext>
+                  </a:extLst>
+                </a:gridCol>
+              </a:tblGrid>
+              <a:tr h="0">
+                <a:tc>
+                  <a:txBody>
+                    <a:bodyPr/>
+                    <a:lstStyle/>
+                    <a:p>
+                      <a:pPr>
+                        <a:lnSpc>
+                          <a:spcPct val="200000"/>
+                        </a:lnSpc>
+                        <a:spcAft>
+                          <a:spcPts val="0"/>
+                        </a:spcAft>
+                      </a:pPr>
+                      <a:r>
+                        <a:rPr lang="en-IN" sz="1200" dirty="0">
+                          <a:effectLst/>
+                        </a:rPr>
+                        <a:t>Cluster No.</a:t>
+                      </a:r>
+                      <a:endParaRPr lang="en-IN" sz="1200" dirty="0">
+                        <a:effectLst/>
+                        <a:latin typeface="Times New Roman" panose="02020603050405020304" pitchFamily="18" charset="0"/>
+                        <a:ea typeface="Calibri" panose="020F0502020204030204" pitchFamily="34" charset="0"/>
+                        <a:cs typeface="Times New Roman" panose="02020603050405020304" pitchFamily="18" charset="0"/>
+                      </a:endParaRPr>
+                    </a:p>
+                  </a:txBody>
+                  <a:tcPr marL="68580" marR="68580" marT="0" marB="0"/>
+                </a:tc>
+                <a:tc>
+                  <a:txBody>
+                    <a:bodyPr/>
+                    <a:lstStyle/>
+                    <a:p>
+                      <a:pPr>
+                        <a:lnSpc>
+                          <a:spcPct val="200000"/>
+                        </a:lnSpc>
+                        <a:spcAft>
+                          <a:spcPts val="0"/>
+                        </a:spcAft>
+                      </a:pPr>
+                      <a:r>
+                        <a:rPr lang="en-IN" sz="1200" dirty="0">
+                          <a:effectLst/>
+                        </a:rPr>
+                        <a:t>Glucose</a:t>
+                      </a:r>
+                      <a:endParaRPr lang="en-IN" sz="1200" dirty="0">
+                        <a:effectLst/>
+                        <a:latin typeface="Times New Roman" panose="02020603050405020304" pitchFamily="18" charset="0"/>
+                        <a:ea typeface="Calibri" panose="020F0502020204030204" pitchFamily="34" charset="0"/>
+                        <a:cs typeface="Times New Roman" panose="02020603050405020304" pitchFamily="18" charset="0"/>
+                      </a:endParaRPr>
+                    </a:p>
+                  </a:txBody>
+                  <a:tcPr marL="68580" marR="68580" marT="0" marB="0"/>
+                </a:tc>
+                <a:tc>
+                  <a:txBody>
+                    <a:bodyPr/>
+                    <a:lstStyle/>
+                    <a:p>
+                      <a:pPr>
+                        <a:lnSpc>
+                          <a:spcPct val="200000"/>
+                        </a:lnSpc>
+                        <a:spcAft>
+                          <a:spcPts val="0"/>
+                        </a:spcAft>
+                      </a:pPr>
+                      <a:r>
+                        <a:rPr lang="en-IN" sz="1200" dirty="0" err="1">
+                          <a:effectLst/>
+                        </a:rPr>
+                        <a:t>BloodPressure</a:t>
+                      </a:r>
+                      <a:endParaRPr lang="en-IN" sz="1200" dirty="0">
+                        <a:effectLst/>
+                        <a:latin typeface="Times New Roman" panose="02020603050405020304" pitchFamily="18" charset="0"/>
+                        <a:ea typeface="Calibri" panose="020F0502020204030204" pitchFamily="34" charset="0"/>
+                        <a:cs typeface="Times New Roman" panose="02020603050405020304" pitchFamily="18" charset="0"/>
+                      </a:endParaRPr>
+                    </a:p>
+                  </a:txBody>
+                  <a:tcPr marL="68580" marR="68580" marT="0" marB="0"/>
+                </a:tc>
+                <a:tc>
+                  <a:txBody>
+                    <a:bodyPr/>
+                    <a:lstStyle/>
+                    <a:p>
+                      <a:pPr>
+                        <a:lnSpc>
+                          <a:spcPct val="200000"/>
+                        </a:lnSpc>
+                        <a:spcAft>
+                          <a:spcPts val="0"/>
+                        </a:spcAft>
+                      </a:pPr>
+                      <a:r>
+                        <a:rPr lang="en-IN" sz="1200">
+                          <a:effectLst/>
+                        </a:rPr>
+                        <a:t>Insulin</a:t>
+                      </a:r>
+                      <a:endParaRPr lang="en-IN" sz="1200">
+                        <a:effectLst/>
+                        <a:latin typeface="Times New Roman" panose="02020603050405020304" pitchFamily="18" charset="0"/>
+                        <a:ea typeface="Calibri" panose="020F0502020204030204" pitchFamily="34" charset="0"/>
+                        <a:cs typeface="Times New Roman" panose="02020603050405020304" pitchFamily="18" charset="0"/>
+                      </a:endParaRPr>
+                    </a:p>
+                  </a:txBody>
+                  <a:tcPr marL="68580" marR="68580" marT="0" marB="0"/>
+                </a:tc>
+                <a:tc>
+                  <a:txBody>
+                    <a:bodyPr/>
+                    <a:lstStyle/>
+                    <a:p>
+                      <a:pPr>
+                        <a:lnSpc>
+                          <a:spcPct val="200000"/>
+                        </a:lnSpc>
+                        <a:spcAft>
+                          <a:spcPts val="0"/>
+                        </a:spcAft>
+                      </a:pPr>
+                      <a:r>
+                        <a:rPr lang="en-IN" sz="1200">
+                          <a:effectLst/>
+                        </a:rPr>
+                        <a:t>BMI</a:t>
+                      </a:r>
+                      <a:endParaRPr lang="en-IN" sz="1200">
+                        <a:effectLst/>
+                        <a:latin typeface="Times New Roman" panose="02020603050405020304" pitchFamily="18" charset="0"/>
+                        <a:ea typeface="Calibri" panose="020F0502020204030204" pitchFamily="34" charset="0"/>
+                        <a:cs typeface="Times New Roman" panose="02020603050405020304" pitchFamily="18" charset="0"/>
+                      </a:endParaRPr>
+                    </a:p>
+                  </a:txBody>
+                  <a:tcPr marL="68580" marR="68580" marT="0" marB="0"/>
+                </a:tc>
+                <a:tc>
+                  <a:txBody>
+                    <a:bodyPr/>
+                    <a:lstStyle/>
+                    <a:p>
+                      <a:pPr>
+                        <a:lnSpc>
+                          <a:spcPct val="200000"/>
+                        </a:lnSpc>
+                        <a:spcAft>
+                          <a:spcPts val="0"/>
+                        </a:spcAft>
+                      </a:pPr>
+                      <a:r>
+                        <a:rPr lang="en-IN" sz="1200">
+                          <a:effectLst/>
+                        </a:rPr>
+                        <a:t>Age</a:t>
+                      </a:r>
+                      <a:endParaRPr lang="en-IN" sz="1200">
+                        <a:effectLst/>
+                        <a:latin typeface="Times New Roman" panose="02020603050405020304" pitchFamily="18" charset="0"/>
+                        <a:ea typeface="Calibri" panose="020F0502020204030204" pitchFamily="34" charset="0"/>
+                        <a:cs typeface="Times New Roman" panose="02020603050405020304" pitchFamily="18" charset="0"/>
+                      </a:endParaRPr>
+                    </a:p>
+                  </a:txBody>
+                  <a:tcPr marL="68580" marR="68580" marT="0" marB="0"/>
+                </a:tc>
+                <a:extLst>
+                  <a:ext uri="{0D108BD9-81ED-4DB2-BD59-A6C34878D82A}">
+                    <a16:rowId xmlns:a16="http://schemas.microsoft.com/office/drawing/2014/main" val="4122556717"/>
+                  </a:ext>
+                </a:extLst>
+              </a:tr>
+              <a:tr h="0">
+                <a:tc>
+                  <a:txBody>
+                    <a:bodyPr/>
+                    <a:lstStyle/>
+                    <a:p>
+                      <a:pPr>
+                        <a:lnSpc>
+                          <a:spcPct val="200000"/>
+                        </a:lnSpc>
+                        <a:spcAft>
+                          <a:spcPts val="0"/>
+                        </a:spcAft>
+                      </a:pPr>
+                      <a:r>
+                        <a:rPr lang="en-IN" sz="1200">
+                          <a:effectLst/>
+                        </a:rPr>
+                        <a:t>Cluster 1</a:t>
+                      </a:r>
+                      <a:endParaRPr lang="en-IN" sz="1200">
+                        <a:effectLst/>
+                        <a:latin typeface="Times New Roman" panose="02020603050405020304" pitchFamily="18" charset="0"/>
+                        <a:ea typeface="Calibri" panose="020F0502020204030204" pitchFamily="34" charset="0"/>
+                        <a:cs typeface="Times New Roman" panose="02020603050405020304" pitchFamily="18" charset="0"/>
+                      </a:endParaRPr>
+                    </a:p>
+                  </a:txBody>
+                  <a:tcPr marL="68580" marR="68580" marT="0" marB="0"/>
+                </a:tc>
+                <a:tc>
+                  <a:txBody>
+                    <a:bodyPr/>
+                    <a:lstStyle/>
+                    <a:p>
+                      <a:pPr>
+                        <a:lnSpc>
+                          <a:spcPct val="200000"/>
+                        </a:lnSpc>
+                        <a:spcAft>
+                          <a:spcPts val="0"/>
+                        </a:spcAft>
+                      </a:pPr>
+                      <a:r>
+                        <a:rPr lang="en-IN" sz="1200">
+                          <a:effectLst/>
+                        </a:rPr>
+                        <a:t>88 - 198</a:t>
+                      </a:r>
+                      <a:endParaRPr lang="en-IN" sz="1200">
+                        <a:effectLst/>
+                        <a:latin typeface="Times New Roman" panose="02020603050405020304" pitchFamily="18" charset="0"/>
+                        <a:ea typeface="Calibri" panose="020F0502020204030204" pitchFamily="34" charset="0"/>
+                        <a:cs typeface="Times New Roman" panose="02020603050405020304" pitchFamily="18" charset="0"/>
+                      </a:endParaRPr>
+                    </a:p>
+                  </a:txBody>
+                  <a:tcPr marL="68580" marR="68580" marT="0" marB="0"/>
+                </a:tc>
+                <a:tc>
+                  <a:txBody>
+                    <a:bodyPr/>
+                    <a:lstStyle/>
+                    <a:p>
+                      <a:pPr>
+                        <a:lnSpc>
+                          <a:spcPct val="200000"/>
+                        </a:lnSpc>
+                        <a:spcAft>
+                          <a:spcPts val="0"/>
+                        </a:spcAft>
+                      </a:pPr>
+                      <a:r>
+                        <a:rPr lang="en-IN" sz="1200">
+                          <a:effectLst/>
+                        </a:rPr>
+                        <a:t>30 - 110</a:t>
+                      </a:r>
+                      <a:endParaRPr lang="en-IN" sz="1200">
+                        <a:effectLst/>
+                        <a:latin typeface="Times New Roman" panose="02020603050405020304" pitchFamily="18" charset="0"/>
+                        <a:ea typeface="Calibri" panose="020F0502020204030204" pitchFamily="34" charset="0"/>
+                        <a:cs typeface="Times New Roman" panose="02020603050405020304" pitchFamily="18" charset="0"/>
+                      </a:endParaRPr>
+                    </a:p>
+                  </a:txBody>
+                  <a:tcPr marL="68580" marR="68580" marT="0" marB="0"/>
+                </a:tc>
+                <a:tc>
+                  <a:txBody>
+                    <a:bodyPr/>
+                    <a:lstStyle/>
+                    <a:p>
+                      <a:pPr>
+                        <a:lnSpc>
+                          <a:spcPct val="200000"/>
+                        </a:lnSpc>
+                        <a:spcAft>
+                          <a:spcPts val="0"/>
+                        </a:spcAft>
+                      </a:pPr>
+                      <a:r>
+                        <a:rPr lang="en-IN" sz="1200" dirty="0">
+                          <a:solidFill>
+                            <a:srgbClr val="0070C0"/>
+                          </a:solidFill>
+                          <a:effectLst/>
+                        </a:rPr>
+                        <a:t>96 - 328</a:t>
+                      </a:r>
+                      <a:endParaRPr lang="en-IN" sz="1200" dirty="0">
+                        <a:solidFill>
+                          <a:srgbClr val="0070C0"/>
+                        </a:solidFill>
+                        <a:effectLst/>
+                        <a:latin typeface="Times New Roman" panose="02020603050405020304" pitchFamily="18" charset="0"/>
+                        <a:ea typeface="Calibri" panose="020F0502020204030204" pitchFamily="34" charset="0"/>
+                        <a:cs typeface="Times New Roman" panose="02020603050405020304" pitchFamily="18" charset="0"/>
+                      </a:endParaRPr>
+                    </a:p>
+                  </a:txBody>
+                  <a:tcPr marL="68580" marR="68580" marT="0" marB="0"/>
+                </a:tc>
+                <a:tc>
+                  <a:txBody>
+                    <a:bodyPr/>
+                    <a:lstStyle/>
+                    <a:p>
+                      <a:pPr>
+                        <a:lnSpc>
+                          <a:spcPct val="200000"/>
+                        </a:lnSpc>
+                        <a:spcAft>
+                          <a:spcPts val="0"/>
+                        </a:spcAft>
+                      </a:pPr>
+                      <a:r>
+                        <a:rPr lang="en-IN" sz="1200">
+                          <a:effectLst/>
+                        </a:rPr>
+                        <a:t>23.4 - 67.1</a:t>
+                      </a:r>
+                      <a:endParaRPr lang="en-IN" sz="1200">
+                        <a:effectLst/>
+                        <a:latin typeface="Times New Roman" panose="02020603050405020304" pitchFamily="18" charset="0"/>
+                        <a:ea typeface="Calibri" panose="020F0502020204030204" pitchFamily="34" charset="0"/>
+                        <a:cs typeface="Times New Roman" panose="02020603050405020304" pitchFamily="18" charset="0"/>
+                      </a:endParaRPr>
+                    </a:p>
+                  </a:txBody>
+                  <a:tcPr marL="68580" marR="68580" marT="0" marB="0"/>
+                </a:tc>
+                <a:tc>
+                  <a:txBody>
+                    <a:bodyPr/>
+                    <a:lstStyle/>
+                    <a:p>
+                      <a:pPr>
+                        <a:lnSpc>
+                          <a:spcPct val="200000"/>
+                        </a:lnSpc>
+                        <a:spcAft>
+                          <a:spcPts val="0"/>
+                        </a:spcAft>
+                      </a:pPr>
+                      <a:r>
+                        <a:rPr lang="en-IN" sz="1200">
+                          <a:effectLst/>
+                        </a:rPr>
+                        <a:t>21 - 58</a:t>
+                      </a:r>
+                      <a:endParaRPr lang="en-IN" sz="1200">
+                        <a:effectLst/>
+                        <a:latin typeface="Times New Roman" panose="02020603050405020304" pitchFamily="18" charset="0"/>
+                        <a:ea typeface="Calibri" panose="020F0502020204030204" pitchFamily="34" charset="0"/>
+                        <a:cs typeface="Times New Roman" panose="02020603050405020304" pitchFamily="18" charset="0"/>
+                      </a:endParaRPr>
+                    </a:p>
+                  </a:txBody>
+                  <a:tcPr marL="68580" marR="68580" marT="0" marB="0"/>
+                </a:tc>
+                <a:extLst>
+                  <a:ext uri="{0D108BD9-81ED-4DB2-BD59-A6C34878D82A}">
+                    <a16:rowId xmlns:a16="http://schemas.microsoft.com/office/drawing/2014/main" val="2088336572"/>
+                  </a:ext>
+                </a:extLst>
+              </a:tr>
+              <a:tr h="0">
+                <a:tc>
+                  <a:txBody>
+                    <a:bodyPr/>
+                    <a:lstStyle/>
+                    <a:p>
+                      <a:pPr>
+                        <a:lnSpc>
+                          <a:spcPct val="200000"/>
+                        </a:lnSpc>
+                        <a:spcAft>
+                          <a:spcPts val="0"/>
+                        </a:spcAft>
+                      </a:pPr>
+                      <a:r>
+                        <a:rPr lang="en-IN" sz="1200">
+                          <a:effectLst/>
+                        </a:rPr>
+                        <a:t>Cluster 2</a:t>
+                      </a:r>
+                      <a:endParaRPr lang="en-IN" sz="1200">
+                        <a:effectLst/>
+                        <a:latin typeface="Times New Roman" panose="02020603050405020304" pitchFamily="18" charset="0"/>
+                        <a:ea typeface="Calibri" panose="020F0502020204030204" pitchFamily="34" charset="0"/>
+                        <a:cs typeface="Times New Roman" panose="02020603050405020304" pitchFamily="18" charset="0"/>
+                      </a:endParaRPr>
+                    </a:p>
+                  </a:txBody>
+                  <a:tcPr marL="68580" marR="68580" marT="0" marB="0"/>
+                </a:tc>
+                <a:tc>
+                  <a:txBody>
+                    <a:bodyPr/>
+                    <a:lstStyle/>
+                    <a:p>
+                      <a:pPr>
+                        <a:lnSpc>
+                          <a:spcPct val="200000"/>
+                        </a:lnSpc>
+                        <a:spcAft>
+                          <a:spcPts val="0"/>
+                        </a:spcAft>
+                      </a:pPr>
+                      <a:r>
+                        <a:rPr lang="en-IN" sz="1200">
+                          <a:effectLst/>
+                        </a:rPr>
+                        <a:t>124 - 197</a:t>
+                      </a:r>
+                      <a:endParaRPr lang="en-IN" sz="1200">
+                        <a:effectLst/>
+                        <a:latin typeface="Times New Roman" panose="02020603050405020304" pitchFamily="18" charset="0"/>
+                        <a:ea typeface="Calibri" panose="020F0502020204030204" pitchFamily="34" charset="0"/>
+                        <a:cs typeface="Times New Roman" panose="02020603050405020304" pitchFamily="18" charset="0"/>
+                      </a:endParaRPr>
+                    </a:p>
+                  </a:txBody>
+                  <a:tcPr marL="68580" marR="68580" marT="0" marB="0"/>
+                </a:tc>
+                <a:tc>
+                  <a:txBody>
+                    <a:bodyPr/>
+                    <a:lstStyle/>
+                    <a:p>
+                      <a:pPr>
+                        <a:lnSpc>
+                          <a:spcPct val="200000"/>
+                        </a:lnSpc>
+                        <a:spcAft>
+                          <a:spcPts val="0"/>
+                        </a:spcAft>
+                      </a:pPr>
+                      <a:r>
+                        <a:rPr lang="en-IN" sz="1200">
+                          <a:effectLst/>
+                        </a:rPr>
+                        <a:t>50 - 90</a:t>
+                      </a:r>
+                      <a:endParaRPr lang="en-IN" sz="1200">
+                        <a:effectLst/>
+                        <a:latin typeface="Times New Roman" panose="02020603050405020304" pitchFamily="18" charset="0"/>
+                        <a:ea typeface="Calibri" panose="020F0502020204030204" pitchFamily="34" charset="0"/>
+                        <a:cs typeface="Times New Roman" panose="02020603050405020304" pitchFamily="18" charset="0"/>
+                      </a:endParaRPr>
+                    </a:p>
+                  </a:txBody>
+                  <a:tcPr marL="68580" marR="68580" marT="0" marB="0"/>
+                </a:tc>
+                <a:tc>
+                  <a:txBody>
+                    <a:bodyPr/>
+                    <a:lstStyle/>
+                    <a:p>
+                      <a:pPr>
+                        <a:lnSpc>
+                          <a:spcPct val="200000"/>
+                        </a:lnSpc>
+                        <a:spcAft>
+                          <a:spcPts val="0"/>
+                        </a:spcAft>
+                      </a:pPr>
+                      <a:r>
+                        <a:rPr lang="en-IN" sz="1200" dirty="0">
+                          <a:solidFill>
+                            <a:srgbClr val="0070C0"/>
+                          </a:solidFill>
+                          <a:effectLst/>
+                        </a:rPr>
+                        <a:t>360 - 846</a:t>
+                      </a:r>
+                      <a:endParaRPr lang="en-IN" sz="1200" dirty="0">
+                        <a:solidFill>
+                          <a:srgbClr val="0070C0"/>
+                        </a:solidFill>
+                        <a:effectLst/>
+                        <a:latin typeface="Times New Roman" panose="02020603050405020304" pitchFamily="18" charset="0"/>
+                        <a:ea typeface="Calibri" panose="020F0502020204030204" pitchFamily="34" charset="0"/>
+                        <a:cs typeface="Times New Roman" panose="02020603050405020304" pitchFamily="18" charset="0"/>
+                      </a:endParaRPr>
+                    </a:p>
+                  </a:txBody>
+                  <a:tcPr marL="68580" marR="68580" marT="0" marB="0"/>
+                </a:tc>
+                <a:tc>
+                  <a:txBody>
+                    <a:bodyPr/>
+                    <a:lstStyle/>
+                    <a:p>
+                      <a:pPr>
+                        <a:lnSpc>
+                          <a:spcPct val="200000"/>
+                        </a:lnSpc>
+                        <a:spcAft>
+                          <a:spcPts val="0"/>
+                        </a:spcAft>
+                      </a:pPr>
+                      <a:r>
+                        <a:rPr lang="en-IN" sz="1200">
+                          <a:effectLst/>
+                        </a:rPr>
+                        <a:t>28 - 46.2</a:t>
+                      </a:r>
+                      <a:endParaRPr lang="en-IN" sz="1200">
+                        <a:effectLst/>
+                        <a:latin typeface="Times New Roman" panose="02020603050405020304" pitchFamily="18" charset="0"/>
+                        <a:ea typeface="Calibri" panose="020F0502020204030204" pitchFamily="34" charset="0"/>
+                        <a:cs typeface="Times New Roman" panose="02020603050405020304" pitchFamily="18" charset="0"/>
+                      </a:endParaRPr>
+                    </a:p>
+                  </a:txBody>
+                  <a:tcPr marL="68580" marR="68580" marT="0" marB="0"/>
+                </a:tc>
+                <a:tc>
+                  <a:txBody>
+                    <a:bodyPr/>
+                    <a:lstStyle/>
+                    <a:p>
+                      <a:pPr>
+                        <a:lnSpc>
+                          <a:spcPct val="200000"/>
+                        </a:lnSpc>
+                        <a:spcAft>
+                          <a:spcPts val="0"/>
+                        </a:spcAft>
+                      </a:pPr>
+                      <a:r>
+                        <a:rPr lang="en-IN" sz="1200">
+                          <a:effectLst/>
+                        </a:rPr>
+                        <a:t>21 - 60</a:t>
+                      </a:r>
+                      <a:endParaRPr lang="en-IN" sz="1200">
+                        <a:effectLst/>
+                        <a:latin typeface="Times New Roman" panose="02020603050405020304" pitchFamily="18" charset="0"/>
+                        <a:ea typeface="Calibri" panose="020F0502020204030204" pitchFamily="34" charset="0"/>
+                        <a:cs typeface="Times New Roman" panose="02020603050405020304" pitchFamily="18" charset="0"/>
+                      </a:endParaRPr>
+                    </a:p>
+                  </a:txBody>
+                  <a:tcPr marL="68580" marR="68580" marT="0" marB="0"/>
+                </a:tc>
+                <a:extLst>
+                  <a:ext uri="{0D108BD9-81ED-4DB2-BD59-A6C34878D82A}">
+                    <a16:rowId xmlns:a16="http://schemas.microsoft.com/office/drawing/2014/main" val="728665827"/>
+                  </a:ext>
+                </a:extLst>
+              </a:tr>
+              <a:tr h="0">
+                <a:tc>
+                  <a:txBody>
+                    <a:bodyPr/>
+                    <a:lstStyle/>
+                    <a:p>
+                      <a:pPr>
+                        <a:lnSpc>
+                          <a:spcPct val="200000"/>
+                        </a:lnSpc>
+                        <a:spcAft>
+                          <a:spcPts val="0"/>
+                        </a:spcAft>
+                      </a:pPr>
+                      <a:r>
+                        <a:rPr lang="en-IN" sz="1200">
+                          <a:effectLst/>
+                        </a:rPr>
+                        <a:t>Cluster 3</a:t>
+                      </a:r>
+                      <a:endParaRPr lang="en-IN" sz="1200">
+                        <a:effectLst/>
+                        <a:latin typeface="Times New Roman" panose="02020603050405020304" pitchFamily="18" charset="0"/>
+                        <a:ea typeface="Calibri" panose="020F0502020204030204" pitchFamily="34" charset="0"/>
+                        <a:cs typeface="Times New Roman" panose="02020603050405020304" pitchFamily="18" charset="0"/>
+                      </a:endParaRPr>
+                    </a:p>
+                  </a:txBody>
+                  <a:tcPr marL="68580" marR="68580" marT="0" marB="0"/>
+                </a:tc>
+                <a:tc>
+                  <a:txBody>
+                    <a:bodyPr/>
+                    <a:lstStyle/>
+                    <a:p>
+                      <a:pPr>
+                        <a:lnSpc>
+                          <a:spcPct val="200000"/>
+                        </a:lnSpc>
+                        <a:spcAft>
+                          <a:spcPts val="0"/>
+                        </a:spcAft>
+                      </a:pPr>
+                      <a:r>
+                        <a:rPr lang="en-IN" sz="1200">
+                          <a:effectLst/>
+                        </a:rPr>
+                        <a:t>78 - 199</a:t>
+                      </a:r>
+                      <a:endParaRPr lang="en-IN" sz="1200">
+                        <a:effectLst/>
+                        <a:latin typeface="Times New Roman" panose="02020603050405020304" pitchFamily="18" charset="0"/>
+                        <a:ea typeface="Calibri" panose="020F0502020204030204" pitchFamily="34" charset="0"/>
+                        <a:cs typeface="Times New Roman" panose="02020603050405020304" pitchFamily="18" charset="0"/>
+                      </a:endParaRPr>
+                    </a:p>
+                  </a:txBody>
+                  <a:tcPr marL="68580" marR="68580" marT="0" marB="0"/>
+                </a:tc>
+                <a:tc>
+                  <a:txBody>
+                    <a:bodyPr/>
+                    <a:lstStyle/>
+                    <a:p>
+                      <a:pPr>
+                        <a:lnSpc>
+                          <a:spcPct val="200000"/>
+                        </a:lnSpc>
+                        <a:spcAft>
+                          <a:spcPts val="0"/>
+                        </a:spcAft>
+                      </a:pPr>
+                      <a:r>
+                        <a:rPr lang="en-IN" sz="1200">
+                          <a:effectLst/>
+                        </a:rPr>
+                        <a:t>50 - 114</a:t>
+                      </a:r>
+                      <a:endParaRPr lang="en-IN" sz="1200">
+                        <a:effectLst/>
+                        <a:latin typeface="Times New Roman" panose="02020603050405020304" pitchFamily="18" charset="0"/>
+                        <a:ea typeface="Calibri" panose="020F0502020204030204" pitchFamily="34" charset="0"/>
+                        <a:cs typeface="Times New Roman" panose="02020603050405020304" pitchFamily="18" charset="0"/>
+                      </a:endParaRPr>
+                    </a:p>
+                  </a:txBody>
+                  <a:tcPr marL="68580" marR="68580" marT="0" marB="0"/>
+                </a:tc>
+                <a:tc>
+                  <a:txBody>
+                    <a:bodyPr/>
+                    <a:lstStyle/>
+                    <a:p>
+                      <a:pPr>
+                        <a:lnSpc>
+                          <a:spcPct val="200000"/>
+                        </a:lnSpc>
+                        <a:spcAft>
+                          <a:spcPts val="0"/>
+                        </a:spcAft>
+                      </a:pPr>
+                      <a:r>
+                        <a:rPr lang="en-IN" sz="1200" dirty="0">
+                          <a:solidFill>
+                            <a:srgbClr val="0070C0"/>
+                          </a:solidFill>
+                          <a:effectLst/>
+                        </a:rPr>
+                        <a:t>0 - 91</a:t>
+                      </a:r>
+                      <a:endParaRPr lang="en-IN" sz="1200" dirty="0">
+                        <a:solidFill>
+                          <a:srgbClr val="0070C0"/>
+                        </a:solidFill>
+                        <a:effectLst/>
+                        <a:latin typeface="Times New Roman" panose="02020603050405020304" pitchFamily="18" charset="0"/>
+                        <a:ea typeface="Calibri" panose="020F0502020204030204" pitchFamily="34" charset="0"/>
+                        <a:cs typeface="Times New Roman" panose="02020603050405020304" pitchFamily="18" charset="0"/>
+                      </a:endParaRPr>
+                    </a:p>
+                  </a:txBody>
+                  <a:tcPr marL="68580" marR="68580" marT="0" marB="0"/>
+                </a:tc>
+                <a:tc>
+                  <a:txBody>
+                    <a:bodyPr/>
+                    <a:lstStyle/>
+                    <a:p>
+                      <a:pPr>
+                        <a:lnSpc>
+                          <a:spcPct val="200000"/>
+                        </a:lnSpc>
+                        <a:spcAft>
+                          <a:spcPts val="0"/>
+                        </a:spcAft>
+                      </a:pPr>
+                      <a:r>
+                        <a:rPr lang="en-IN" sz="1200">
+                          <a:effectLst/>
+                        </a:rPr>
+                        <a:t>22.9 - 59.4</a:t>
+                      </a:r>
+                      <a:endParaRPr lang="en-IN" sz="1200">
+                        <a:effectLst/>
+                        <a:latin typeface="Times New Roman" panose="02020603050405020304" pitchFamily="18" charset="0"/>
+                        <a:ea typeface="Calibri" panose="020F0502020204030204" pitchFamily="34" charset="0"/>
+                        <a:cs typeface="Times New Roman" panose="02020603050405020304" pitchFamily="18" charset="0"/>
+                      </a:endParaRPr>
+                    </a:p>
+                  </a:txBody>
+                  <a:tcPr marL="68580" marR="68580" marT="0" marB="0"/>
+                </a:tc>
+                <a:tc>
+                  <a:txBody>
+                    <a:bodyPr/>
+                    <a:lstStyle/>
+                    <a:p>
+                      <a:pPr>
+                        <a:lnSpc>
+                          <a:spcPct val="200000"/>
+                        </a:lnSpc>
+                        <a:spcAft>
+                          <a:spcPts val="0"/>
+                        </a:spcAft>
+                      </a:pPr>
+                      <a:r>
+                        <a:rPr lang="en-IN" sz="1200" dirty="0">
+                          <a:effectLst/>
+                        </a:rPr>
+                        <a:t>21 - 70</a:t>
+                      </a:r>
+                      <a:endParaRPr lang="en-IN" sz="1200" dirty="0">
+                        <a:effectLst/>
+                        <a:latin typeface="Times New Roman" panose="02020603050405020304" pitchFamily="18" charset="0"/>
+                        <a:ea typeface="Calibri" panose="020F0502020204030204" pitchFamily="34" charset="0"/>
+                        <a:cs typeface="Times New Roman" panose="02020603050405020304" pitchFamily="18" charset="0"/>
+                      </a:endParaRPr>
+                    </a:p>
+                  </a:txBody>
+                  <a:tcPr marL="68580" marR="68580" marT="0" marB="0"/>
+                </a:tc>
+                <a:extLst>
+                  <a:ext uri="{0D108BD9-81ED-4DB2-BD59-A6C34878D82A}">
+                    <a16:rowId xmlns:a16="http://schemas.microsoft.com/office/drawing/2014/main" val="3000143739"/>
+                  </a:ext>
+                </a:extLst>
+              </a:tr>
+            </a:tbl>
+          </a:graphicData>
+        </a:graphic>
+      </p:graphicFrame>
     </p:spTree>
     <p:extLst>
       <p:ext uri="{BB962C8B-B14F-4D97-AF65-F5344CB8AC3E}">
@@ -6289,6 +9342,13 @@
   <p:clrMapOvr>
     <a:masterClrMapping/>
   </p:clrMapOvr>
+  <p:timing>
+    <p:tnLst>
+      <p:par>
+        <p:cTn id="1" dur="indefinite" restart="never" nodeType="tmRoot"/>
+      </p:par>
+    </p:tnLst>
+  </p:timing>
 </p:sld>
 </file>
 
@@ -6406,7 +9466,15 @@
             </a:r>
             <a:r>
               <a:rPr lang="en-IN" sz="1600" dirty="0"/>
-              <a:t>  = 5, generated 2 clusters </a:t>
+              <a:t>  = </a:t>
+            </a:r>
+            <a:r>
+              <a:rPr lang="en-IN" sz="1600" dirty="0" smtClean="0"/>
+              <a:t>3, </a:t>
+            </a:r>
+            <a:r>
+              <a:rPr lang="en-IN" sz="1600" dirty="0"/>
+              <a:t>generated 2 clusters </a:t>
             </a:r>
             <a:br>
               <a:rPr lang="en-IN" sz="1600" dirty="0"/>
@@ -6512,21 +9580,592 @@
           <p:nvPr/>
         </p:nvPicPr>
         <p:blipFill>
-          <a:blip r:embed="rId2"/>
+          <a:blip r:embed="rId3"/>
           <a:stretch>
             <a:fillRect/>
           </a:stretch>
         </p:blipFill>
         <p:spPr>
           <a:xfrm>
-            <a:off x="6776884" y="2573261"/>
-            <a:ext cx="4547710" cy="3369573"/>
+            <a:off x="7391401" y="1992236"/>
+            <a:ext cx="3764280" cy="3023416"/>
           </a:xfrm>
           <a:prstGeom prst="rect">
             <a:avLst/>
           </a:prstGeom>
         </p:spPr>
       </p:pic>
+      <p:pic>
+        <p:nvPicPr>
+          <p:cNvPr id="6" name="Picture 5"/>
+          <p:cNvPicPr>
+            <a:picLocks noChangeAspect="1"/>
+          </p:cNvPicPr>
+          <p:nvPr/>
+        </p:nvPicPr>
+        <p:blipFill>
+          <a:blip r:embed="rId4"/>
+          <a:stretch>
+            <a:fillRect/>
+          </a:stretch>
+        </p:blipFill>
+        <p:spPr>
+          <a:xfrm>
+            <a:off x="2060949" y="3988646"/>
+            <a:ext cx="3663575" cy="2391833"/>
+          </a:xfrm>
+          <a:prstGeom prst="rect">
+            <a:avLst/>
+          </a:prstGeom>
+        </p:spPr>
+      </p:pic>
+      <p:graphicFrame>
+        <p:nvGraphicFramePr>
+          <p:cNvPr id="7" name="Table 6"/>
+          <p:cNvGraphicFramePr>
+            <a:graphicFrameLocks noGrp="1"/>
+          </p:cNvGraphicFramePr>
+          <p:nvPr>
+            <p:extLst>
+              <p:ext uri="{D42A27DB-BD31-4B8C-83A1-F6EECF244321}">
+                <p14:modId xmlns:p14="http://schemas.microsoft.com/office/powerpoint/2010/main" val="3856777292"/>
+              </p:ext>
+            </p:extLst>
+          </p:nvPr>
+        </p:nvGraphicFramePr>
+        <p:xfrm>
+          <a:off x="6253480" y="5046873"/>
+          <a:ext cx="4902200" cy="853440"/>
+        </p:xfrm>
+        <a:graphic>
+          <a:graphicData uri="http://schemas.openxmlformats.org/drawingml/2006/table">
+            <a:tbl>
+              <a:tblPr firstRow="1" firstCol="1" bandRow="1">
+                <a:tableStyleId>{5C22544A-7EE6-4342-B048-85BDC9FD1C3A}</a:tableStyleId>
+              </a:tblPr>
+              <a:tblGrid>
+                <a:gridCol w="863600">
+                  <a:extLst>
+                    <a:ext uri="{9D8B030D-6E8A-4147-A177-3AD203B41FA5}">
+                      <a16:colId xmlns:a16="http://schemas.microsoft.com/office/drawing/2014/main" val="429285687"/>
+                    </a:ext>
+                  </a:extLst>
+                </a:gridCol>
+                <a:gridCol w="749300">
+                  <a:extLst>
+                    <a:ext uri="{9D8B030D-6E8A-4147-A177-3AD203B41FA5}">
+                      <a16:colId xmlns:a16="http://schemas.microsoft.com/office/drawing/2014/main" val="3439050005"/>
+                    </a:ext>
+                  </a:extLst>
+                </a:gridCol>
+                <a:gridCol w="1104900">
+                  <a:extLst>
+                    <a:ext uri="{9D8B030D-6E8A-4147-A177-3AD203B41FA5}">
+                      <a16:colId xmlns:a16="http://schemas.microsoft.com/office/drawing/2014/main" val="713342803"/>
+                    </a:ext>
+                  </a:extLst>
+                </a:gridCol>
+                <a:gridCol w="749300">
+                  <a:extLst>
+                    <a:ext uri="{9D8B030D-6E8A-4147-A177-3AD203B41FA5}">
+                      <a16:colId xmlns:a16="http://schemas.microsoft.com/office/drawing/2014/main" val="659774604"/>
+                    </a:ext>
+                  </a:extLst>
+                </a:gridCol>
+                <a:gridCol w="825500">
+                  <a:extLst>
+                    <a:ext uri="{9D8B030D-6E8A-4147-A177-3AD203B41FA5}">
+                      <a16:colId xmlns:a16="http://schemas.microsoft.com/office/drawing/2014/main" val="954247102"/>
+                    </a:ext>
+                  </a:extLst>
+                </a:gridCol>
+                <a:gridCol w="609600">
+                  <a:extLst>
+                    <a:ext uri="{9D8B030D-6E8A-4147-A177-3AD203B41FA5}">
+                      <a16:colId xmlns:a16="http://schemas.microsoft.com/office/drawing/2014/main" val="465751917"/>
+                    </a:ext>
+                  </a:extLst>
+                </a:gridCol>
+              </a:tblGrid>
+              <a:tr h="419100">
+                <a:tc>
+                  <a:txBody>
+                    <a:bodyPr/>
+                    <a:lstStyle/>
+                    <a:p>
+                      <a:pPr algn="l" rtl="0" fontAlgn="ctr"/>
+                      <a:r>
+                        <a:rPr lang="en-US" sz="1200" u="none" strike="noStrike">
+                          <a:effectLst/>
+                        </a:rPr>
+                        <a:t>Cluster No.</a:t>
+                      </a:r>
+                      <a:endParaRPr lang="en-US" sz="1200" b="1" i="0" u="none" strike="noStrike">
+                        <a:solidFill>
+                          <a:srgbClr val="FFFFFF"/>
+                        </a:solidFill>
+                        <a:effectLst/>
+                        <a:latin typeface="Franklin Gothic Book" panose="020B0503020102020204" pitchFamily="34" charset="0"/>
+                      </a:endParaRPr>
+                    </a:p>
+                  </a:txBody>
+                  <a:tcPr marL="7620" marR="7620" marT="7620" marB="0" anchor="ctr"/>
+                </a:tc>
+                <a:tc>
+                  <a:txBody>
+                    <a:bodyPr/>
+                    <a:lstStyle/>
+                    <a:p>
+                      <a:pPr algn="l" rtl="0" fontAlgn="ctr"/>
+                      <a:r>
+                        <a:rPr lang="en-US" sz="1200" u="none" strike="noStrike">
+                          <a:effectLst/>
+                        </a:rPr>
+                        <a:t>Glucose</a:t>
+                      </a:r>
+                      <a:endParaRPr lang="en-US" sz="1200" b="1" i="0" u="none" strike="noStrike">
+                        <a:solidFill>
+                          <a:srgbClr val="FFFFFF"/>
+                        </a:solidFill>
+                        <a:effectLst/>
+                        <a:latin typeface="Franklin Gothic Book" panose="020B0503020102020204" pitchFamily="34" charset="0"/>
+                      </a:endParaRPr>
+                    </a:p>
+                  </a:txBody>
+                  <a:tcPr marL="7620" marR="7620" marT="7620" marB="0" anchor="ctr"/>
+                </a:tc>
+                <a:tc>
+                  <a:txBody>
+                    <a:bodyPr/>
+                    <a:lstStyle/>
+                    <a:p>
+                      <a:pPr algn="l" rtl="0" fontAlgn="ctr"/>
+                      <a:r>
+                        <a:rPr lang="en-US" sz="1200" u="none" strike="noStrike" dirty="0" err="1">
+                          <a:effectLst/>
+                        </a:rPr>
+                        <a:t>BloodPressure</a:t>
+                      </a:r>
+                      <a:endParaRPr lang="en-US" sz="1200" b="1" i="0" u="none" strike="noStrike" dirty="0">
+                        <a:solidFill>
+                          <a:srgbClr val="FFFFFF"/>
+                        </a:solidFill>
+                        <a:effectLst/>
+                        <a:latin typeface="Franklin Gothic Book" panose="020B0503020102020204" pitchFamily="34" charset="0"/>
+                      </a:endParaRPr>
+                    </a:p>
+                  </a:txBody>
+                  <a:tcPr marL="7620" marR="7620" marT="7620" marB="0" anchor="ctr"/>
+                </a:tc>
+                <a:tc>
+                  <a:txBody>
+                    <a:bodyPr/>
+                    <a:lstStyle/>
+                    <a:p>
+                      <a:pPr algn="l" rtl="0" fontAlgn="ctr"/>
+                      <a:r>
+                        <a:rPr lang="en-US" sz="1200" u="none" strike="noStrike">
+                          <a:effectLst/>
+                        </a:rPr>
+                        <a:t>Insulin</a:t>
+                      </a:r>
+                      <a:endParaRPr lang="en-US" sz="1200" b="1" i="0" u="none" strike="noStrike">
+                        <a:solidFill>
+                          <a:srgbClr val="FFFFFF"/>
+                        </a:solidFill>
+                        <a:effectLst/>
+                        <a:latin typeface="Franklin Gothic Book" panose="020B0503020102020204" pitchFamily="34" charset="0"/>
+                      </a:endParaRPr>
+                    </a:p>
+                  </a:txBody>
+                  <a:tcPr marL="7620" marR="7620" marT="7620" marB="0" anchor="ctr"/>
+                </a:tc>
+                <a:tc>
+                  <a:txBody>
+                    <a:bodyPr/>
+                    <a:lstStyle/>
+                    <a:p>
+                      <a:pPr algn="l" rtl="0" fontAlgn="ctr"/>
+                      <a:r>
+                        <a:rPr lang="en-US" sz="1200" u="none" strike="noStrike">
+                          <a:effectLst/>
+                        </a:rPr>
+                        <a:t>BMI</a:t>
+                      </a:r>
+                      <a:endParaRPr lang="en-US" sz="1200" b="1" i="0" u="none" strike="noStrike">
+                        <a:solidFill>
+                          <a:srgbClr val="FFFFFF"/>
+                        </a:solidFill>
+                        <a:effectLst/>
+                        <a:latin typeface="Franklin Gothic Book" panose="020B0503020102020204" pitchFamily="34" charset="0"/>
+                      </a:endParaRPr>
+                    </a:p>
+                  </a:txBody>
+                  <a:tcPr marL="7620" marR="7620" marT="7620" marB="0" anchor="ctr"/>
+                </a:tc>
+                <a:tc>
+                  <a:txBody>
+                    <a:bodyPr/>
+                    <a:lstStyle/>
+                    <a:p>
+                      <a:pPr algn="l" rtl="0" fontAlgn="ctr"/>
+                      <a:r>
+                        <a:rPr lang="en-US" sz="1200" u="none" strike="noStrike">
+                          <a:effectLst/>
+                        </a:rPr>
+                        <a:t>Age</a:t>
+                      </a:r>
+                      <a:endParaRPr lang="en-US" sz="1200" b="1" i="0" u="none" strike="noStrike">
+                        <a:solidFill>
+                          <a:srgbClr val="FFFFFF"/>
+                        </a:solidFill>
+                        <a:effectLst/>
+                        <a:latin typeface="Franklin Gothic Book" panose="020B0503020102020204" pitchFamily="34" charset="0"/>
+                      </a:endParaRPr>
+                    </a:p>
+                  </a:txBody>
+                  <a:tcPr marL="7620" marR="7620" marT="7620" marB="0" anchor="ctr"/>
+                </a:tc>
+                <a:extLst>
+                  <a:ext uri="{0D108BD9-81ED-4DB2-BD59-A6C34878D82A}">
+                    <a16:rowId xmlns:a16="http://schemas.microsoft.com/office/drawing/2014/main" val="2153869982"/>
+                  </a:ext>
+                </a:extLst>
+              </a:tr>
+              <a:tr h="220980">
+                <a:tc>
+                  <a:txBody>
+                    <a:bodyPr/>
+                    <a:lstStyle/>
+                    <a:p>
+                      <a:pPr algn="l" rtl="0" fontAlgn="ctr"/>
+                      <a:r>
+                        <a:rPr lang="en-US" sz="1200" u="none" strike="noStrike">
+                          <a:effectLst/>
+                        </a:rPr>
+                        <a:t>Cluster 1</a:t>
+                      </a:r>
+                      <a:endParaRPr lang="en-US" sz="1200" b="1" i="0" u="none" strike="noStrike">
+                        <a:solidFill>
+                          <a:srgbClr val="FFFFFF"/>
+                        </a:solidFill>
+                        <a:effectLst/>
+                        <a:latin typeface="Franklin Gothic Book" panose="020B0503020102020204" pitchFamily="34" charset="0"/>
+                      </a:endParaRPr>
+                    </a:p>
+                  </a:txBody>
+                  <a:tcPr marL="7620" marR="7620" marT="7620" marB="0" anchor="ctr"/>
+                </a:tc>
+                <a:tc>
+                  <a:txBody>
+                    <a:bodyPr/>
+                    <a:lstStyle/>
+                    <a:p>
+                      <a:pPr algn="l" rtl="0" fontAlgn="ctr"/>
+                      <a:r>
+                        <a:rPr lang="en-US" sz="1200" u="none" strike="noStrike">
+                          <a:effectLst/>
+                        </a:rPr>
+                        <a:t>78 - 199</a:t>
+                      </a:r>
+                      <a:endParaRPr lang="en-US" sz="1200" b="0" i="0" u="none" strike="noStrike">
+                        <a:solidFill>
+                          <a:srgbClr val="000000"/>
+                        </a:solidFill>
+                        <a:effectLst/>
+                        <a:latin typeface="Franklin Gothic Book" panose="020B0503020102020204" pitchFamily="34" charset="0"/>
+                      </a:endParaRPr>
+                    </a:p>
+                  </a:txBody>
+                  <a:tcPr marL="7620" marR="7620" marT="7620" marB="0" anchor="ctr"/>
+                </a:tc>
+                <a:tc>
+                  <a:txBody>
+                    <a:bodyPr/>
+                    <a:lstStyle/>
+                    <a:p>
+                      <a:pPr algn="l" rtl="0" fontAlgn="ctr"/>
+                      <a:r>
+                        <a:rPr lang="en-US" sz="1200" u="none" strike="noStrike">
+                          <a:effectLst/>
+                        </a:rPr>
+                        <a:t>30 - 114</a:t>
+                      </a:r>
+                      <a:endParaRPr lang="en-US" sz="1200" b="0" i="0" u="none" strike="noStrike">
+                        <a:solidFill>
+                          <a:srgbClr val="000000"/>
+                        </a:solidFill>
+                        <a:effectLst/>
+                        <a:latin typeface="Franklin Gothic Book" panose="020B0503020102020204" pitchFamily="34" charset="0"/>
+                      </a:endParaRPr>
+                    </a:p>
+                  </a:txBody>
+                  <a:tcPr marL="7620" marR="7620" marT="7620" marB="0" anchor="ctr"/>
+                </a:tc>
+                <a:tc>
+                  <a:txBody>
+                    <a:bodyPr/>
+                    <a:lstStyle/>
+                    <a:p>
+                      <a:pPr algn="l" rtl="0" fontAlgn="ctr"/>
+                      <a:r>
+                        <a:rPr lang="en-US" sz="1200" u="none" strike="noStrike" dirty="0" smtClean="0">
+                          <a:effectLst/>
+                        </a:rPr>
+                        <a:t> </a:t>
+                      </a:r>
+                      <a:r>
+                        <a:rPr lang="en-US" sz="1200" kern="1200" dirty="0" smtClean="0">
+                          <a:solidFill>
+                            <a:srgbClr val="0070C0"/>
+                          </a:solidFill>
+                          <a:effectLst/>
+                          <a:latin typeface="+mn-lt"/>
+                          <a:ea typeface="+mn-ea"/>
+                          <a:cs typeface="+mn-cs"/>
+                        </a:rPr>
+                        <a:t>0 </a:t>
+                      </a:r>
+                      <a:r>
+                        <a:rPr lang="en-US" sz="1200" u="none" strike="noStrike" dirty="0">
+                          <a:effectLst/>
+                        </a:rPr>
+                        <a:t>- </a:t>
+                      </a:r>
+                      <a:r>
+                        <a:rPr lang="en-US" sz="1200" kern="1200" dirty="0">
+                          <a:solidFill>
+                            <a:srgbClr val="0070C0"/>
+                          </a:solidFill>
+                          <a:effectLst/>
+                          <a:latin typeface="+mn-lt"/>
+                          <a:ea typeface="+mn-ea"/>
+                          <a:cs typeface="+mn-cs"/>
+                        </a:rPr>
+                        <a:t>392</a:t>
+                      </a:r>
+                    </a:p>
+                  </a:txBody>
+                  <a:tcPr marL="7620" marR="7620" marT="7620" marB="0" anchor="ctr"/>
+                </a:tc>
+                <a:tc>
+                  <a:txBody>
+                    <a:bodyPr/>
+                    <a:lstStyle/>
+                    <a:p>
+                      <a:pPr algn="l" rtl="0" fontAlgn="ctr"/>
+                      <a:r>
+                        <a:rPr lang="en-US" sz="1200" u="none" strike="noStrike">
+                          <a:effectLst/>
+                        </a:rPr>
+                        <a:t>22.9 - 67.1</a:t>
+                      </a:r>
+                      <a:endParaRPr lang="en-US" sz="1200" b="0" i="0" u="none" strike="noStrike">
+                        <a:solidFill>
+                          <a:srgbClr val="000000"/>
+                        </a:solidFill>
+                        <a:effectLst/>
+                        <a:latin typeface="Franklin Gothic Book" panose="020B0503020102020204" pitchFamily="34" charset="0"/>
+                      </a:endParaRPr>
+                    </a:p>
+                  </a:txBody>
+                  <a:tcPr marL="7620" marR="7620" marT="7620" marB="0" anchor="ctr"/>
+                </a:tc>
+                <a:tc>
+                  <a:txBody>
+                    <a:bodyPr/>
+                    <a:lstStyle/>
+                    <a:p>
+                      <a:pPr algn="l" rtl="0" fontAlgn="ctr"/>
+                      <a:r>
+                        <a:rPr lang="en-US" sz="1200" u="none" strike="noStrike">
+                          <a:effectLst/>
+                        </a:rPr>
+                        <a:t>21 - 70</a:t>
+                      </a:r>
+                      <a:endParaRPr lang="en-US" sz="1200" b="0" i="0" u="none" strike="noStrike">
+                        <a:solidFill>
+                          <a:srgbClr val="000000"/>
+                        </a:solidFill>
+                        <a:effectLst/>
+                        <a:latin typeface="Franklin Gothic Book" panose="020B0503020102020204" pitchFamily="34" charset="0"/>
+                      </a:endParaRPr>
+                    </a:p>
+                  </a:txBody>
+                  <a:tcPr marL="7620" marR="7620" marT="7620" marB="0" anchor="ctr"/>
+                </a:tc>
+                <a:extLst>
+                  <a:ext uri="{0D108BD9-81ED-4DB2-BD59-A6C34878D82A}">
+                    <a16:rowId xmlns:a16="http://schemas.microsoft.com/office/drawing/2014/main" val="3104726674"/>
+                  </a:ext>
+                </a:extLst>
+              </a:tr>
+              <a:tr h="213360">
+                <a:tc>
+                  <a:txBody>
+                    <a:bodyPr/>
+                    <a:lstStyle/>
+                    <a:p>
+                      <a:pPr algn="l" rtl="0" fontAlgn="ctr"/>
+                      <a:r>
+                        <a:rPr lang="en-US" sz="1200" u="none" strike="noStrike">
+                          <a:effectLst/>
+                        </a:rPr>
+                        <a:t>Cluster 2</a:t>
+                      </a:r>
+                      <a:endParaRPr lang="en-US" sz="1200" b="1" i="0" u="none" strike="noStrike">
+                        <a:solidFill>
+                          <a:srgbClr val="FFFFFF"/>
+                        </a:solidFill>
+                        <a:effectLst/>
+                        <a:latin typeface="Franklin Gothic Book" panose="020B0503020102020204" pitchFamily="34" charset="0"/>
+                      </a:endParaRPr>
+                    </a:p>
+                  </a:txBody>
+                  <a:tcPr marL="7620" marR="7620" marT="7620" marB="0" anchor="ctr"/>
+                </a:tc>
+                <a:tc>
+                  <a:txBody>
+                    <a:bodyPr/>
+                    <a:lstStyle/>
+                    <a:p>
+                      <a:pPr algn="l" rtl="0" fontAlgn="ctr"/>
+                      <a:r>
+                        <a:rPr lang="en-US" sz="1200" u="none" strike="noStrike">
+                          <a:effectLst/>
+                        </a:rPr>
+                        <a:t>142 - 197</a:t>
+                      </a:r>
+                      <a:endParaRPr lang="en-US" sz="1200" b="0" i="0" u="none" strike="noStrike">
+                        <a:solidFill>
+                          <a:srgbClr val="000000"/>
+                        </a:solidFill>
+                        <a:effectLst/>
+                        <a:latin typeface="Franklin Gothic Book" panose="020B0503020102020204" pitchFamily="34" charset="0"/>
+                      </a:endParaRPr>
+                    </a:p>
+                  </a:txBody>
+                  <a:tcPr marL="7620" marR="7620" marT="7620" marB="0" anchor="ctr"/>
+                </a:tc>
+                <a:tc>
+                  <a:txBody>
+                    <a:bodyPr/>
+                    <a:lstStyle/>
+                    <a:p>
+                      <a:pPr algn="l" rtl="0" fontAlgn="ctr"/>
+                      <a:r>
+                        <a:rPr lang="en-US" sz="1200" u="none" strike="noStrike">
+                          <a:effectLst/>
+                        </a:rPr>
+                        <a:t>52 - 90</a:t>
+                      </a:r>
+                      <a:endParaRPr lang="en-US" sz="1200" b="0" i="0" u="none" strike="noStrike">
+                        <a:solidFill>
+                          <a:srgbClr val="000000"/>
+                        </a:solidFill>
+                        <a:effectLst/>
+                        <a:latin typeface="Franklin Gothic Book" panose="020B0503020102020204" pitchFamily="34" charset="0"/>
+                      </a:endParaRPr>
+                    </a:p>
+                  </a:txBody>
+                  <a:tcPr marL="7620" marR="7620" marT="7620" marB="0" anchor="ctr"/>
+                </a:tc>
+                <a:tc>
+                  <a:txBody>
+                    <a:bodyPr/>
+                    <a:lstStyle/>
+                    <a:p>
+                      <a:pPr algn="l" rtl="0" fontAlgn="ctr"/>
+                      <a:r>
+                        <a:rPr lang="en-US" sz="1200" kern="1200" dirty="0">
+                          <a:solidFill>
+                            <a:srgbClr val="0070C0"/>
+                          </a:solidFill>
+                          <a:effectLst/>
+                          <a:latin typeface="+mn-lt"/>
+                          <a:ea typeface="+mn-ea"/>
+                          <a:cs typeface="+mn-cs"/>
+                        </a:rPr>
+                        <a:t>465</a:t>
+                      </a:r>
+                      <a:r>
+                        <a:rPr lang="en-US" sz="1200" u="none" strike="noStrike" dirty="0">
+                          <a:effectLst/>
+                        </a:rPr>
+                        <a:t> - </a:t>
+                      </a:r>
+                      <a:r>
+                        <a:rPr lang="en-US" sz="1200" kern="1200" dirty="0">
+                          <a:solidFill>
+                            <a:srgbClr val="0070C0"/>
+                          </a:solidFill>
+                          <a:effectLst/>
+                          <a:latin typeface="+mn-lt"/>
+                          <a:ea typeface="+mn-ea"/>
+                          <a:cs typeface="+mn-cs"/>
+                        </a:rPr>
+                        <a:t>579</a:t>
+                      </a:r>
+                    </a:p>
+                  </a:txBody>
+                  <a:tcPr marL="7620" marR="7620" marT="7620" marB="0" anchor="ctr"/>
+                </a:tc>
+                <a:tc>
+                  <a:txBody>
+                    <a:bodyPr/>
+                    <a:lstStyle/>
+                    <a:p>
+                      <a:pPr algn="l" rtl="0" fontAlgn="ctr"/>
+                      <a:r>
+                        <a:rPr lang="en-US" sz="1200" u="none" strike="noStrike">
+                          <a:effectLst/>
+                        </a:rPr>
+                        <a:t>30.1 - 43.3</a:t>
+                      </a:r>
+                      <a:endParaRPr lang="en-US" sz="1200" b="0" i="0" u="none" strike="noStrike">
+                        <a:solidFill>
+                          <a:srgbClr val="000000"/>
+                        </a:solidFill>
+                        <a:effectLst/>
+                        <a:latin typeface="Franklin Gothic Book" panose="020B0503020102020204" pitchFamily="34" charset="0"/>
+                      </a:endParaRPr>
+                    </a:p>
+                  </a:txBody>
+                  <a:tcPr marL="7620" marR="7620" marT="7620" marB="0" anchor="ctr"/>
+                </a:tc>
+                <a:tc>
+                  <a:txBody>
+                    <a:bodyPr/>
+                    <a:lstStyle/>
+                    <a:p>
+                      <a:pPr algn="l" rtl="0" fontAlgn="ctr"/>
+                      <a:r>
+                        <a:rPr lang="en-US" sz="1200" u="none" strike="noStrike" dirty="0">
+                          <a:effectLst/>
+                        </a:rPr>
+                        <a:t>21 - 60</a:t>
+                      </a:r>
+                      <a:endParaRPr lang="en-US" sz="1200" b="0" i="0" u="none" strike="noStrike" dirty="0">
+                        <a:solidFill>
+                          <a:srgbClr val="000000"/>
+                        </a:solidFill>
+                        <a:effectLst/>
+                        <a:latin typeface="Franklin Gothic Book" panose="020B0503020102020204" pitchFamily="34" charset="0"/>
+                      </a:endParaRPr>
+                    </a:p>
+                  </a:txBody>
+                  <a:tcPr marL="7620" marR="7620" marT="7620" marB="0" anchor="ctr"/>
+                </a:tc>
+                <a:extLst>
+                  <a:ext uri="{0D108BD9-81ED-4DB2-BD59-A6C34878D82A}">
+                    <a16:rowId xmlns:a16="http://schemas.microsoft.com/office/drawing/2014/main" val="2811778985"/>
+                  </a:ext>
+                </a:extLst>
+              </a:tr>
+            </a:tbl>
+          </a:graphicData>
+        </a:graphic>
+      </p:graphicFrame>
     </p:spTree>
     <p:extLst>
       <p:ext uri="{BB962C8B-B14F-4D97-AF65-F5344CB8AC3E}">
@@ -6537,6 +10176,13 @@
   <p:clrMapOvr>
     <a:masterClrMapping/>
   </p:clrMapOvr>
+  <p:timing>
+    <p:tnLst>
+      <p:par>
+        <p:cTn id="1" dur="indefinite" restart="never" nodeType="tmRoot"/>
+      </p:par>
+    </p:tnLst>
+  </p:timing>
 </p:sld>
 </file>
 
@@ -6728,7 +10374,7 @@
           <p:nvPr/>
         </p:nvPicPr>
         <p:blipFill>
-          <a:blip r:embed="rId2"/>
+          <a:blip r:embed="rId3"/>
           <a:stretch>
             <a:fillRect/>
           </a:stretch>
@@ -6756,7 +10402,7 @@
           <p:nvPr/>
         </p:nvPicPr>
         <p:blipFill>
-          <a:blip r:embed="rId3"/>
+          <a:blip r:embed="rId4"/>
           <a:stretch>
             <a:fillRect/>
           </a:stretch>
@@ -6784,7 +10430,7 @@
           <p:nvPr/>
         </p:nvPicPr>
         <p:blipFill>
-          <a:blip r:embed="rId4"/>
+          <a:blip r:embed="rId5"/>
           <a:stretch>
             <a:fillRect/>
           </a:stretch>
@@ -6812,7 +10458,7 @@
           <p:nvPr/>
         </p:nvPicPr>
         <p:blipFill>
-          <a:blip r:embed="rId5">
+          <a:blip r:embed="rId6">
             <a:extLst>
               <a:ext uri="{28A0092B-C50C-407E-A947-70E740481C1C}">
                 <a14:useLocalDpi xmlns:a14="http://schemas.microsoft.com/office/drawing/2010/main" val="0"/>
@@ -6847,6 +10493,13 @@
   <p:clrMapOvr>
     <a:masterClrMapping/>
   </p:clrMapOvr>
+  <p:timing>
+    <p:tnLst>
+      <p:par>
+        <p:cTn id="1" dur="indefinite" restart="never" nodeType="tmRoot"/>
+      </p:par>
+    </p:tnLst>
+  </p:timing>
 </p:sld>
 </file>
 
@@ -7046,7 +10699,7 @@
         </p:nvGraphicFramePr>
         <p:xfrm>
           <a:off x="5796193" y="4629572"/>
-          <a:ext cx="5587394" cy="1239520"/>
+          <a:ext cx="5587394" cy="1463040"/>
         </p:xfrm>
         <a:graphic>
           <a:graphicData uri="http://schemas.openxmlformats.org/drawingml/2006/table">
@@ -7854,6 +11507,13 @@
   <p:clrMapOvr>
     <a:masterClrMapping/>
   </p:clrMapOvr>
+  <p:timing>
+    <p:tnLst>
+      <p:par>
+        <p:cTn id="1" dur="indefinite" restart="never" nodeType="tmRoot"/>
+      </p:par>
+    </p:tnLst>
+  </p:timing>
 </p:sld>
 </file>
 
@@ -7979,8 +11639,20 @@
             </a:br>
             <a:r>
               <a:rPr lang="en-IN" sz="1600" dirty="0"/>
-              <a:t>valid range (positive).</a:t>
-            </a:r>
+              <a:t>valid range (positive</a:t>
+            </a:r>
+            <a:r>
+              <a:rPr lang="en-IN" sz="1600" dirty="0" smtClean="0"/>
+              <a:t>).</a:t>
+            </a:r>
+          </a:p>
+          <a:p>
+            <a:pPr lvl="1"/>
+            <a:r>
+              <a:rPr lang="en-IN" sz="1600" dirty="0" smtClean="0"/>
+              <a:t>Conclusion: Unsupervised learning can detect risk based groups</a:t>
+            </a:r>
+            <a:endParaRPr lang="en-IN" sz="1600" dirty="0"/>
           </a:p>
           <a:p>
             <a:endParaRPr lang="en-IN" dirty="0"/>
@@ -8064,7 +11736,7 @@
           <p:nvPr/>
         </p:nvPicPr>
         <p:blipFill>
-          <a:blip r:embed="rId2"/>
+          <a:blip r:embed="rId3"/>
           <a:stretch>
             <a:fillRect/>
           </a:stretch>
@@ -8092,7 +11764,7 @@
           <p:nvPr/>
         </p:nvPicPr>
         <p:blipFill>
-          <a:blip r:embed="rId3"/>
+          <a:blip r:embed="rId4"/>
           <a:stretch>
             <a:fillRect/>
           </a:stretch>
@@ -8129,7 +11801,7 @@
         </p:nvGraphicFramePr>
         <p:xfrm>
           <a:off x="1097279" y="4329976"/>
-          <a:ext cx="5937250" cy="1239520"/>
+          <a:ext cx="5937250" cy="1463040"/>
         </p:xfrm>
         <a:graphic>
           <a:graphicData uri="http://schemas.openxmlformats.org/drawingml/2006/table">
@@ -8955,6 +12627,13 @@
   <p:clrMapOvr>
     <a:masterClrMapping/>
   </p:clrMapOvr>
+  <p:timing>
+    <p:tnLst>
+      <p:par>
+        <p:cTn id="1" dur="indefinite" restart="never" nodeType="tmRoot"/>
+      </p:par>
+    </p:tnLst>
+  </p:timing>
 </p:sld>
 </file>
 
@@ -9043,7 +12722,15 @@
             <a:pPr lvl="1"/>
             <a:r>
               <a:rPr lang="en-IN" sz="1600" dirty="0"/>
-              <a:t>Design was based on trend analysis of cluster sizes that are generated from the previous steps.</a:t>
+              <a:t>Design was based on trend analysis of </a:t>
+            </a:r>
+            <a:r>
+              <a:rPr lang="en-IN" sz="1600" dirty="0" smtClean="0"/>
+              <a:t>cluster (k=3) </a:t>
+            </a:r>
+            <a:r>
+              <a:rPr lang="en-IN" sz="1600" dirty="0"/>
+              <a:t>sizes that are generated from the previous steps.</a:t>
             </a:r>
           </a:p>
           <a:p>
@@ -9184,7 +12871,7 @@
         </p:nvGraphicFramePr>
         <p:xfrm>
           <a:off x="1333254" y="4898813"/>
-          <a:ext cx="6025902" cy="1136396"/>
+          <a:ext cx="6025902" cy="1341120"/>
         </p:xfrm>
         <a:graphic>
           <a:graphicData uri="http://schemas.openxmlformats.org/drawingml/2006/table">
@@ -10832,7 +14519,7 @@
           <p:nvPr/>
         </p:nvPicPr>
         <p:blipFill>
-          <a:blip r:embed="rId2">
+          <a:blip r:embed="rId3">
             <a:extLst>
               <a:ext uri="{28A0092B-C50C-407E-A947-70E740481C1C}">
                 <a14:useLocalDpi xmlns:a14="http://schemas.microsoft.com/office/drawing/2010/main" val="0"/>
@@ -10868,6 +14555,13 @@
   <p:clrMapOvr>
     <a:masterClrMapping/>
   </p:clrMapOvr>
+  <p:timing>
+    <p:tnLst>
+      <p:par>
+        <p:cTn id="1" dur="indefinite" restart="never" nodeType="tmRoot"/>
+      </p:par>
+    </p:tnLst>
+  </p:timing>
 </p:sld>
 </file>
 
@@ -10945,8 +14639,12 @@
               </a:lnSpc>
             </a:pPr>
             <a:r>
+              <a:rPr lang="en-IN" sz="2400" dirty="0" smtClean="0"/>
+              <a:t>Real-life </a:t>
+            </a:r>
+            <a:r>
               <a:rPr lang="en-IN" sz="2400" dirty="0"/>
-              <a:t>Real life data on diseases like Diabetes, is not easily separable into clusters using default method of K-means or DBSCAN method. Assumption related to good separated clusters should generate risk-based groups was found to be incorrect.</a:t>
+              <a:t>data on diseases like Diabetes, is not easily separable into clusters using default method of K-means or DBSCAN method. Assumption related to good separated clusters should generate risk-based groups was found to be incorrect.</a:t>
             </a:r>
           </a:p>
           <a:p>
@@ -11103,6 +14801,13 @@
   <p:clrMapOvr>
     <a:masterClrMapping/>
   </p:clrMapOvr>
+  <p:timing>
+    <p:tnLst>
+      <p:par>
+        <p:cTn id="1" dur="indefinite" restart="never" nodeType="tmRoot"/>
+      </p:par>
+    </p:tnLst>
+  </p:timing>
 </p:sld>
 </file>
 
@@ -11139,7 +14844,7 @@
                 <a16:creationId xmlns:a16="http://schemas.microsoft.com/office/drawing/2014/main" id="{FBDCECDC-EEE3-4128-AA5E-82A8C08796E8}"/>
               </a:ext>
               <a:ext uri="{C183D7F6-B498-43B3-948B-1728B52AA6E4}">
-                <adec:decorative xmlns:adec="http://schemas.microsoft.com/office/drawing/2017/decorative" val="1"/>
+                <adec:decorative xmlns:adec="http://schemas.microsoft.com/office/drawing/2017/decorative" xmlns="" val="1"/>
               </a:ext>
             </a:extLst>
           </p:cNvPr>
@@ -11242,7 +14947,7 @@
                 <a16:creationId xmlns:a16="http://schemas.microsoft.com/office/drawing/2014/main" id="{4260EDE0-989C-4E16-AF94-F652294D828E}"/>
               </a:ext>
               <a:ext uri="{C183D7F6-B498-43B3-948B-1728B52AA6E4}">
-                <adec:decorative xmlns:adec="http://schemas.microsoft.com/office/drawing/2017/decorative" val="1"/>
+                <adec:decorative xmlns:adec="http://schemas.microsoft.com/office/drawing/2017/decorative" xmlns="" val="1"/>
               </a:ext>
             </a:extLst>
           </p:cNvPr>
@@ -11394,6 +15099,13 @@
   <p:clrMapOvr>
     <a:masterClrMapping/>
   </p:clrMapOvr>
+  <p:timing>
+    <p:tnLst>
+      <p:par>
+        <p:cTn id="1" dur="indefinite" restart="never" nodeType="tmRoot"/>
+      </p:par>
+    </p:tnLst>
+  </p:timing>
 </p:sld>
 </file>
 
@@ -12180,6 +15892,13 @@
   <p:clrMapOvr>
     <a:masterClrMapping/>
   </p:clrMapOvr>
+  <p:timing>
+    <p:tnLst>
+      <p:par>
+        <p:cTn id="1" dur="indefinite" restart="never" nodeType="tmRoot"/>
+      </p:par>
+    </p:tnLst>
+  </p:timing>
 </p:sld>
 </file>
 
@@ -12395,7 +16114,7 @@
           <p:nvPr/>
         </p:nvPicPr>
         <p:blipFill>
-          <a:blip r:embed="rId2">
+          <a:blip r:embed="rId3">
             <a:extLst>
               <a:ext uri="{28A0092B-C50C-407E-A947-70E740481C1C}">
                 <a14:useLocalDpi xmlns:a14="http://schemas.microsoft.com/office/drawing/2010/main" val="0"/>
@@ -12426,6 +16145,13 @@
   <p:clrMapOvr>
     <a:masterClrMapping/>
   </p:clrMapOvr>
+  <p:timing>
+    <p:tnLst>
+      <p:par>
+        <p:cTn id="1" dur="indefinite" restart="never" nodeType="tmRoot"/>
+      </p:par>
+    </p:tnLst>
+  </p:timing>
 </p:sld>
 </file>
 
@@ -12493,46 +16219,71 @@
         <p:spPr/>
         <p:txBody>
           <a:bodyPr>
-            <a:normAutofit fontScale="47500" lnSpcReduction="20000"/>
+            <a:normAutofit fontScale="25000" lnSpcReduction="20000"/>
           </a:bodyPr>
           <a:lstStyle/>
           <a:p>
             <a:r>
-              <a:rPr lang="en-IN" sz="4200" dirty="0"/>
+              <a:rPr lang="en-IN" sz="7200" dirty="0"/>
               <a:t>Observations</a:t>
             </a:r>
           </a:p>
           <a:p>
             <a:pPr lvl="1"/>
             <a:r>
-              <a:rPr lang="en-IN" sz="3300" dirty="0"/>
+              <a:rPr lang="en-IN" sz="5600" dirty="0"/>
               <a:t>Current solutions have little or no way to assess the QoC.</a:t>
             </a:r>
           </a:p>
           <a:p>
             <a:pPr lvl="1"/>
             <a:r>
-              <a:rPr lang="en-IN" sz="3300" dirty="0"/>
+              <a:rPr lang="en-IN" sz="5600" dirty="0"/>
               <a:t>Knowledge related to QoC is observed in the people but is not yet implemented.</a:t>
             </a:r>
           </a:p>
           <a:p>
             <a:pPr lvl="1"/>
             <a:r>
-              <a:rPr lang="en-IN" sz="3300" dirty="0"/>
+              <a:rPr lang="en-IN" sz="5600" dirty="0"/>
               <a:t>Ad-hoc methods are adopted for QoC report generation on a need basis.</a:t>
             </a:r>
           </a:p>
           <a:p>
             <a:pPr lvl="1"/>
             <a:r>
-              <a:rPr lang="en-IN" sz="3300" dirty="0"/>
-              <a:t>Data needed for assessing QoC is present in the existing system.</a:t>
-            </a:r>
+              <a:rPr lang="en-IN" sz="5600" dirty="0"/>
+              <a:t>Data needed for assessing QoC is present in the existing </a:t>
+            </a:r>
+            <a:r>
+              <a:rPr lang="en-IN" sz="5600" dirty="0" smtClean="0"/>
+              <a:t>system.</a:t>
+            </a:r>
+          </a:p>
+          <a:p>
+            <a:pPr marL="201168" lvl="1" indent="0">
+              <a:buNone/>
+            </a:pPr>
+            <a:endParaRPr lang="en-IN" sz="5600" dirty="0" smtClean="0"/>
+          </a:p>
+          <a:p>
+            <a:r>
+              <a:rPr lang="en-IN" sz="8000" dirty="0" smtClean="0"/>
+              <a:t>Learning</a:t>
+            </a:r>
+            <a:endParaRPr lang="en-IN" sz="5600" dirty="0" smtClean="0"/>
           </a:p>
           <a:p>
             <a:pPr lvl="1"/>
-            <a:endParaRPr lang="en-IN" sz="2500" dirty="0"/>
+            <a:r>
+              <a:rPr lang="en-IN" sz="5600" dirty="0" smtClean="0"/>
+              <a:t>QoC depends on risk-based groups identification, more care is need for high-risk patients (clustering)</a:t>
+            </a:r>
+            <a:endParaRPr lang="en-IN" sz="5600" dirty="0"/>
+          </a:p>
+          <a:p>
+            <a:pPr lvl="1"/>
+            <a:endParaRPr lang="en-IN" sz="4000" dirty="0"/>
           </a:p>
           <a:p>
             <a:pPr marL="91440" lvl="1" indent="-91440">
@@ -12553,7 +16304,7 @@
               <a:buChar char=" "/>
             </a:pPr>
             <a:r>
-              <a:rPr lang="en-IN" sz="4200" dirty="0"/>
+              <a:rPr lang="en-IN" sz="7200" dirty="0"/>
               <a:t>Objectives</a:t>
             </a:r>
           </a:p>
@@ -12562,16 +16313,27 @@
               <a:buSzPct val="100000"/>
             </a:pPr>
             <a:r>
-              <a:rPr lang="en-IN" sz="3300" dirty="0"/>
+              <a:rPr lang="en-IN" sz="5600" dirty="0"/>
               <a:t>Define a way to find QoC attributes for an application </a:t>
             </a:r>
+            <a:endParaRPr lang="en-IN" sz="5600" dirty="0" smtClean="0"/>
           </a:p>
           <a:p>
             <a:pPr lvl="1">
               <a:buSzPct val="100000"/>
             </a:pPr>
             <a:r>
-              <a:rPr lang="en-IN" sz="3300" dirty="0"/>
+              <a:rPr lang="en-IN" sz="5600" dirty="0" smtClean="0"/>
+              <a:t>Identification of low, moderate and high risk patients </a:t>
+            </a:r>
+            <a:endParaRPr lang="en-IN" sz="5600" dirty="0"/>
+          </a:p>
+          <a:p>
+            <a:pPr lvl="1">
+              <a:buSzPct val="100000"/>
+            </a:pPr>
+            <a:r>
+              <a:rPr lang="en-IN" sz="5600" dirty="0"/>
               <a:t>Propose a model to assess the QoC using those attributes</a:t>
             </a:r>
           </a:p>
@@ -12700,8 +16462,13 @@
           <a:p>
             <a:r>
               <a:rPr lang="en-IN" dirty="0"/>
-              <a:t>Work Summary</a:t>
-            </a:r>
+              <a:t>Work </a:t>
+            </a:r>
+            <a:r>
+              <a:rPr lang="en-IN" dirty="0" smtClean="0"/>
+              <a:t>on Quality of Care</a:t>
+            </a:r>
+            <a:endParaRPr lang="en-IN" dirty="0"/>
           </a:p>
         </p:txBody>
       </p:sp>
@@ -12796,7 +16563,7 @@
           <p:nvPr/>
         </p:nvPicPr>
         <p:blipFill>
-          <a:blip r:embed="rId2">
+          <a:blip r:embed="rId3">
             <a:extLst>
               <a:ext uri="{28A0092B-C50C-407E-A947-70E740481C1C}">
                 <a14:useLocalDpi xmlns:a14="http://schemas.microsoft.com/office/drawing/2010/main" val="0"/>
@@ -12832,13 +16599,13 @@
           <p:nvPr/>
         </p:nvPicPr>
         <p:blipFill>
-          <a:blip r:embed="rId3" cstate="hqprint">
+          <a:blip r:embed="rId4" cstate="hqprint">
             <a:extLst>
               <a:ext uri="{28A0092B-C50C-407E-A947-70E740481C1C}">
                 <a14:useLocalDpi xmlns:a14="http://schemas.microsoft.com/office/drawing/2010/main" val="0"/>
               </a:ext>
               <a:ext uri="{96DAC541-7B7A-43D3-8B79-37D633B846F1}">
-                <asvg:svgBlip xmlns:asvg="http://schemas.microsoft.com/office/drawing/2016/SVG/main" r:embed="rId4"/>
+                <asvg:svgBlip xmlns:asvg="http://schemas.microsoft.com/office/drawing/2016/SVG/main" xmlns="" r:embed="rId5"/>
               </a:ext>
             </a:extLst>
           </a:blip>
@@ -12871,7 +16638,7 @@
           <p:nvPr/>
         </p:nvPicPr>
         <p:blipFill>
-          <a:blip r:embed="rId5" cstate="hqprint">
+          <a:blip r:embed="rId6" cstate="hqprint">
             <a:extLst>
               <a:ext uri="{28A0092B-C50C-407E-A947-70E740481C1C}">
                 <a14:useLocalDpi xmlns:a14="http://schemas.microsoft.com/office/drawing/2010/main" val="0"/>
@@ -13102,7 +16869,7 @@
           <p:nvPr/>
         </p:nvPicPr>
         <p:blipFill>
-          <a:blip r:embed="rId6" cstate="hqprint">
+          <a:blip r:embed="rId7" cstate="hqprint">
             <a:extLst>
               <a:ext uri="{28A0092B-C50C-407E-A947-70E740481C1C}">
                 <a14:useLocalDpi xmlns:a14="http://schemas.microsoft.com/office/drawing/2010/main" val="0"/>
@@ -13203,55 +16970,55 @@
           <a:lstStyle/>
           <a:p>
             <a:r>
+              <a:rPr lang="en-IN" sz="2000" dirty="0"/>
+              <a:t>Brainstorming sessions helped to understand the ways to find QoC.</a:t>
+            </a:r>
+          </a:p>
+          <a:p>
+            <a:pPr marL="578358" lvl="1" indent="-285750"/>
+            <a:r>
               <a:rPr lang="en-IN" sz="1800" dirty="0"/>
-              <a:t>Brainstorming sessions helped to understand the ways to find QoC.</a:t>
+              <a:t>Summarizing the patient feedback at the overall level gives information about the quality of care. </a:t>
+            </a:r>
+          </a:p>
+          <a:p>
+            <a:pPr marL="761238" lvl="2" indent="-285750"/>
+            <a:r>
+              <a:rPr lang="en-IN" sz="1100" dirty="0"/>
+              <a:t>The adoption of such a method does not seem very accurate and feedback is always optional.</a:t>
             </a:r>
           </a:p>
           <a:p>
             <a:pPr marL="578358" lvl="1" indent="-285750"/>
             <a:r>
-              <a:rPr lang="en-IN" sz="1600" dirty="0"/>
-              <a:t>Summarizing the patient feedback at the overall level gives information about the quality of care. </a:t>
+              <a:rPr lang="en-IN" sz="1800" dirty="0"/>
+              <a:t>Trend analysis of each patient’s health can also provide details on the Quality of Care. </a:t>
             </a:r>
           </a:p>
           <a:p>
             <a:pPr marL="761238" lvl="2" indent="-285750"/>
             <a:r>
-              <a:rPr lang="en-IN" sz="1050" dirty="0"/>
-              <a:t>The adoption of such a method does not seem very accurate and feedback is always optional.</a:t>
+              <a:rPr lang="en-IN" sz="1100" dirty="0"/>
+              <a:t>This method is time-consuming and does not generate insights on the population level.</a:t>
             </a:r>
           </a:p>
           <a:p>
             <a:pPr marL="578358" lvl="1" indent="-285750"/>
             <a:r>
-              <a:rPr lang="en-IN" sz="1600" dirty="0"/>
-              <a:t>Trend analysis of each patient’s health can also provide details on the Quality of Care. </a:t>
+              <a:rPr lang="en-IN" sz="1800" dirty="0"/>
+              <a:t>Compare data from previously used applications which have proved better Quality of Care. </a:t>
             </a:r>
           </a:p>
           <a:p>
             <a:pPr marL="761238" lvl="2" indent="-285750"/>
             <a:r>
-              <a:rPr lang="en-IN" sz="1050" dirty="0"/>
-              <a:t>This method is time-consuming and does not generate insights on the population level.</a:t>
-            </a:r>
-          </a:p>
-          <a:p>
-            <a:pPr marL="578358" lvl="1" indent="-285750"/>
-            <a:r>
-              <a:rPr lang="en-IN" sz="1600" dirty="0"/>
-              <a:t>Compare data from previously used applications which have proved better Quality of Care. </a:t>
-            </a:r>
-          </a:p>
-          <a:p>
-            <a:pPr marL="761238" lvl="2" indent="-285750"/>
-            <a:r>
-              <a:rPr lang="en-IN" sz="1050" dirty="0"/>
+              <a:rPr lang="en-IN" sz="1100" dirty="0"/>
               <a:t>It is difficult to achieve due to the dependency on finding a trustable system.  </a:t>
             </a:r>
           </a:p>
           <a:p>
             <a:r>
-              <a:rPr lang="en-IN" sz="1800" dirty="0"/>
+              <a:rPr lang="en-IN" sz="2000" dirty="0"/>
               <a:t>Research requirement was gathered, and a proposal was made with the objectives.</a:t>
             </a:r>
           </a:p>
@@ -13260,18 +17027,52 @@
               <a:buSzPct val="100000"/>
             </a:pPr>
             <a:r>
-              <a:rPr lang="en-IN" sz="1600" dirty="0"/>
-              <a:t>Research a way to find QoC attributes for an application.</a:t>
-            </a:r>
+              <a:rPr lang="en-IN" sz="1800" dirty="0"/>
+              <a:t>Research a way to find </a:t>
+            </a:r>
+            <a:r>
+              <a:rPr lang="en-IN" sz="1800" dirty="0" smtClean="0"/>
+              <a:t>attributes </a:t>
+            </a:r>
+            <a:r>
+              <a:rPr lang="en-IN" sz="1800" dirty="0"/>
+              <a:t>for an </a:t>
+            </a:r>
+            <a:r>
+              <a:rPr lang="en-IN" sz="1800" dirty="0" smtClean="0"/>
+              <a:t>application </a:t>
+            </a:r>
+            <a:r>
+              <a:rPr lang="en-IN" sz="1800" dirty="0" smtClean="0"/>
+              <a:t>useful for QoC</a:t>
+            </a:r>
+            <a:r>
+              <a:rPr lang="en-IN" sz="1800" dirty="0"/>
+              <a:t>.</a:t>
+            </a:r>
+            <a:endParaRPr lang="en-IN" sz="1800" dirty="0"/>
           </a:p>
           <a:p>
             <a:pPr lvl="1">
               <a:buSzPct val="100000"/>
             </a:pPr>
             <a:r>
-              <a:rPr lang="en-IN" sz="1600" dirty="0"/>
-              <a:t>Propose a model to assess the QoC using those attributes.</a:t>
-            </a:r>
+              <a:rPr lang="en-IN" sz="1800" dirty="0"/>
+              <a:t>Propose a </a:t>
+            </a:r>
+            <a:r>
+              <a:rPr lang="en-IN" sz="1800" dirty="0" smtClean="0"/>
+              <a:t>design </a:t>
+            </a:r>
+            <a:r>
+              <a:rPr lang="en-IN" sz="1800" dirty="0"/>
+              <a:t>to assess the QoC </a:t>
+            </a:r>
+            <a:r>
+              <a:rPr lang="en-IN" sz="1800" dirty="0" smtClean="0"/>
+              <a:t>for an application.</a:t>
+            </a:r>
+            <a:endParaRPr lang="en-IN" sz="1800" dirty="0"/>
           </a:p>
           <a:p>
             <a:endParaRPr lang="en-IN" dirty="0"/>
@@ -13346,6 +17147,13 @@
   <p:clrMapOvr>
     <a:masterClrMapping/>
   </p:clrMapOvr>
+  <p:timing>
+    <p:tnLst>
+      <p:par>
+        <p:cTn id="1" dur="indefinite" restart="never" nodeType="tmRoot"/>
+      </p:par>
+    </p:tnLst>
+  </p:timing>
 </p:sld>
 </file>
 
@@ -13491,7 +17299,7 @@
         </p:blipFill>
         <p:spPr bwMode="auto">
           <a:xfrm>
-            <a:off x="4506410" y="2795460"/>
+            <a:off x="3001460" y="3047206"/>
             <a:ext cx="5926061" cy="3156223"/>
           </a:xfrm>
           <a:prstGeom prst="rect">
@@ -13794,6 +17602,13 @@
   <p:clrMapOvr>
     <a:masterClrMapping/>
   </p:clrMapOvr>
+  <p:timing>
+    <p:tnLst>
+      <p:par>
+        <p:cTn id="1" dur="indefinite" restart="never" nodeType="tmRoot"/>
+      </p:par>
+    </p:tnLst>
+  </p:timing>
 </p:sld>
 </file>
 
@@ -13995,7 +17810,7 @@
           <p:nvPr/>
         </p:nvPicPr>
         <p:blipFill>
-          <a:blip r:embed="rId2"/>
+          <a:blip r:embed="rId3"/>
           <a:stretch>
             <a:fillRect/>
           </a:stretch>
@@ -14599,4 +18414,265 @@
     </a:ext>
   </a:extLst>
 </a:theme>
+</file>
+
+<file path=ppt/theme/theme3.xml><?xml version="1.0" encoding="utf-8"?>
+<a:theme xmlns:a="http://schemas.openxmlformats.org/drawingml/2006/main" name="Office Theme">
+  <a:themeElements>
+    <a:clrScheme name="Office">
+      <a:dk1>
+        <a:sysClr val="windowText" lastClr="000000"/>
+      </a:dk1>
+      <a:lt1>
+        <a:sysClr val="window" lastClr="FFFFFF"/>
+      </a:lt1>
+      <a:dk2>
+        <a:srgbClr val="44546A"/>
+      </a:dk2>
+      <a:lt2>
+        <a:srgbClr val="E7E6E6"/>
+      </a:lt2>
+      <a:accent1>
+        <a:srgbClr val="5B9BD5"/>
+      </a:accent1>
+      <a:accent2>
+        <a:srgbClr val="ED7D31"/>
+      </a:accent2>
+      <a:accent3>
+        <a:srgbClr val="A5A5A5"/>
+      </a:accent3>
+      <a:accent4>
+        <a:srgbClr val="FFC000"/>
+      </a:accent4>
+      <a:accent5>
+        <a:srgbClr val="4472C4"/>
+      </a:accent5>
+      <a:accent6>
+        <a:srgbClr val="70AD47"/>
+      </a:accent6>
+      <a:hlink>
+        <a:srgbClr val="0563C1"/>
+      </a:hlink>
+      <a:folHlink>
+        <a:srgbClr val="954F72"/>
+      </a:folHlink>
+    </a:clrScheme>
+    <a:fontScheme name="Office">
+      <a:majorFont>
+        <a:latin typeface="Calibri Light" panose="020F0302020204030204"/>
+        <a:ea typeface=""/>
+        <a:cs typeface=""/>
+        <a:font script="Jpan" typeface="游ゴシック Light"/>
+        <a:font script="Hang" typeface="맑은 고딕"/>
+        <a:font script="Hans" typeface="等线 Light"/>
+        <a:font script="Hant" typeface="新細明體"/>
+        <a:font script="Arab" typeface="Times New Roman"/>
+        <a:font script="Hebr" typeface="Times New Roman"/>
+        <a:font script="Thai" typeface="Angsana New"/>
+        <a:font script="Ethi" typeface="Nyala"/>
+        <a:font script="Beng" typeface="Vrinda"/>
+        <a:font script="Gujr" typeface="Shruti"/>
+        <a:font script="Khmr" typeface="MoolBoran"/>
+        <a:font script="Knda" typeface="Tunga"/>
+        <a:font script="Guru" typeface="Raavi"/>
+        <a:font script="Cans" typeface="Euphemia"/>
+        <a:font script="Cher" typeface="Plantagenet Cherokee"/>
+        <a:font script="Yiii" typeface="Microsoft Yi Baiti"/>
+        <a:font script="Tibt" typeface="Microsoft Himalaya"/>
+        <a:font script="Thaa" typeface="MV Boli"/>
+        <a:font script="Deva" typeface="Mangal"/>
+        <a:font script="Telu" typeface="Gautami"/>
+        <a:font script="Taml" typeface="Latha"/>
+        <a:font script="Syrc" typeface="Estrangelo Edessa"/>
+        <a:font script="Orya" typeface="Kalinga"/>
+        <a:font script="Mlym" typeface="Kartika"/>
+        <a:font script="Laoo" typeface="DokChampa"/>
+        <a:font script="Sinh" typeface="Iskoola Pota"/>
+        <a:font script="Mong" typeface="Mongolian Baiti"/>
+        <a:font script="Viet" typeface="Times New Roman"/>
+        <a:font script="Uigh" typeface="Microsoft Uighur"/>
+        <a:font script="Geor" typeface="Sylfaen"/>
+      </a:majorFont>
+      <a:minorFont>
+        <a:latin typeface="Calibri" panose="020F0502020204030204"/>
+        <a:ea typeface=""/>
+        <a:cs typeface=""/>
+        <a:font script="Jpan" typeface="游ゴシック"/>
+        <a:font script="Hang" typeface="맑은 고딕"/>
+        <a:font script="Hans" typeface="等线"/>
+        <a:font script="Hant" typeface="新細明體"/>
+        <a:font script="Arab" typeface="Arial"/>
+        <a:font script="Hebr" typeface="Arial"/>
+        <a:font script="Thai" typeface="Cordia New"/>
+        <a:font script="Ethi" typeface="Nyala"/>
+        <a:font script="Beng" typeface="Vrinda"/>
+        <a:font script="Gujr" typeface="Shruti"/>
+        <a:font script="Khmr" typeface="DaunPenh"/>
+        <a:font script="Knda" typeface="Tunga"/>
+        <a:font script="Guru" typeface="Raavi"/>
+        <a:font script="Cans" typeface="Euphemia"/>
+        <a:font script="Cher" typeface="Plantagenet Cherokee"/>
+        <a:font script="Yiii" typeface="Microsoft Yi Baiti"/>
+        <a:font script="Tibt" typeface="Microsoft Himalaya"/>
+        <a:font script="Thaa" typeface="MV Boli"/>
+        <a:font script="Deva" typeface="Mangal"/>
+        <a:font script="Telu" typeface="Gautami"/>
+        <a:font script="Taml" typeface="Latha"/>
+        <a:font script="Syrc" typeface="Estrangelo Edessa"/>
+        <a:font script="Orya" typeface="Kalinga"/>
+        <a:font script="Mlym" typeface="Kartika"/>
+        <a:font script="Laoo" typeface="DokChampa"/>
+        <a:font script="Sinh" typeface="Iskoola Pota"/>
+        <a:font script="Mong" typeface="Mongolian Baiti"/>
+        <a:font script="Viet" typeface="Arial"/>
+        <a:font script="Uigh" typeface="Microsoft Uighur"/>
+        <a:font script="Geor" typeface="Sylfaen"/>
+      </a:minorFont>
+    </a:fontScheme>
+    <a:fmtScheme name="Office">
+      <a:fillStyleLst>
+        <a:solidFill>
+          <a:schemeClr val="phClr"/>
+        </a:solidFill>
+        <a:gradFill rotWithShape="1">
+          <a:gsLst>
+            <a:gs pos="0">
+              <a:schemeClr val="phClr">
+                <a:lumMod val="110000"/>
+                <a:satMod val="105000"/>
+                <a:tint val="67000"/>
+              </a:schemeClr>
+            </a:gs>
+            <a:gs pos="50000">
+              <a:schemeClr val="phClr">
+                <a:lumMod val="105000"/>
+                <a:satMod val="103000"/>
+                <a:tint val="73000"/>
+              </a:schemeClr>
+            </a:gs>
+            <a:gs pos="100000">
+              <a:schemeClr val="phClr">
+                <a:lumMod val="105000"/>
+                <a:satMod val="109000"/>
+                <a:tint val="81000"/>
+              </a:schemeClr>
+            </a:gs>
+          </a:gsLst>
+          <a:lin ang="5400000" scaled="0"/>
+        </a:gradFill>
+        <a:gradFill rotWithShape="1">
+          <a:gsLst>
+            <a:gs pos="0">
+              <a:schemeClr val="phClr">
+                <a:satMod val="103000"/>
+                <a:lumMod val="102000"/>
+                <a:tint val="94000"/>
+              </a:schemeClr>
+            </a:gs>
+            <a:gs pos="50000">
+              <a:schemeClr val="phClr">
+                <a:satMod val="110000"/>
+                <a:lumMod val="100000"/>
+                <a:shade val="100000"/>
+              </a:schemeClr>
+            </a:gs>
+            <a:gs pos="100000">
+              <a:schemeClr val="phClr">
+                <a:lumMod val="99000"/>
+                <a:satMod val="120000"/>
+                <a:shade val="78000"/>
+              </a:schemeClr>
+            </a:gs>
+          </a:gsLst>
+          <a:lin ang="5400000" scaled="0"/>
+        </a:gradFill>
+      </a:fillStyleLst>
+      <a:lnStyleLst>
+        <a:ln w="6350" cap="flat" cmpd="sng" algn="ctr">
+          <a:solidFill>
+            <a:schemeClr val="phClr"/>
+          </a:solidFill>
+          <a:prstDash val="solid"/>
+          <a:miter lim="800000"/>
+        </a:ln>
+        <a:ln w="12700" cap="flat" cmpd="sng" algn="ctr">
+          <a:solidFill>
+            <a:schemeClr val="phClr"/>
+          </a:solidFill>
+          <a:prstDash val="solid"/>
+          <a:miter lim="800000"/>
+        </a:ln>
+        <a:ln w="19050" cap="flat" cmpd="sng" algn="ctr">
+          <a:solidFill>
+            <a:schemeClr val="phClr"/>
+          </a:solidFill>
+          <a:prstDash val="solid"/>
+          <a:miter lim="800000"/>
+        </a:ln>
+      </a:lnStyleLst>
+      <a:effectStyleLst>
+        <a:effectStyle>
+          <a:effectLst/>
+        </a:effectStyle>
+        <a:effectStyle>
+          <a:effectLst/>
+        </a:effectStyle>
+        <a:effectStyle>
+          <a:effectLst>
+            <a:outerShdw blurRad="57150" dist="19050" dir="5400000" algn="ctr" rotWithShape="0">
+              <a:srgbClr val="000000">
+                <a:alpha val="63000"/>
+              </a:srgbClr>
+            </a:outerShdw>
+          </a:effectLst>
+        </a:effectStyle>
+      </a:effectStyleLst>
+      <a:bgFillStyleLst>
+        <a:solidFill>
+          <a:schemeClr val="phClr"/>
+        </a:solidFill>
+        <a:solidFill>
+          <a:schemeClr val="phClr">
+            <a:tint val="95000"/>
+            <a:satMod val="170000"/>
+          </a:schemeClr>
+        </a:solidFill>
+        <a:gradFill rotWithShape="1">
+          <a:gsLst>
+            <a:gs pos="0">
+              <a:schemeClr val="phClr">
+                <a:tint val="93000"/>
+                <a:satMod val="150000"/>
+                <a:shade val="98000"/>
+                <a:lumMod val="102000"/>
+              </a:schemeClr>
+            </a:gs>
+            <a:gs pos="50000">
+              <a:schemeClr val="phClr">
+                <a:tint val="98000"/>
+                <a:satMod val="130000"/>
+                <a:shade val="90000"/>
+                <a:lumMod val="103000"/>
+              </a:schemeClr>
+            </a:gs>
+            <a:gs pos="100000">
+              <a:schemeClr val="phClr">
+                <a:shade val="63000"/>
+                <a:satMod val="120000"/>
+              </a:schemeClr>
+            </a:gs>
+          </a:gsLst>
+          <a:lin ang="5400000" scaled="0"/>
+        </a:gradFill>
+      </a:bgFillStyleLst>
+    </a:fmtScheme>
+  </a:themeElements>
+  <a:objectDefaults/>
+  <a:extraClrSchemeLst/>
+  <a:extLst>
+    <a:ext uri="{05A4C25C-085E-4340-85A3-A5531E510DB2}">
+      <thm15:themeFamily xmlns:thm15="http://schemas.microsoft.com/office/thememl/2012/main" name="Office Theme" id="{62F939B6-93AF-4DB8-9C6B-D6C7DFDC589F}" vid="{4A3C46E8-61CC-4603-A589-7422A47A8E4A}"/>
+    </a:ext>
+  </a:extLst>
+</a:theme>
 </file>
</xml_diff>

<commit_message>
Final updated based on Lov Kumar's remark
</commit_message>
<xml_diff>
--- a/docs/Quality of Care.pptx
+++ b/docs/Quality of Care.pptx
@@ -5,10 +5,10 @@
     <p:sldMasterId id="2147483746" r:id="rId1"/>
   </p:sldMasterIdLst>
   <p:notesMasterIdLst>
-    <p:notesMasterId r:id="rId23"/>
+    <p:notesMasterId r:id="rId24"/>
   </p:notesMasterIdLst>
   <p:handoutMasterIdLst>
-    <p:handoutMasterId r:id="rId24"/>
+    <p:handoutMasterId r:id="rId25"/>
   </p:handoutMasterIdLst>
   <p:sldIdLst>
     <p:sldId id="257" r:id="rId2"/>
@@ -29,9 +29,10 @@
     <p:sldId id="273" r:id="rId17"/>
     <p:sldId id="274" r:id="rId18"/>
     <p:sldId id="264" r:id="rId19"/>
-    <p:sldId id="275" r:id="rId20"/>
-    <p:sldId id="276" r:id="rId21"/>
-    <p:sldId id="265" r:id="rId22"/>
+    <p:sldId id="279" r:id="rId20"/>
+    <p:sldId id="275" r:id="rId21"/>
+    <p:sldId id="276" r:id="rId22"/>
+    <p:sldId id="265" r:id="rId23"/>
   </p:sldIdLst>
   <p:sldSz cx="12192000" cy="6858000"/>
   <p:notesSz cx="6858000" cy="9144000"/>
@@ -134,6 +135,9 @@
     <p:ext uri="{EFAFB233-063F-42B5-8137-9DF3F51BA10A}">
       <p15:sldGuideLst xmlns:p15="http://schemas.microsoft.com/office/powerpoint/2012/main"/>
     </p:ext>
+    <p:ext uri="{2D200454-40CA-4A62-9FC3-DE9A4176ACB9}">
+      <p15:notesGuideLst xmlns:p15="http://schemas.microsoft.com/office/powerpoint/2012/main"/>
+    </p:ext>
   </p:extLst>
 </p:presentation>
 </file>
@@ -220,7 +224,7 @@
           <a:p>
             <a:fld id="{E500F4C0-4E3A-4C47-A929-17026DE34046}" type="datetimeFigureOut">
               <a:rPr lang="en-US" smtClean="0"/>
-              <a:t>4/27/2020</a:t>
+              <a:t>4/28/2020</a:t>
             </a:fld>
             <a:endParaRPr lang="en-US"/>
           </a:p>
@@ -385,7 +389,7 @@
           <a:p>
             <a:fld id="{BC46ECE3-5739-471E-8276-669D33A7DECB}" type="datetimeFigureOut">
               <a:rPr lang="en-IN" smtClean="0"/>
-              <a:t>27-04-2020</a:t>
+              <a:t>28-04-2020</a:t>
             </a:fld>
             <a:endParaRPr lang="en-IN"/>
           </a:p>
@@ -1174,115 +1178,14 @@
           <a:bodyPr/>
           <a:lstStyle/>
           <a:p>
-            <a:pPr marL="228600" indent="-228600">
-              <a:buAutoNum type="arabicPeriod"/>
-            </a:pPr>
             <a:r>
               <a:rPr lang="en-IN" dirty="0" smtClean="0"/>
-              <a:t>Now that we have made sure about the group formation</a:t>
+              <a:t>So</a:t>
             </a:r>
             <a:r>
               <a:rPr lang="en-IN" baseline="0" dirty="0" smtClean="0"/>
-              <a:t> and the QoC attributes and how to search the best ones, we move to the design of QoC assessment using this clusters </a:t>
-            </a:r>
-          </a:p>
-          <a:p>
-            <a:pPr marL="228600" indent="-228600">
-              <a:buAutoNum type="arabicPeriod"/>
-            </a:pPr>
-            <a:r>
-              <a:rPr lang="en-IN" baseline="0" dirty="0" smtClean="0"/>
-              <a:t>We have identified high-risk population and now we have to manage them over time and understand the trend to comment on the QoC</a:t>
-            </a:r>
-          </a:p>
-          <a:p>
-            <a:pPr marL="228600" indent="-228600">
-              <a:buAutoNum type="arabicPeriod"/>
-            </a:pPr>
-            <a:r>
-              <a:rPr lang="en-IN" baseline="0" dirty="0" smtClean="0"/>
-              <a:t>First plot describes the optimal no. of trees needed for Random Forest with min. error</a:t>
-            </a:r>
-          </a:p>
-          <a:p>
-            <a:pPr marL="228600" indent="-228600">
-              <a:buAutoNum type="arabicPeriod"/>
-            </a:pPr>
-            <a:r>
-              <a:rPr lang="en-IN" baseline="0" dirty="0" smtClean="0"/>
-              <a:t>Second plot is from </a:t>
-            </a:r>
-            <a:r>
-              <a:rPr lang="en-IN" baseline="0" dirty="0" err="1" smtClean="0"/>
-              <a:t>varImpPlot</a:t>
-            </a:r>
-            <a:r>
-              <a:rPr lang="en-IN" baseline="0" dirty="0" smtClean="0"/>
-              <a:t> - </a:t>
-            </a:r>
-            <a:r>
-              <a:rPr lang="en-IN" sz="1200" b="0" i="0" kern="1200" dirty="0" smtClean="0">
-                <a:solidFill>
-                  <a:schemeClr val="tx1"/>
-                </a:solidFill>
-                <a:effectLst/>
-                <a:latin typeface="+mn-lt"/>
-                <a:ea typeface="+mn-ea"/>
-                <a:cs typeface="+mn-cs"/>
-              </a:rPr>
-              <a:t>variable importance as measured by a Random Forest (Mean Decrease Accuracy (%</a:t>
-            </a:r>
-            <a:r>
-              <a:rPr lang="en-IN" sz="1200" b="0" i="0" kern="1200" dirty="0" err="1" smtClean="0">
-                <a:solidFill>
-                  <a:schemeClr val="tx1"/>
-                </a:solidFill>
-                <a:effectLst/>
-                <a:latin typeface="+mn-lt"/>
-                <a:ea typeface="+mn-ea"/>
-                <a:cs typeface="+mn-cs"/>
-              </a:rPr>
-              <a:t>IncMSE</a:t>
-            </a:r>
-            <a:r>
-              <a:rPr lang="en-IN" sz="1200" b="0" i="0" kern="1200" dirty="0" smtClean="0">
-                <a:solidFill>
-                  <a:schemeClr val="tx1"/>
-                </a:solidFill>
-                <a:effectLst/>
-                <a:latin typeface="+mn-lt"/>
-                <a:ea typeface="+mn-ea"/>
-                <a:cs typeface="+mn-cs"/>
-              </a:rPr>
-              <a:t>) and Mean Decrease Gini (</a:t>
-            </a:r>
-            <a:r>
-              <a:rPr lang="en-IN" sz="1200" b="1" i="0" kern="1200" dirty="0" err="1" smtClean="0">
-                <a:solidFill>
-                  <a:schemeClr val="tx1"/>
-                </a:solidFill>
-                <a:effectLst/>
-                <a:latin typeface="+mn-lt"/>
-                <a:ea typeface="+mn-ea"/>
-                <a:cs typeface="+mn-cs"/>
-              </a:rPr>
-              <a:t>IncNodePurity</a:t>
-            </a:r>
-            <a:r>
-              <a:rPr lang="en-IN" sz="1200" b="0" i="0" kern="1200" smtClean="0">
-                <a:solidFill>
-                  <a:schemeClr val="tx1"/>
-                </a:solidFill>
-                <a:effectLst/>
-                <a:latin typeface="+mn-lt"/>
-                <a:ea typeface="+mn-ea"/>
-                <a:cs typeface="+mn-cs"/>
-              </a:rPr>
-              <a:t>) )</a:t>
-            </a:r>
-            <a:endParaRPr lang="en-IN" baseline="0" dirty="0" smtClean="0"/>
-          </a:p>
-          <a:p>
+              <a:t> I had to start again with attribute selection, so I started reading on the best approaches for it, when I came across Random Forest (the papers are mentioned in the references too)</a:t>
+            </a:r>
             <a:endParaRPr lang="en-US" dirty="0"/>
           </a:p>
         </p:txBody>
@@ -1304,7 +1207,7 @@
           <a:p>
             <a:fld id="{D58A01DC-D56B-4089-94FD-B2CDCC879BEA}" type="slidenum">
               <a:rPr lang="en-IN" smtClean="0"/>
-              <a:t>17</a:t>
+              <a:t>16</a:t>
             </a:fld>
             <a:endParaRPr lang="en-IN"/>
           </a:p>
@@ -1313,7 +1216,7 @@
     </p:spTree>
     <p:extLst>
       <p:ext uri="{BB962C8B-B14F-4D97-AF65-F5344CB8AC3E}">
-        <p14:creationId xmlns:p14="http://schemas.microsoft.com/office/powerpoint/2010/main" val="2005090637"/>
+        <p14:creationId xmlns:p14="http://schemas.microsoft.com/office/powerpoint/2010/main" val="859950116"/>
       </p:ext>
     </p:extLst>
   </p:cSld>
@@ -1371,6 +1274,216 @@
               <a:buAutoNum type="arabicPeriod"/>
             </a:pPr>
             <a:r>
+              <a:rPr lang="en-IN" baseline="0" dirty="0" smtClean="0"/>
+              <a:t>First plot describes the optimal no. of trees needed for Random Forest with min. error &gt; </a:t>
+            </a:r>
+            <a:br>
+              <a:rPr lang="en-IN" baseline="0" dirty="0" smtClean="0"/>
+            </a:br>
+            <a:r>
+              <a:rPr lang="en-IN" baseline="0" dirty="0" smtClean="0"/>
+              <a:t>70/30 train test data was used, trees = 80 to 100, where the accuracy went from 72.92 to 73.79</a:t>
+            </a:r>
+          </a:p>
+          <a:p>
+            <a:pPr marL="228600" indent="-228600">
+              <a:buAutoNum type="arabicPeriod"/>
+            </a:pPr>
+            <a:r>
+              <a:rPr lang="en-IN" baseline="0" dirty="0" smtClean="0"/>
+              <a:t>Second plot is from </a:t>
+            </a:r>
+            <a:r>
+              <a:rPr lang="en-IN" baseline="0" dirty="0" err="1" smtClean="0"/>
+              <a:t>varImpPlot</a:t>
+            </a:r>
+            <a:r>
+              <a:rPr lang="en-IN" baseline="0" dirty="0" smtClean="0"/>
+              <a:t> - </a:t>
+            </a:r>
+            <a:r>
+              <a:rPr lang="en-IN" sz="1200" b="0" i="0" kern="1200" dirty="0" smtClean="0">
+                <a:solidFill>
+                  <a:schemeClr val="tx1"/>
+                </a:solidFill>
+                <a:effectLst/>
+                <a:latin typeface="+mn-lt"/>
+                <a:ea typeface="+mn-ea"/>
+                <a:cs typeface="+mn-cs"/>
+              </a:rPr>
+              <a:t>variable importance as measured by a Random Forest (Mean Decrease Accuracy (%</a:t>
+            </a:r>
+            <a:r>
+              <a:rPr lang="en-IN" sz="1200" b="0" i="0" kern="1200" dirty="0" err="1" smtClean="0">
+                <a:solidFill>
+                  <a:schemeClr val="tx1"/>
+                </a:solidFill>
+                <a:effectLst/>
+                <a:latin typeface="+mn-lt"/>
+                <a:ea typeface="+mn-ea"/>
+                <a:cs typeface="+mn-cs"/>
+              </a:rPr>
+              <a:t>IncMSE</a:t>
+            </a:r>
+            <a:r>
+              <a:rPr lang="en-IN" sz="1200" b="0" i="0" kern="1200" dirty="0" smtClean="0">
+                <a:solidFill>
+                  <a:schemeClr val="tx1"/>
+                </a:solidFill>
+                <a:effectLst/>
+                <a:latin typeface="+mn-lt"/>
+                <a:ea typeface="+mn-ea"/>
+                <a:cs typeface="+mn-cs"/>
+              </a:rPr>
+              <a:t>) and Mean Decrease Gini (</a:t>
+            </a:r>
+            <a:r>
+              <a:rPr lang="en-IN" sz="1200" b="1" i="0" kern="1200" dirty="0" err="1" smtClean="0">
+                <a:solidFill>
+                  <a:schemeClr val="tx1"/>
+                </a:solidFill>
+                <a:effectLst/>
+                <a:latin typeface="+mn-lt"/>
+                <a:ea typeface="+mn-ea"/>
+                <a:cs typeface="+mn-cs"/>
+              </a:rPr>
+              <a:t>IncNodePurity</a:t>
+            </a:r>
+            <a:r>
+              <a:rPr lang="en-IN" sz="1200" b="0" i="0" kern="1200" dirty="0" smtClean="0">
+                <a:solidFill>
+                  <a:schemeClr val="tx1"/>
+                </a:solidFill>
+                <a:effectLst/>
+                <a:latin typeface="+mn-lt"/>
+                <a:ea typeface="+mn-ea"/>
+                <a:cs typeface="+mn-cs"/>
+              </a:rPr>
+              <a:t>) )</a:t>
+            </a:r>
+            <a:endParaRPr lang="en-IN" baseline="0" dirty="0" smtClean="0"/>
+          </a:p>
+          <a:p>
+            <a:pPr marL="228600" indent="-228600">
+              <a:buAutoNum type="arabicPeriod"/>
+            </a:pPr>
+            <a:endParaRPr lang="en-IN" dirty="0" smtClean="0"/>
+          </a:p>
+          <a:p>
+            <a:pPr marL="228600" indent="-228600">
+              <a:buAutoNum type="arabicPeriod"/>
+            </a:pPr>
+            <a:r>
+              <a:rPr lang="en-IN" dirty="0" smtClean="0"/>
+              <a:t>Now </a:t>
+            </a:r>
+            <a:r>
+              <a:rPr lang="en-IN" dirty="0" smtClean="0"/>
+              <a:t>that we have made sure about the group formation</a:t>
+            </a:r>
+            <a:r>
+              <a:rPr lang="en-IN" baseline="0" dirty="0" smtClean="0"/>
+              <a:t> and the QoC attributes and how to search the best ones, we move to the design of QoC assessment using this clusters </a:t>
+            </a:r>
+          </a:p>
+          <a:p>
+            <a:pPr marL="228600" indent="-228600">
+              <a:buAutoNum type="arabicPeriod"/>
+            </a:pPr>
+            <a:r>
+              <a:rPr lang="en-IN" baseline="0" dirty="0" smtClean="0"/>
+              <a:t>We have identified high-risk population and now we have to manage them over time and understand the trend to comment on the QoC</a:t>
+            </a:r>
+          </a:p>
+          <a:p>
+            <a:endParaRPr lang="en-US" dirty="0"/>
+          </a:p>
+        </p:txBody>
+      </p:sp>
+      <p:sp>
+        <p:nvSpPr>
+          <p:cNvPr id="4" name="Slide Number Placeholder 3"/>
+          <p:cNvSpPr>
+            <a:spLocks noGrp="1"/>
+          </p:cNvSpPr>
+          <p:nvPr>
+            <p:ph type="sldNum" sz="quarter" idx="10"/>
+          </p:nvPr>
+        </p:nvSpPr>
+        <p:spPr/>
+        <p:txBody>
+          <a:bodyPr/>
+          <a:lstStyle/>
+          <a:p>
+            <a:fld id="{D58A01DC-D56B-4089-94FD-B2CDCC879BEA}" type="slidenum">
+              <a:rPr lang="en-IN" smtClean="0"/>
+              <a:t>17</a:t>
+            </a:fld>
+            <a:endParaRPr lang="en-IN"/>
+          </a:p>
+        </p:txBody>
+      </p:sp>
+    </p:spTree>
+    <p:extLst>
+      <p:ext uri="{BB962C8B-B14F-4D97-AF65-F5344CB8AC3E}">
+        <p14:creationId xmlns:p14="http://schemas.microsoft.com/office/powerpoint/2010/main" val="2005090637"/>
+      </p:ext>
+    </p:extLst>
+  </p:cSld>
+  <p:clrMapOvr>
+    <a:masterClrMapping/>
+  </p:clrMapOvr>
+</p:notes>
+</file>
+
+<file path=ppt/notesSlides/notesSlide14.xml><?xml version="1.0" encoding="utf-8"?>
+<p:notes xmlns:a="http://schemas.openxmlformats.org/drawingml/2006/main" xmlns:r="http://schemas.openxmlformats.org/officeDocument/2006/relationships" xmlns:p="http://schemas.openxmlformats.org/presentationml/2006/main">
+  <p:cSld>
+    <p:spTree>
+      <p:nvGrpSpPr>
+        <p:cNvPr id="1" name=""/>
+        <p:cNvGrpSpPr/>
+        <p:nvPr/>
+      </p:nvGrpSpPr>
+      <p:grpSpPr>
+        <a:xfrm>
+          <a:off x="0" y="0"/>
+          <a:ext cx="0" cy="0"/>
+          <a:chOff x="0" y="0"/>
+          <a:chExt cx="0" cy="0"/>
+        </a:xfrm>
+      </p:grpSpPr>
+      <p:sp>
+        <p:nvSpPr>
+          <p:cNvPr id="2" name="Slide Image Placeholder 1"/>
+          <p:cNvSpPr>
+            <a:spLocks noGrp="1" noRot="1" noChangeAspect="1"/>
+          </p:cNvSpPr>
+          <p:nvPr>
+            <p:ph type="sldImg"/>
+          </p:nvPr>
+        </p:nvSpPr>
+        <p:spPr/>
+      </p:sp>
+      <p:sp>
+        <p:nvSpPr>
+          <p:cNvPr id="3" name="Notes Placeholder 2"/>
+          <p:cNvSpPr>
+            <a:spLocks noGrp="1"/>
+          </p:cNvSpPr>
+          <p:nvPr>
+            <p:ph type="body" idx="1"/>
+          </p:nvPr>
+        </p:nvSpPr>
+        <p:spPr/>
+        <p:txBody>
+          <a:bodyPr/>
+          <a:lstStyle/>
+          <a:p>
+            <a:pPr marL="228600" indent="-228600">
+              <a:buAutoNum type="arabicPeriod"/>
+            </a:pPr>
+            <a:r>
               <a:rPr lang="en-IN" dirty="0" smtClean="0"/>
               <a:t>CCS score</a:t>
             </a:r>
@@ -1438,6 +1551,154 @@
     <p:extLst>
       <p:ext uri="{BB962C8B-B14F-4D97-AF65-F5344CB8AC3E}">
         <p14:creationId xmlns:p14="http://schemas.microsoft.com/office/powerpoint/2010/main" val="2770198304"/>
+      </p:ext>
+    </p:extLst>
+  </p:cSld>
+  <p:clrMapOvr>
+    <a:masterClrMapping/>
+  </p:clrMapOvr>
+</p:notes>
+</file>
+
+<file path=ppt/notesSlides/notesSlide15.xml><?xml version="1.0" encoding="utf-8"?>
+<p:notes xmlns:a="http://schemas.openxmlformats.org/drawingml/2006/main" xmlns:r="http://schemas.openxmlformats.org/officeDocument/2006/relationships" xmlns:p="http://schemas.openxmlformats.org/presentationml/2006/main">
+  <p:cSld>
+    <p:spTree>
+      <p:nvGrpSpPr>
+        <p:cNvPr id="1" name=""/>
+        <p:cNvGrpSpPr/>
+        <p:nvPr/>
+      </p:nvGrpSpPr>
+      <p:grpSpPr>
+        <a:xfrm>
+          <a:off x="0" y="0"/>
+          <a:ext cx="0" cy="0"/>
+          <a:chOff x="0" y="0"/>
+          <a:chExt cx="0" cy="0"/>
+        </a:xfrm>
+      </p:grpSpPr>
+      <p:sp>
+        <p:nvSpPr>
+          <p:cNvPr id="2" name="Slide Image Placeholder 1"/>
+          <p:cNvSpPr>
+            <a:spLocks noGrp="1" noRot="1" noChangeAspect="1"/>
+          </p:cNvSpPr>
+          <p:nvPr>
+            <p:ph type="sldImg"/>
+          </p:nvPr>
+        </p:nvSpPr>
+        <p:spPr/>
+      </p:sp>
+      <p:sp>
+        <p:nvSpPr>
+          <p:cNvPr id="3" name="Notes Placeholder 2"/>
+          <p:cNvSpPr>
+            <a:spLocks noGrp="1"/>
+          </p:cNvSpPr>
+          <p:nvPr>
+            <p:ph type="body" idx="1"/>
+          </p:nvPr>
+        </p:nvSpPr>
+        <p:spPr/>
+        <p:txBody>
+          <a:bodyPr/>
+          <a:lstStyle/>
+          <a:p>
+            <a:r>
+              <a:rPr lang="en-IN" dirty="0" smtClean="0"/>
+              <a:t>CCS:</a:t>
+            </a:r>
+            <a:r>
+              <a:rPr lang="en-IN" baseline="0" dirty="0" smtClean="0"/>
+              <a:t> defines how many data points were correctly identified in the high-risk cluster</a:t>
+            </a:r>
+          </a:p>
+          <a:p>
+            <a:r>
+              <a:rPr lang="en-IN" baseline="0" dirty="0" smtClean="0"/>
+              <a:t>Slope indicates the movement of the size of cluster, we expect it to decrease so the negative slope is considered good </a:t>
+            </a:r>
+          </a:p>
+          <a:p>
+            <a:r>
+              <a:rPr lang="en-IN" baseline="0" dirty="0" smtClean="0"/>
+              <a:t>Error in model talks about how good the LM line fits the data points, close to 100 means all points lie on the line. So Anything above 80 should be considered good</a:t>
+            </a:r>
+          </a:p>
+          <a:p>
+            <a:endParaRPr lang="en-IN" baseline="0" dirty="0" smtClean="0"/>
+          </a:p>
+          <a:p>
+            <a:r>
+              <a:rPr lang="en-IN" baseline="0" dirty="0" smtClean="0"/>
+              <a:t>Certainly these 3 factors should be configured by the domain experts to get proper assessment of the QoC as per their expectations. </a:t>
+            </a:r>
+          </a:p>
+          <a:p>
+            <a:endParaRPr lang="en-IN" baseline="0" dirty="0" smtClean="0"/>
+          </a:p>
+          <a:p>
+            <a:r>
+              <a:rPr lang="en-IN" baseline="0" dirty="0" smtClean="0"/>
+              <a:t>Helpful to set up goals for care providers</a:t>
+            </a:r>
+          </a:p>
+          <a:p>
+            <a:r>
+              <a:rPr lang="en-IN" baseline="0" dirty="0" smtClean="0"/>
+              <a:t>Also to understand the effectiveness of certain treatment protocol</a:t>
+            </a:r>
+          </a:p>
+          <a:p>
+            <a:r>
+              <a:rPr lang="en-IN" baseline="0" dirty="0" smtClean="0"/>
+              <a:t>Alerts for patients moving into high-risk zone (based on prediction </a:t>
+            </a:r>
+            <a:r>
+              <a:rPr lang="en-IN" baseline="0" dirty="0" err="1" smtClean="0"/>
+              <a:t>algo</a:t>
+            </a:r>
+            <a:r>
+              <a:rPr lang="en-IN" baseline="0" dirty="0" smtClean="0"/>
+              <a:t> on the cluster)</a:t>
+            </a:r>
+          </a:p>
+          <a:p>
+            <a:r>
+              <a:rPr lang="en-IN" baseline="0" dirty="0" smtClean="0"/>
+              <a:t>Finally, the business value: customers can seen how better they are managing the patients at high risk with the application. </a:t>
+            </a:r>
+            <a:endParaRPr lang="en-US" dirty="0"/>
+          </a:p>
+        </p:txBody>
+      </p:sp>
+      <p:sp>
+        <p:nvSpPr>
+          <p:cNvPr id="4" name="Slide Number Placeholder 3"/>
+          <p:cNvSpPr>
+            <a:spLocks noGrp="1"/>
+          </p:cNvSpPr>
+          <p:nvPr>
+            <p:ph type="sldNum" sz="quarter" idx="10"/>
+          </p:nvPr>
+        </p:nvSpPr>
+        <p:spPr/>
+        <p:txBody>
+          <a:bodyPr/>
+          <a:lstStyle/>
+          <a:p>
+            <a:fld id="{D58A01DC-D56B-4089-94FD-B2CDCC879BEA}" type="slidenum">
+              <a:rPr lang="en-IN" smtClean="0"/>
+              <a:t>19</a:t>
+            </a:fld>
+            <a:endParaRPr lang="en-IN"/>
+          </a:p>
+        </p:txBody>
+      </p:sp>
+    </p:spTree>
+    <p:extLst>
+      <p:ext uri="{BB962C8B-B14F-4D97-AF65-F5344CB8AC3E}">
+        <p14:creationId xmlns:p14="http://schemas.microsoft.com/office/powerpoint/2010/main" val="1314813578"/>
       </p:ext>
     </p:extLst>
   </p:cSld>
@@ -2924,7 +3185,7 @@
           <a:p>
             <a:fld id="{DA33E745-8FE1-47CC-91DA-CD8A7CF025A3}" type="datetime1">
               <a:rPr lang="en-US" smtClean="0"/>
-              <a:t>4/27/2020</a:t>
+              <a:t>4/28/2020</a:t>
             </a:fld>
             <a:endParaRPr lang="en-US" dirty="0"/>
           </a:p>
@@ -3116,7 +3377,7 @@
           <a:p>
             <a:fld id="{D0F87860-D0B0-438C-9AE6-1AD9EE8E8B0E}" type="datetime1">
               <a:rPr lang="en-US" smtClean="0"/>
-              <a:t>4/27/2020</a:t>
+              <a:t>4/28/2020</a:t>
             </a:fld>
             <a:endParaRPr lang="en-US" dirty="0"/>
           </a:p>
@@ -3362,7 +3623,7 @@
           <a:p>
             <a:fld id="{B322B73F-9EB1-4EA4-AD9F-B2980F2457F0}" type="datetime1">
               <a:rPr lang="en-US" smtClean="0"/>
-              <a:t>4/27/2020</a:t>
+              <a:t>4/28/2020</a:t>
             </a:fld>
             <a:endParaRPr lang="en-US" dirty="0"/>
           </a:p>
@@ -3554,7 +3815,7 @@
           <a:p>
             <a:fld id="{729E3528-EB33-475D-8B9A-F28254ACC31C}" type="datetime1">
               <a:rPr lang="en-US" smtClean="0"/>
-              <a:t>4/27/2020</a:t>
+              <a:t>4/28/2020</a:t>
             </a:fld>
             <a:endParaRPr lang="en-US" dirty="0"/>
           </a:p>
@@ -3931,7 +4192,7 @@
           <a:p>
             <a:fld id="{2BEE3975-8C66-4BA8-A7E2-CAB9A35681C1}" type="datetime1">
               <a:rPr lang="en-US" smtClean="0"/>
-              <a:t>4/27/2020</a:t>
+              <a:t>4/28/2020</a:t>
             </a:fld>
             <a:endParaRPr lang="en-US" dirty="0"/>
           </a:p>
@@ -4190,7 +4451,7 @@
           <a:p>
             <a:fld id="{15715BA5-2FD0-4578-8689-EC29B250C8A4}" type="datetime1">
               <a:rPr lang="en-US" smtClean="0"/>
-              <a:t>4/27/2020</a:t>
+              <a:t>4/28/2020</a:t>
             </a:fld>
             <a:endParaRPr lang="en-US" dirty="0"/>
           </a:p>
@@ -4591,7 +4852,7 @@
           <a:p>
             <a:fld id="{30D3F7EE-31C8-4752-93C5-13E9A9E58C9C}" type="datetime1">
               <a:rPr lang="en-US" smtClean="0"/>
-              <a:t>4/27/2020</a:t>
+              <a:t>4/28/2020</a:t>
             </a:fld>
             <a:endParaRPr lang="en-US" dirty="0"/>
           </a:p>
@@ -4731,7 +4992,7 @@
           <a:p>
             <a:fld id="{37E26A07-523D-43DE-8DBE-08FFE0AA0CA1}" type="datetime1">
               <a:rPr lang="en-US" smtClean="0"/>
-              <a:t>4/27/2020</a:t>
+              <a:t>4/28/2020</a:t>
             </a:fld>
             <a:endParaRPr lang="en-US" dirty="0"/>
           </a:p>
@@ -4892,7 +5153,7 @@
           <a:p>
             <a:fld id="{2C9CFBD5-D14A-4300-BA93-A2414E4D5FA5}" type="datetime1">
               <a:rPr lang="en-US" smtClean="0"/>
-              <a:t>4/27/2020</a:t>
+              <a:t>4/28/2020</a:t>
             </a:fld>
             <a:endParaRPr lang="en-US" dirty="0"/>
           </a:p>
@@ -5225,7 +5486,7 @@
           <a:p>
             <a:fld id="{39B460A2-04A8-47A8-9FCB-846A50EC35F0}" type="datetime1">
               <a:rPr lang="en-US" smtClean="0"/>
-              <a:t>4/27/2020</a:t>
+              <a:t>4/28/2020</a:t>
             </a:fld>
             <a:endParaRPr lang="en-US" dirty="0"/>
           </a:p>
@@ -5579,7 +5840,7 @@
           <a:p>
             <a:fld id="{9728EA47-BE8C-4FD8-AADD-542A56491222}" type="datetime1">
               <a:rPr lang="en-US" smtClean="0"/>
-              <a:t>4/27/2020</a:t>
+              <a:t>4/28/2020</a:t>
             </a:fld>
             <a:endParaRPr lang="en-US" dirty="0"/>
           </a:p>
@@ -5844,7 +6105,7 @@
           <a:p>
             <a:fld id="{A89E64EA-8512-4027-A5F4-89414817116A}" type="datetime1">
               <a:rPr lang="en-US" smtClean="0"/>
-              <a:t>4/27/2020</a:t>
+              <a:t>4/28/2020</a:t>
             </a:fld>
             <a:endParaRPr lang="en-US" dirty="0"/>
           </a:p>
@@ -6387,7 +6648,7 @@
                 <a16:creationId xmlns:a16="http://schemas.microsoft.com/office/drawing/2014/main" id="{A9286AD2-18A9-4868-A4E3-7A2097A20810}"/>
               </a:ext>
               <a:ext uri="{C183D7F6-B498-43B3-948B-1728B52AA6E4}">
-                <adec:decorative xmlns:adec="http://schemas.microsoft.com/office/drawing/2017/decorative" xmlns="" val="1"/>
+                <adec:decorative xmlns="" xmlns:adec="http://schemas.microsoft.com/office/drawing/2017/decorative" val="1"/>
               </a:ext>
             </a:extLst>
           </p:cNvPr>
@@ -6589,7 +6850,7 @@
                 <a16:creationId xmlns:a16="http://schemas.microsoft.com/office/drawing/2014/main" id="{E7A7CD63-7EC3-44F3-95D0-595C4019FF24}"/>
               </a:ext>
               <a:ext uri="{C183D7F6-B498-43B3-948B-1728B52AA6E4}">
-                <adec:decorative xmlns:adec="http://schemas.microsoft.com/office/drawing/2017/decorative" xmlns="" val="1"/>
+                <adec:decorative xmlns="" xmlns:adec="http://schemas.microsoft.com/office/drawing/2017/decorative" val="1"/>
               </a:ext>
             </a:extLst>
           </p:cNvPr>
@@ -7786,6 +8047,13 @@
   <p:clrMapOvr>
     <a:masterClrMapping/>
   </p:clrMapOvr>
+  <p:timing>
+    <p:tnLst>
+      <p:par>
+        <p:cTn id="1" dur="indefinite" restart="never" nodeType="tmRoot"/>
+      </p:par>
+    </p:tnLst>
+  </p:timing>
 </p:sld>
 </file>
 
@@ -7872,8 +8140,13 @@
             <a:pPr lvl="1"/>
             <a:r>
               <a:rPr lang="en-IN" dirty="0"/>
-              <a:t>Removal of records with 0 value for Glucose, Blood Sugar, BMI.</a:t>
-            </a:r>
+              <a:t>Removal of records with 0 value for Glucose, Blood Sugar, </a:t>
+            </a:r>
+            <a:r>
+              <a:rPr lang="en-IN" dirty="0" smtClean="0"/>
+              <a:t>BMI, (i.e. all 3 attributes were 0).</a:t>
+            </a:r>
+            <a:endParaRPr lang="en-IN" dirty="0"/>
           </a:p>
           <a:p>
             <a:pPr lvl="1"/>
@@ -8106,8 +8379,13 @@
           <a:p>
             <a:r>
               <a:rPr lang="en-IN" dirty="0"/>
-              <a:t>Correlations in filtered data with strong correlations are listed below</a:t>
-            </a:r>
+              <a:t>Correlations in filtered data </a:t>
+            </a:r>
+            <a:r>
+              <a:rPr lang="en-IN" dirty="0" smtClean="0"/>
+              <a:t>listed below. </a:t>
+            </a:r>
+            <a:endParaRPr lang="en-IN" dirty="0"/>
           </a:p>
           <a:p>
             <a:pPr lvl="1"/>
@@ -8158,8 +8436,18 @@
               <a:t> and </a:t>
             </a:r>
             <a:r>
-              <a:rPr lang="en-IN" i="1" dirty="0"/>
+              <a:rPr lang="en-IN" i="1" dirty="0" smtClean="0"/>
               <a:t>BMI</a:t>
+            </a:r>
+          </a:p>
+          <a:p>
+            <a:r>
+              <a:rPr lang="en-IN" dirty="0" smtClean="0"/>
+              <a:t>Weak correlations were seen, so attributes are </a:t>
+            </a:r>
+            <a:r>
+              <a:rPr lang="en-IN" smtClean="0"/>
+              <a:t>not correlated.</a:t>
             </a:r>
             <a:endParaRPr lang="en-IN" dirty="0"/>
           </a:p>
@@ -14584,13 +14872,7 @@
       </p:grpSpPr>
       <p:sp>
         <p:nvSpPr>
-          <p:cNvPr id="2" name="Title 1">
-            <a:extLst>
-              <a:ext uri="{FF2B5EF4-FFF2-40B4-BE49-F238E27FC236}">
-                <a16:creationId xmlns:a16="http://schemas.microsoft.com/office/drawing/2014/main" id="{EE78CEC5-B211-4638-A0C1-7C0D3E0785F5}"/>
-              </a:ext>
-            </a:extLst>
-          </p:cNvPr>
+          <p:cNvPr id="2" name="Title 1"/>
           <p:cNvSpPr>
             <a:spLocks noGrp="1"/>
           </p:cNvSpPr>
@@ -14604,149 +14886,21 @@
           <a:lstStyle/>
           <a:p>
             <a:r>
-              <a:rPr lang="en-IN" dirty="0"/>
-              <a:t>Conclusion</a:t>
-            </a:r>
-          </a:p>
-        </p:txBody>
-      </p:sp>
-      <p:sp>
-        <p:nvSpPr>
-          <p:cNvPr id="3" name="Content Placeholder 2">
-            <a:extLst>
-              <a:ext uri="{FF2B5EF4-FFF2-40B4-BE49-F238E27FC236}">
-                <a16:creationId xmlns:a16="http://schemas.microsoft.com/office/drawing/2014/main" id="{9C7C6623-5669-4B2E-992D-DDCF446171F6}"/>
-              </a:ext>
-            </a:extLst>
-          </p:cNvPr>
+              <a:rPr lang="en-IN" dirty="0" smtClean="0"/>
+              <a:t>QoC</a:t>
+            </a:r>
+            <a:endParaRPr lang="en-US" dirty="0"/>
+          </a:p>
+        </p:txBody>
+      </p:sp>
+      <p:sp>
+        <p:nvSpPr>
+          <p:cNvPr id="3" name="Content Placeholder 2"/>
           <p:cNvSpPr>
             <a:spLocks noGrp="1"/>
           </p:cNvSpPr>
           <p:nvPr>
             <p:ph idx="1"/>
-          </p:nvPr>
-        </p:nvSpPr>
-        <p:spPr/>
-        <p:txBody>
-          <a:bodyPr>
-            <a:normAutofit fontScale="62500" lnSpcReduction="20000"/>
-          </a:bodyPr>
-          <a:lstStyle/>
-          <a:p>
-            <a:pPr lvl="1" fontAlgn="t">
-              <a:lnSpc>
-                <a:spcPct val="120000"/>
-              </a:lnSpc>
-            </a:pPr>
-            <a:r>
-              <a:rPr lang="en-IN" sz="2400" dirty="0" smtClean="0"/>
-              <a:t>Real-life </a:t>
-            </a:r>
-            <a:r>
-              <a:rPr lang="en-IN" sz="2400" dirty="0"/>
-              <a:t>data on diseases like Diabetes, is not easily separable into clusters using default method of K-means or DBSCAN method. Assumption related to good separated clusters should generate risk-based groups was found to be incorrect.</a:t>
-            </a:r>
-          </a:p>
-          <a:p>
-            <a:pPr lvl="1" fontAlgn="t">
-              <a:lnSpc>
-                <a:spcPct val="120000"/>
-              </a:lnSpc>
-            </a:pPr>
-            <a:r>
-              <a:rPr lang="en-IN" sz="2400" dirty="0"/>
-              <a:t>Unsupervised learning (K-means clustering) helps in analysis of risk-based groups when we find the right set of data attributes.</a:t>
-            </a:r>
-          </a:p>
-          <a:p>
-            <a:pPr lvl="1" fontAlgn="t">
-              <a:lnSpc>
-                <a:spcPct val="120000"/>
-              </a:lnSpc>
-            </a:pPr>
-            <a:r>
-              <a:rPr lang="en-IN" sz="2400" dirty="0"/>
-              <a:t>Random Forest provides better results for attribute selection compared to Average Silhouette Width analysis.</a:t>
-            </a:r>
-          </a:p>
-          <a:p>
-            <a:pPr lvl="1" fontAlgn="t">
-              <a:lnSpc>
-                <a:spcPct val="120000"/>
-              </a:lnSpc>
-            </a:pPr>
-            <a:r>
-              <a:rPr lang="en-IN" sz="2400" dirty="0"/>
-              <a:t>Cluster Confidence Score plays an important role to validate the learning from the model from a medical professional.</a:t>
-            </a:r>
-          </a:p>
-          <a:p>
-            <a:pPr lvl="1" fontAlgn="t">
-              <a:lnSpc>
-                <a:spcPct val="120000"/>
-              </a:lnSpc>
-            </a:pPr>
-            <a:r>
-              <a:rPr lang="en-IN" sz="2400" dirty="0"/>
-              <a:t>Risk-based groups formation was observed after taking the attributes provided by Random Forest approach when prediction accuracy was acquired around 80%.  </a:t>
-            </a:r>
-          </a:p>
-          <a:p>
-            <a:pPr lvl="1" fontAlgn="t">
-              <a:lnSpc>
-                <a:spcPct val="120000"/>
-              </a:lnSpc>
-            </a:pPr>
-            <a:r>
-              <a:rPr lang="en-IN" sz="2400" dirty="0"/>
-              <a:t>QoC for existing and new systems do have similar models based on trend of size of clusters.</a:t>
-            </a:r>
-          </a:p>
-          <a:p>
-            <a:pPr lvl="1"/>
-            <a:endParaRPr lang="en-IN" sz="1800" dirty="0"/>
-          </a:p>
-          <a:p>
-            <a:pPr lvl="0"/>
-            <a:endParaRPr lang="en-IN" dirty="0"/>
-          </a:p>
-          <a:p>
-            <a:pPr marL="0" indent="0">
-              <a:buNone/>
-            </a:pPr>
-            <a:r>
-              <a:rPr lang="en-IN" sz="1800" dirty="0"/>
-              <a:t> </a:t>
-            </a:r>
-          </a:p>
-          <a:p>
-            <a:endParaRPr lang="en-IN" dirty="0"/>
-          </a:p>
-          <a:p>
-            <a:endParaRPr lang="en-IN" dirty="0"/>
-          </a:p>
-          <a:p>
-            <a:endParaRPr lang="en-IN" dirty="0"/>
-          </a:p>
-          <a:p>
-            <a:endParaRPr lang="en-IN" dirty="0"/>
-          </a:p>
-        </p:txBody>
-      </p:sp>
-      <p:sp>
-        <p:nvSpPr>
-          <p:cNvPr id="4" name="Footer Placeholder 3">
-            <a:extLst>
-              <a:ext uri="{FF2B5EF4-FFF2-40B4-BE49-F238E27FC236}">
-                <a16:creationId xmlns:a16="http://schemas.microsoft.com/office/drawing/2014/main" id="{DF343C9C-342F-4516-8475-C8ED1D96ECA3}"/>
-              </a:ext>
-            </a:extLst>
-          </p:cNvPr>
-          <p:cNvSpPr>
-            <a:spLocks noGrp="1"/>
-          </p:cNvSpPr>
-          <p:nvPr>
-            <p:ph type="ftr" sz="quarter" idx="11"/>
           </p:nvPr>
         </p:nvSpPr>
         <p:spPr/>
@@ -14755,7 +14909,80 @@
           <a:lstStyle/>
           <a:p>
             <a:r>
-              <a:rPr lang="en-US"/>
+              <a:rPr lang="en-IN" dirty="0" smtClean="0"/>
+              <a:t>Design is based on 3 factors:</a:t>
+            </a:r>
+          </a:p>
+          <a:p>
+            <a:r>
+              <a:rPr lang="en-IN" dirty="0" smtClean="0"/>
+              <a:t>1. CCS (ideal: &gt; 70, observed: 96)</a:t>
+            </a:r>
+          </a:p>
+          <a:p>
+            <a:r>
+              <a:rPr lang="en-IN" dirty="0" smtClean="0"/>
+              <a:t>2. Slope of high-risk cluster (negative, -2.81)</a:t>
+            </a:r>
+          </a:p>
+          <a:p>
+            <a:r>
+              <a:rPr lang="en-IN" dirty="0" smtClean="0"/>
+              <a:t>3. Error in </a:t>
+            </a:r>
+            <a:r>
+              <a:rPr lang="en-IN" dirty="0"/>
+              <a:t>LM </a:t>
+            </a:r>
+            <a:r>
+              <a:rPr lang="en-IN" dirty="0" smtClean="0"/>
+              <a:t>(multiple </a:t>
+            </a:r>
+            <a:r>
+              <a:rPr lang="en-IN" dirty="0"/>
+              <a:t>R-squared:  0.9588,	</a:t>
+            </a:r>
+            <a:r>
+              <a:rPr lang="en-IN" dirty="0" smtClean="0"/>
+              <a:t>adjusted </a:t>
+            </a:r>
+            <a:r>
+              <a:rPr lang="en-IN" dirty="0"/>
+              <a:t>R-squared:  0.9547</a:t>
+            </a:r>
+            <a:r>
+              <a:rPr lang="en-IN" dirty="0" smtClean="0"/>
+              <a:t>)</a:t>
+            </a:r>
+          </a:p>
+          <a:p>
+            <a:r>
+              <a:rPr lang="en-IN" dirty="0" smtClean="0"/>
+              <a:t>Configurations can be setup to define the predicates for “good”, “average” and “bad” QoC in any system on the above mentioned factors.</a:t>
+            </a:r>
+          </a:p>
+          <a:p>
+            <a:endParaRPr lang="en-US" dirty="0"/>
+          </a:p>
+        </p:txBody>
+      </p:sp>
+      <p:sp>
+        <p:nvSpPr>
+          <p:cNvPr id="4" name="Footer Placeholder 3"/>
+          <p:cNvSpPr>
+            <a:spLocks noGrp="1"/>
+          </p:cNvSpPr>
+          <p:nvPr>
+            <p:ph type="ftr" sz="quarter" idx="11"/>
+          </p:nvPr>
+        </p:nvSpPr>
+        <p:spPr/>
+        <p:txBody>
+          <a:bodyPr/>
+          <a:lstStyle/>
+          <a:p>
+            <a:r>
+              <a:rPr lang="en-US" smtClean="0"/>
               <a:t>Vaibhav Gaikwad (2018HT12597)</a:t>
             </a:r>
             <a:endParaRPr lang="en-US" dirty="0"/>
@@ -14764,13 +14991,7 @@
       </p:sp>
       <p:sp>
         <p:nvSpPr>
-          <p:cNvPr id="5" name="Slide Number Placeholder 4">
-            <a:extLst>
-              <a:ext uri="{FF2B5EF4-FFF2-40B4-BE49-F238E27FC236}">
-                <a16:creationId xmlns:a16="http://schemas.microsoft.com/office/drawing/2014/main" id="{A5691F1F-EB6D-452C-826C-FDE0B81DF43D}"/>
-              </a:ext>
-            </a:extLst>
-          </p:cNvPr>
+          <p:cNvPr id="5" name="Slide Number Placeholder 4"/>
           <p:cNvSpPr>
             <a:spLocks noGrp="1"/>
           </p:cNvSpPr>
@@ -14794,7 +15015,7 @@
     </p:spTree>
     <p:extLst>
       <p:ext uri="{BB962C8B-B14F-4D97-AF65-F5344CB8AC3E}">
-        <p14:creationId xmlns:p14="http://schemas.microsoft.com/office/powerpoint/2010/main" val="3288038167"/>
+        <p14:creationId xmlns:p14="http://schemas.microsoft.com/office/powerpoint/2010/main" val="2661892635"/>
       </p:ext>
     </p:extLst>
   </p:cSld>
@@ -14844,7 +15065,7 @@
                 <a16:creationId xmlns:a16="http://schemas.microsoft.com/office/drawing/2014/main" id="{FBDCECDC-EEE3-4128-AA5E-82A8C08796E8}"/>
               </a:ext>
               <a:ext uri="{C183D7F6-B498-43B3-948B-1728B52AA6E4}">
-                <adec:decorative xmlns:adec="http://schemas.microsoft.com/office/drawing/2017/decorative" xmlns="" val="1"/>
+                <adec:decorative xmlns="" xmlns:adec="http://schemas.microsoft.com/office/drawing/2017/decorative" val="1"/>
               </a:ext>
             </a:extLst>
           </p:cNvPr>
@@ -14947,7 +15168,7 @@
                 <a16:creationId xmlns:a16="http://schemas.microsoft.com/office/drawing/2014/main" id="{4260EDE0-989C-4E16-AF94-F652294D828E}"/>
               </a:ext>
               <a:ext uri="{C183D7F6-B498-43B3-948B-1728B52AA6E4}">
-                <adec:decorative xmlns:adec="http://schemas.microsoft.com/office/drawing/2017/decorative" xmlns="" val="1"/>
+                <adec:decorative xmlns="" xmlns:adec="http://schemas.microsoft.com/office/drawing/2017/decorative" val="1"/>
               </a:ext>
             </a:extLst>
           </p:cNvPr>
@@ -15131,7 +15352,7 @@
           <p:cNvPr id="2" name="Title 1">
             <a:extLst>
               <a:ext uri="{FF2B5EF4-FFF2-40B4-BE49-F238E27FC236}">
-                <a16:creationId xmlns:a16="http://schemas.microsoft.com/office/drawing/2014/main" id="{599B2AC1-B645-47AB-A6C2-1AD107C51238}"/>
+                <a16:creationId xmlns:a16="http://schemas.microsoft.com/office/drawing/2014/main" id="{EE78CEC5-B211-4638-A0C1-7C0D3E0785F5}"/>
               </a:ext>
             </a:extLst>
           </p:cNvPr>
@@ -15149,8 +15370,131 @@
           <a:p>
             <a:r>
               <a:rPr lang="en-IN" dirty="0"/>
-              <a:t>References</a:t>
-            </a:r>
+              <a:t>Conclusion</a:t>
+            </a:r>
+          </a:p>
+        </p:txBody>
+      </p:sp>
+      <p:sp>
+        <p:nvSpPr>
+          <p:cNvPr id="3" name="Content Placeholder 2">
+            <a:extLst>
+              <a:ext uri="{FF2B5EF4-FFF2-40B4-BE49-F238E27FC236}">
+                <a16:creationId xmlns:a16="http://schemas.microsoft.com/office/drawing/2014/main" id="{9C7C6623-5669-4B2E-992D-DDCF446171F6}"/>
+              </a:ext>
+            </a:extLst>
+          </p:cNvPr>
+          <p:cNvSpPr>
+            <a:spLocks noGrp="1"/>
+          </p:cNvSpPr>
+          <p:nvPr>
+            <p:ph idx="1"/>
+          </p:nvPr>
+        </p:nvSpPr>
+        <p:spPr/>
+        <p:txBody>
+          <a:bodyPr>
+            <a:normAutofit fontScale="62500" lnSpcReduction="20000"/>
+          </a:bodyPr>
+          <a:lstStyle/>
+          <a:p>
+            <a:pPr lvl="1" fontAlgn="t">
+              <a:lnSpc>
+                <a:spcPct val="120000"/>
+              </a:lnSpc>
+            </a:pPr>
+            <a:r>
+              <a:rPr lang="en-IN" sz="2400" dirty="0" smtClean="0"/>
+              <a:t>Real-life </a:t>
+            </a:r>
+            <a:r>
+              <a:rPr lang="en-IN" sz="2400" dirty="0"/>
+              <a:t>data on diseases like Diabetes, is not easily separable into clusters using default method of K-means or DBSCAN method. Assumption related to good separated clusters should generate risk-based groups was found to be incorrect.</a:t>
+            </a:r>
+          </a:p>
+          <a:p>
+            <a:pPr lvl="1" fontAlgn="t">
+              <a:lnSpc>
+                <a:spcPct val="120000"/>
+              </a:lnSpc>
+            </a:pPr>
+            <a:r>
+              <a:rPr lang="en-IN" sz="2400" dirty="0"/>
+              <a:t>Unsupervised learning (K-means clustering) helps in analysis of risk-based groups when we find the right set of data attributes.</a:t>
+            </a:r>
+          </a:p>
+          <a:p>
+            <a:pPr lvl="1" fontAlgn="t">
+              <a:lnSpc>
+                <a:spcPct val="120000"/>
+              </a:lnSpc>
+            </a:pPr>
+            <a:r>
+              <a:rPr lang="en-IN" sz="2400" dirty="0"/>
+              <a:t>Random Forest provides better results for attribute selection compared to Average Silhouette Width analysis.</a:t>
+            </a:r>
+          </a:p>
+          <a:p>
+            <a:pPr lvl="1" fontAlgn="t">
+              <a:lnSpc>
+                <a:spcPct val="120000"/>
+              </a:lnSpc>
+            </a:pPr>
+            <a:r>
+              <a:rPr lang="en-IN" sz="2400" dirty="0"/>
+              <a:t>Cluster Confidence Score plays an important role to validate the learning from the model from a medical professional.</a:t>
+            </a:r>
+          </a:p>
+          <a:p>
+            <a:pPr lvl="1" fontAlgn="t">
+              <a:lnSpc>
+                <a:spcPct val="120000"/>
+              </a:lnSpc>
+            </a:pPr>
+            <a:r>
+              <a:rPr lang="en-IN" sz="2400" dirty="0"/>
+              <a:t>Risk-based groups formation was observed after taking the attributes provided by Random Forest approach when prediction accuracy was acquired around 80%.  </a:t>
+            </a:r>
+          </a:p>
+          <a:p>
+            <a:pPr lvl="1" fontAlgn="t">
+              <a:lnSpc>
+                <a:spcPct val="120000"/>
+              </a:lnSpc>
+            </a:pPr>
+            <a:r>
+              <a:rPr lang="en-IN" sz="2400" dirty="0"/>
+              <a:t>QoC for existing and new systems do have similar models based on trend of size of clusters.</a:t>
+            </a:r>
+          </a:p>
+          <a:p>
+            <a:pPr lvl="1"/>
+            <a:endParaRPr lang="en-IN" sz="1800" dirty="0"/>
+          </a:p>
+          <a:p>
+            <a:pPr lvl="0"/>
+            <a:endParaRPr lang="en-IN" dirty="0"/>
+          </a:p>
+          <a:p>
+            <a:pPr marL="0" indent="0">
+              <a:buNone/>
+            </a:pPr>
+            <a:r>
+              <a:rPr lang="en-IN" sz="1800" dirty="0"/>
+              <a:t> </a:t>
+            </a:r>
+          </a:p>
+          <a:p>
+            <a:endParaRPr lang="en-IN" dirty="0"/>
+          </a:p>
+          <a:p>
+            <a:endParaRPr lang="en-IN" dirty="0"/>
+          </a:p>
+          <a:p>
+            <a:endParaRPr lang="en-IN" dirty="0"/>
+          </a:p>
+          <a:p>
+            <a:endParaRPr lang="en-IN" dirty="0"/>
           </a:p>
         </p:txBody>
       </p:sp>
@@ -15159,7 +15503,7 @@
           <p:cNvPr id="4" name="Footer Placeholder 3">
             <a:extLst>
               <a:ext uri="{FF2B5EF4-FFF2-40B4-BE49-F238E27FC236}">
-                <a16:creationId xmlns:a16="http://schemas.microsoft.com/office/drawing/2014/main" id="{DE6B4F98-5A3C-40F4-8F71-2491ABE66B8E}"/>
+                <a16:creationId xmlns:a16="http://schemas.microsoft.com/office/drawing/2014/main" id="{DF343C9C-342F-4516-8475-C8ED1D96ECA3}"/>
               </a:ext>
             </a:extLst>
           </p:cNvPr>
@@ -15188,7 +15532,7 @@
           <p:cNvPr id="5" name="Slide Number Placeholder 4">
             <a:extLst>
               <a:ext uri="{FF2B5EF4-FFF2-40B4-BE49-F238E27FC236}">
-                <a16:creationId xmlns:a16="http://schemas.microsoft.com/office/drawing/2014/main" id="{998E79DC-D345-4C75-BCA8-AB18B93B1749}"/>
+                <a16:creationId xmlns:a16="http://schemas.microsoft.com/office/drawing/2014/main" id="{A5691F1F-EB6D-452C-826C-FDE0B81DF43D}"/>
               </a:ext>
             </a:extLst>
           </p:cNvPr>
@@ -15212,110 +15556,23 @@
           </a:p>
         </p:txBody>
       </p:sp>
-      <p:sp>
-        <p:nvSpPr>
-          <p:cNvPr id="10" name="Content Placeholder 9">
-            <a:extLst>
-              <a:ext uri="{FF2B5EF4-FFF2-40B4-BE49-F238E27FC236}">
-                <a16:creationId xmlns:a16="http://schemas.microsoft.com/office/drawing/2014/main" id="{0EA7C94D-365D-49A8-8A45-62E97ACAFAB1}"/>
-              </a:ext>
-            </a:extLst>
-          </p:cNvPr>
-          <p:cNvSpPr>
-            <a:spLocks noGrp="1"/>
-          </p:cNvSpPr>
-          <p:nvPr>
-            <p:ph idx="1"/>
-          </p:nvPr>
-        </p:nvSpPr>
-        <p:spPr/>
-        <p:txBody>
-          <a:bodyPr/>
-          <a:lstStyle/>
-          <a:p>
-            <a:pPr lvl="1" fontAlgn="t"/>
-            <a:r>
-              <a:rPr lang="en-IN" dirty="0"/>
-              <a:t>M. J. Hallett, J. J. Fan, X. G. </a:t>
-            </a:r>
-            <a:r>
-              <a:rPr lang="en-IN" dirty="0" err="1"/>
-              <a:t>Su</a:t>
-            </a:r>
-            <a:r>
-              <a:rPr lang="en-IN" dirty="0"/>
-              <a:t>, R. A. Levine and M. E. Nunn, “Random forest and variable importance rankings for correlated survival data, with applications to tooth loss,” </a:t>
-            </a:r>
-            <a:r>
-              <a:rPr lang="en-IN" i="1" dirty="0"/>
-              <a:t>Statistical Modelling, </a:t>
-            </a:r>
-            <a:r>
-              <a:rPr lang="en-IN" dirty="0"/>
-              <a:t>pp. 523-547, 2014. </a:t>
-            </a:r>
-          </a:p>
-          <a:p>
-            <a:pPr lvl="1" fontAlgn="t"/>
-            <a:r>
-              <a:rPr lang="en-IN" dirty="0"/>
-              <a:t>B. Rai, “Feature Selection and Predictive </a:t>
-            </a:r>
-            <a:r>
-              <a:rPr lang="en-IN" dirty="0" err="1"/>
-              <a:t>Modeling</a:t>
-            </a:r>
-            <a:r>
-              <a:rPr lang="en-IN" dirty="0"/>
-              <a:t> of Housing Data Using Random Forest,” </a:t>
-            </a:r>
-            <a:r>
-              <a:rPr lang="en-IN" i="1" dirty="0"/>
-              <a:t>International Journal of Business and Economics Engineering, </a:t>
-            </a:r>
-            <a:r>
-              <a:rPr lang="en-IN" dirty="0"/>
-              <a:t>vol. 11, no. 4, pp. 919-923, 2017. </a:t>
-            </a:r>
-          </a:p>
-          <a:p>
-            <a:pPr lvl="1" fontAlgn="t"/>
-            <a:r>
-              <a:rPr lang="en-IN" dirty="0"/>
-              <a:t>C. Chapman and E. M. </a:t>
-            </a:r>
-            <a:r>
-              <a:rPr lang="en-IN" dirty="0" err="1"/>
-              <a:t>Feit</a:t>
-            </a:r>
-            <a:r>
-              <a:rPr lang="en-IN" dirty="0"/>
-              <a:t>, “R for Marketing Research and Analytics,” in </a:t>
-            </a:r>
-            <a:r>
-              <a:rPr lang="en-IN" i="1" dirty="0"/>
-              <a:t>R for Marketing Research and Analytics</a:t>
-            </a:r>
-            <a:r>
-              <a:rPr lang="en-IN" dirty="0"/>
-              <a:t>, Springer Nature, 2015, pp. 331,332,333.</a:t>
-            </a:r>
-          </a:p>
-          <a:p>
-            <a:endParaRPr lang="en-IN" dirty="0"/>
-          </a:p>
-        </p:txBody>
-      </p:sp>
     </p:spTree>
     <p:extLst>
       <p:ext uri="{BB962C8B-B14F-4D97-AF65-F5344CB8AC3E}">
-        <p14:creationId xmlns:p14="http://schemas.microsoft.com/office/powerpoint/2010/main" val="1096407868"/>
+        <p14:creationId xmlns:p14="http://schemas.microsoft.com/office/powerpoint/2010/main" val="3288038167"/>
       </p:ext>
     </p:extLst>
   </p:cSld>
   <p:clrMapOvr>
     <a:masterClrMapping/>
   </p:clrMapOvr>
+  <p:timing>
+    <p:tnLst>
+      <p:par>
+        <p:cTn id="1" dur="indefinite" restart="never" nodeType="tmRoot"/>
+      </p:par>
+    </p:tnLst>
+  </p:timing>
 </p:sld>
 </file>
 
@@ -15338,6 +15595,223 @@
       </p:grpSpPr>
       <p:sp>
         <p:nvSpPr>
+          <p:cNvPr id="2" name="Title 1">
+            <a:extLst>
+              <a:ext uri="{FF2B5EF4-FFF2-40B4-BE49-F238E27FC236}">
+                <a16:creationId xmlns:a16="http://schemas.microsoft.com/office/drawing/2014/main" id="{599B2AC1-B645-47AB-A6C2-1AD107C51238}"/>
+              </a:ext>
+            </a:extLst>
+          </p:cNvPr>
+          <p:cNvSpPr>
+            <a:spLocks noGrp="1"/>
+          </p:cNvSpPr>
+          <p:nvPr>
+            <p:ph type="title"/>
+          </p:nvPr>
+        </p:nvSpPr>
+        <p:spPr/>
+        <p:txBody>
+          <a:bodyPr/>
+          <a:lstStyle/>
+          <a:p>
+            <a:r>
+              <a:rPr lang="en-IN" dirty="0"/>
+              <a:t>References</a:t>
+            </a:r>
+          </a:p>
+        </p:txBody>
+      </p:sp>
+      <p:sp>
+        <p:nvSpPr>
+          <p:cNvPr id="4" name="Footer Placeholder 3">
+            <a:extLst>
+              <a:ext uri="{FF2B5EF4-FFF2-40B4-BE49-F238E27FC236}">
+                <a16:creationId xmlns:a16="http://schemas.microsoft.com/office/drawing/2014/main" id="{DE6B4F98-5A3C-40F4-8F71-2491ABE66B8E}"/>
+              </a:ext>
+            </a:extLst>
+          </p:cNvPr>
+          <p:cNvSpPr>
+            <a:spLocks noGrp="1"/>
+          </p:cNvSpPr>
+          <p:nvPr>
+            <p:ph type="ftr" sz="quarter" idx="11"/>
+          </p:nvPr>
+        </p:nvSpPr>
+        <p:spPr/>
+        <p:txBody>
+          <a:bodyPr/>
+          <a:lstStyle/>
+          <a:p>
+            <a:r>
+              <a:rPr lang="en-US"/>
+              <a:t>Vaibhav Gaikwad (2018HT12597)</a:t>
+            </a:r>
+            <a:endParaRPr lang="en-US" dirty="0"/>
+          </a:p>
+        </p:txBody>
+      </p:sp>
+      <p:sp>
+        <p:nvSpPr>
+          <p:cNvPr id="5" name="Slide Number Placeholder 4">
+            <a:extLst>
+              <a:ext uri="{FF2B5EF4-FFF2-40B4-BE49-F238E27FC236}">
+                <a16:creationId xmlns:a16="http://schemas.microsoft.com/office/drawing/2014/main" id="{998E79DC-D345-4C75-BCA8-AB18B93B1749}"/>
+              </a:ext>
+            </a:extLst>
+          </p:cNvPr>
+          <p:cNvSpPr>
+            <a:spLocks noGrp="1"/>
+          </p:cNvSpPr>
+          <p:nvPr>
+            <p:ph type="sldNum" sz="quarter" idx="12"/>
+          </p:nvPr>
+        </p:nvSpPr>
+        <p:spPr/>
+        <p:txBody>
+          <a:bodyPr/>
+          <a:lstStyle/>
+          <a:p>
+            <a:fld id="{3A98EE3D-8CD1-4C3F-BD1C-C98C9596463C}" type="slidenum">
+              <a:rPr lang="en-US" smtClean="0"/>
+              <a:t>21</a:t>
+            </a:fld>
+            <a:endParaRPr lang="en-US" dirty="0"/>
+          </a:p>
+        </p:txBody>
+      </p:sp>
+      <p:sp>
+        <p:nvSpPr>
+          <p:cNvPr id="10" name="Content Placeholder 9">
+            <a:extLst>
+              <a:ext uri="{FF2B5EF4-FFF2-40B4-BE49-F238E27FC236}">
+                <a16:creationId xmlns:a16="http://schemas.microsoft.com/office/drawing/2014/main" id="{0EA7C94D-365D-49A8-8A45-62E97ACAFAB1}"/>
+              </a:ext>
+            </a:extLst>
+          </p:cNvPr>
+          <p:cNvSpPr>
+            <a:spLocks noGrp="1"/>
+          </p:cNvSpPr>
+          <p:nvPr>
+            <p:ph idx="1"/>
+          </p:nvPr>
+        </p:nvSpPr>
+        <p:spPr/>
+        <p:txBody>
+          <a:bodyPr/>
+          <a:lstStyle/>
+          <a:p>
+            <a:pPr lvl="1" fontAlgn="t"/>
+            <a:r>
+              <a:rPr lang="en-IN" dirty="0"/>
+              <a:t>M. J. Hallett, J. J. Fan, X. G. </a:t>
+            </a:r>
+            <a:r>
+              <a:rPr lang="en-IN" dirty="0" err="1"/>
+              <a:t>Su</a:t>
+            </a:r>
+            <a:r>
+              <a:rPr lang="en-IN" dirty="0"/>
+              <a:t>, R. A. Levine and M. E. Nunn, “Random forest and variable importance rankings for correlated survival data, with applications to tooth loss,” </a:t>
+            </a:r>
+            <a:r>
+              <a:rPr lang="en-IN" i="1" dirty="0"/>
+              <a:t>Statistical Modelling, </a:t>
+            </a:r>
+            <a:r>
+              <a:rPr lang="en-IN" dirty="0"/>
+              <a:t>pp. 523-547, 2014. </a:t>
+            </a:r>
+          </a:p>
+          <a:p>
+            <a:pPr lvl="1" fontAlgn="t"/>
+            <a:r>
+              <a:rPr lang="en-IN" dirty="0"/>
+              <a:t>B. Rai, “Feature Selection and Predictive </a:t>
+            </a:r>
+            <a:r>
+              <a:rPr lang="en-IN" dirty="0" err="1"/>
+              <a:t>Modeling</a:t>
+            </a:r>
+            <a:r>
+              <a:rPr lang="en-IN" dirty="0"/>
+              <a:t> of Housing Data Using Random Forest,” </a:t>
+            </a:r>
+            <a:r>
+              <a:rPr lang="en-IN" i="1" dirty="0"/>
+              <a:t>International Journal of Business and Economics Engineering, </a:t>
+            </a:r>
+            <a:r>
+              <a:rPr lang="en-IN" dirty="0"/>
+              <a:t>vol. 11, no. 4, pp. 919-923, 2017. </a:t>
+            </a:r>
+          </a:p>
+          <a:p>
+            <a:pPr lvl="1" fontAlgn="t"/>
+            <a:r>
+              <a:rPr lang="en-IN" dirty="0"/>
+              <a:t>C. Chapman and E. M. </a:t>
+            </a:r>
+            <a:r>
+              <a:rPr lang="en-IN" dirty="0" err="1"/>
+              <a:t>Feit</a:t>
+            </a:r>
+            <a:r>
+              <a:rPr lang="en-IN" dirty="0"/>
+              <a:t>, “R for Marketing Research and Analytics,” in </a:t>
+            </a:r>
+            <a:r>
+              <a:rPr lang="en-IN" i="1" dirty="0"/>
+              <a:t>R for Marketing Research and Analytics</a:t>
+            </a:r>
+            <a:r>
+              <a:rPr lang="en-IN" dirty="0"/>
+              <a:t>, Springer Nature, 2015, pp. 331,332,333.</a:t>
+            </a:r>
+          </a:p>
+          <a:p>
+            <a:endParaRPr lang="en-IN" dirty="0"/>
+          </a:p>
+        </p:txBody>
+      </p:sp>
+    </p:spTree>
+    <p:extLst>
+      <p:ext uri="{BB962C8B-B14F-4D97-AF65-F5344CB8AC3E}">
+        <p14:creationId xmlns:p14="http://schemas.microsoft.com/office/powerpoint/2010/main" val="1096407868"/>
+      </p:ext>
+    </p:extLst>
+  </p:cSld>
+  <p:clrMapOvr>
+    <a:masterClrMapping/>
+  </p:clrMapOvr>
+  <p:timing>
+    <p:tnLst>
+      <p:par>
+        <p:cTn id="1" dur="indefinite" restart="never" nodeType="tmRoot"/>
+      </p:par>
+    </p:tnLst>
+  </p:timing>
+</p:sld>
+</file>
+
+<file path=ppt/slides/slide22.xml><?xml version="1.0" encoding="utf-8"?>
+<p:sld xmlns:a="http://schemas.openxmlformats.org/drawingml/2006/main" xmlns:r="http://schemas.openxmlformats.org/officeDocument/2006/relationships" xmlns:p="http://schemas.openxmlformats.org/presentationml/2006/main">
+  <p:cSld>
+    <p:spTree>
+      <p:nvGrpSpPr>
+        <p:cNvPr id="1" name=""/>
+        <p:cNvGrpSpPr/>
+        <p:nvPr/>
+      </p:nvGrpSpPr>
+      <p:grpSpPr>
+        <a:xfrm>
+          <a:off x="0" y="0"/>
+          <a:ext cx="0" cy="0"/>
+          <a:chOff x="0" y="0"/>
+          <a:chExt cx="0" cy="0"/>
+        </a:xfrm>
+      </p:grpSpPr>
+      <p:sp>
+        <p:nvSpPr>
           <p:cNvPr id="4" name="TextBox 3">
             <a:extLst>
               <a:ext uri="{FF2B5EF4-FFF2-40B4-BE49-F238E27FC236}">
@@ -15438,6 +15912,13 @@
   <p:clrMapOvr>
     <a:masterClrMapping/>
   </p:clrMapOvr>
+  <p:timing>
+    <p:tnLst>
+      <p:par>
+        <p:cTn id="1" dur="indefinite" restart="never" nodeType="tmRoot"/>
+      </p:par>
+    </p:tnLst>
+  </p:timing>
 </p:sld>
 </file>
 
@@ -16419,6 +16900,13 @@
   <p:clrMapOvr>
     <a:masterClrMapping/>
   </p:clrMapOvr>
+  <p:timing>
+    <p:tnLst>
+      <p:par>
+        <p:cTn id="1" dur="indefinite" restart="never" nodeType="tmRoot"/>
+      </p:par>
+    </p:tnLst>
+  </p:timing>
 </p:sld>
 </file>
 
@@ -16605,7 +17093,7 @@
                 <a14:useLocalDpi xmlns:a14="http://schemas.microsoft.com/office/drawing/2010/main" val="0"/>
               </a:ext>
               <a:ext uri="{96DAC541-7B7A-43D3-8B79-37D633B846F1}">
-                <asvg:svgBlip xmlns:asvg="http://schemas.microsoft.com/office/drawing/2016/SVG/main" xmlns="" r:embed="rId5"/>
+                <asvg:svgBlip xmlns="" xmlns:asvg="http://schemas.microsoft.com/office/drawing/2016/SVG/main" r:embed="rId5"/>
               </a:ext>
             </a:extLst>
           </a:blip>
@@ -16900,6 +17388,13 @@
   <p:clrMapOvr>
     <a:masterClrMapping/>
   </p:clrMapOvr>
+  <p:timing>
+    <p:tnLst>
+      <p:par>
+        <p:cTn id="1" dur="indefinite" restart="never" nodeType="tmRoot"/>
+      </p:par>
+    </p:tnLst>
+  </p:timing>
 </p:sld>
 </file>
 
@@ -17040,17 +17535,12 @@
             </a:r>
             <a:r>
               <a:rPr lang="en-IN" sz="1800" dirty="0" smtClean="0"/>
-              <a:t>application </a:t>
-            </a:r>
-            <a:r>
-              <a:rPr lang="en-IN" sz="1800" dirty="0" smtClean="0"/>
-              <a:t>useful for QoC</a:t>
+              <a:t>application useful for QoC</a:t>
             </a:r>
             <a:r>
               <a:rPr lang="en-IN" sz="1800" dirty="0"/>
               <a:t>.</a:t>
             </a:r>
-            <a:endParaRPr lang="en-IN" sz="1800" dirty="0"/>
           </a:p>
           <a:p>
             <a:pPr lvl="1">
@@ -17835,6 +18325,13 @@
   <p:clrMapOvr>
     <a:masterClrMapping/>
   </p:clrMapOvr>
+  <p:timing>
+    <p:tnLst>
+      <p:par>
+        <p:cTn id="1" dur="indefinite" restart="never" nodeType="tmRoot"/>
+      </p:par>
+    </p:tnLst>
+  </p:timing>
 </p:sld>
 </file>
 

</xml_diff>